<commit_message>
ISIS-2205: converts IsisXxxModule into Spring @Configurations
same as the IsisBootXxx classes
</commit_message>
<xml_diff>
--- a/antora/components/core/modules/archdesign/attachments/isis-configurations-and-modules.pptx
+++ b/antora/components/core/modules/archdesign/attachments/isis-configurations-and-modules.pptx
@@ -261,7 +261,7 @@
           <a:p>
             <a:fld id="{3159BD86-569B-442C-ABE1-0B002BE59BAD}" type="datetimeFigureOut">
               <a:rPr lang="en-GB" smtClean="0"/>
-              <a:t>03/12/2019</a:t>
+              <a:t>04/12/2019</a:t>
             </a:fld>
             <a:endParaRPr lang="en-GB"/>
           </a:p>
@@ -461,7 +461,7 @@
           <a:p>
             <a:fld id="{3159BD86-569B-442C-ABE1-0B002BE59BAD}" type="datetimeFigureOut">
               <a:rPr lang="en-GB" smtClean="0"/>
-              <a:t>03/12/2019</a:t>
+              <a:t>04/12/2019</a:t>
             </a:fld>
             <a:endParaRPr lang="en-GB"/>
           </a:p>
@@ -671,7 +671,7 @@
           <a:p>
             <a:fld id="{3159BD86-569B-442C-ABE1-0B002BE59BAD}" type="datetimeFigureOut">
               <a:rPr lang="en-GB" smtClean="0"/>
-              <a:t>03/12/2019</a:t>
+              <a:t>04/12/2019</a:t>
             </a:fld>
             <a:endParaRPr lang="en-GB"/>
           </a:p>
@@ -871,7 +871,7 @@
           <a:p>
             <a:fld id="{3159BD86-569B-442C-ABE1-0B002BE59BAD}" type="datetimeFigureOut">
               <a:rPr lang="en-GB" smtClean="0"/>
-              <a:t>03/12/2019</a:t>
+              <a:t>04/12/2019</a:t>
             </a:fld>
             <a:endParaRPr lang="en-GB"/>
           </a:p>
@@ -1147,7 +1147,7 @@
           <a:p>
             <a:fld id="{3159BD86-569B-442C-ABE1-0B002BE59BAD}" type="datetimeFigureOut">
               <a:rPr lang="en-GB" smtClean="0"/>
-              <a:t>03/12/2019</a:t>
+              <a:t>04/12/2019</a:t>
             </a:fld>
             <a:endParaRPr lang="en-GB"/>
           </a:p>
@@ -1415,7 +1415,7 @@
           <a:p>
             <a:fld id="{3159BD86-569B-442C-ABE1-0B002BE59BAD}" type="datetimeFigureOut">
               <a:rPr lang="en-GB" smtClean="0"/>
-              <a:t>03/12/2019</a:t>
+              <a:t>04/12/2019</a:t>
             </a:fld>
             <a:endParaRPr lang="en-GB"/>
           </a:p>
@@ -1830,7 +1830,7 @@
           <a:p>
             <a:fld id="{3159BD86-569B-442C-ABE1-0B002BE59BAD}" type="datetimeFigureOut">
               <a:rPr lang="en-GB" smtClean="0"/>
-              <a:t>03/12/2019</a:t>
+              <a:t>04/12/2019</a:t>
             </a:fld>
             <a:endParaRPr lang="en-GB"/>
           </a:p>
@@ -1972,7 +1972,7 @@
           <a:p>
             <a:fld id="{3159BD86-569B-442C-ABE1-0B002BE59BAD}" type="datetimeFigureOut">
               <a:rPr lang="en-GB" smtClean="0"/>
-              <a:t>03/12/2019</a:t>
+              <a:t>04/12/2019</a:t>
             </a:fld>
             <a:endParaRPr lang="en-GB"/>
           </a:p>
@@ -2085,7 +2085,7 @@
           <a:p>
             <a:fld id="{3159BD86-569B-442C-ABE1-0B002BE59BAD}" type="datetimeFigureOut">
               <a:rPr lang="en-GB" smtClean="0"/>
-              <a:t>03/12/2019</a:t>
+              <a:t>04/12/2019</a:t>
             </a:fld>
             <a:endParaRPr lang="en-GB"/>
           </a:p>
@@ -2398,7 +2398,7 @@
           <a:p>
             <a:fld id="{3159BD86-569B-442C-ABE1-0B002BE59BAD}" type="datetimeFigureOut">
               <a:rPr lang="en-GB" smtClean="0"/>
-              <a:t>03/12/2019</a:t>
+              <a:t>04/12/2019</a:t>
             </a:fld>
             <a:endParaRPr lang="en-GB"/>
           </a:p>
@@ -2687,7 +2687,7 @@
           <a:p>
             <a:fld id="{3159BD86-569B-442C-ABE1-0B002BE59BAD}" type="datetimeFigureOut">
               <a:rPr lang="en-GB" smtClean="0"/>
-              <a:t>03/12/2019</a:t>
+              <a:t>04/12/2019</a:t>
             </a:fld>
             <a:endParaRPr lang="en-GB"/>
           </a:p>
@@ -2930,7 +2930,7 @@
           <a:p>
             <a:fld id="{3159BD86-569B-442C-ABE1-0B002BE59BAD}" type="datetimeFigureOut">
               <a:rPr lang="en-GB" smtClean="0"/>
-              <a:t>03/12/2019</a:t>
+              <a:t>04/12/2019</a:t>
             </a:fld>
             <a:endParaRPr lang="en-GB"/>
           </a:p>
@@ -4309,8 +4309,532 @@
         </p:nvSpPr>
         <p:spPr>
           <a:xfrm>
-            <a:off x="170074" y="1107939"/>
+            <a:off x="622639" y="134392"/>
             <a:ext cx="1538205" cy="486032"/>
+          </a:xfrm>
+          <a:prstGeom prst="rect">
+            <a:avLst/>
+          </a:prstGeom>
+        </p:spPr>
+        <p:style>
+          <a:lnRef idx="2">
+            <a:schemeClr val="accent1">
+              <a:shade val="50000"/>
+            </a:schemeClr>
+          </a:lnRef>
+          <a:fillRef idx="1">
+            <a:schemeClr val="accent1"/>
+          </a:fillRef>
+          <a:effectRef idx="0">
+            <a:schemeClr val="accent1"/>
+          </a:effectRef>
+          <a:fontRef idx="minor">
+            <a:schemeClr val="lt1"/>
+          </a:fontRef>
+        </p:style>
+        <p:txBody>
+          <a:bodyPr rtlCol="0" anchor="ctr"/>
+          <a:lstStyle/>
+          <a:p>
+            <a:pPr algn="ctr"/>
+            <a:r>
+              <a:rPr lang="en-GB" sz="1200" dirty="0" err="1"/>
+              <a:t>IsisApplib</a:t>
+            </a:r>
+            <a:br>
+              <a:rPr lang="en-GB" sz="1200" dirty="0"/>
+            </a:br>
+            <a:r>
+              <a:rPr lang="en-GB" sz="1200" dirty="0"/>
+              <a:t>Module</a:t>
+            </a:r>
+          </a:p>
+        </p:txBody>
+      </p:sp>
+      <p:sp>
+        <p:nvSpPr>
+          <p:cNvPr id="81" name="Rectangle 80">
+            <a:extLst>
+              <a:ext uri="{FF2B5EF4-FFF2-40B4-BE49-F238E27FC236}">
+                <a16:creationId xmlns:a16="http://schemas.microsoft.com/office/drawing/2014/main" id="{9628B3BA-B27E-4A22-82C8-2C262BA1DABF}"/>
+              </a:ext>
+            </a:extLst>
+          </p:cNvPr>
+          <p:cNvSpPr/>
+          <p:nvPr/>
+        </p:nvSpPr>
+        <p:spPr>
+          <a:xfrm>
+            <a:off x="2982980" y="128614"/>
+            <a:ext cx="1538205" cy="486032"/>
+          </a:xfrm>
+          <a:prstGeom prst="rect">
+            <a:avLst/>
+          </a:prstGeom>
+        </p:spPr>
+        <p:style>
+          <a:lnRef idx="2">
+            <a:schemeClr val="accent1">
+              <a:shade val="50000"/>
+            </a:schemeClr>
+          </a:lnRef>
+          <a:fillRef idx="1">
+            <a:schemeClr val="accent1"/>
+          </a:fillRef>
+          <a:effectRef idx="0">
+            <a:schemeClr val="accent1"/>
+          </a:effectRef>
+          <a:fontRef idx="minor">
+            <a:schemeClr val="lt1"/>
+          </a:fontRef>
+        </p:style>
+        <p:txBody>
+          <a:bodyPr rtlCol="0" anchor="ctr"/>
+          <a:lstStyle/>
+          <a:p>
+            <a:pPr algn="ctr"/>
+            <a:r>
+              <a:rPr lang="en-GB" sz="1200" dirty="0" err="1"/>
+              <a:t>IsisMetamodel</a:t>
+            </a:r>
+            <a:br>
+              <a:rPr lang="en-GB" sz="1200" dirty="0"/>
+            </a:br>
+            <a:r>
+              <a:rPr lang="en-GB" sz="1200" dirty="0"/>
+              <a:t>Module</a:t>
+            </a:r>
+          </a:p>
+        </p:txBody>
+      </p:sp>
+      <p:sp>
+        <p:nvSpPr>
+          <p:cNvPr id="83" name="Rectangle 82">
+            <a:extLst>
+              <a:ext uri="{FF2B5EF4-FFF2-40B4-BE49-F238E27FC236}">
+                <a16:creationId xmlns:a16="http://schemas.microsoft.com/office/drawing/2014/main" id="{A4DD96EA-3E39-4D05-A946-0B7EDF5A51A1}"/>
+              </a:ext>
+            </a:extLst>
+          </p:cNvPr>
+          <p:cNvSpPr/>
+          <p:nvPr/>
+        </p:nvSpPr>
+        <p:spPr>
+          <a:xfrm>
+            <a:off x="2982980" y="900429"/>
+            <a:ext cx="1538205" cy="486032"/>
+          </a:xfrm>
+          <a:prstGeom prst="rect">
+            <a:avLst/>
+          </a:prstGeom>
+        </p:spPr>
+        <p:style>
+          <a:lnRef idx="2">
+            <a:schemeClr val="accent1">
+              <a:shade val="50000"/>
+            </a:schemeClr>
+          </a:lnRef>
+          <a:fillRef idx="1">
+            <a:schemeClr val="accent1"/>
+          </a:fillRef>
+          <a:effectRef idx="0">
+            <a:schemeClr val="accent1"/>
+          </a:effectRef>
+          <a:fontRef idx="minor">
+            <a:schemeClr val="lt1"/>
+          </a:fontRef>
+        </p:style>
+        <p:txBody>
+          <a:bodyPr rtlCol="0" anchor="ctr"/>
+          <a:lstStyle/>
+          <a:p>
+            <a:pPr algn="ctr"/>
+            <a:r>
+              <a:rPr lang="en-GB" sz="1200" dirty="0" err="1"/>
+              <a:t>IsisRuntime</a:t>
+            </a:r>
+            <a:br>
+              <a:rPr lang="en-GB" sz="1200" dirty="0"/>
+            </a:br>
+            <a:r>
+              <a:rPr lang="en-GB" sz="1200" dirty="0"/>
+              <a:t>Module</a:t>
+            </a:r>
+          </a:p>
+        </p:txBody>
+      </p:sp>
+      <p:cxnSp>
+        <p:nvCxnSpPr>
+          <p:cNvPr id="84" name="Connector: Curved 83">
+            <a:extLst>
+              <a:ext uri="{FF2B5EF4-FFF2-40B4-BE49-F238E27FC236}">
+                <a16:creationId xmlns:a16="http://schemas.microsoft.com/office/drawing/2014/main" id="{6484D11A-DBAB-4364-B77A-37674B39B183}"/>
+              </a:ext>
+            </a:extLst>
+          </p:cNvPr>
+          <p:cNvCxnSpPr>
+            <a:cxnSpLocks/>
+            <a:stCxn id="81" idx="1"/>
+            <a:endCxn id="80" idx="3"/>
+          </p:cNvCxnSpPr>
+          <p:nvPr/>
+        </p:nvCxnSpPr>
+        <p:spPr>
+          <a:xfrm rot="10800000" flipV="1">
+            <a:off x="2160844" y="371630"/>
+            <a:ext cx="822136" cy="5778"/>
+          </a:xfrm>
+          <a:prstGeom prst="curvedConnector3">
+            <a:avLst>
+              <a:gd name="adj1" fmla="val 50000"/>
+            </a:avLst>
+          </a:prstGeom>
+          <a:ln>
+            <a:prstDash val="solid"/>
+            <a:tailEnd type="triangle"/>
+          </a:ln>
+        </p:spPr>
+        <p:style>
+          <a:lnRef idx="1">
+            <a:schemeClr val="accent1"/>
+          </a:lnRef>
+          <a:fillRef idx="0">
+            <a:schemeClr val="accent1"/>
+          </a:fillRef>
+          <a:effectRef idx="0">
+            <a:schemeClr val="accent1"/>
+          </a:effectRef>
+          <a:fontRef idx="minor">
+            <a:schemeClr val="tx1"/>
+          </a:fontRef>
+        </p:style>
+      </p:cxnSp>
+      <p:cxnSp>
+        <p:nvCxnSpPr>
+          <p:cNvPr id="90" name="Connector: Curved 89">
+            <a:extLst>
+              <a:ext uri="{FF2B5EF4-FFF2-40B4-BE49-F238E27FC236}">
+                <a16:creationId xmlns:a16="http://schemas.microsoft.com/office/drawing/2014/main" id="{87E4CFA5-AF76-42C7-A763-3D44C7292444}"/>
+              </a:ext>
+            </a:extLst>
+          </p:cNvPr>
+          <p:cNvCxnSpPr>
+            <a:cxnSpLocks/>
+            <a:stCxn id="83" idx="1"/>
+            <a:endCxn id="81" idx="3"/>
+          </p:cNvCxnSpPr>
+          <p:nvPr/>
+        </p:nvCxnSpPr>
+        <p:spPr>
+          <a:xfrm rot="10800000" flipH="1">
+            <a:off x="2982979" y="371631"/>
+            <a:ext cx="1538205" cy="771815"/>
+          </a:xfrm>
+          <a:prstGeom prst="curvedConnector5">
+            <a:avLst>
+              <a:gd name="adj1" fmla="val -14861"/>
+              <a:gd name="adj2" fmla="val 50000"/>
+              <a:gd name="adj3" fmla="val 114861"/>
+            </a:avLst>
+          </a:prstGeom>
+          <a:ln>
+            <a:prstDash val="solid"/>
+            <a:tailEnd type="triangle"/>
+          </a:ln>
+        </p:spPr>
+        <p:style>
+          <a:lnRef idx="1">
+            <a:schemeClr val="accent1"/>
+          </a:lnRef>
+          <a:fillRef idx="0">
+            <a:schemeClr val="accent1"/>
+          </a:fillRef>
+          <a:effectRef idx="0">
+            <a:schemeClr val="accent1"/>
+          </a:effectRef>
+          <a:fontRef idx="minor">
+            <a:schemeClr val="tx1"/>
+          </a:fontRef>
+        </p:style>
+      </p:cxnSp>
+      <p:cxnSp>
+        <p:nvCxnSpPr>
+          <p:cNvPr id="93" name="Connector: Curved 92">
+            <a:extLst>
+              <a:ext uri="{FF2B5EF4-FFF2-40B4-BE49-F238E27FC236}">
+                <a16:creationId xmlns:a16="http://schemas.microsoft.com/office/drawing/2014/main" id="{9490D9E0-ABAC-46C9-9164-37B6D5C8FF84}"/>
+              </a:ext>
+            </a:extLst>
+          </p:cNvPr>
+          <p:cNvCxnSpPr>
+            <a:cxnSpLocks/>
+            <a:stCxn id="99" idx="1"/>
+            <a:endCxn id="83" idx="3"/>
+          </p:cNvCxnSpPr>
+          <p:nvPr/>
+        </p:nvCxnSpPr>
+        <p:spPr>
+          <a:xfrm rot="10800000" flipH="1">
+            <a:off x="3048143" y="1143445"/>
+            <a:ext cx="1473042" cy="775182"/>
+          </a:xfrm>
+          <a:prstGeom prst="curvedConnector5">
+            <a:avLst>
+              <a:gd name="adj1" fmla="val -15519"/>
+              <a:gd name="adj2" fmla="val 50000"/>
+              <a:gd name="adj3" fmla="val 115519"/>
+            </a:avLst>
+          </a:prstGeom>
+          <a:ln>
+            <a:prstDash val="solid"/>
+            <a:tailEnd type="triangle"/>
+          </a:ln>
+        </p:spPr>
+        <p:style>
+          <a:lnRef idx="1">
+            <a:schemeClr val="accent1"/>
+          </a:lnRef>
+          <a:fillRef idx="0">
+            <a:schemeClr val="accent1"/>
+          </a:fillRef>
+          <a:effectRef idx="0">
+            <a:schemeClr val="accent1"/>
+          </a:effectRef>
+          <a:fontRef idx="minor">
+            <a:schemeClr val="tx1"/>
+          </a:fontRef>
+        </p:style>
+      </p:cxnSp>
+      <p:sp>
+        <p:nvSpPr>
+          <p:cNvPr id="99" name="Rectangle 98">
+            <a:extLst>
+              <a:ext uri="{FF2B5EF4-FFF2-40B4-BE49-F238E27FC236}">
+                <a16:creationId xmlns:a16="http://schemas.microsoft.com/office/drawing/2014/main" id="{9411BEDB-9F4E-48A0-802D-3363014B0B78}"/>
+              </a:ext>
+            </a:extLst>
+          </p:cNvPr>
+          <p:cNvSpPr/>
+          <p:nvPr/>
+        </p:nvSpPr>
+        <p:spPr>
+          <a:xfrm>
+            <a:off x="3048143" y="1675611"/>
+            <a:ext cx="1538205" cy="486032"/>
+          </a:xfrm>
+          <a:prstGeom prst="rect">
+            <a:avLst/>
+          </a:prstGeom>
+        </p:spPr>
+        <p:style>
+          <a:lnRef idx="2">
+            <a:schemeClr val="accent1">
+              <a:shade val="50000"/>
+            </a:schemeClr>
+          </a:lnRef>
+          <a:fillRef idx="1">
+            <a:schemeClr val="accent1"/>
+          </a:fillRef>
+          <a:effectRef idx="0">
+            <a:schemeClr val="accent1"/>
+          </a:effectRef>
+          <a:fontRef idx="minor">
+            <a:schemeClr val="lt1"/>
+          </a:fontRef>
+        </p:style>
+        <p:txBody>
+          <a:bodyPr rtlCol="0" anchor="ctr"/>
+          <a:lstStyle/>
+          <a:p>
+            <a:pPr algn="ctr"/>
+            <a:r>
+              <a:rPr lang="en-GB" sz="1200" dirty="0" err="1"/>
+              <a:t>IsisRuntimeServices</a:t>
+            </a:r>
+            <a:br>
+              <a:rPr lang="en-GB" sz="1200" dirty="0"/>
+            </a:br>
+            <a:r>
+              <a:rPr lang="en-GB" sz="1200" dirty="0"/>
+              <a:t>Module</a:t>
+            </a:r>
+          </a:p>
+        </p:txBody>
+      </p:sp>
+      <p:cxnSp>
+        <p:nvCxnSpPr>
+          <p:cNvPr id="101" name="Connector: Curved 100">
+            <a:extLst>
+              <a:ext uri="{FF2B5EF4-FFF2-40B4-BE49-F238E27FC236}">
+                <a16:creationId xmlns:a16="http://schemas.microsoft.com/office/drawing/2014/main" id="{32116EEB-BD70-457A-A7B4-0D5746ABEF16}"/>
+              </a:ext>
+            </a:extLst>
+          </p:cNvPr>
+          <p:cNvCxnSpPr>
+            <a:cxnSpLocks/>
+            <a:stCxn id="9" idx="1"/>
+            <a:endCxn id="99" idx="3"/>
+          </p:cNvCxnSpPr>
+          <p:nvPr/>
+        </p:nvCxnSpPr>
+        <p:spPr>
+          <a:xfrm rot="10800000" flipV="1">
+            <a:off x="4586349" y="1916049"/>
+            <a:ext cx="577621" cy="2578"/>
+          </a:xfrm>
+          <a:prstGeom prst="curvedConnector3">
+            <a:avLst>
+              <a:gd name="adj1" fmla="val 50000"/>
+            </a:avLst>
+          </a:prstGeom>
+          <a:ln>
+            <a:prstDash val="solid"/>
+            <a:tailEnd type="triangle"/>
+          </a:ln>
+        </p:spPr>
+        <p:style>
+          <a:lnRef idx="1">
+            <a:schemeClr val="accent1"/>
+          </a:lnRef>
+          <a:fillRef idx="0">
+            <a:schemeClr val="accent1"/>
+          </a:fillRef>
+          <a:effectRef idx="0">
+            <a:schemeClr val="accent1"/>
+          </a:effectRef>
+          <a:fontRef idx="minor">
+            <a:schemeClr val="tx1"/>
+          </a:fontRef>
+        </p:style>
+      </p:cxnSp>
+      <p:sp>
+        <p:nvSpPr>
+          <p:cNvPr id="111" name="Rectangle 110">
+            <a:extLst>
+              <a:ext uri="{FF2B5EF4-FFF2-40B4-BE49-F238E27FC236}">
+                <a16:creationId xmlns:a16="http://schemas.microsoft.com/office/drawing/2014/main" id="{9D4E7237-01E5-4455-A567-99B66E54CF3B}"/>
+              </a:ext>
+            </a:extLst>
+          </p:cNvPr>
+          <p:cNvSpPr/>
+          <p:nvPr/>
+        </p:nvSpPr>
+        <p:spPr>
+          <a:xfrm>
+            <a:off x="622638" y="900429"/>
+            <a:ext cx="1538205" cy="486032"/>
+          </a:xfrm>
+          <a:prstGeom prst="rect">
+            <a:avLst/>
+          </a:prstGeom>
+        </p:spPr>
+        <p:style>
+          <a:lnRef idx="2">
+            <a:schemeClr val="accent1">
+              <a:shade val="50000"/>
+            </a:schemeClr>
+          </a:lnRef>
+          <a:fillRef idx="1">
+            <a:schemeClr val="accent1"/>
+          </a:fillRef>
+          <a:effectRef idx="0">
+            <a:schemeClr val="accent1"/>
+          </a:effectRef>
+          <a:fontRef idx="minor">
+            <a:schemeClr val="lt1"/>
+          </a:fontRef>
+        </p:style>
+        <p:txBody>
+          <a:bodyPr rtlCol="0" anchor="ctr"/>
+          <a:lstStyle/>
+          <a:p>
+            <a:pPr algn="ctr"/>
+            <a:r>
+              <a:rPr lang="en-GB" sz="1200" dirty="0" err="1"/>
+              <a:t>IsisConfig</a:t>
+            </a:r>
+            <a:br>
+              <a:rPr lang="en-GB" sz="1200" dirty="0"/>
+            </a:br>
+            <a:r>
+              <a:rPr lang="en-GB" sz="1200" dirty="0"/>
+              <a:t>Module</a:t>
+            </a:r>
+          </a:p>
+        </p:txBody>
+      </p:sp>
+      <p:sp>
+        <p:nvSpPr>
+          <p:cNvPr id="120" name="Rectangle 119">
+            <a:extLst>
+              <a:ext uri="{FF2B5EF4-FFF2-40B4-BE49-F238E27FC236}">
+                <a16:creationId xmlns:a16="http://schemas.microsoft.com/office/drawing/2014/main" id="{C37653D5-41D4-4C2D-82D7-604F34FD559F}"/>
+              </a:ext>
+            </a:extLst>
+          </p:cNvPr>
+          <p:cNvSpPr/>
+          <p:nvPr/>
+        </p:nvSpPr>
+        <p:spPr>
+          <a:xfrm>
+            <a:off x="9761435" y="6314915"/>
+            <a:ext cx="1089327" cy="369134"/>
+          </a:xfrm>
+          <a:prstGeom prst="rect">
+            <a:avLst/>
+          </a:prstGeom>
+        </p:spPr>
+        <p:style>
+          <a:lnRef idx="2">
+            <a:schemeClr val="accent1">
+              <a:shade val="50000"/>
+            </a:schemeClr>
+          </a:lnRef>
+          <a:fillRef idx="1">
+            <a:schemeClr val="accent1"/>
+          </a:fillRef>
+          <a:effectRef idx="0">
+            <a:schemeClr val="accent1"/>
+          </a:effectRef>
+          <a:fontRef idx="minor">
+            <a:schemeClr val="lt1"/>
+          </a:fontRef>
+        </p:style>
+        <p:txBody>
+          <a:bodyPr rtlCol="0" anchor="ctr"/>
+          <a:lstStyle/>
+          <a:p>
+            <a:pPr algn="ctr"/>
+            <a:r>
+              <a:rPr lang="en-GB" sz="1050" dirty="0"/>
+              <a:t>@Configuration</a:t>
+            </a:r>
+            <a:br>
+              <a:rPr lang="en-GB" sz="1050" dirty="0"/>
+            </a:br>
+            <a:r>
+              <a:rPr lang="en-GB" sz="1050" dirty="0"/>
+              <a:t>(framework)</a:t>
+            </a:r>
+          </a:p>
+        </p:txBody>
+      </p:sp>
+      <p:sp>
+        <p:nvSpPr>
+          <p:cNvPr id="121" name="Rectangle 120">
+            <a:extLst>
+              <a:ext uri="{FF2B5EF4-FFF2-40B4-BE49-F238E27FC236}">
+                <a16:creationId xmlns:a16="http://schemas.microsoft.com/office/drawing/2014/main" id="{ABD6177F-CA4F-4D0C-AA72-86A4B8EB8B5A}"/>
+              </a:ext>
+            </a:extLst>
+          </p:cNvPr>
+          <p:cNvSpPr/>
+          <p:nvPr/>
+        </p:nvSpPr>
+        <p:spPr>
+          <a:xfrm>
+            <a:off x="7370785" y="6314915"/>
+            <a:ext cx="1089327" cy="369134"/>
           </a:xfrm>
           <a:prstGeom prst="rect">
             <a:avLst/>
@@ -4338,668 +4862,6 @@
           <a:p>
             <a:pPr algn="ctr"/>
             <a:r>
-              <a:rPr lang="en-GB" sz="1200" dirty="0" err="1"/>
-              <a:t>IsisApplib</a:t>
-            </a:r>
-            <a:br>
-              <a:rPr lang="en-GB" sz="1200" dirty="0"/>
-            </a:br>
-            <a:r>
-              <a:rPr lang="en-GB" sz="1200" dirty="0"/>
-              <a:t>Module</a:t>
-            </a:r>
-          </a:p>
-        </p:txBody>
-      </p:sp>
-      <p:sp>
-        <p:nvSpPr>
-          <p:cNvPr id="81" name="Rectangle 80">
-            <a:extLst>
-              <a:ext uri="{FF2B5EF4-FFF2-40B4-BE49-F238E27FC236}">
-                <a16:creationId xmlns:a16="http://schemas.microsoft.com/office/drawing/2014/main" id="{9628B3BA-B27E-4A22-82C8-2C262BA1DABF}"/>
-              </a:ext>
-            </a:extLst>
-          </p:cNvPr>
-          <p:cNvSpPr/>
-          <p:nvPr/>
-        </p:nvSpPr>
-        <p:spPr>
-          <a:xfrm>
-            <a:off x="170074" y="1719092"/>
-            <a:ext cx="1538205" cy="486032"/>
-          </a:xfrm>
-          <a:prstGeom prst="rect">
-            <a:avLst/>
-          </a:prstGeom>
-        </p:spPr>
-        <p:style>
-          <a:lnRef idx="2">
-            <a:schemeClr val="accent2">
-              <a:shade val="50000"/>
-            </a:schemeClr>
-          </a:lnRef>
-          <a:fillRef idx="1">
-            <a:schemeClr val="accent2"/>
-          </a:fillRef>
-          <a:effectRef idx="0">
-            <a:schemeClr val="accent2"/>
-          </a:effectRef>
-          <a:fontRef idx="minor">
-            <a:schemeClr val="lt1"/>
-          </a:fontRef>
-        </p:style>
-        <p:txBody>
-          <a:bodyPr rtlCol="0" anchor="ctr"/>
-          <a:lstStyle/>
-          <a:p>
-            <a:pPr algn="ctr"/>
-            <a:r>
-              <a:rPr lang="en-GB" sz="1200" dirty="0" err="1"/>
-              <a:t>IsisMetamodel</a:t>
-            </a:r>
-            <a:br>
-              <a:rPr lang="en-GB" sz="1200" dirty="0"/>
-            </a:br>
-            <a:r>
-              <a:rPr lang="en-GB" sz="1200" dirty="0"/>
-              <a:t>Module</a:t>
-            </a:r>
-          </a:p>
-        </p:txBody>
-      </p:sp>
-      <p:sp>
-        <p:nvSpPr>
-          <p:cNvPr id="83" name="Rectangle 82">
-            <a:extLst>
-              <a:ext uri="{FF2B5EF4-FFF2-40B4-BE49-F238E27FC236}">
-                <a16:creationId xmlns:a16="http://schemas.microsoft.com/office/drawing/2014/main" id="{A4DD96EA-3E39-4D05-A946-0B7EDF5A51A1}"/>
-              </a:ext>
-            </a:extLst>
-          </p:cNvPr>
-          <p:cNvSpPr/>
-          <p:nvPr/>
-        </p:nvSpPr>
-        <p:spPr>
-          <a:xfrm>
-            <a:off x="182394" y="2330245"/>
-            <a:ext cx="1538205" cy="486032"/>
-          </a:xfrm>
-          <a:prstGeom prst="rect">
-            <a:avLst/>
-          </a:prstGeom>
-        </p:spPr>
-        <p:style>
-          <a:lnRef idx="2">
-            <a:schemeClr val="accent2">
-              <a:shade val="50000"/>
-            </a:schemeClr>
-          </a:lnRef>
-          <a:fillRef idx="1">
-            <a:schemeClr val="accent2"/>
-          </a:fillRef>
-          <a:effectRef idx="0">
-            <a:schemeClr val="accent2"/>
-          </a:effectRef>
-          <a:fontRef idx="minor">
-            <a:schemeClr val="lt1"/>
-          </a:fontRef>
-        </p:style>
-        <p:txBody>
-          <a:bodyPr rtlCol="0" anchor="ctr"/>
-          <a:lstStyle/>
-          <a:p>
-            <a:pPr algn="ctr"/>
-            <a:r>
-              <a:rPr lang="en-GB" sz="1200" dirty="0" err="1"/>
-              <a:t>IsisRuntime</a:t>
-            </a:r>
-            <a:br>
-              <a:rPr lang="en-GB" sz="1200" dirty="0"/>
-            </a:br>
-            <a:r>
-              <a:rPr lang="en-GB" sz="1200" dirty="0"/>
-              <a:t>Module</a:t>
-            </a:r>
-          </a:p>
-        </p:txBody>
-      </p:sp>
-      <p:cxnSp>
-        <p:nvCxnSpPr>
-          <p:cNvPr id="84" name="Connector: Curved 83">
-            <a:extLst>
-              <a:ext uri="{FF2B5EF4-FFF2-40B4-BE49-F238E27FC236}">
-                <a16:creationId xmlns:a16="http://schemas.microsoft.com/office/drawing/2014/main" id="{6484D11A-DBAB-4364-B77A-37674B39B183}"/>
-              </a:ext>
-            </a:extLst>
-          </p:cNvPr>
-          <p:cNvCxnSpPr>
-            <a:cxnSpLocks/>
-            <a:stCxn id="9" idx="1"/>
-            <a:endCxn id="80" idx="3"/>
-          </p:cNvCxnSpPr>
-          <p:nvPr/>
-        </p:nvCxnSpPr>
-        <p:spPr>
-          <a:xfrm rot="10800000">
-            <a:off x="1708279" y="1350955"/>
-            <a:ext cx="3455690" cy="565094"/>
-          </a:xfrm>
-          <a:prstGeom prst="curvedConnector3">
-            <a:avLst>
-              <a:gd name="adj1" fmla="val 50000"/>
-            </a:avLst>
-          </a:prstGeom>
-          <a:ln>
-            <a:prstDash val="dash"/>
-            <a:tailEnd type="triangle"/>
-          </a:ln>
-        </p:spPr>
-        <p:style>
-          <a:lnRef idx="1">
-            <a:schemeClr val="accent1"/>
-          </a:lnRef>
-          <a:fillRef idx="0">
-            <a:schemeClr val="accent1"/>
-          </a:fillRef>
-          <a:effectRef idx="0">
-            <a:schemeClr val="accent1"/>
-          </a:effectRef>
-          <a:fontRef idx="minor">
-            <a:schemeClr val="tx1"/>
-          </a:fontRef>
-        </p:style>
-      </p:cxnSp>
-      <p:sp>
-        <p:nvSpPr>
-          <p:cNvPr id="88" name="TextBox 87">
-            <a:extLst>
-              <a:ext uri="{FF2B5EF4-FFF2-40B4-BE49-F238E27FC236}">
-                <a16:creationId xmlns:a16="http://schemas.microsoft.com/office/drawing/2014/main" id="{AE6D2941-A59A-4401-95C5-80F66CD98252}"/>
-              </a:ext>
-            </a:extLst>
-          </p:cNvPr>
-          <p:cNvSpPr txBox="1"/>
-          <p:nvPr/>
-        </p:nvSpPr>
-        <p:spPr>
-          <a:xfrm>
-            <a:off x="1770738" y="1007900"/>
-            <a:ext cx="1359971" cy="253916"/>
-          </a:xfrm>
-          <a:prstGeom prst="rect">
-            <a:avLst/>
-          </a:prstGeom>
-          <a:noFill/>
-        </p:spPr>
-        <p:txBody>
-          <a:bodyPr wrap="square" rtlCol="0">
-            <a:spAutoFit/>
-          </a:bodyPr>
-          <a:lstStyle/>
-          <a:p>
-            <a:r>
-              <a:rPr lang="en-GB" sz="1050" dirty="0"/>
-              <a:t>@</a:t>
-            </a:r>
-            <a:r>
-              <a:rPr lang="en-GB" sz="1050" dirty="0" err="1"/>
-              <a:t>ComponentScan</a:t>
-            </a:r>
-            <a:endParaRPr lang="en-GB" sz="1050" dirty="0"/>
-          </a:p>
-        </p:txBody>
-      </p:sp>
-      <p:cxnSp>
-        <p:nvCxnSpPr>
-          <p:cNvPr id="90" name="Connector: Curved 89">
-            <a:extLst>
-              <a:ext uri="{FF2B5EF4-FFF2-40B4-BE49-F238E27FC236}">
-                <a16:creationId xmlns:a16="http://schemas.microsoft.com/office/drawing/2014/main" id="{87E4CFA5-AF76-42C7-A763-3D44C7292444}"/>
-              </a:ext>
-            </a:extLst>
-          </p:cNvPr>
-          <p:cNvCxnSpPr>
-            <a:cxnSpLocks/>
-            <a:stCxn id="9" idx="1"/>
-            <a:endCxn id="81" idx="3"/>
-          </p:cNvCxnSpPr>
-          <p:nvPr/>
-        </p:nvCxnSpPr>
-        <p:spPr>
-          <a:xfrm rot="10800000" flipV="1">
-            <a:off x="1708279" y="1916048"/>
-            <a:ext cx="3455690" cy="46059"/>
-          </a:xfrm>
-          <a:prstGeom prst="curvedConnector3">
-            <a:avLst>
-              <a:gd name="adj1" fmla="val 50000"/>
-            </a:avLst>
-          </a:prstGeom>
-          <a:ln>
-            <a:prstDash val="dash"/>
-            <a:tailEnd type="triangle"/>
-          </a:ln>
-        </p:spPr>
-        <p:style>
-          <a:lnRef idx="1">
-            <a:schemeClr val="accent1"/>
-          </a:lnRef>
-          <a:fillRef idx="0">
-            <a:schemeClr val="accent1"/>
-          </a:fillRef>
-          <a:effectRef idx="0">
-            <a:schemeClr val="accent1"/>
-          </a:effectRef>
-          <a:fontRef idx="minor">
-            <a:schemeClr val="tx1"/>
-          </a:fontRef>
-        </p:style>
-      </p:cxnSp>
-      <p:cxnSp>
-        <p:nvCxnSpPr>
-          <p:cNvPr id="93" name="Connector: Curved 92">
-            <a:extLst>
-              <a:ext uri="{FF2B5EF4-FFF2-40B4-BE49-F238E27FC236}">
-                <a16:creationId xmlns:a16="http://schemas.microsoft.com/office/drawing/2014/main" id="{9490D9E0-ABAC-46C9-9164-37B6D5C8FF84}"/>
-              </a:ext>
-            </a:extLst>
-          </p:cNvPr>
-          <p:cNvCxnSpPr>
-            <a:cxnSpLocks/>
-            <a:stCxn id="9" idx="1"/>
-            <a:endCxn id="83" idx="3"/>
-          </p:cNvCxnSpPr>
-          <p:nvPr/>
-        </p:nvCxnSpPr>
-        <p:spPr>
-          <a:xfrm rot="10800000" flipV="1">
-            <a:off x="1720599" y="1916049"/>
-            <a:ext cx="3443370" cy="657212"/>
-          </a:xfrm>
-          <a:prstGeom prst="curvedConnector3">
-            <a:avLst>
-              <a:gd name="adj1" fmla="val 50000"/>
-            </a:avLst>
-          </a:prstGeom>
-          <a:ln>
-            <a:prstDash val="dash"/>
-            <a:tailEnd type="triangle"/>
-          </a:ln>
-        </p:spPr>
-        <p:style>
-          <a:lnRef idx="1">
-            <a:schemeClr val="accent1"/>
-          </a:lnRef>
-          <a:fillRef idx="0">
-            <a:schemeClr val="accent1"/>
-          </a:fillRef>
-          <a:effectRef idx="0">
-            <a:schemeClr val="accent1"/>
-          </a:effectRef>
-          <a:fontRef idx="minor">
-            <a:schemeClr val="tx1"/>
-          </a:fontRef>
-        </p:style>
-      </p:cxnSp>
-      <p:sp>
-        <p:nvSpPr>
-          <p:cNvPr id="99" name="Rectangle 98">
-            <a:extLst>
-              <a:ext uri="{FF2B5EF4-FFF2-40B4-BE49-F238E27FC236}">
-                <a16:creationId xmlns:a16="http://schemas.microsoft.com/office/drawing/2014/main" id="{9411BEDB-9F4E-48A0-802D-3363014B0B78}"/>
-              </a:ext>
-            </a:extLst>
-          </p:cNvPr>
-          <p:cNvSpPr/>
-          <p:nvPr/>
-        </p:nvSpPr>
-        <p:spPr>
-          <a:xfrm>
-            <a:off x="182394" y="2941398"/>
-            <a:ext cx="1538205" cy="486032"/>
-          </a:xfrm>
-          <a:prstGeom prst="rect">
-            <a:avLst/>
-          </a:prstGeom>
-        </p:spPr>
-        <p:style>
-          <a:lnRef idx="2">
-            <a:schemeClr val="accent2">
-              <a:shade val="50000"/>
-            </a:schemeClr>
-          </a:lnRef>
-          <a:fillRef idx="1">
-            <a:schemeClr val="accent2"/>
-          </a:fillRef>
-          <a:effectRef idx="0">
-            <a:schemeClr val="accent2"/>
-          </a:effectRef>
-          <a:fontRef idx="minor">
-            <a:schemeClr val="lt1"/>
-          </a:fontRef>
-        </p:style>
-        <p:txBody>
-          <a:bodyPr rtlCol="0" anchor="ctr"/>
-          <a:lstStyle/>
-          <a:p>
-            <a:pPr algn="ctr"/>
-            <a:r>
-              <a:rPr lang="en-GB" sz="1200" dirty="0" err="1"/>
-              <a:t>IsisRuntimeServices</a:t>
-            </a:r>
-            <a:br>
-              <a:rPr lang="en-GB" sz="1200" dirty="0"/>
-            </a:br>
-            <a:r>
-              <a:rPr lang="en-GB" sz="1200" dirty="0"/>
-              <a:t>Module</a:t>
-            </a:r>
-          </a:p>
-        </p:txBody>
-      </p:sp>
-      <p:sp>
-        <p:nvSpPr>
-          <p:cNvPr id="100" name="Rectangle 99">
-            <a:extLst>
-              <a:ext uri="{FF2B5EF4-FFF2-40B4-BE49-F238E27FC236}">
-                <a16:creationId xmlns:a16="http://schemas.microsoft.com/office/drawing/2014/main" id="{486D76AD-B1D1-475B-A59A-070455BBD003}"/>
-              </a:ext>
-            </a:extLst>
-          </p:cNvPr>
-          <p:cNvSpPr/>
-          <p:nvPr/>
-        </p:nvSpPr>
-        <p:spPr>
-          <a:xfrm>
-            <a:off x="170073" y="3552552"/>
-            <a:ext cx="1538205" cy="486032"/>
-          </a:xfrm>
-          <a:prstGeom prst="rect">
-            <a:avLst/>
-          </a:prstGeom>
-        </p:spPr>
-        <p:style>
-          <a:lnRef idx="2">
-            <a:schemeClr val="accent2">
-              <a:shade val="50000"/>
-            </a:schemeClr>
-          </a:lnRef>
-          <a:fillRef idx="1">
-            <a:schemeClr val="accent2"/>
-          </a:fillRef>
-          <a:effectRef idx="0">
-            <a:schemeClr val="accent2"/>
-          </a:effectRef>
-          <a:fontRef idx="minor">
-            <a:schemeClr val="lt1"/>
-          </a:fontRef>
-        </p:style>
-        <p:txBody>
-          <a:bodyPr rtlCol="0" anchor="ctr"/>
-          <a:lstStyle/>
-          <a:p>
-            <a:pPr algn="ctr"/>
-            <a:r>
-              <a:rPr lang="en-GB" sz="1200" dirty="0" err="1"/>
-              <a:t>IsisWrapper</a:t>
-            </a:r>
-            <a:br>
-              <a:rPr lang="en-GB" sz="1200" dirty="0"/>
-            </a:br>
-            <a:r>
-              <a:rPr lang="en-GB" sz="1200" dirty="0"/>
-              <a:t>Module</a:t>
-            </a:r>
-          </a:p>
-        </p:txBody>
-      </p:sp>
-      <p:cxnSp>
-        <p:nvCxnSpPr>
-          <p:cNvPr id="101" name="Connector: Curved 100">
-            <a:extLst>
-              <a:ext uri="{FF2B5EF4-FFF2-40B4-BE49-F238E27FC236}">
-                <a16:creationId xmlns:a16="http://schemas.microsoft.com/office/drawing/2014/main" id="{32116EEB-BD70-457A-A7B4-0D5746ABEF16}"/>
-              </a:ext>
-            </a:extLst>
-          </p:cNvPr>
-          <p:cNvCxnSpPr>
-            <a:cxnSpLocks/>
-            <a:stCxn id="9" idx="1"/>
-            <a:endCxn id="99" idx="3"/>
-          </p:cNvCxnSpPr>
-          <p:nvPr/>
-        </p:nvCxnSpPr>
-        <p:spPr>
-          <a:xfrm rot="10800000" flipV="1">
-            <a:off x="1720599" y="1916048"/>
-            <a:ext cx="3443370" cy="1268365"/>
-          </a:xfrm>
-          <a:prstGeom prst="curvedConnector3">
-            <a:avLst>
-              <a:gd name="adj1" fmla="val 50000"/>
-            </a:avLst>
-          </a:prstGeom>
-          <a:ln>
-            <a:prstDash val="dash"/>
-            <a:tailEnd type="triangle"/>
-          </a:ln>
-        </p:spPr>
-        <p:style>
-          <a:lnRef idx="1">
-            <a:schemeClr val="accent1"/>
-          </a:lnRef>
-          <a:fillRef idx="0">
-            <a:schemeClr val="accent1"/>
-          </a:fillRef>
-          <a:effectRef idx="0">
-            <a:schemeClr val="accent1"/>
-          </a:effectRef>
-          <a:fontRef idx="minor">
-            <a:schemeClr val="tx1"/>
-          </a:fontRef>
-        </p:style>
-      </p:cxnSp>
-      <p:cxnSp>
-        <p:nvCxnSpPr>
-          <p:cNvPr id="104" name="Connector: Curved 103">
-            <a:extLst>
-              <a:ext uri="{FF2B5EF4-FFF2-40B4-BE49-F238E27FC236}">
-                <a16:creationId xmlns:a16="http://schemas.microsoft.com/office/drawing/2014/main" id="{94A4A72E-DACA-4135-BC82-819ED054A5BE}"/>
-              </a:ext>
-            </a:extLst>
-          </p:cNvPr>
-          <p:cNvCxnSpPr>
-            <a:cxnSpLocks/>
-            <a:stCxn id="9" idx="1"/>
-            <a:endCxn id="100" idx="3"/>
-          </p:cNvCxnSpPr>
-          <p:nvPr/>
-        </p:nvCxnSpPr>
-        <p:spPr>
-          <a:xfrm rot="10800000" flipV="1">
-            <a:off x="1708279" y="1916048"/>
-            <a:ext cx="3455691" cy="1879519"/>
-          </a:xfrm>
-          <a:prstGeom prst="curvedConnector3">
-            <a:avLst>
-              <a:gd name="adj1" fmla="val 50000"/>
-            </a:avLst>
-          </a:prstGeom>
-          <a:ln>
-            <a:prstDash val="dash"/>
-            <a:tailEnd type="triangle"/>
-          </a:ln>
-        </p:spPr>
-        <p:style>
-          <a:lnRef idx="1">
-            <a:schemeClr val="accent1"/>
-          </a:lnRef>
-          <a:fillRef idx="0">
-            <a:schemeClr val="accent1"/>
-          </a:fillRef>
-          <a:effectRef idx="0">
-            <a:schemeClr val="accent1"/>
-          </a:effectRef>
-          <a:fontRef idx="minor">
-            <a:schemeClr val="tx1"/>
-          </a:fontRef>
-        </p:style>
-      </p:cxnSp>
-      <p:sp>
-        <p:nvSpPr>
-          <p:cNvPr id="111" name="Rectangle 110">
-            <a:extLst>
-              <a:ext uri="{FF2B5EF4-FFF2-40B4-BE49-F238E27FC236}">
-                <a16:creationId xmlns:a16="http://schemas.microsoft.com/office/drawing/2014/main" id="{9D4E7237-01E5-4455-A567-99B66E54CF3B}"/>
-              </a:ext>
-            </a:extLst>
-          </p:cNvPr>
-          <p:cNvSpPr/>
-          <p:nvPr/>
-        </p:nvSpPr>
-        <p:spPr>
-          <a:xfrm>
-            <a:off x="2678550" y="352892"/>
-            <a:ext cx="1538205" cy="486032"/>
-          </a:xfrm>
-          <a:prstGeom prst="rect">
-            <a:avLst/>
-          </a:prstGeom>
-        </p:spPr>
-        <p:style>
-          <a:lnRef idx="2">
-            <a:schemeClr val="accent1">
-              <a:shade val="50000"/>
-            </a:schemeClr>
-          </a:lnRef>
-          <a:fillRef idx="1">
-            <a:schemeClr val="accent1"/>
-          </a:fillRef>
-          <a:effectRef idx="0">
-            <a:schemeClr val="accent1"/>
-          </a:effectRef>
-          <a:fontRef idx="minor">
-            <a:schemeClr val="lt1"/>
-          </a:fontRef>
-        </p:style>
-        <p:txBody>
-          <a:bodyPr rtlCol="0" anchor="ctr"/>
-          <a:lstStyle/>
-          <a:p>
-            <a:pPr algn="ctr"/>
-            <a:r>
-              <a:rPr lang="en-GB" sz="1200" dirty="0" err="1"/>
-              <a:t>IsisConfig</a:t>
-            </a:r>
-            <a:br>
-              <a:rPr lang="en-GB" sz="1200" dirty="0"/>
-            </a:br>
-            <a:r>
-              <a:rPr lang="en-GB" sz="1200" dirty="0"/>
-              <a:t>Module</a:t>
-            </a:r>
-          </a:p>
-        </p:txBody>
-      </p:sp>
-      <p:sp>
-        <p:nvSpPr>
-          <p:cNvPr id="120" name="Rectangle 119">
-            <a:extLst>
-              <a:ext uri="{FF2B5EF4-FFF2-40B4-BE49-F238E27FC236}">
-                <a16:creationId xmlns:a16="http://schemas.microsoft.com/office/drawing/2014/main" id="{C37653D5-41D4-4C2D-82D7-604F34FD559F}"/>
-              </a:ext>
-            </a:extLst>
-          </p:cNvPr>
-          <p:cNvSpPr/>
-          <p:nvPr/>
-        </p:nvSpPr>
-        <p:spPr>
-          <a:xfrm>
-            <a:off x="9761435" y="6314915"/>
-            <a:ext cx="1089327" cy="369134"/>
-          </a:xfrm>
-          <a:prstGeom prst="rect">
-            <a:avLst/>
-          </a:prstGeom>
-        </p:spPr>
-        <p:style>
-          <a:lnRef idx="2">
-            <a:schemeClr val="accent1">
-              <a:shade val="50000"/>
-            </a:schemeClr>
-          </a:lnRef>
-          <a:fillRef idx="1">
-            <a:schemeClr val="accent1"/>
-          </a:fillRef>
-          <a:effectRef idx="0">
-            <a:schemeClr val="accent1"/>
-          </a:effectRef>
-          <a:fontRef idx="minor">
-            <a:schemeClr val="lt1"/>
-          </a:fontRef>
-        </p:style>
-        <p:txBody>
-          <a:bodyPr rtlCol="0" anchor="ctr"/>
-          <a:lstStyle/>
-          <a:p>
-            <a:pPr algn="ctr"/>
-            <a:r>
-              <a:rPr lang="en-GB" sz="1050" dirty="0"/>
-              <a:t>@Configuration</a:t>
-            </a:r>
-            <a:br>
-              <a:rPr lang="en-GB" sz="1050" dirty="0"/>
-            </a:br>
-            <a:r>
-              <a:rPr lang="en-GB" sz="1050" dirty="0"/>
-              <a:t>(framework)</a:t>
-            </a:r>
-          </a:p>
-        </p:txBody>
-      </p:sp>
-      <p:sp>
-        <p:nvSpPr>
-          <p:cNvPr id="121" name="Rectangle 120">
-            <a:extLst>
-              <a:ext uri="{FF2B5EF4-FFF2-40B4-BE49-F238E27FC236}">
-                <a16:creationId xmlns:a16="http://schemas.microsoft.com/office/drawing/2014/main" id="{ABD6177F-CA4F-4D0C-AA72-86A4B8EB8B5A}"/>
-              </a:ext>
-            </a:extLst>
-          </p:cNvPr>
-          <p:cNvSpPr/>
-          <p:nvPr/>
-        </p:nvSpPr>
-        <p:spPr>
-          <a:xfrm>
-            <a:off x="7370785" y="6314915"/>
-            <a:ext cx="1089327" cy="369134"/>
-          </a:xfrm>
-          <a:prstGeom prst="rect">
-            <a:avLst/>
-          </a:prstGeom>
-        </p:spPr>
-        <p:style>
-          <a:lnRef idx="2">
-            <a:schemeClr val="accent2">
-              <a:shade val="50000"/>
-            </a:schemeClr>
-          </a:lnRef>
-          <a:fillRef idx="1">
-            <a:schemeClr val="accent2"/>
-          </a:fillRef>
-          <a:effectRef idx="0">
-            <a:schemeClr val="accent2"/>
-          </a:effectRef>
-          <a:fontRef idx="minor">
-            <a:schemeClr val="lt1"/>
-          </a:fontRef>
-        </p:style>
-        <p:txBody>
-          <a:bodyPr rtlCol="0" anchor="ctr"/>
-          <a:lstStyle/>
-          <a:p>
-            <a:pPr algn="ctr"/>
-            <a:r>
               <a:rPr lang="en-GB" sz="1050" dirty="0"/>
               <a:t>Module</a:t>
             </a:r>
@@ -5017,15 +4879,15 @@
           </p:cNvPr>
           <p:cNvCxnSpPr>
             <a:cxnSpLocks/>
-            <a:stCxn id="9" idx="1"/>
+            <a:stCxn id="81" idx="1"/>
             <a:endCxn id="111" idx="3"/>
           </p:cNvCxnSpPr>
           <p:nvPr/>
         </p:nvCxnSpPr>
         <p:spPr>
-          <a:xfrm rot="10800000">
-            <a:off x="4216755" y="595909"/>
-            <a:ext cx="947214" cy="1320141"/>
+          <a:xfrm rot="10800000" flipV="1">
+            <a:off x="2160844" y="371629"/>
+            <a:ext cx="822137" cy="771815"/>
           </a:xfrm>
           <a:prstGeom prst="curvedConnector3">
             <a:avLst>
@@ -5066,7 +4928,7 @@
         </p:nvSpPr>
         <p:spPr>
           <a:xfrm>
-            <a:off x="181996" y="354207"/>
+            <a:off x="289453" y="1845306"/>
             <a:ext cx="1538205" cy="486032"/>
           </a:xfrm>
           <a:prstGeom prst="rect">
@@ -5281,13 +5143,15 @@
           <p:nvPr/>
         </p:nvCxnSpPr>
         <p:spPr>
-          <a:xfrm rot="10800000" flipV="1">
-            <a:off x="1720202" y="595907"/>
-            <a:ext cx="958349" cy="1315"/>
-          </a:xfrm>
-          <a:prstGeom prst="curvedConnector3">
+          <a:xfrm rot="10800000" flipH="1" flipV="1">
+            <a:off x="622638" y="1143444"/>
+            <a:ext cx="1205020" cy="944877"/>
+          </a:xfrm>
+          <a:prstGeom prst="curvedConnector5">
             <a:avLst>
-              <a:gd name="adj1" fmla="val 50000"/>
+              <a:gd name="adj1" fmla="val -18971"/>
+              <a:gd name="adj2" fmla="val 50000"/>
+              <a:gd name="adj3" fmla="val 118971"/>
             </a:avLst>
           </a:prstGeom>
           <a:ln>
@@ -5324,7 +5188,7 @@
         </p:nvSpPr>
         <p:spPr>
           <a:xfrm>
-            <a:off x="1270090" y="113287"/>
+            <a:off x="0" y="1489450"/>
             <a:ext cx="2064193" cy="252867"/>
           </a:xfrm>
           <a:prstGeom prst="rect">
@@ -5377,6 +5241,7 @@
             </a:avLst>
           </a:prstGeom>
           <a:ln>
+            <a:prstDash val="solid"/>
             <a:tailEnd type="triangle"/>
           </a:ln>
         </p:spPr>

</xml_diff>

<commit_message>
ISIS-2208: moves h2 console into new isis extension
</commit_message>
<xml_diff>
--- a/antora/components/core/modules/archdesign/attachments/isis-configurations-and-modules.pptx
+++ b/antora/components/core/modules/archdesign/attachments/isis-configurations-and-modules.pptx
@@ -3517,7 +3517,7 @@
         </p:nvSpPr>
         <p:spPr>
           <a:xfrm>
-            <a:off x="6899193" y="4817575"/>
+            <a:off x="7370785" y="5388516"/>
             <a:ext cx="943185" cy="252867"/>
           </a:xfrm>
           <a:prstGeom prst="rect">
@@ -3882,7 +3882,7 @@
         </p:nvSpPr>
         <p:spPr>
           <a:xfrm>
-            <a:off x="3200794" y="4957203"/>
+            <a:off x="2216867" y="4735379"/>
             <a:ext cx="1538205" cy="486032"/>
           </a:xfrm>
           <a:prstGeom prst="rect">
@@ -3942,8 +3942,8 @@
         </p:nvCxnSpPr>
         <p:spPr>
           <a:xfrm rot="10800000">
-            <a:off x="4738999" y="5200220"/>
-            <a:ext cx="418808" cy="116731"/>
+            <a:off x="3755073" y="4978396"/>
+            <a:ext cx="1402735" cy="338555"/>
           </a:xfrm>
           <a:prstGeom prst="curvedConnector3">
             <a:avLst>
@@ -4223,8 +4223,8 @@
         </p:nvCxnSpPr>
         <p:spPr>
           <a:xfrm rot="10800000" flipV="1">
-            <a:off x="4738999" y="4498855"/>
-            <a:ext cx="418808" cy="701363"/>
+            <a:off x="3755073" y="4498855"/>
+            <a:ext cx="1402735" cy="479539"/>
           </a:xfrm>
           <a:prstGeom prst="curvedConnector3">
             <a:avLst>
@@ -5034,7 +5034,7 @@
         </p:nvSpPr>
         <p:spPr>
           <a:xfrm>
-            <a:off x="3370593" y="3666121"/>
+            <a:off x="3376675" y="3415397"/>
             <a:ext cx="1158870" cy="486032"/>
           </a:xfrm>
           <a:prstGeom prst="rect">
@@ -5231,9 +5231,9 @@
           <p:nvPr/>
         </p:nvCxnSpPr>
         <p:spPr>
-          <a:xfrm rot="10800000" flipV="1">
-            <a:off x="4529463" y="3658413"/>
-            <a:ext cx="628346" cy="250724"/>
+          <a:xfrm rot="10800000">
+            <a:off x="4535545" y="3658413"/>
+            <a:ext cx="622264" cy="12700"/>
           </a:xfrm>
           <a:prstGeom prst="curvedConnector3">
             <a:avLst>
@@ -5274,7 +5274,7 @@
         </p:nvSpPr>
         <p:spPr>
           <a:xfrm>
-            <a:off x="3362316" y="4311662"/>
+            <a:off x="3301656" y="4124138"/>
             <a:ext cx="1158870" cy="486032"/>
           </a:xfrm>
           <a:prstGeom prst="rect">
@@ -5330,7 +5330,7 @@
         </p:nvSpPr>
         <p:spPr>
           <a:xfrm>
-            <a:off x="3362316" y="5575952"/>
+            <a:off x="3118282" y="5503460"/>
             <a:ext cx="1158870" cy="486032"/>
           </a:xfrm>
           <a:prstGeom prst="rect">
@@ -5387,7 +5387,7 @@
         </p:nvSpPr>
         <p:spPr>
           <a:xfrm>
-            <a:off x="1617348" y="5192145"/>
+            <a:off x="628596" y="4748235"/>
             <a:ext cx="1158870" cy="486032"/>
           </a:xfrm>
           <a:prstGeom prst="rect">
@@ -5450,7 +5450,7 @@
         </p:nvSpPr>
         <p:spPr>
           <a:xfrm>
-            <a:off x="1617348" y="5828883"/>
+            <a:off x="3752081" y="6071899"/>
             <a:ext cx="1158870" cy="486032"/>
           </a:xfrm>
           <a:prstGeom prst="rect">
@@ -5509,9 +5509,9 @@
           <p:nvPr/>
         </p:nvCxnSpPr>
         <p:spPr>
-          <a:xfrm rot="10800000" flipV="1">
-            <a:off x="4521187" y="4498856"/>
-            <a:ext cx="636621" cy="55822"/>
+          <a:xfrm rot="10800000">
+            <a:off x="4460527" y="4367154"/>
+            <a:ext cx="697281" cy="131702"/>
           </a:xfrm>
           <a:prstGeom prst="curvedConnector3">
             <a:avLst>
@@ -5555,8 +5555,8 @@
         </p:nvCxnSpPr>
         <p:spPr>
           <a:xfrm rot="10800000" flipV="1">
-            <a:off x="4521187" y="5316950"/>
-            <a:ext cx="636621" cy="502018"/>
+            <a:off x="4277153" y="5316950"/>
+            <a:ext cx="880655" cy="429526"/>
           </a:xfrm>
           <a:prstGeom prst="curvedConnector3">
             <a:avLst>
@@ -5600,8 +5600,8 @@
         </p:nvCxnSpPr>
         <p:spPr>
           <a:xfrm rot="10800000" flipV="1">
-            <a:off x="2776218" y="5200219"/>
-            <a:ext cx="424576" cy="234942"/>
+            <a:off x="1787467" y="4978395"/>
+            <a:ext cx="429401" cy="12856"/>
           </a:xfrm>
           <a:prstGeom prst="curvedConnector3">
             <a:avLst>
@@ -5638,15 +5638,15 @@
           </p:cNvPr>
           <p:cNvCxnSpPr>
             <a:cxnSpLocks/>
-            <a:stCxn id="20" idx="1"/>
+            <a:stCxn id="66" idx="1"/>
             <a:endCxn id="184" idx="3"/>
           </p:cNvCxnSpPr>
           <p:nvPr/>
         </p:nvCxnSpPr>
         <p:spPr>
           <a:xfrm rot="10800000" flipV="1">
-            <a:off x="2776218" y="5200219"/>
-            <a:ext cx="424576" cy="871680"/>
+            <a:off x="4910952" y="5922277"/>
+            <a:ext cx="270967" cy="392638"/>
           </a:xfrm>
           <a:prstGeom prst="curvedConnector3">
             <a:avLst>
@@ -6403,6 +6403,152 @@
           <a:prstGeom prst="curvedConnector3">
             <a:avLst>
               <a:gd name="adj1" fmla="val 44542"/>
+            </a:avLst>
+          </a:prstGeom>
+          <a:ln>
+            <a:tailEnd type="triangle"/>
+          </a:ln>
+        </p:spPr>
+        <p:style>
+          <a:lnRef idx="1">
+            <a:schemeClr val="accent1"/>
+          </a:lnRef>
+          <a:fillRef idx="0">
+            <a:schemeClr val="accent1"/>
+          </a:fillRef>
+          <a:effectRef idx="0">
+            <a:schemeClr val="accent1"/>
+          </a:effectRef>
+          <a:fontRef idx="minor">
+            <a:schemeClr val="tx1"/>
+          </a:fontRef>
+        </p:style>
+      </p:cxnSp>
+      <p:sp>
+        <p:nvSpPr>
+          <p:cNvPr id="66" name="Rectangle 65">
+            <a:extLst>
+              <a:ext uri="{FF2B5EF4-FFF2-40B4-BE49-F238E27FC236}">
+                <a16:creationId xmlns:a16="http://schemas.microsoft.com/office/drawing/2014/main" id="{963CC49E-3468-4FA0-B95B-2A673A6D2B9F}"/>
+              </a:ext>
+            </a:extLst>
+          </p:cNvPr>
+          <p:cNvSpPr/>
+          <p:nvPr/>
+        </p:nvSpPr>
+        <p:spPr>
+          <a:xfrm>
+            <a:off x="5181918" y="5679261"/>
+            <a:ext cx="1538205" cy="486032"/>
+          </a:xfrm>
+          <a:prstGeom prst="rect">
+            <a:avLst/>
+          </a:prstGeom>
+        </p:spPr>
+        <p:style>
+          <a:lnRef idx="2">
+            <a:schemeClr val="accent1">
+              <a:shade val="50000"/>
+            </a:schemeClr>
+          </a:lnRef>
+          <a:fillRef idx="1">
+            <a:schemeClr val="accent1"/>
+          </a:fillRef>
+          <a:effectRef idx="0">
+            <a:schemeClr val="accent1"/>
+          </a:effectRef>
+          <a:fontRef idx="minor">
+            <a:schemeClr val="lt1"/>
+          </a:fontRef>
+        </p:style>
+        <p:txBody>
+          <a:bodyPr rtlCol="0" anchor="ctr"/>
+          <a:lstStyle/>
+          <a:p>
+            <a:pPr algn="ctr"/>
+            <a:r>
+              <a:rPr lang="en-GB" sz="1200" dirty="0"/>
+              <a:t>IsisExtH2Console</a:t>
+            </a:r>
+            <a:br>
+              <a:rPr lang="en-GB" sz="1200" dirty="0"/>
+            </a:br>
+            <a:r>
+              <a:rPr lang="en-GB" sz="1200" dirty="0"/>
+              <a:t>Module</a:t>
+            </a:r>
+          </a:p>
+        </p:txBody>
+      </p:sp>
+      <p:cxnSp>
+        <p:nvCxnSpPr>
+          <p:cNvPr id="69" name="Connector: Curved 68">
+            <a:extLst>
+              <a:ext uri="{FF2B5EF4-FFF2-40B4-BE49-F238E27FC236}">
+                <a16:creationId xmlns:a16="http://schemas.microsoft.com/office/drawing/2014/main" id="{06294774-0010-41A3-9681-B0F18772705B}"/>
+              </a:ext>
+            </a:extLst>
+          </p:cNvPr>
+          <p:cNvCxnSpPr>
+            <a:cxnSpLocks/>
+            <a:stCxn id="5" idx="1"/>
+            <a:endCxn id="66" idx="3"/>
+          </p:cNvCxnSpPr>
+          <p:nvPr/>
+        </p:nvCxnSpPr>
+        <p:spPr>
+          <a:xfrm rot="10800000" flipV="1">
+            <a:off x="6720123" y="4210225"/>
+            <a:ext cx="1491244" cy="1712051"/>
+          </a:xfrm>
+          <a:prstGeom prst="curvedConnector3">
+            <a:avLst>
+              <a:gd name="adj1" fmla="val 50000"/>
+            </a:avLst>
+          </a:prstGeom>
+          <a:ln>
+            <a:tailEnd type="triangle"/>
+          </a:ln>
+        </p:spPr>
+        <p:style>
+          <a:lnRef idx="1">
+            <a:schemeClr val="accent1"/>
+          </a:lnRef>
+          <a:fillRef idx="0">
+            <a:schemeClr val="accent1"/>
+          </a:fillRef>
+          <a:effectRef idx="0">
+            <a:schemeClr val="accent1"/>
+          </a:effectRef>
+          <a:fontRef idx="minor">
+            <a:schemeClr val="tx1"/>
+          </a:fontRef>
+        </p:style>
+      </p:cxnSp>
+      <p:cxnSp>
+        <p:nvCxnSpPr>
+          <p:cNvPr id="82" name="Connector: Curved 81">
+            <a:extLst>
+              <a:ext uri="{FF2B5EF4-FFF2-40B4-BE49-F238E27FC236}">
+                <a16:creationId xmlns:a16="http://schemas.microsoft.com/office/drawing/2014/main" id="{B4575090-D3B8-4D0D-9F06-00CC05DD7A90}"/>
+              </a:ext>
+            </a:extLst>
+          </p:cNvPr>
+          <p:cNvCxnSpPr>
+            <a:cxnSpLocks/>
+            <a:stCxn id="66" idx="1"/>
+            <a:endCxn id="20" idx="3"/>
+          </p:cNvCxnSpPr>
+          <p:nvPr/>
+        </p:nvCxnSpPr>
+        <p:spPr>
+          <a:xfrm rot="10800000">
+            <a:off x="3755072" y="4978395"/>
+            <a:ext cx="1426846" cy="943882"/>
+          </a:xfrm>
+          <a:prstGeom prst="curvedConnector3">
+            <a:avLst>
+              <a:gd name="adj1" fmla="val 50000"/>
             </a:avLst>
           </a:prstGeom>
           <a:ln>

</xml_diff>

<commit_message>
ISIS-2213: updates .pptx for simpleapp module dependencies
</commit_message>
<xml_diff>
--- a/antora/components/core/modules/archdesign/attachments/isis-configurations-and-modules.pptx
+++ b/antora/components/core/modules/archdesign/attachments/isis-configurations-and-modules.pptx
@@ -3581,13 +3581,6 @@
           <a:p>
             <a:pPr algn="ctr"/>
             <a:r>
-              <a:rPr lang="en-GB" sz="1000" dirty="0"/>
-              <a:t>[runtime-spring]</a:t>
-            </a:r>
-            <a:br>
-              <a:rPr lang="en-GB" sz="1000" dirty="0"/>
-            </a:br>
-            <a:r>
               <a:rPr lang="en-GB" sz="1200" dirty="0" err="1"/>
               <a:t>IsisBoot</a:t>
             </a:r>
@@ -5973,17 +5966,16 @@
           <a:p>
             <a:pPr algn="ctr"/>
             <a:r>
-              <a:rPr lang="en-GB" sz="1200" dirty="0" err="1"/>
-              <a:t>DomainApp</a:t>
+              <a:rPr lang="en-GB" sz="1200" dirty="0"/>
+              <a:t>Application</a:t>
             </a:r>
             <a:br>
               <a:rPr lang="en-GB" sz="1200" dirty="0"/>
             </a:br>
             <a:r>
-              <a:rPr lang="en-GB" sz="1200" dirty="0" err="1"/>
-              <a:t>ApplicationModule</a:t>
-            </a:r>
-            <a:endParaRPr lang="en-GB" sz="1200" dirty="0"/>
+              <a:rPr lang="en-GB" sz="1200" dirty="0"/>
+              <a:t>Module</a:t>
+            </a:r>
           </a:p>
         </p:txBody>
       </p:sp>
@@ -6797,6 +6789,88 @@
           </a:fontRef>
         </p:style>
       </p:cxnSp>
+      <p:sp>
+        <p:nvSpPr>
+          <p:cNvPr id="71" name="TextBox 70">
+            <a:extLst>
+              <a:ext uri="{FF2B5EF4-FFF2-40B4-BE49-F238E27FC236}">
+                <a16:creationId xmlns:a16="http://schemas.microsoft.com/office/drawing/2014/main" id="{9468C3BA-1104-4FAF-B227-156B513C306D}"/>
+              </a:ext>
+            </a:extLst>
+          </p:cNvPr>
+          <p:cNvSpPr txBox="1"/>
+          <p:nvPr/>
+        </p:nvSpPr>
+        <p:spPr>
+          <a:xfrm>
+            <a:off x="5824368" y="4173626"/>
+            <a:ext cx="1379318" cy="253916"/>
+          </a:xfrm>
+          <a:prstGeom prst="rect">
+            <a:avLst/>
+          </a:prstGeom>
+          <a:noFill/>
+        </p:spPr>
+        <p:txBody>
+          <a:bodyPr wrap="square" rtlCol="0">
+            <a:spAutoFit/>
+          </a:bodyPr>
+          <a:lstStyle/>
+          <a:p>
+            <a:r>
+              <a:rPr lang="en-GB" sz="1050" dirty="0"/>
+              <a:t>(not used in this app)</a:t>
+            </a:r>
+          </a:p>
+        </p:txBody>
+      </p:sp>
+      <p:sp>
+        <p:nvSpPr>
+          <p:cNvPr id="2" name="TextBox 1">
+            <a:extLst>
+              <a:ext uri="{FF2B5EF4-FFF2-40B4-BE49-F238E27FC236}">
+                <a16:creationId xmlns:a16="http://schemas.microsoft.com/office/drawing/2014/main" id="{F2FE4EC6-A964-40FD-9686-116AD5FEDF4E}"/>
+              </a:ext>
+            </a:extLst>
+          </p:cNvPr>
+          <p:cNvSpPr txBox="1"/>
+          <p:nvPr/>
+        </p:nvSpPr>
+        <p:spPr>
+          <a:xfrm flipH="1">
+            <a:off x="8383874" y="218114"/>
+            <a:ext cx="3553660" cy="646331"/>
+          </a:xfrm>
+          <a:prstGeom prst="rect">
+            <a:avLst/>
+          </a:prstGeom>
+          <a:noFill/>
+        </p:spPr>
+        <p:txBody>
+          <a:bodyPr wrap="square" rtlCol="0">
+            <a:spAutoFit/>
+          </a:bodyPr>
+          <a:lstStyle/>
+          <a:p>
+            <a:pPr algn="ctr"/>
+            <a:r>
+              <a:rPr lang="en-GB" dirty="0"/>
+              <a:t>Module dependencies of</a:t>
+            </a:r>
+            <a:br>
+              <a:rPr lang="en-GB" dirty="0"/>
+            </a:br>
+            <a:r>
+              <a:rPr lang="en-GB" dirty="0" err="1"/>
+              <a:t>isis</a:t>
+            </a:r>
+            <a:r>
+              <a:rPr lang="en-GB" dirty="0"/>
+              <a:t>-app-simpleapp (starter app)</a:t>
+            </a:r>
+          </a:p>
+        </p:txBody>
+      </p:sp>
     </p:spTree>
     <p:extLst>
       <p:ext uri="{BB962C8B-B14F-4D97-AF65-F5344CB8AC3E}">

</xml_diff>

<commit_message>
ISIS-2215: adds missing modules, move some classes around
and started to enumerate @Components for some (applib, metamodel) ... ie to remove @ComponentScan
</commit_message>
<xml_diff>
--- a/antora/components/core/modules/archdesign/attachments/isis-configurations-and-modules.pptx
+++ b/antora/components/core/modules/archdesign/attachments/isis-configurations-and-modules.pptx
@@ -261,7 +261,7 @@
           <a:p>
             <a:fld id="{3159BD86-569B-442C-ABE1-0B002BE59BAD}" type="datetimeFigureOut">
               <a:rPr lang="en-GB" smtClean="0"/>
-              <a:t>04/12/2019</a:t>
+              <a:t>05/12/2019</a:t>
             </a:fld>
             <a:endParaRPr lang="en-GB"/>
           </a:p>
@@ -461,7 +461,7 @@
           <a:p>
             <a:fld id="{3159BD86-569B-442C-ABE1-0B002BE59BAD}" type="datetimeFigureOut">
               <a:rPr lang="en-GB" smtClean="0"/>
-              <a:t>04/12/2019</a:t>
+              <a:t>05/12/2019</a:t>
             </a:fld>
             <a:endParaRPr lang="en-GB"/>
           </a:p>
@@ -671,7 +671,7 @@
           <a:p>
             <a:fld id="{3159BD86-569B-442C-ABE1-0B002BE59BAD}" type="datetimeFigureOut">
               <a:rPr lang="en-GB" smtClean="0"/>
-              <a:t>04/12/2019</a:t>
+              <a:t>05/12/2019</a:t>
             </a:fld>
             <a:endParaRPr lang="en-GB"/>
           </a:p>
@@ -871,7 +871,7 @@
           <a:p>
             <a:fld id="{3159BD86-569B-442C-ABE1-0B002BE59BAD}" type="datetimeFigureOut">
               <a:rPr lang="en-GB" smtClean="0"/>
-              <a:t>04/12/2019</a:t>
+              <a:t>05/12/2019</a:t>
             </a:fld>
             <a:endParaRPr lang="en-GB"/>
           </a:p>
@@ -1147,7 +1147,7 @@
           <a:p>
             <a:fld id="{3159BD86-569B-442C-ABE1-0B002BE59BAD}" type="datetimeFigureOut">
               <a:rPr lang="en-GB" smtClean="0"/>
-              <a:t>04/12/2019</a:t>
+              <a:t>05/12/2019</a:t>
             </a:fld>
             <a:endParaRPr lang="en-GB"/>
           </a:p>
@@ -1415,7 +1415,7 @@
           <a:p>
             <a:fld id="{3159BD86-569B-442C-ABE1-0B002BE59BAD}" type="datetimeFigureOut">
               <a:rPr lang="en-GB" smtClean="0"/>
-              <a:t>04/12/2019</a:t>
+              <a:t>05/12/2019</a:t>
             </a:fld>
             <a:endParaRPr lang="en-GB"/>
           </a:p>
@@ -1830,7 +1830,7 @@
           <a:p>
             <a:fld id="{3159BD86-569B-442C-ABE1-0B002BE59BAD}" type="datetimeFigureOut">
               <a:rPr lang="en-GB" smtClean="0"/>
-              <a:t>04/12/2019</a:t>
+              <a:t>05/12/2019</a:t>
             </a:fld>
             <a:endParaRPr lang="en-GB"/>
           </a:p>
@@ -1972,7 +1972,7 @@
           <a:p>
             <a:fld id="{3159BD86-569B-442C-ABE1-0B002BE59BAD}" type="datetimeFigureOut">
               <a:rPr lang="en-GB" smtClean="0"/>
-              <a:t>04/12/2019</a:t>
+              <a:t>05/12/2019</a:t>
             </a:fld>
             <a:endParaRPr lang="en-GB"/>
           </a:p>
@@ -2085,7 +2085,7 @@
           <a:p>
             <a:fld id="{3159BD86-569B-442C-ABE1-0B002BE59BAD}" type="datetimeFigureOut">
               <a:rPr lang="en-GB" smtClean="0"/>
-              <a:t>04/12/2019</a:t>
+              <a:t>05/12/2019</a:t>
             </a:fld>
             <a:endParaRPr lang="en-GB"/>
           </a:p>
@@ -2398,7 +2398,7 @@
           <a:p>
             <a:fld id="{3159BD86-569B-442C-ABE1-0B002BE59BAD}" type="datetimeFigureOut">
               <a:rPr lang="en-GB" smtClean="0"/>
-              <a:t>04/12/2019</a:t>
+              <a:t>05/12/2019</a:t>
             </a:fld>
             <a:endParaRPr lang="en-GB"/>
           </a:p>
@@ -2687,7 +2687,7 @@
           <a:p>
             <a:fld id="{3159BD86-569B-442C-ABE1-0B002BE59BAD}" type="datetimeFigureOut">
               <a:rPr lang="en-GB" smtClean="0"/>
-              <a:t>04/12/2019</a:t>
+              <a:t>05/12/2019</a:t>
             </a:fld>
             <a:endParaRPr lang="en-GB"/>
           </a:p>
@@ -2930,7 +2930,7 @@
           <a:p>
             <a:fld id="{3159BD86-569B-442C-ABE1-0B002BE59BAD}" type="datetimeFigureOut">
               <a:rPr lang="en-GB" smtClean="0"/>
-              <a:t>04/12/2019</a:t>
+              <a:t>05/12/2019</a:t>
             </a:fld>
             <a:endParaRPr lang="en-GB"/>
           </a:p>
@@ -3582,7 +3582,7 @@
             <a:pPr algn="ctr"/>
             <a:r>
               <a:rPr lang="en-GB" sz="1200" dirty="0" err="1"/>
-              <a:t>IsisBoot</a:t>
+              <a:t>SpringBoot</a:t>
             </a:r>
             <a:endParaRPr lang="en-GB" sz="1200" dirty="0"/>
           </a:p>
@@ -3647,7 +3647,7 @@
         </p:nvSpPr>
         <p:spPr>
           <a:xfrm>
-            <a:off x="5144867" y="3127499"/>
+            <a:off x="5140767" y="3127499"/>
             <a:ext cx="1538205" cy="486032"/>
           </a:xfrm>
           <a:prstGeom prst="rect">
@@ -3676,17 +3676,16 @@
           <a:p>
             <a:pPr algn="ctr"/>
             <a:r>
-              <a:rPr lang="en-GB" sz="1200" dirty="0" err="1"/>
-              <a:t>IsisBoot</a:t>
+              <a:rPr lang="en-GB" sz="1200" dirty="0"/>
+              <a:t>Security</a:t>
             </a:r>
             <a:br>
               <a:rPr lang="en-GB" sz="1200" dirty="0"/>
             </a:br>
             <a:r>
-              <a:rPr lang="en-GB" sz="1200" dirty="0" err="1"/>
-              <a:t>SecurityShiro</a:t>
-            </a:r>
-            <a:endParaRPr lang="en-GB" sz="1200" dirty="0"/>
+              <a:rPr lang="en-GB" sz="1200" dirty="0"/>
+              <a:t>Shiro</a:t>
+            </a:r>
           </a:p>
         </p:txBody>
       </p:sp>
@@ -3733,17 +3732,9 @@
           <a:p>
             <a:pPr algn="ctr"/>
             <a:r>
-              <a:rPr lang="en-GB" sz="1200" dirty="0" err="1"/>
-              <a:t>IsisBoot</a:t>
-            </a:r>
-            <a:br>
               <a:rPr lang="en-GB" sz="1200" dirty="0"/>
-            </a:br>
-            <a:r>
-              <a:rPr lang="en-GB" sz="1200" dirty="0" err="1"/>
-              <a:t>DataNucleus</a:t>
-            </a:r>
-            <a:endParaRPr lang="en-GB" sz="1200" dirty="0"/>
+              <a:t>DataNucleus5</a:t>
+            </a:r>
           </a:p>
         </p:txBody>
       </p:sp>
@@ -3790,17 +3781,16 @@
           <a:p>
             <a:pPr algn="ctr"/>
             <a:r>
-              <a:rPr lang="en-GB" sz="1200" dirty="0" err="1"/>
-              <a:t>IsisBoot</a:t>
+              <a:rPr lang="en-GB" sz="1200" dirty="0"/>
+              <a:t>Wicket</a:t>
             </a:r>
             <a:br>
               <a:rPr lang="en-GB" sz="1200" dirty="0"/>
             </a:br>
             <a:r>
-              <a:rPr lang="en-GB" sz="1200" dirty="0" err="1"/>
-              <a:t>ViewerWicket</a:t>
-            </a:r>
-            <a:endParaRPr lang="en-GB" sz="1200" dirty="0"/>
+              <a:rPr lang="en-GB" sz="1200" dirty="0"/>
+              <a:t>Viewer</a:t>
+            </a:r>
           </a:p>
         </p:txBody>
       </p:sp>
@@ -3848,16 +3838,15 @@
             <a:pPr algn="ctr"/>
             <a:r>
               <a:rPr lang="en-GB" sz="1200" dirty="0" err="1"/>
-              <a:t>IsisBoot</a:t>
+              <a:t>RestfulObjects</a:t>
             </a:r>
             <a:br>
               <a:rPr lang="en-GB" sz="1200" dirty="0"/>
             </a:br>
             <a:r>
-              <a:rPr lang="en-GB" sz="1200" dirty="0" err="1"/>
-              <a:t>ViewerRestfulObjects</a:t>
-            </a:r>
-            <a:endParaRPr lang="en-GB" sz="1200" dirty="0"/>
+              <a:rPr lang="en-GB" sz="1200" dirty="0"/>
+              <a:t>Viewer</a:t>
+            </a:r>
           </a:p>
         </p:txBody>
       </p:sp>
@@ -3903,13 +3892,6 @@
           <a:lstStyle/>
           <a:p>
             <a:pPr algn="ctr"/>
-            <a:r>
-              <a:rPr lang="en-GB" sz="1200" dirty="0" err="1"/>
-              <a:t>IsisBoot</a:t>
-            </a:r>
-            <a:br>
-              <a:rPr lang="en-GB" sz="1200" dirty="0"/>
-            </a:br>
             <a:r>
               <a:rPr lang="en-GB" sz="1200" dirty="0"/>
               <a:t>WebApp</a:t>
@@ -3980,8 +3962,8 @@
         </p:nvCxnSpPr>
         <p:spPr>
           <a:xfrm rot="10800000">
-            <a:off x="6683073" y="3370516"/>
-            <a:ext cx="1528295" cy="839711"/>
+            <a:off x="6678973" y="3370516"/>
+            <a:ext cx="1532395" cy="839711"/>
           </a:xfrm>
           <a:prstGeom prst="curvedConnector3">
             <a:avLst>
@@ -4186,15 +4168,9 @@
             <a:pPr algn="ctr"/>
             <a:r>
               <a:rPr lang="en-GB" sz="1200" dirty="0" err="1"/>
-              <a:t>IsisExtFixtures</a:t>
-            </a:r>
-            <a:br>
-              <a:rPr lang="en-GB" sz="1200" dirty="0"/>
-            </a:br>
-            <a:r>
-              <a:rPr lang="en-GB" sz="1200" dirty="0"/>
-              <a:t>Module</a:t>
-            </a:r>
+              <a:t>ExtFixtures</a:t>
+            </a:r>
+            <a:endParaRPr lang="en-GB" sz="1200" dirty="0"/>
           </a:p>
         </p:txBody>
       </p:sp>
@@ -4287,15 +4263,9 @@
             <a:pPr algn="ctr"/>
             <a:r>
               <a:rPr lang="en-GB" sz="1200" dirty="0" err="1"/>
-              <a:t>IsisApplib</a:t>
-            </a:r>
-            <a:br>
-              <a:rPr lang="en-GB" sz="1200" dirty="0"/>
-            </a:br>
-            <a:r>
-              <a:rPr lang="en-GB" sz="1200" dirty="0"/>
-              <a:t>Module</a:t>
-            </a:r>
+              <a:t>Applib</a:t>
+            </a:r>
+            <a:endParaRPr lang="en-GB" sz="1200" dirty="0"/>
           </a:p>
         </p:txBody>
       </p:sp>
@@ -4342,15 +4312,8 @@
           <a:p>
             <a:pPr algn="ctr"/>
             <a:r>
-              <a:rPr lang="en-GB" sz="1200" dirty="0" err="1"/>
-              <a:t>IsisMetamodel</a:t>
-            </a:r>
-            <a:br>
               <a:rPr lang="en-GB" sz="1200" dirty="0"/>
-            </a:br>
-            <a:r>
-              <a:rPr lang="en-GB" sz="1200" dirty="0"/>
-              <a:t>Module</a:t>
+              <a:t>Metamodel</a:t>
             </a:r>
           </a:p>
         </p:txBody>
@@ -4398,15 +4361,8 @@
           <a:p>
             <a:pPr algn="ctr"/>
             <a:r>
-              <a:rPr lang="en-GB" sz="1200" dirty="0" err="1"/>
-              <a:t>IsisRuntime</a:t>
-            </a:r>
-            <a:br>
               <a:rPr lang="en-GB" sz="1200" dirty="0"/>
-            </a:br>
-            <a:r>
-              <a:rPr lang="en-GB" sz="1200" dirty="0"/>
-              <a:t>Module</a:t>
+              <a:t>Runtime</a:t>
             </a:r>
           </a:p>
         </p:txBody>
@@ -4597,15 +4553,9 @@
             <a:pPr algn="ctr"/>
             <a:r>
               <a:rPr lang="en-GB" sz="1200" dirty="0" err="1"/>
-              <a:t>IsisRuntimeServices</a:t>
-            </a:r>
-            <a:br>
-              <a:rPr lang="en-GB" sz="1200" dirty="0"/>
-            </a:br>
-            <a:r>
-              <a:rPr lang="en-GB" sz="1200" dirty="0"/>
-              <a:t>Module</a:t>
-            </a:r>
+              <a:t>RuntimeServices</a:t>
+            </a:r>
+            <a:endParaRPr lang="en-GB" sz="1200" dirty="0"/>
           </a:p>
         </p:txBody>
       </p:sp>
@@ -4698,15 +4648,8 @@
           <a:p>
             <a:pPr algn="ctr"/>
             <a:r>
-              <a:rPr lang="en-GB" sz="1200" dirty="0" err="1"/>
-              <a:t>IsisConfig</a:t>
-            </a:r>
-            <a:br>
               <a:rPr lang="en-GB" sz="1200" dirty="0"/>
-            </a:br>
-            <a:r>
-              <a:rPr lang="en-GB" sz="1200" dirty="0"/>
-              <a:t>Module</a:t>
+              <a:t>Config</a:t>
             </a:r>
           </a:p>
         </p:txBody>
@@ -4761,8 +4704,12 @@
               <a:rPr lang="en-GB" sz="1050" dirty="0"/>
             </a:br>
             <a:r>
+              <a:rPr lang="en-GB" sz="1050" dirty="0" err="1"/>
+              <a:t>IsisModule</a:t>
+            </a:r>
+            <a:r>
               <a:rPr lang="en-GB" sz="1050" dirty="0"/>
-              <a:t>(framework)</a:t>
+              <a:t>…</a:t>
             </a:r>
           </a:p>
         </p:txBody>
@@ -4877,7 +4824,7 @@
         </p:nvSpPr>
         <p:spPr>
           <a:xfrm>
-            <a:off x="9763643" y="5835277"/>
+            <a:off x="8525408" y="5835277"/>
             <a:ext cx="1089327" cy="369134"/>
           </a:xfrm>
           <a:prstGeom prst="rect">
@@ -4962,13 +4909,6 @@
           <a:p>
             <a:pPr algn="ctr"/>
             <a:r>
-              <a:rPr lang="en-GB" sz="1200" dirty="0" err="1"/>
-              <a:t>WebModule</a:t>
-            </a:r>
-            <a:br>
-              <a:rPr lang="en-GB" sz="1200" dirty="0"/>
-            </a:br>
-            <a:r>
               <a:rPr lang="en-GB" sz="1200" dirty="0"/>
               <a:t>Shiro</a:t>
             </a:r>
@@ -5132,7 +5072,7 @@
         <p:spPr>
           <a:xfrm rot="10800000">
             <a:off x="4528613" y="3368555"/>
-            <a:ext cx="616255" cy="1960"/>
+            <a:ext cx="612155" cy="1960"/>
           </a:xfrm>
           <a:prstGeom prst="curvedConnector3">
             <a:avLst>
@@ -5202,13 +5142,6 @@
           <a:p>
             <a:pPr algn="ctr"/>
             <a:r>
-              <a:rPr lang="en-GB" sz="1200" dirty="0" err="1"/>
-              <a:t>WebModule</a:t>
-            </a:r>
-            <a:br>
-              <a:rPr lang="en-GB" sz="1200" dirty="0"/>
-            </a:br>
-            <a:r>
               <a:rPr lang="en-GB" sz="1200" dirty="0"/>
               <a:t>Wicket</a:t>
             </a:r>
@@ -5259,13 +5192,6 @@
             <a:pPr algn="ctr"/>
             <a:r>
               <a:rPr lang="en-GB" sz="1200" dirty="0" err="1"/>
-              <a:t>WebModule</a:t>
-            </a:r>
-            <a:br>
-              <a:rPr lang="en-GB" sz="1200" dirty="0"/>
-            </a:br>
-            <a:r>
-              <a:rPr lang="en-GB" sz="1200" dirty="0" err="1"/>
               <a:t>RestfulObjects</a:t>
             </a:r>
             <a:endParaRPr lang="en-GB" sz="1200" dirty="0"/>
@@ -5316,13 +5242,6 @@
             <a:pPr algn="ctr"/>
             <a:r>
               <a:rPr lang="en-GB" sz="1200" dirty="0" err="1"/>
-              <a:t>WebModule</a:t>
-            </a:r>
-            <a:br>
-              <a:rPr lang="en-GB" sz="1200" dirty="0"/>
-            </a:br>
-            <a:r>
-              <a:rPr lang="en-GB" sz="1200" dirty="0" err="1"/>
               <a:t>TemplateResources</a:t>
             </a:r>
             <a:endParaRPr lang="en-GB" sz="1200" dirty="0"/>
@@ -5372,13 +5291,6 @@
           <a:p>
             <a:pPr algn="ctr"/>
             <a:r>
-              <a:rPr lang="en-GB" sz="1200" dirty="0" err="1"/>
-              <a:t>WebModule</a:t>
-            </a:r>
-            <a:br>
-              <a:rPr lang="en-GB" sz="1200" dirty="0"/>
-            </a:br>
-            <a:r>
               <a:rPr lang="en-GB" sz="1200" dirty="0"/>
               <a:t>H2Console</a:t>
             </a:r>
@@ -5531,15 +5443,15 @@
           </p:cNvPr>
           <p:cNvCxnSpPr>
             <a:cxnSpLocks/>
-            <a:stCxn id="66" idx="1"/>
+            <a:stCxn id="92" idx="1"/>
             <a:endCxn id="184" idx="3"/>
           </p:cNvCxnSpPr>
           <p:nvPr/>
         </p:nvCxnSpPr>
         <p:spPr>
           <a:xfrm rot="10800000" flipV="1">
-            <a:off x="4528613" y="6117743"/>
-            <a:ext cx="616255" cy="403399"/>
+            <a:off x="4528612" y="6108849"/>
+            <a:ext cx="618336" cy="412293"/>
           </a:xfrm>
           <a:prstGeom prst="curvedConnector3">
             <a:avLst>
@@ -5613,17 +5525,16 @@
           <a:p>
             <a:pPr algn="ctr"/>
             <a:r>
-              <a:rPr lang="en-GB" sz="1200" dirty="0" err="1"/>
-              <a:t>IsisBoot</a:t>
+              <a:rPr lang="en-GB" sz="1200" dirty="0"/>
+              <a:t>Security</a:t>
             </a:r>
             <a:br>
               <a:rPr lang="en-GB" sz="1200" dirty="0"/>
             </a:br>
             <a:r>
-              <a:rPr lang="en-GB" sz="1200" dirty="0" err="1"/>
-              <a:t>SecurityBypass</a:t>
-            </a:r>
-            <a:endParaRPr lang="en-GB" sz="1200" dirty="0"/>
+              <a:rPr lang="en-GB" sz="1200" dirty="0"/>
+              <a:t>Bypass</a:t>
+            </a:r>
           </a:p>
         </p:txBody>
       </p:sp>
@@ -5946,15 +5857,15 @@
         </p:spPr>
         <p:style>
           <a:lnRef idx="2">
-            <a:schemeClr val="accent5">
+            <a:schemeClr val="accent2">
               <a:shade val="50000"/>
             </a:schemeClr>
           </a:lnRef>
           <a:fillRef idx="1">
-            <a:schemeClr val="accent5"/>
+            <a:schemeClr val="accent2"/>
           </a:fillRef>
           <a:effectRef idx="0">
-            <a:schemeClr val="accent5"/>
+            <a:schemeClr val="accent2"/>
           </a:effectRef>
           <a:fontRef idx="minor">
             <a:schemeClr val="lt1"/>
@@ -5995,6 +5906,933 @@
           <a:xfrm>
             <a:off x="10419546" y="3947218"/>
             <a:ext cx="1590060" cy="486032"/>
+          </a:xfrm>
+          <a:prstGeom prst="rect">
+            <a:avLst/>
+          </a:prstGeom>
+        </p:spPr>
+        <p:style>
+          <a:lnRef idx="2">
+            <a:schemeClr val="accent2">
+              <a:shade val="50000"/>
+            </a:schemeClr>
+          </a:lnRef>
+          <a:fillRef idx="1">
+            <a:schemeClr val="accent2"/>
+          </a:fillRef>
+          <a:effectRef idx="0">
+            <a:schemeClr val="accent2"/>
+          </a:effectRef>
+          <a:fontRef idx="minor">
+            <a:schemeClr val="lt1"/>
+          </a:fontRef>
+        </p:style>
+        <p:txBody>
+          <a:bodyPr rtlCol="0" anchor="ctr"/>
+          <a:lstStyle/>
+          <a:p>
+            <a:pPr algn="ctr"/>
+            <a:r>
+              <a:rPr lang="en-GB" sz="1200" dirty="0"/>
+              <a:t>Simple</a:t>
+            </a:r>
+            <a:br>
+              <a:rPr lang="en-GB" sz="1200" dirty="0"/>
+            </a:br>
+            <a:r>
+              <a:rPr lang="en-GB" sz="1200" dirty="0"/>
+              <a:t>Module</a:t>
+            </a:r>
+          </a:p>
+        </p:txBody>
+      </p:sp>
+      <p:sp>
+        <p:nvSpPr>
+          <p:cNvPr id="388" name="Rectangle 387">
+            <a:extLst>
+              <a:ext uri="{FF2B5EF4-FFF2-40B4-BE49-F238E27FC236}">
+                <a16:creationId xmlns:a16="http://schemas.microsoft.com/office/drawing/2014/main" id="{93CD03F5-D318-4C5F-8172-CAB8BD858EB4}"/>
+              </a:ext>
+            </a:extLst>
+          </p:cNvPr>
+          <p:cNvSpPr/>
+          <p:nvPr/>
+        </p:nvSpPr>
+        <p:spPr>
+          <a:xfrm>
+            <a:off x="9742936" y="5835277"/>
+            <a:ext cx="1089327" cy="369134"/>
+          </a:xfrm>
+          <a:prstGeom prst="rect">
+            <a:avLst/>
+          </a:prstGeom>
+        </p:spPr>
+        <p:style>
+          <a:lnRef idx="2">
+            <a:schemeClr val="accent2">
+              <a:shade val="50000"/>
+            </a:schemeClr>
+          </a:lnRef>
+          <a:fillRef idx="1">
+            <a:schemeClr val="accent2"/>
+          </a:fillRef>
+          <a:effectRef idx="0">
+            <a:schemeClr val="accent2"/>
+          </a:effectRef>
+          <a:fontRef idx="minor">
+            <a:schemeClr val="lt1"/>
+          </a:fontRef>
+        </p:style>
+        <p:txBody>
+          <a:bodyPr rtlCol="0" anchor="ctr"/>
+          <a:lstStyle/>
+          <a:p>
+            <a:pPr algn="ctr"/>
+            <a:r>
+              <a:rPr lang="en-GB" sz="1050" dirty="0"/>
+              <a:t>@Configuration</a:t>
+            </a:r>
+            <a:br>
+              <a:rPr lang="en-GB" sz="1050" dirty="0"/>
+            </a:br>
+            <a:r>
+              <a:rPr lang="en-GB" sz="1050" dirty="0"/>
+              <a:t>(application)</a:t>
+            </a:r>
+          </a:p>
+        </p:txBody>
+      </p:sp>
+      <p:cxnSp>
+        <p:nvCxnSpPr>
+          <p:cNvPr id="389" name="Connector: Curved 388">
+            <a:extLst>
+              <a:ext uri="{FF2B5EF4-FFF2-40B4-BE49-F238E27FC236}">
+                <a16:creationId xmlns:a16="http://schemas.microsoft.com/office/drawing/2014/main" id="{64C8F4C0-AB99-4D2A-B586-D334DD017AF9}"/>
+              </a:ext>
+            </a:extLst>
+          </p:cNvPr>
+          <p:cNvCxnSpPr>
+            <a:cxnSpLocks/>
+            <a:stCxn id="5" idx="3"/>
+            <a:endCxn id="377" idx="1"/>
+          </p:cNvCxnSpPr>
+          <p:nvPr/>
+        </p:nvCxnSpPr>
+        <p:spPr>
+          <a:xfrm flipV="1">
+            <a:off x="9749572" y="3467940"/>
+            <a:ext cx="406267" cy="742286"/>
+          </a:xfrm>
+          <a:prstGeom prst="curvedConnector3">
+            <a:avLst>
+              <a:gd name="adj1" fmla="val 50000"/>
+            </a:avLst>
+          </a:prstGeom>
+          <a:ln>
+            <a:tailEnd type="triangle"/>
+          </a:ln>
+        </p:spPr>
+        <p:style>
+          <a:lnRef idx="1">
+            <a:schemeClr val="accent1"/>
+          </a:lnRef>
+          <a:fillRef idx="0">
+            <a:schemeClr val="accent1"/>
+          </a:fillRef>
+          <a:effectRef idx="0">
+            <a:schemeClr val="accent1"/>
+          </a:effectRef>
+          <a:fontRef idx="minor">
+            <a:schemeClr val="tx1"/>
+          </a:fontRef>
+        </p:style>
+      </p:cxnSp>
+      <p:cxnSp>
+        <p:nvCxnSpPr>
+          <p:cNvPr id="392" name="Connector: Curved 391">
+            <a:extLst>
+              <a:ext uri="{FF2B5EF4-FFF2-40B4-BE49-F238E27FC236}">
+                <a16:creationId xmlns:a16="http://schemas.microsoft.com/office/drawing/2014/main" id="{9CC15F83-8243-4E1E-8902-3B6880A74C93}"/>
+              </a:ext>
+            </a:extLst>
+          </p:cNvPr>
+          <p:cNvCxnSpPr>
+            <a:cxnSpLocks/>
+            <a:stCxn id="377" idx="2"/>
+            <a:endCxn id="387" idx="0"/>
+          </p:cNvCxnSpPr>
+          <p:nvPr/>
+        </p:nvCxnSpPr>
+        <p:spPr>
+          <a:xfrm rot="16200000" flipH="1">
+            <a:off x="10951628" y="3684270"/>
+            <a:ext cx="236262" cy="289634"/>
+          </a:xfrm>
+          <a:prstGeom prst="curvedConnector3">
+            <a:avLst>
+              <a:gd name="adj1" fmla="val 50000"/>
+            </a:avLst>
+          </a:prstGeom>
+          <a:ln>
+            <a:tailEnd type="triangle"/>
+          </a:ln>
+        </p:spPr>
+        <p:style>
+          <a:lnRef idx="2">
+            <a:schemeClr val="accent2">
+              <a:shade val="50000"/>
+            </a:schemeClr>
+          </a:lnRef>
+          <a:fillRef idx="1">
+            <a:schemeClr val="accent2"/>
+          </a:fillRef>
+          <a:effectRef idx="0">
+            <a:schemeClr val="accent2"/>
+          </a:effectRef>
+          <a:fontRef idx="minor">
+            <a:schemeClr val="lt1"/>
+          </a:fontRef>
+        </p:style>
+      </p:cxnSp>
+      <p:cxnSp>
+        <p:nvCxnSpPr>
+          <p:cNvPr id="421" name="Connector: Curved 420">
+            <a:extLst>
+              <a:ext uri="{FF2B5EF4-FFF2-40B4-BE49-F238E27FC236}">
+                <a16:creationId xmlns:a16="http://schemas.microsoft.com/office/drawing/2014/main" id="{1BF1B88B-11F5-418D-95F0-4B82A6D8BEFF}"/>
+              </a:ext>
+            </a:extLst>
+          </p:cNvPr>
+          <p:cNvCxnSpPr>
+            <a:cxnSpLocks/>
+            <a:stCxn id="286" idx="1"/>
+            <a:endCxn id="42" idx="6"/>
+          </p:cNvCxnSpPr>
+          <p:nvPr/>
+        </p:nvCxnSpPr>
+        <p:spPr>
+          <a:xfrm rot="10800000">
+            <a:off x="7609953" y="2125789"/>
+            <a:ext cx="594779" cy="605431"/>
+          </a:xfrm>
+          <a:prstGeom prst="curvedConnector3">
+            <a:avLst>
+              <a:gd name="adj1" fmla="val 50000"/>
+            </a:avLst>
+          </a:prstGeom>
+          <a:ln>
+            <a:tailEnd type="triangle"/>
+          </a:ln>
+        </p:spPr>
+        <p:style>
+          <a:lnRef idx="1">
+            <a:schemeClr val="accent1"/>
+          </a:lnRef>
+          <a:fillRef idx="0">
+            <a:schemeClr val="accent1"/>
+          </a:fillRef>
+          <a:effectRef idx="0">
+            <a:schemeClr val="accent1"/>
+          </a:effectRef>
+          <a:fontRef idx="minor">
+            <a:schemeClr val="tx1"/>
+          </a:fontRef>
+        </p:style>
+      </p:cxnSp>
+      <p:cxnSp>
+        <p:nvCxnSpPr>
+          <p:cNvPr id="456" name="Connector: Curved 455">
+            <a:extLst>
+              <a:ext uri="{FF2B5EF4-FFF2-40B4-BE49-F238E27FC236}">
+                <a16:creationId xmlns:a16="http://schemas.microsoft.com/office/drawing/2014/main" id="{DA9FFB47-1BAC-47F3-9FDC-C98339712BEB}"/>
+              </a:ext>
+            </a:extLst>
+          </p:cNvPr>
+          <p:cNvCxnSpPr>
+            <a:cxnSpLocks/>
+            <a:stCxn id="286" idx="3"/>
+            <a:endCxn id="377" idx="1"/>
+          </p:cNvCxnSpPr>
+          <p:nvPr/>
+        </p:nvCxnSpPr>
+        <p:spPr>
+          <a:xfrm>
+            <a:off x="9742936" y="2731219"/>
+            <a:ext cx="412903" cy="736721"/>
+          </a:xfrm>
+          <a:prstGeom prst="curvedConnector3">
+            <a:avLst>
+              <a:gd name="adj1" fmla="val 50000"/>
+            </a:avLst>
+          </a:prstGeom>
+          <a:ln>
+            <a:tailEnd type="triangle"/>
+          </a:ln>
+        </p:spPr>
+        <p:style>
+          <a:lnRef idx="1">
+            <a:schemeClr val="accent1"/>
+          </a:lnRef>
+          <a:fillRef idx="0">
+            <a:schemeClr val="accent1"/>
+          </a:fillRef>
+          <a:effectRef idx="0">
+            <a:schemeClr val="accent1"/>
+          </a:effectRef>
+          <a:fontRef idx="minor">
+            <a:schemeClr val="tx1"/>
+          </a:fontRef>
+        </p:style>
+      </p:cxnSp>
+      <p:cxnSp>
+        <p:nvCxnSpPr>
+          <p:cNvPr id="69" name="Connector: Curved 68">
+            <a:extLst>
+              <a:ext uri="{FF2B5EF4-FFF2-40B4-BE49-F238E27FC236}">
+                <a16:creationId xmlns:a16="http://schemas.microsoft.com/office/drawing/2014/main" id="{06294774-0010-41A3-9681-B0F18772705B}"/>
+              </a:ext>
+            </a:extLst>
+          </p:cNvPr>
+          <p:cNvCxnSpPr>
+            <a:cxnSpLocks/>
+            <a:stCxn id="5" idx="1"/>
+            <a:endCxn id="92" idx="3"/>
+          </p:cNvCxnSpPr>
+          <p:nvPr/>
+        </p:nvCxnSpPr>
+        <p:spPr>
+          <a:xfrm rot="10800000" flipV="1">
+            <a:off x="6685153" y="4210226"/>
+            <a:ext cx="1526214" cy="1898624"/>
+          </a:xfrm>
+          <a:prstGeom prst="curvedConnector3">
+            <a:avLst>
+              <a:gd name="adj1" fmla="val 50000"/>
+            </a:avLst>
+          </a:prstGeom>
+          <a:ln>
+            <a:tailEnd type="triangle"/>
+          </a:ln>
+        </p:spPr>
+        <p:style>
+          <a:lnRef idx="1">
+            <a:schemeClr val="accent1"/>
+          </a:lnRef>
+          <a:fillRef idx="0">
+            <a:schemeClr val="accent1"/>
+          </a:fillRef>
+          <a:effectRef idx="0">
+            <a:schemeClr val="accent1"/>
+          </a:effectRef>
+          <a:fontRef idx="minor">
+            <a:schemeClr val="tx1"/>
+          </a:fontRef>
+        </p:style>
+      </p:cxnSp>
+      <p:cxnSp>
+        <p:nvCxnSpPr>
+          <p:cNvPr id="82" name="Connector: Curved 81">
+            <a:extLst>
+              <a:ext uri="{FF2B5EF4-FFF2-40B4-BE49-F238E27FC236}">
+                <a16:creationId xmlns:a16="http://schemas.microsoft.com/office/drawing/2014/main" id="{B4575090-D3B8-4D0D-9F06-00CC05DD7A90}"/>
+              </a:ext>
+            </a:extLst>
+          </p:cNvPr>
+          <p:cNvCxnSpPr>
+            <a:cxnSpLocks/>
+            <a:stCxn id="92" idx="1"/>
+            <a:endCxn id="20" idx="3"/>
+          </p:cNvCxnSpPr>
+          <p:nvPr/>
+        </p:nvCxnSpPr>
+        <p:spPr>
+          <a:xfrm rot="10800000">
+            <a:off x="4528612" y="5280548"/>
+            <a:ext cx="618336" cy="828302"/>
+          </a:xfrm>
+          <a:prstGeom prst="curvedConnector3">
+            <a:avLst>
+              <a:gd name="adj1" fmla="val 50000"/>
+            </a:avLst>
+          </a:prstGeom>
+          <a:ln>
+            <a:tailEnd type="triangle"/>
+          </a:ln>
+        </p:spPr>
+        <p:style>
+          <a:lnRef idx="1">
+            <a:schemeClr val="accent1"/>
+          </a:lnRef>
+          <a:fillRef idx="0">
+            <a:schemeClr val="accent1"/>
+          </a:fillRef>
+          <a:effectRef idx="0">
+            <a:schemeClr val="accent1"/>
+          </a:effectRef>
+          <a:fontRef idx="minor">
+            <a:schemeClr val="tx1"/>
+          </a:fontRef>
+        </p:style>
+      </p:cxnSp>
+      <p:sp>
+        <p:nvSpPr>
+          <p:cNvPr id="42" name="Oval 41">
+            <a:extLst>
+              <a:ext uri="{FF2B5EF4-FFF2-40B4-BE49-F238E27FC236}">
+                <a16:creationId xmlns:a16="http://schemas.microsoft.com/office/drawing/2014/main" id="{F557478D-0046-4346-AFE3-81BF2E5A2356}"/>
+              </a:ext>
+            </a:extLst>
+          </p:cNvPr>
+          <p:cNvSpPr/>
+          <p:nvPr/>
+        </p:nvSpPr>
+        <p:spPr>
+          <a:xfrm>
+            <a:off x="7432454" y="2031133"/>
+            <a:ext cx="177498" cy="189310"/>
+          </a:xfrm>
+          <a:prstGeom prst="ellipse">
+            <a:avLst/>
+          </a:prstGeom>
+        </p:spPr>
+        <p:style>
+          <a:lnRef idx="2">
+            <a:schemeClr val="accent6"/>
+          </a:lnRef>
+          <a:fillRef idx="1">
+            <a:schemeClr val="lt1"/>
+          </a:fillRef>
+          <a:effectRef idx="0">
+            <a:schemeClr val="accent6"/>
+          </a:effectRef>
+          <a:fontRef idx="minor">
+            <a:schemeClr val="dk1"/>
+          </a:fontRef>
+        </p:style>
+        <p:txBody>
+          <a:bodyPr rtlCol="0" anchor="ctr"/>
+          <a:lstStyle/>
+          <a:p>
+            <a:pPr algn="ctr"/>
+            <a:endParaRPr lang="en-GB"/>
+          </a:p>
+        </p:txBody>
+      </p:sp>
+      <p:cxnSp>
+        <p:nvCxnSpPr>
+          <p:cNvPr id="94" name="Connector: Curved 93">
+            <a:extLst>
+              <a:ext uri="{FF2B5EF4-FFF2-40B4-BE49-F238E27FC236}">
+                <a16:creationId xmlns:a16="http://schemas.microsoft.com/office/drawing/2014/main" id="{6D6BAC74-E21A-46C5-B20F-78FB48479529}"/>
+              </a:ext>
+            </a:extLst>
+          </p:cNvPr>
+          <p:cNvCxnSpPr>
+            <a:cxnSpLocks/>
+            <a:stCxn id="42" idx="2"/>
+            <a:endCxn id="40" idx="3"/>
+          </p:cNvCxnSpPr>
+          <p:nvPr/>
+        </p:nvCxnSpPr>
+        <p:spPr>
+          <a:xfrm rot="10800000">
+            <a:off x="6683072" y="669840"/>
+            <a:ext cx="749382" cy="1455949"/>
+          </a:xfrm>
+          <a:prstGeom prst="curvedConnector3">
+            <a:avLst>
+              <a:gd name="adj1" fmla="val 50000"/>
+            </a:avLst>
+          </a:prstGeom>
+          <a:ln>
+            <a:tailEnd type="triangle"/>
+          </a:ln>
+        </p:spPr>
+        <p:style>
+          <a:lnRef idx="1">
+            <a:schemeClr val="accent1"/>
+          </a:lnRef>
+          <a:fillRef idx="0">
+            <a:schemeClr val="accent1"/>
+          </a:fillRef>
+          <a:effectRef idx="0">
+            <a:schemeClr val="accent1"/>
+          </a:effectRef>
+          <a:fontRef idx="minor">
+            <a:schemeClr val="tx1"/>
+          </a:fontRef>
+        </p:style>
+      </p:cxnSp>
+      <p:sp>
+        <p:nvSpPr>
+          <p:cNvPr id="114" name="Oval 113">
+            <a:extLst>
+              <a:ext uri="{FF2B5EF4-FFF2-40B4-BE49-F238E27FC236}">
+                <a16:creationId xmlns:a16="http://schemas.microsoft.com/office/drawing/2014/main" id="{8F0DEB79-4888-4DB9-8985-6BB7917CBBDC}"/>
+              </a:ext>
+            </a:extLst>
+          </p:cNvPr>
+          <p:cNvSpPr/>
+          <p:nvPr/>
+        </p:nvSpPr>
+        <p:spPr>
+          <a:xfrm>
+            <a:off x="10924941" y="5496060"/>
+            <a:ext cx="177498" cy="189310"/>
+          </a:xfrm>
+          <a:prstGeom prst="ellipse">
+            <a:avLst/>
+          </a:prstGeom>
+        </p:spPr>
+        <p:style>
+          <a:lnRef idx="2">
+            <a:schemeClr val="accent6"/>
+          </a:lnRef>
+          <a:fillRef idx="1">
+            <a:schemeClr val="lt1"/>
+          </a:fillRef>
+          <a:effectRef idx="0">
+            <a:schemeClr val="accent6"/>
+          </a:effectRef>
+          <a:fontRef idx="minor">
+            <a:schemeClr val="dk1"/>
+          </a:fontRef>
+        </p:style>
+        <p:txBody>
+          <a:bodyPr rtlCol="0" anchor="ctr"/>
+          <a:lstStyle/>
+          <a:p>
+            <a:pPr algn="ctr"/>
+            <a:endParaRPr lang="en-GB"/>
+          </a:p>
+        </p:txBody>
+      </p:sp>
+      <p:sp>
+        <p:nvSpPr>
+          <p:cNvPr id="115" name="TextBox 114">
+            <a:extLst>
+              <a:ext uri="{FF2B5EF4-FFF2-40B4-BE49-F238E27FC236}">
+                <a16:creationId xmlns:a16="http://schemas.microsoft.com/office/drawing/2014/main" id="{6B5B04DF-5FB2-404C-9AB5-B0EE9A966812}"/>
+              </a:ext>
+            </a:extLst>
+          </p:cNvPr>
+          <p:cNvSpPr txBox="1"/>
+          <p:nvPr/>
+        </p:nvSpPr>
+        <p:spPr>
+          <a:xfrm>
+            <a:off x="11086875" y="5349245"/>
+            <a:ext cx="943185" cy="415498"/>
+          </a:xfrm>
+          <a:prstGeom prst="rect">
+            <a:avLst/>
+          </a:prstGeom>
+          <a:noFill/>
+        </p:spPr>
+        <p:txBody>
+          <a:bodyPr wrap="square" rtlCol="0">
+            <a:spAutoFit/>
+          </a:bodyPr>
+          <a:lstStyle/>
+          <a:p>
+            <a:r>
+              <a:rPr lang="en-GB" sz="1050" dirty="0"/>
+              <a:t>common dependencies</a:t>
+            </a:r>
+          </a:p>
+        </p:txBody>
+      </p:sp>
+      <p:sp>
+        <p:nvSpPr>
+          <p:cNvPr id="116" name="TextBox 115">
+            <a:extLst>
+              <a:ext uri="{FF2B5EF4-FFF2-40B4-BE49-F238E27FC236}">
+                <a16:creationId xmlns:a16="http://schemas.microsoft.com/office/drawing/2014/main" id="{247209C1-AD03-4AA2-815E-C8A9590DD921}"/>
+              </a:ext>
+            </a:extLst>
+          </p:cNvPr>
+          <p:cNvSpPr txBox="1"/>
+          <p:nvPr/>
+        </p:nvSpPr>
+        <p:spPr>
+          <a:xfrm>
+            <a:off x="9030653" y="4501141"/>
+            <a:ext cx="1878796" cy="253916"/>
+          </a:xfrm>
+          <a:prstGeom prst="rect">
+            <a:avLst/>
+          </a:prstGeom>
+          <a:noFill/>
+        </p:spPr>
+        <p:txBody>
+          <a:bodyPr wrap="square" rtlCol="0">
+            <a:spAutoFit/>
+          </a:bodyPr>
+          <a:lstStyle/>
+          <a:p>
+            <a:r>
+              <a:rPr lang="en-GB" sz="1050" dirty="0"/>
+              <a:t>@Import</a:t>
+            </a:r>
+          </a:p>
+        </p:txBody>
+      </p:sp>
+      <p:sp>
+        <p:nvSpPr>
+          <p:cNvPr id="123" name="Rectangle 122">
+            <a:extLst>
+              <a:ext uri="{FF2B5EF4-FFF2-40B4-BE49-F238E27FC236}">
+                <a16:creationId xmlns:a16="http://schemas.microsoft.com/office/drawing/2014/main" id="{7CA212B5-D148-4CEA-B3C2-FB7FAA771FBD}"/>
+              </a:ext>
+            </a:extLst>
+          </p:cNvPr>
+          <p:cNvSpPr/>
+          <p:nvPr/>
+        </p:nvSpPr>
+        <p:spPr>
+          <a:xfrm>
+            <a:off x="5144867" y="3708012"/>
+            <a:ext cx="1538205" cy="486032"/>
+          </a:xfrm>
+          <a:prstGeom prst="rect">
+            <a:avLst/>
+          </a:prstGeom>
+          <a:solidFill>
+            <a:srgbClr val="4472C4">
+              <a:alpha val="50196"/>
+            </a:srgbClr>
+          </a:solidFill>
+        </p:spPr>
+        <p:style>
+          <a:lnRef idx="2">
+            <a:schemeClr val="accent1">
+              <a:shade val="50000"/>
+            </a:schemeClr>
+          </a:lnRef>
+          <a:fillRef idx="1">
+            <a:schemeClr val="accent1"/>
+          </a:fillRef>
+          <a:effectRef idx="0">
+            <a:schemeClr val="accent1"/>
+          </a:effectRef>
+          <a:fontRef idx="minor">
+            <a:schemeClr val="lt1"/>
+          </a:fontRef>
+        </p:style>
+        <p:txBody>
+          <a:bodyPr rtlCol="0" anchor="ctr"/>
+          <a:lstStyle/>
+          <a:p>
+            <a:pPr algn="ctr"/>
+            <a:r>
+              <a:rPr lang="en-GB" sz="1200" dirty="0"/>
+              <a:t>Security</a:t>
+            </a:r>
+            <a:br>
+              <a:rPr lang="en-GB" sz="1200" dirty="0"/>
+            </a:br>
+            <a:r>
+              <a:rPr lang="en-GB" sz="1200" dirty="0"/>
+              <a:t>Keycloak</a:t>
+            </a:r>
+          </a:p>
+        </p:txBody>
+      </p:sp>
+      <p:sp>
+        <p:nvSpPr>
+          <p:cNvPr id="125" name="Rectangle 124">
+            <a:extLst>
+              <a:ext uri="{FF2B5EF4-FFF2-40B4-BE49-F238E27FC236}">
+                <a16:creationId xmlns:a16="http://schemas.microsoft.com/office/drawing/2014/main" id="{1935E35C-1264-4F97-8E33-3C5F2259556C}"/>
+              </a:ext>
+            </a:extLst>
+          </p:cNvPr>
+          <p:cNvSpPr/>
+          <p:nvPr/>
+        </p:nvSpPr>
+        <p:spPr>
+          <a:xfrm>
+            <a:off x="2990407" y="3706052"/>
+            <a:ext cx="1538205" cy="486032"/>
+          </a:xfrm>
+          <a:prstGeom prst="rect">
+            <a:avLst/>
+          </a:prstGeom>
+          <a:solidFill>
+            <a:srgbClr val="70AD47">
+              <a:alpha val="50196"/>
+            </a:srgbClr>
+          </a:solidFill>
+        </p:spPr>
+        <p:style>
+          <a:lnRef idx="2">
+            <a:schemeClr val="accent6">
+              <a:shade val="50000"/>
+            </a:schemeClr>
+          </a:lnRef>
+          <a:fillRef idx="1">
+            <a:schemeClr val="accent6"/>
+          </a:fillRef>
+          <a:effectRef idx="0">
+            <a:schemeClr val="accent6"/>
+          </a:effectRef>
+          <a:fontRef idx="minor">
+            <a:schemeClr val="lt1"/>
+          </a:fontRef>
+        </p:style>
+        <p:txBody>
+          <a:bodyPr rtlCol="0" anchor="ctr"/>
+          <a:lstStyle/>
+          <a:p>
+            <a:pPr algn="ctr"/>
+            <a:r>
+              <a:rPr lang="en-GB" sz="1200" dirty="0"/>
+              <a:t>Keycloak</a:t>
+            </a:r>
+          </a:p>
+        </p:txBody>
+      </p:sp>
+      <p:cxnSp>
+        <p:nvCxnSpPr>
+          <p:cNvPr id="126" name="Connector: Curved 125">
+            <a:extLst>
+              <a:ext uri="{FF2B5EF4-FFF2-40B4-BE49-F238E27FC236}">
+                <a16:creationId xmlns:a16="http://schemas.microsoft.com/office/drawing/2014/main" id="{1F9A5455-6900-4E96-BA45-E51C295BB70C}"/>
+              </a:ext>
+            </a:extLst>
+          </p:cNvPr>
+          <p:cNvCxnSpPr>
+            <a:cxnSpLocks/>
+            <a:stCxn id="123" idx="1"/>
+            <a:endCxn id="125" idx="3"/>
+          </p:cNvCxnSpPr>
+          <p:nvPr/>
+        </p:nvCxnSpPr>
+        <p:spPr>
+          <a:xfrm rot="10800000">
+            <a:off x="4528613" y="3949068"/>
+            <a:ext cx="616255" cy="1960"/>
+          </a:xfrm>
+          <a:prstGeom prst="curvedConnector3">
+            <a:avLst>
+              <a:gd name="adj1" fmla="val 50000"/>
+            </a:avLst>
+          </a:prstGeom>
+          <a:ln>
+            <a:prstDash val="solid"/>
+            <a:tailEnd type="triangle"/>
+          </a:ln>
+        </p:spPr>
+        <p:style>
+          <a:lnRef idx="1">
+            <a:schemeClr val="accent1"/>
+          </a:lnRef>
+          <a:fillRef idx="0">
+            <a:schemeClr val="accent1"/>
+          </a:fillRef>
+          <a:effectRef idx="0">
+            <a:schemeClr val="accent1"/>
+          </a:effectRef>
+          <a:fontRef idx="minor">
+            <a:schemeClr val="tx1"/>
+          </a:fontRef>
+        </p:style>
+      </p:cxnSp>
+      <p:sp>
+        <p:nvSpPr>
+          <p:cNvPr id="71" name="TextBox 70">
+            <a:extLst>
+              <a:ext uri="{FF2B5EF4-FFF2-40B4-BE49-F238E27FC236}">
+                <a16:creationId xmlns:a16="http://schemas.microsoft.com/office/drawing/2014/main" id="{9468C3BA-1104-4FAF-B227-156B513C306D}"/>
+              </a:ext>
+            </a:extLst>
+          </p:cNvPr>
+          <p:cNvSpPr txBox="1"/>
+          <p:nvPr/>
+        </p:nvSpPr>
+        <p:spPr>
+          <a:xfrm>
+            <a:off x="5824368" y="4173626"/>
+            <a:ext cx="1379318" cy="253916"/>
+          </a:xfrm>
+          <a:prstGeom prst="rect">
+            <a:avLst/>
+          </a:prstGeom>
+          <a:noFill/>
+        </p:spPr>
+        <p:txBody>
+          <a:bodyPr wrap="square" rtlCol="0">
+            <a:spAutoFit/>
+          </a:bodyPr>
+          <a:lstStyle/>
+          <a:p>
+            <a:r>
+              <a:rPr lang="en-GB" sz="1050" dirty="0"/>
+              <a:t>(not used in this app)</a:t>
+            </a:r>
+          </a:p>
+        </p:txBody>
+      </p:sp>
+      <p:sp>
+        <p:nvSpPr>
+          <p:cNvPr id="2" name="TextBox 1">
+            <a:extLst>
+              <a:ext uri="{FF2B5EF4-FFF2-40B4-BE49-F238E27FC236}">
+                <a16:creationId xmlns:a16="http://schemas.microsoft.com/office/drawing/2014/main" id="{F2FE4EC6-A964-40FD-9686-116AD5FEDF4E}"/>
+              </a:ext>
+            </a:extLst>
+          </p:cNvPr>
+          <p:cNvSpPr txBox="1"/>
+          <p:nvPr/>
+        </p:nvSpPr>
+        <p:spPr>
+          <a:xfrm flipH="1">
+            <a:off x="8383874" y="218114"/>
+            <a:ext cx="3553660" cy="646331"/>
+          </a:xfrm>
+          <a:prstGeom prst="rect">
+            <a:avLst/>
+          </a:prstGeom>
+          <a:noFill/>
+        </p:spPr>
+        <p:txBody>
+          <a:bodyPr wrap="square" rtlCol="0">
+            <a:spAutoFit/>
+          </a:bodyPr>
+          <a:lstStyle/>
+          <a:p>
+            <a:pPr algn="ctr"/>
+            <a:r>
+              <a:rPr lang="en-GB" dirty="0"/>
+              <a:t>Module dependencies of</a:t>
+            </a:r>
+            <a:br>
+              <a:rPr lang="en-GB" dirty="0"/>
+            </a:br>
+            <a:r>
+              <a:rPr lang="en-GB" dirty="0" err="1"/>
+              <a:t>isis</a:t>
+            </a:r>
+            <a:r>
+              <a:rPr lang="en-GB" dirty="0"/>
+              <a:t>-app-simpleapp (starter app)</a:t>
+            </a:r>
+          </a:p>
+        </p:txBody>
+      </p:sp>
+      <p:sp>
+        <p:nvSpPr>
+          <p:cNvPr id="75" name="Rectangle 74">
+            <a:extLst>
+              <a:ext uri="{FF2B5EF4-FFF2-40B4-BE49-F238E27FC236}">
+                <a16:creationId xmlns:a16="http://schemas.microsoft.com/office/drawing/2014/main" id="{2B4416A3-F184-4260-AA9D-16E19ACF33B3}"/>
+              </a:ext>
+            </a:extLst>
+          </p:cNvPr>
+          <p:cNvSpPr/>
+          <p:nvPr/>
+        </p:nvSpPr>
+        <p:spPr>
+          <a:xfrm>
+            <a:off x="111761" y="3032743"/>
+            <a:ext cx="1538205" cy="486032"/>
+          </a:xfrm>
+          <a:prstGeom prst="rect">
+            <a:avLst/>
+          </a:prstGeom>
+        </p:spPr>
+        <p:style>
+          <a:lnRef idx="2">
+            <a:schemeClr val="accent1">
+              <a:shade val="50000"/>
+            </a:schemeClr>
+          </a:lnRef>
+          <a:fillRef idx="1">
+            <a:schemeClr val="accent1"/>
+          </a:fillRef>
+          <a:effectRef idx="0">
+            <a:schemeClr val="accent1"/>
+          </a:effectRef>
+          <a:fontRef idx="minor">
+            <a:schemeClr val="lt1"/>
+          </a:fontRef>
+        </p:style>
+        <p:txBody>
+          <a:bodyPr rtlCol="0" anchor="ctr"/>
+          <a:lstStyle/>
+          <a:p>
+            <a:pPr algn="ctr"/>
+            <a:r>
+              <a:rPr lang="en-GB" sz="1200" dirty="0"/>
+              <a:t>Commons</a:t>
+            </a:r>
+          </a:p>
+        </p:txBody>
+      </p:sp>
+      <p:cxnSp>
+        <p:nvCxnSpPr>
+          <p:cNvPr id="76" name="Connector: Curved 75">
+            <a:extLst>
+              <a:ext uri="{FF2B5EF4-FFF2-40B4-BE49-F238E27FC236}">
+                <a16:creationId xmlns:a16="http://schemas.microsoft.com/office/drawing/2014/main" id="{3DAAA8E7-2185-4A8C-80A0-45FC60219C57}"/>
+              </a:ext>
+            </a:extLst>
+          </p:cNvPr>
+          <p:cNvCxnSpPr>
+            <a:cxnSpLocks/>
+            <a:stCxn id="111" idx="1"/>
+            <a:endCxn id="75" idx="3"/>
+          </p:cNvCxnSpPr>
+          <p:nvPr/>
+        </p:nvCxnSpPr>
+        <p:spPr>
+          <a:xfrm rot="10800000" flipH="1" flipV="1">
+            <a:off x="783550" y="1279785"/>
+            <a:ext cx="866415" cy="1995973"/>
+          </a:xfrm>
+          <a:prstGeom prst="curvedConnector5">
+            <a:avLst>
+              <a:gd name="adj1" fmla="val -73238"/>
+              <a:gd name="adj2" fmla="val 76912"/>
+              <a:gd name="adj3" fmla="val 126385"/>
+            </a:avLst>
+          </a:prstGeom>
+          <a:ln>
+            <a:prstDash val="solid"/>
+            <a:tailEnd type="triangle"/>
+          </a:ln>
+        </p:spPr>
+        <p:style>
+          <a:lnRef idx="1">
+            <a:schemeClr val="accent1"/>
+          </a:lnRef>
+          <a:fillRef idx="0">
+            <a:schemeClr val="accent1"/>
+          </a:fillRef>
+          <a:effectRef idx="0">
+            <a:schemeClr val="accent1"/>
+          </a:effectRef>
+          <a:fontRef idx="minor">
+            <a:schemeClr val="tx1"/>
+          </a:fontRef>
+        </p:style>
+      </p:cxnSp>
+      <p:sp>
+        <p:nvSpPr>
+          <p:cNvPr id="86" name="Rectangle 85">
+            <a:extLst>
+              <a:ext uri="{FF2B5EF4-FFF2-40B4-BE49-F238E27FC236}">
+                <a16:creationId xmlns:a16="http://schemas.microsoft.com/office/drawing/2014/main" id="{32168251-15DA-4469-9763-4F4F29B26CFB}"/>
+              </a:ext>
+            </a:extLst>
+          </p:cNvPr>
+          <p:cNvSpPr/>
+          <p:nvPr/>
+        </p:nvSpPr>
+        <p:spPr>
+          <a:xfrm>
+            <a:off x="10968112" y="6319443"/>
+            <a:ext cx="1089327" cy="369134"/>
           </a:xfrm>
           <a:prstGeom prst="rect">
             <a:avLst/>
@@ -6022,25 +6860,29 @@
           <a:p>
             <a:pPr algn="ctr"/>
             <a:r>
-              <a:rPr lang="en-GB" sz="1200" dirty="0"/>
-              <a:t>Simple</a:t>
+              <a:rPr lang="en-GB" sz="1050" dirty="0"/>
+              <a:t>@Configuration</a:t>
             </a:r>
             <a:br>
-              <a:rPr lang="en-GB" sz="1200" dirty="0"/>
+              <a:rPr lang="en-GB" sz="1050" dirty="0"/>
             </a:br>
             <a:r>
-              <a:rPr lang="en-GB" sz="1200" dirty="0"/>
-              <a:t>Module</a:t>
-            </a:r>
-          </a:p>
-        </p:txBody>
-      </p:sp>
-      <p:sp>
-        <p:nvSpPr>
-          <p:cNvPr id="388" name="Rectangle 387">
-            <a:extLst>
-              <a:ext uri="{FF2B5EF4-FFF2-40B4-BE49-F238E27FC236}">
-                <a16:creationId xmlns:a16="http://schemas.microsoft.com/office/drawing/2014/main" id="{93CD03F5-D318-4C5F-8172-CAB8BD858EB4}"/>
+              <a:rPr lang="en-GB" sz="1050" dirty="0" err="1"/>
+              <a:t>IsisModuleExt</a:t>
+            </a:r>
+            <a:r>
+              <a:rPr lang="en-GB" sz="1050" dirty="0"/>
+              <a:t>…</a:t>
+            </a:r>
+          </a:p>
+        </p:txBody>
+      </p:sp>
+      <p:sp>
+        <p:nvSpPr>
+          <p:cNvPr id="91" name="Rectangle 90">
+            <a:extLst>
+              <a:ext uri="{FF2B5EF4-FFF2-40B4-BE49-F238E27FC236}">
+                <a16:creationId xmlns:a16="http://schemas.microsoft.com/office/drawing/2014/main" id="{1EFBFD41-7EFF-41C4-9398-4E198CEF93CD}"/>
               </a:ext>
             </a:extLst>
           </p:cNvPr>
@@ -6049,8 +6891,8 @@
         </p:nvSpPr>
         <p:spPr>
           <a:xfrm>
-            <a:off x="10961177" y="6314915"/>
-            <a:ext cx="1089327" cy="369134"/>
+            <a:off x="5144867" y="418622"/>
+            <a:ext cx="1538205" cy="486032"/>
           </a:xfrm>
           <a:prstGeom prst="rect">
             <a:avLst/>
@@ -6078,214 +6920,27 @@
           <a:p>
             <a:pPr algn="ctr"/>
             <a:r>
-              <a:rPr lang="en-GB" sz="1050" dirty="0"/>
-              <a:t>@Configuration</a:t>
-            </a:r>
-            <a:br>
-              <a:rPr lang="en-GB" sz="1050" dirty="0"/>
-            </a:br>
-            <a:r>
-              <a:rPr lang="en-GB" sz="1050" dirty="0"/>
-              <a:t>(application)</a:t>
-            </a:r>
-          </a:p>
-        </p:txBody>
-      </p:sp>
-      <p:cxnSp>
-        <p:nvCxnSpPr>
-          <p:cNvPr id="389" name="Connector: Curved 388">
-            <a:extLst>
-              <a:ext uri="{FF2B5EF4-FFF2-40B4-BE49-F238E27FC236}">
-                <a16:creationId xmlns:a16="http://schemas.microsoft.com/office/drawing/2014/main" id="{64C8F4C0-AB99-4D2A-B586-D334DD017AF9}"/>
-              </a:ext>
-            </a:extLst>
-          </p:cNvPr>
-          <p:cNvCxnSpPr>
-            <a:cxnSpLocks/>
-            <a:stCxn id="5" idx="3"/>
-            <a:endCxn id="377" idx="1"/>
-          </p:cNvCxnSpPr>
-          <p:nvPr/>
-        </p:nvCxnSpPr>
-        <p:spPr>
-          <a:xfrm flipV="1">
-            <a:off x="9749572" y="3467940"/>
-            <a:ext cx="406267" cy="742286"/>
-          </a:xfrm>
-          <a:prstGeom prst="curvedConnector3">
-            <a:avLst>
-              <a:gd name="adj1" fmla="val 50000"/>
-            </a:avLst>
-          </a:prstGeom>
-          <a:ln>
-            <a:tailEnd type="triangle"/>
-          </a:ln>
-        </p:spPr>
-        <p:style>
-          <a:lnRef idx="1">
-            <a:schemeClr val="accent1"/>
-          </a:lnRef>
-          <a:fillRef idx="0">
-            <a:schemeClr val="accent1"/>
-          </a:fillRef>
-          <a:effectRef idx="0">
-            <a:schemeClr val="accent1"/>
-          </a:effectRef>
-          <a:fontRef idx="minor">
-            <a:schemeClr val="tx1"/>
-          </a:fontRef>
-        </p:style>
-      </p:cxnSp>
-      <p:cxnSp>
-        <p:nvCxnSpPr>
-          <p:cNvPr id="392" name="Connector: Curved 391">
-            <a:extLst>
-              <a:ext uri="{FF2B5EF4-FFF2-40B4-BE49-F238E27FC236}">
-                <a16:creationId xmlns:a16="http://schemas.microsoft.com/office/drawing/2014/main" id="{9CC15F83-8243-4E1E-8902-3B6880A74C93}"/>
-              </a:ext>
-            </a:extLst>
-          </p:cNvPr>
-          <p:cNvCxnSpPr>
-            <a:cxnSpLocks/>
-            <a:stCxn id="377" idx="2"/>
-            <a:endCxn id="387" idx="0"/>
-          </p:cNvCxnSpPr>
-          <p:nvPr/>
-        </p:nvCxnSpPr>
-        <p:spPr>
-          <a:xfrm rot="16200000" flipH="1">
-            <a:off x="10951628" y="3684270"/>
-            <a:ext cx="236262" cy="289634"/>
-          </a:xfrm>
-          <a:prstGeom prst="curvedConnector3">
-            <a:avLst>
-              <a:gd name="adj1" fmla="val 50000"/>
-            </a:avLst>
-          </a:prstGeom>
-          <a:ln>
-            <a:tailEnd type="triangle"/>
-          </a:ln>
-        </p:spPr>
-        <p:style>
-          <a:lnRef idx="1">
-            <a:schemeClr val="accent1"/>
-          </a:lnRef>
-          <a:fillRef idx="0">
-            <a:schemeClr val="accent1"/>
-          </a:fillRef>
-          <a:effectRef idx="0">
-            <a:schemeClr val="accent1"/>
-          </a:effectRef>
-          <a:fontRef idx="minor">
-            <a:schemeClr val="tx1"/>
-          </a:fontRef>
-        </p:style>
-      </p:cxnSp>
-      <p:cxnSp>
-        <p:nvCxnSpPr>
-          <p:cNvPr id="421" name="Connector: Curved 420">
-            <a:extLst>
-              <a:ext uri="{FF2B5EF4-FFF2-40B4-BE49-F238E27FC236}">
-                <a16:creationId xmlns:a16="http://schemas.microsoft.com/office/drawing/2014/main" id="{1BF1B88B-11F5-418D-95F0-4B82A6D8BEFF}"/>
-              </a:ext>
-            </a:extLst>
-          </p:cNvPr>
-          <p:cNvCxnSpPr>
-            <a:cxnSpLocks/>
-            <a:stCxn id="286" idx="1"/>
-            <a:endCxn id="42" idx="6"/>
-          </p:cNvCxnSpPr>
-          <p:nvPr/>
-        </p:nvCxnSpPr>
-        <p:spPr>
-          <a:xfrm rot="10800000">
-            <a:off x="7609953" y="2125789"/>
-            <a:ext cx="594779" cy="605431"/>
-          </a:xfrm>
-          <a:prstGeom prst="curvedConnector3">
-            <a:avLst>
-              <a:gd name="adj1" fmla="val 50000"/>
-            </a:avLst>
-          </a:prstGeom>
-          <a:ln>
-            <a:tailEnd type="triangle"/>
-          </a:ln>
-        </p:spPr>
-        <p:style>
-          <a:lnRef idx="1">
-            <a:schemeClr val="accent1"/>
-          </a:lnRef>
-          <a:fillRef idx="0">
-            <a:schemeClr val="accent1"/>
-          </a:fillRef>
-          <a:effectRef idx="0">
-            <a:schemeClr val="accent1"/>
-          </a:effectRef>
-          <a:fontRef idx="minor">
-            <a:schemeClr val="tx1"/>
-          </a:fontRef>
-        </p:style>
-      </p:cxnSp>
-      <p:cxnSp>
-        <p:nvCxnSpPr>
-          <p:cNvPr id="456" name="Connector: Curved 455">
-            <a:extLst>
-              <a:ext uri="{FF2B5EF4-FFF2-40B4-BE49-F238E27FC236}">
-                <a16:creationId xmlns:a16="http://schemas.microsoft.com/office/drawing/2014/main" id="{DA9FFB47-1BAC-47F3-9FDC-C98339712BEB}"/>
-              </a:ext>
-            </a:extLst>
-          </p:cNvPr>
-          <p:cNvCxnSpPr>
-            <a:cxnSpLocks/>
-            <a:stCxn id="286" idx="3"/>
-            <a:endCxn id="377" idx="1"/>
-          </p:cNvCxnSpPr>
-          <p:nvPr/>
-        </p:nvCxnSpPr>
+              <a:rPr lang="en-GB" sz="1200" dirty="0"/>
+              <a:t>Fixtures</a:t>
+            </a:r>
+          </a:p>
+        </p:txBody>
+      </p:sp>
+      <p:sp>
+        <p:nvSpPr>
+          <p:cNvPr id="92" name="Rectangle 91">
+            <a:extLst>
+              <a:ext uri="{FF2B5EF4-FFF2-40B4-BE49-F238E27FC236}">
+                <a16:creationId xmlns:a16="http://schemas.microsoft.com/office/drawing/2014/main" id="{14693512-383A-4929-AF26-D8704FB13744}"/>
+              </a:ext>
+            </a:extLst>
+          </p:cNvPr>
+          <p:cNvSpPr/>
+          <p:nvPr/>
+        </p:nvSpPr>
         <p:spPr>
           <a:xfrm>
-            <a:off x="9742936" y="2731219"/>
-            <a:ext cx="412903" cy="736721"/>
-          </a:xfrm>
-          <a:prstGeom prst="curvedConnector3">
-            <a:avLst>
-              <a:gd name="adj1" fmla="val 50000"/>
-            </a:avLst>
-          </a:prstGeom>
-          <a:ln>
-            <a:tailEnd type="triangle"/>
-          </a:ln>
-        </p:spPr>
-        <p:style>
-          <a:lnRef idx="1">
-            <a:schemeClr val="accent1"/>
-          </a:lnRef>
-          <a:fillRef idx="0">
-            <a:schemeClr val="accent1"/>
-          </a:fillRef>
-          <a:effectRef idx="0">
-            <a:schemeClr val="accent1"/>
-          </a:effectRef>
-          <a:fontRef idx="minor">
-            <a:schemeClr val="tx1"/>
-          </a:fontRef>
-        </p:style>
-      </p:cxnSp>
-      <p:sp>
-        <p:nvSpPr>
-          <p:cNvPr id="66" name="Rectangle 65">
-            <a:extLst>
-              <a:ext uri="{FF2B5EF4-FFF2-40B4-BE49-F238E27FC236}">
-                <a16:creationId xmlns:a16="http://schemas.microsoft.com/office/drawing/2014/main" id="{963CC49E-3468-4FA0-B95B-2A673A6D2B9F}"/>
-              </a:ext>
-            </a:extLst>
-          </p:cNvPr>
-          <p:cNvSpPr/>
-          <p:nvPr/>
-        </p:nvSpPr>
-        <p:spPr>
-          <a:xfrm>
-            <a:off x="5144867" y="5874728"/>
+            <a:off x="5146948" y="5865834"/>
             <a:ext cx="1538205" cy="486032"/>
           </a:xfrm>
           <a:prstGeom prst="rect">
@@ -6294,15 +6949,15 @@
         </p:spPr>
         <p:style>
           <a:lnRef idx="2">
-            <a:schemeClr val="accent1">
+            <a:schemeClr val="accent5">
               <a:shade val="50000"/>
             </a:schemeClr>
           </a:lnRef>
           <a:fillRef idx="1">
-            <a:schemeClr val="accent1"/>
+            <a:schemeClr val="accent5"/>
           </a:fillRef>
           <a:effectRef idx="0">
-            <a:schemeClr val="accent1"/>
+            <a:schemeClr val="accent5"/>
           </a:effectRef>
           <a:fontRef idx="minor">
             <a:schemeClr val="lt1"/>
@@ -6315,558 +6970,7 @@
             <a:pPr algn="ctr"/>
             <a:r>
               <a:rPr lang="en-GB" sz="1200" dirty="0"/>
-              <a:t>IsisExtH2Console</a:t>
-            </a:r>
-            <a:br>
-              <a:rPr lang="en-GB" sz="1200" dirty="0"/>
-            </a:br>
-            <a:r>
-              <a:rPr lang="en-GB" sz="1200" dirty="0"/>
-              <a:t>Module</a:t>
-            </a:r>
-          </a:p>
-        </p:txBody>
-      </p:sp>
-      <p:cxnSp>
-        <p:nvCxnSpPr>
-          <p:cNvPr id="69" name="Connector: Curved 68">
-            <a:extLst>
-              <a:ext uri="{FF2B5EF4-FFF2-40B4-BE49-F238E27FC236}">
-                <a16:creationId xmlns:a16="http://schemas.microsoft.com/office/drawing/2014/main" id="{06294774-0010-41A3-9681-B0F18772705B}"/>
-              </a:ext>
-            </a:extLst>
-          </p:cNvPr>
-          <p:cNvCxnSpPr>
-            <a:cxnSpLocks/>
-            <a:stCxn id="5" idx="1"/>
-            <a:endCxn id="66" idx="3"/>
-          </p:cNvCxnSpPr>
-          <p:nvPr/>
-        </p:nvCxnSpPr>
-        <p:spPr>
-          <a:xfrm rot="10800000" flipV="1">
-            <a:off x="6683073" y="4210226"/>
-            <a:ext cx="1528295" cy="1907518"/>
-          </a:xfrm>
-          <a:prstGeom prst="curvedConnector3">
-            <a:avLst>
-              <a:gd name="adj1" fmla="val 50000"/>
-            </a:avLst>
-          </a:prstGeom>
-          <a:ln>
-            <a:tailEnd type="triangle"/>
-          </a:ln>
-        </p:spPr>
-        <p:style>
-          <a:lnRef idx="1">
-            <a:schemeClr val="accent1"/>
-          </a:lnRef>
-          <a:fillRef idx="0">
-            <a:schemeClr val="accent1"/>
-          </a:fillRef>
-          <a:effectRef idx="0">
-            <a:schemeClr val="accent1"/>
-          </a:effectRef>
-          <a:fontRef idx="minor">
-            <a:schemeClr val="tx1"/>
-          </a:fontRef>
-        </p:style>
-      </p:cxnSp>
-      <p:cxnSp>
-        <p:nvCxnSpPr>
-          <p:cNvPr id="82" name="Connector: Curved 81">
-            <a:extLst>
-              <a:ext uri="{FF2B5EF4-FFF2-40B4-BE49-F238E27FC236}">
-                <a16:creationId xmlns:a16="http://schemas.microsoft.com/office/drawing/2014/main" id="{B4575090-D3B8-4D0D-9F06-00CC05DD7A90}"/>
-              </a:ext>
-            </a:extLst>
-          </p:cNvPr>
-          <p:cNvCxnSpPr>
-            <a:cxnSpLocks/>
-            <a:stCxn id="66" idx="1"/>
-            <a:endCxn id="20" idx="3"/>
-          </p:cNvCxnSpPr>
-          <p:nvPr/>
-        </p:nvCxnSpPr>
-        <p:spPr>
-          <a:xfrm rot="10800000">
-            <a:off x="4528613" y="5280548"/>
-            <a:ext cx="616255" cy="837196"/>
-          </a:xfrm>
-          <a:prstGeom prst="curvedConnector3">
-            <a:avLst>
-              <a:gd name="adj1" fmla="val 50000"/>
-            </a:avLst>
-          </a:prstGeom>
-          <a:ln>
-            <a:tailEnd type="triangle"/>
-          </a:ln>
-        </p:spPr>
-        <p:style>
-          <a:lnRef idx="1">
-            <a:schemeClr val="accent1"/>
-          </a:lnRef>
-          <a:fillRef idx="0">
-            <a:schemeClr val="accent1"/>
-          </a:fillRef>
-          <a:effectRef idx="0">
-            <a:schemeClr val="accent1"/>
-          </a:effectRef>
-          <a:fontRef idx="minor">
-            <a:schemeClr val="tx1"/>
-          </a:fontRef>
-        </p:style>
-      </p:cxnSp>
-      <p:sp>
-        <p:nvSpPr>
-          <p:cNvPr id="42" name="Oval 41">
-            <a:extLst>
-              <a:ext uri="{FF2B5EF4-FFF2-40B4-BE49-F238E27FC236}">
-                <a16:creationId xmlns:a16="http://schemas.microsoft.com/office/drawing/2014/main" id="{F557478D-0046-4346-AFE3-81BF2E5A2356}"/>
-              </a:ext>
-            </a:extLst>
-          </p:cNvPr>
-          <p:cNvSpPr/>
-          <p:nvPr/>
-        </p:nvSpPr>
-        <p:spPr>
-          <a:xfrm>
-            <a:off x="7432454" y="2031133"/>
-            <a:ext cx="177498" cy="189310"/>
-          </a:xfrm>
-          <a:prstGeom prst="ellipse">
-            <a:avLst/>
-          </a:prstGeom>
-        </p:spPr>
-        <p:style>
-          <a:lnRef idx="2">
-            <a:schemeClr val="accent6"/>
-          </a:lnRef>
-          <a:fillRef idx="1">
-            <a:schemeClr val="lt1"/>
-          </a:fillRef>
-          <a:effectRef idx="0">
-            <a:schemeClr val="accent6"/>
-          </a:effectRef>
-          <a:fontRef idx="minor">
-            <a:schemeClr val="dk1"/>
-          </a:fontRef>
-        </p:style>
-        <p:txBody>
-          <a:bodyPr rtlCol="0" anchor="ctr"/>
-          <a:lstStyle/>
-          <a:p>
-            <a:pPr algn="ctr"/>
-            <a:endParaRPr lang="en-GB"/>
-          </a:p>
-        </p:txBody>
-      </p:sp>
-      <p:cxnSp>
-        <p:nvCxnSpPr>
-          <p:cNvPr id="94" name="Connector: Curved 93">
-            <a:extLst>
-              <a:ext uri="{FF2B5EF4-FFF2-40B4-BE49-F238E27FC236}">
-                <a16:creationId xmlns:a16="http://schemas.microsoft.com/office/drawing/2014/main" id="{6D6BAC74-E21A-46C5-B20F-78FB48479529}"/>
-              </a:ext>
-            </a:extLst>
-          </p:cNvPr>
-          <p:cNvCxnSpPr>
-            <a:cxnSpLocks/>
-            <a:stCxn id="42" idx="2"/>
-            <a:endCxn id="40" idx="3"/>
-          </p:cNvCxnSpPr>
-          <p:nvPr/>
-        </p:nvCxnSpPr>
-        <p:spPr>
-          <a:xfrm rot="10800000">
-            <a:off x="6683072" y="669840"/>
-            <a:ext cx="749382" cy="1455949"/>
-          </a:xfrm>
-          <a:prstGeom prst="curvedConnector3">
-            <a:avLst>
-              <a:gd name="adj1" fmla="val 50000"/>
-            </a:avLst>
-          </a:prstGeom>
-          <a:ln>
-            <a:tailEnd type="triangle"/>
-          </a:ln>
-        </p:spPr>
-        <p:style>
-          <a:lnRef idx="1">
-            <a:schemeClr val="accent1"/>
-          </a:lnRef>
-          <a:fillRef idx="0">
-            <a:schemeClr val="accent1"/>
-          </a:fillRef>
-          <a:effectRef idx="0">
-            <a:schemeClr val="accent1"/>
-          </a:effectRef>
-          <a:fontRef idx="minor">
-            <a:schemeClr val="tx1"/>
-          </a:fontRef>
-        </p:style>
-      </p:cxnSp>
-      <p:sp>
-        <p:nvSpPr>
-          <p:cNvPr id="114" name="Oval 113">
-            <a:extLst>
-              <a:ext uri="{FF2B5EF4-FFF2-40B4-BE49-F238E27FC236}">
-                <a16:creationId xmlns:a16="http://schemas.microsoft.com/office/drawing/2014/main" id="{8F0DEB79-4888-4DB9-8985-6BB7917CBBDC}"/>
-              </a:ext>
-            </a:extLst>
-          </p:cNvPr>
-          <p:cNvSpPr/>
-          <p:nvPr/>
-        </p:nvSpPr>
-        <p:spPr>
-          <a:xfrm>
-            <a:off x="10924941" y="5496060"/>
-            <a:ext cx="177498" cy="189310"/>
-          </a:xfrm>
-          <a:prstGeom prst="ellipse">
-            <a:avLst/>
-          </a:prstGeom>
-        </p:spPr>
-        <p:style>
-          <a:lnRef idx="2">
-            <a:schemeClr val="accent6"/>
-          </a:lnRef>
-          <a:fillRef idx="1">
-            <a:schemeClr val="lt1"/>
-          </a:fillRef>
-          <a:effectRef idx="0">
-            <a:schemeClr val="accent6"/>
-          </a:effectRef>
-          <a:fontRef idx="minor">
-            <a:schemeClr val="dk1"/>
-          </a:fontRef>
-        </p:style>
-        <p:txBody>
-          <a:bodyPr rtlCol="0" anchor="ctr"/>
-          <a:lstStyle/>
-          <a:p>
-            <a:pPr algn="ctr"/>
-            <a:endParaRPr lang="en-GB"/>
-          </a:p>
-        </p:txBody>
-      </p:sp>
-      <p:sp>
-        <p:nvSpPr>
-          <p:cNvPr id="115" name="TextBox 114">
-            <a:extLst>
-              <a:ext uri="{FF2B5EF4-FFF2-40B4-BE49-F238E27FC236}">
-                <a16:creationId xmlns:a16="http://schemas.microsoft.com/office/drawing/2014/main" id="{6B5B04DF-5FB2-404C-9AB5-B0EE9A966812}"/>
-              </a:ext>
-            </a:extLst>
-          </p:cNvPr>
-          <p:cNvSpPr txBox="1"/>
-          <p:nvPr/>
-        </p:nvSpPr>
-        <p:spPr>
-          <a:xfrm>
-            <a:off x="11086875" y="5349245"/>
-            <a:ext cx="943185" cy="415498"/>
-          </a:xfrm>
-          <a:prstGeom prst="rect">
-            <a:avLst/>
-          </a:prstGeom>
-          <a:noFill/>
-        </p:spPr>
-        <p:txBody>
-          <a:bodyPr wrap="square" rtlCol="0">
-            <a:spAutoFit/>
-          </a:bodyPr>
-          <a:lstStyle/>
-          <a:p>
-            <a:r>
-              <a:rPr lang="en-GB" sz="1050" dirty="0"/>
-              <a:t>common dependencies</a:t>
-            </a:r>
-          </a:p>
-        </p:txBody>
-      </p:sp>
-      <p:sp>
-        <p:nvSpPr>
-          <p:cNvPr id="116" name="TextBox 115">
-            <a:extLst>
-              <a:ext uri="{FF2B5EF4-FFF2-40B4-BE49-F238E27FC236}">
-                <a16:creationId xmlns:a16="http://schemas.microsoft.com/office/drawing/2014/main" id="{247209C1-AD03-4AA2-815E-C8A9590DD921}"/>
-              </a:ext>
-            </a:extLst>
-          </p:cNvPr>
-          <p:cNvSpPr txBox="1"/>
-          <p:nvPr/>
-        </p:nvSpPr>
-        <p:spPr>
-          <a:xfrm>
-            <a:off x="9030653" y="4501141"/>
-            <a:ext cx="1878796" cy="253916"/>
-          </a:xfrm>
-          <a:prstGeom prst="rect">
-            <a:avLst/>
-          </a:prstGeom>
-          <a:noFill/>
-        </p:spPr>
-        <p:txBody>
-          <a:bodyPr wrap="square" rtlCol="0">
-            <a:spAutoFit/>
-          </a:bodyPr>
-          <a:lstStyle/>
-          <a:p>
-            <a:r>
-              <a:rPr lang="en-GB" sz="1050" dirty="0"/>
-              <a:t>@Import</a:t>
-            </a:r>
-          </a:p>
-        </p:txBody>
-      </p:sp>
-      <p:sp>
-        <p:nvSpPr>
-          <p:cNvPr id="123" name="Rectangle 122">
-            <a:extLst>
-              <a:ext uri="{FF2B5EF4-FFF2-40B4-BE49-F238E27FC236}">
-                <a16:creationId xmlns:a16="http://schemas.microsoft.com/office/drawing/2014/main" id="{7CA212B5-D148-4CEA-B3C2-FB7FAA771FBD}"/>
-              </a:ext>
-            </a:extLst>
-          </p:cNvPr>
-          <p:cNvSpPr/>
-          <p:nvPr/>
-        </p:nvSpPr>
-        <p:spPr>
-          <a:xfrm>
-            <a:off x="5144867" y="3708012"/>
-            <a:ext cx="1538205" cy="486032"/>
-          </a:xfrm>
-          <a:prstGeom prst="rect">
-            <a:avLst/>
-          </a:prstGeom>
-          <a:solidFill>
-            <a:srgbClr val="4472C4">
-              <a:alpha val="50196"/>
-            </a:srgbClr>
-          </a:solidFill>
-        </p:spPr>
-        <p:style>
-          <a:lnRef idx="2">
-            <a:schemeClr val="accent1">
-              <a:shade val="50000"/>
-            </a:schemeClr>
-          </a:lnRef>
-          <a:fillRef idx="1">
-            <a:schemeClr val="accent1"/>
-          </a:fillRef>
-          <a:effectRef idx="0">
-            <a:schemeClr val="accent1"/>
-          </a:effectRef>
-          <a:fontRef idx="minor">
-            <a:schemeClr val="lt1"/>
-          </a:fontRef>
-        </p:style>
-        <p:txBody>
-          <a:bodyPr rtlCol="0" anchor="ctr"/>
-          <a:lstStyle/>
-          <a:p>
-            <a:pPr algn="ctr"/>
-            <a:r>
-              <a:rPr lang="en-GB" sz="1200" dirty="0" err="1"/>
-              <a:t>IsisBoot</a:t>
-            </a:r>
-            <a:br>
-              <a:rPr lang="en-GB" sz="1200" dirty="0"/>
-            </a:br>
-            <a:r>
-              <a:rPr lang="en-GB" sz="1200" dirty="0" err="1"/>
-              <a:t>SecurityKeycloak</a:t>
-            </a:r>
-            <a:endParaRPr lang="en-GB" sz="1200" dirty="0"/>
-          </a:p>
-        </p:txBody>
-      </p:sp>
-      <p:sp>
-        <p:nvSpPr>
-          <p:cNvPr id="125" name="Rectangle 124">
-            <a:extLst>
-              <a:ext uri="{FF2B5EF4-FFF2-40B4-BE49-F238E27FC236}">
-                <a16:creationId xmlns:a16="http://schemas.microsoft.com/office/drawing/2014/main" id="{1935E35C-1264-4F97-8E33-3C5F2259556C}"/>
-              </a:ext>
-            </a:extLst>
-          </p:cNvPr>
-          <p:cNvSpPr/>
-          <p:nvPr/>
-        </p:nvSpPr>
-        <p:spPr>
-          <a:xfrm>
-            <a:off x="2990407" y="3706052"/>
-            <a:ext cx="1538205" cy="486032"/>
-          </a:xfrm>
-          <a:prstGeom prst="rect">
-            <a:avLst/>
-          </a:prstGeom>
-          <a:solidFill>
-            <a:srgbClr val="70AD47">
-              <a:alpha val="50196"/>
-            </a:srgbClr>
-          </a:solidFill>
-        </p:spPr>
-        <p:style>
-          <a:lnRef idx="2">
-            <a:schemeClr val="accent6">
-              <a:shade val="50000"/>
-            </a:schemeClr>
-          </a:lnRef>
-          <a:fillRef idx="1">
-            <a:schemeClr val="accent6"/>
-          </a:fillRef>
-          <a:effectRef idx="0">
-            <a:schemeClr val="accent6"/>
-          </a:effectRef>
-          <a:fontRef idx="minor">
-            <a:schemeClr val="lt1"/>
-          </a:fontRef>
-        </p:style>
-        <p:txBody>
-          <a:bodyPr rtlCol="0" anchor="ctr"/>
-          <a:lstStyle/>
-          <a:p>
-            <a:pPr algn="ctr"/>
-            <a:r>
-              <a:rPr lang="en-GB" sz="1200" dirty="0" err="1"/>
-              <a:t>WebModule</a:t>
-            </a:r>
-            <a:br>
-              <a:rPr lang="en-GB" sz="1200" dirty="0"/>
-            </a:br>
-            <a:r>
-              <a:rPr lang="en-GB" sz="1200" dirty="0"/>
-              <a:t>Keycloak</a:t>
-            </a:r>
-          </a:p>
-        </p:txBody>
-      </p:sp>
-      <p:cxnSp>
-        <p:nvCxnSpPr>
-          <p:cNvPr id="126" name="Connector: Curved 125">
-            <a:extLst>
-              <a:ext uri="{FF2B5EF4-FFF2-40B4-BE49-F238E27FC236}">
-                <a16:creationId xmlns:a16="http://schemas.microsoft.com/office/drawing/2014/main" id="{1F9A5455-6900-4E96-BA45-E51C295BB70C}"/>
-              </a:ext>
-            </a:extLst>
-          </p:cNvPr>
-          <p:cNvCxnSpPr>
-            <a:cxnSpLocks/>
-            <a:stCxn id="123" idx="1"/>
-            <a:endCxn id="125" idx="3"/>
-          </p:cNvCxnSpPr>
-          <p:nvPr/>
-        </p:nvCxnSpPr>
-        <p:spPr>
-          <a:xfrm rot="10800000">
-            <a:off x="4528613" y="3949068"/>
-            <a:ext cx="616255" cy="1960"/>
-          </a:xfrm>
-          <a:prstGeom prst="curvedConnector3">
-            <a:avLst>
-              <a:gd name="adj1" fmla="val 50000"/>
-            </a:avLst>
-          </a:prstGeom>
-          <a:ln>
-            <a:prstDash val="solid"/>
-            <a:tailEnd type="triangle"/>
-          </a:ln>
-        </p:spPr>
-        <p:style>
-          <a:lnRef idx="1">
-            <a:schemeClr val="accent1"/>
-          </a:lnRef>
-          <a:fillRef idx="0">
-            <a:schemeClr val="accent1"/>
-          </a:fillRef>
-          <a:effectRef idx="0">
-            <a:schemeClr val="accent1"/>
-          </a:effectRef>
-          <a:fontRef idx="minor">
-            <a:schemeClr val="tx1"/>
-          </a:fontRef>
-        </p:style>
-      </p:cxnSp>
-      <p:sp>
-        <p:nvSpPr>
-          <p:cNvPr id="71" name="TextBox 70">
-            <a:extLst>
-              <a:ext uri="{FF2B5EF4-FFF2-40B4-BE49-F238E27FC236}">
-                <a16:creationId xmlns:a16="http://schemas.microsoft.com/office/drawing/2014/main" id="{9468C3BA-1104-4FAF-B227-156B513C306D}"/>
-              </a:ext>
-            </a:extLst>
-          </p:cNvPr>
-          <p:cNvSpPr txBox="1"/>
-          <p:nvPr/>
-        </p:nvSpPr>
-        <p:spPr>
-          <a:xfrm>
-            <a:off x="5824368" y="4173626"/>
-            <a:ext cx="1379318" cy="253916"/>
-          </a:xfrm>
-          <a:prstGeom prst="rect">
-            <a:avLst/>
-          </a:prstGeom>
-          <a:noFill/>
-        </p:spPr>
-        <p:txBody>
-          <a:bodyPr wrap="square" rtlCol="0">
-            <a:spAutoFit/>
-          </a:bodyPr>
-          <a:lstStyle/>
-          <a:p>
-            <a:r>
-              <a:rPr lang="en-GB" sz="1050" dirty="0"/>
-              <a:t>(not used in this app)</a:t>
-            </a:r>
-          </a:p>
-        </p:txBody>
-      </p:sp>
-      <p:sp>
-        <p:nvSpPr>
-          <p:cNvPr id="2" name="TextBox 1">
-            <a:extLst>
-              <a:ext uri="{FF2B5EF4-FFF2-40B4-BE49-F238E27FC236}">
-                <a16:creationId xmlns:a16="http://schemas.microsoft.com/office/drawing/2014/main" id="{F2FE4EC6-A964-40FD-9686-116AD5FEDF4E}"/>
-              </a:ext>
-            </a:extLst>
-          </p:cNvPr>
-          <p:cNvSpPr txBox="1"/>
-          <p:nvPr/>
-        </p:nvSpPr>
-        <p:spPr>
-          <a:xfrm flipH="1">
-            <a:off x="8383874" y="218114"/>
-            <a:ext cx="3553660" cy="646331"/>
-          </a:xfrm>
-          <a:prstGeom prst="rect">
-            <a:avLst/>
-          </a:prstGeom>
-          <a:noFill/>
-        </p:spPr>
-        <p:txBody>
-          <a:bodyPr wrap="square" rtlCol="0">
-            <a:spAutoFit/>
-          </a:bodyPr>
-          <a:lstStyle/>
-          <a:p>
-            <a:pPr algn="ctr"/>
-            <a:r>
-              <a:rPr lang="en-GB" dirty="0"/>
-              <a:t>Module dependencies of</a:t>
-            </a:r>
-            <a:br>
-              <a:rPr lang="en-GB" dirty="0"/>
-            </a:br>
-            <a:r>
-              <a:rPr lang="en-GB" dirty="0" err="1"/>
-              <a:t>isis</a:t>
-            </a:r>
-            <a:r>
-              <a:rPr lang="en-GB" dirty="0"/>
-              <a:t>-app-simpleapp (starter app)</a:t>
+              <a:t>H2Console</a:t>
             </a:r>
           </a:p>
         </p:txBody>

</xml_diff>

<commit_message>
ISIS-2215: removes @ComponentScan throughout core.
</commit_message>
<xml_diff>
--- a/antora/components/core/modules/archdesign/attachments/isis-configurations-and-modules.pptx
+++ b/antora/components/core/modules/archdesign/attachments/isis-configurations-and-modules.pptx
@@ -3361,7 +3361,7 @@
         </p:nvSpPr>
         <p:spPr>
           <a:xfrm>
-            <a:off x="8211366" y="4791461"/>
+            <a:off x="10162268" y="4797386"/>
             <a:ext cx="1785587" cy="486032"/>
           </a:xfrm>
           <a:prstGeom prst="rect">
@@ -3422,7 +3422,7 @@
         </p:nvSpPr>
         <p:spPr>
           <a:xfrm>
-            <a:off x="8211367" y="3967210"/>
+            <a:off x="9012891" y="3880826"/>
             <a:ext cx="1538205" cy="486032"/>
           </a:xfrm>
           <a:prstGeom prst="rect">
@@ -3469,20 +3469,18 @@
           </p:cNvPr>
           <p:cNvCxnSpPr>
             <a:cxnSpLocks/>
-            <a:stCxn id="4" idx="0"/>
+            <a:stCxn id="4" idx="1"/>
             <a:endCxn id="5" idx="2"/>
           </p:cNvCxnSpPr>
           <p:nvPr/>
         </p:nvCxnSpPr>
         <p:spPr>
-          <a:xfrm rot="16200000" flipV="1">
-            <a:off x="8873206" y="4560507"/>
-            <a:ext cx="338219" cy="123690"/>
-          </a:xfrm>
-          <a:prstGeom prst="curvedConnector3">
-            <a:avLst>
-              <a:gd name="adj1" fmla="val 50000"/>
-            </a:avLst>
+          <a:xfrm rot="10800000">
+            <a:off x="9781994" y="4366858"/>
+            <a:ext cx="380274" cy="673544"/>
+          </a:xfrm>
+          <a:prstGeom prst="curvedConnector2">
+            <a:avLst/>
           </a:prstGeom>
           <a:ln>
             <a:tailEnd type="triangle"/>
@@ -3517,7 +3515,7 @@
         </p:nvSpPr>
         <p:spPr>
           <a:xfrm>
-            <a:off x="6987683" y="919462"/>
+            <a:off x="8068245" y="928649"/>
             <a:ext cx="943185" cy="252867"/>
           </a:xfrm>
           <a:prstGeom prst="rect">
@@ -3552,8 +3550,8 @@
         </p:nvSpPr>
         <p:spPr>
           <a:xfrm>
-            <a:off x="5144867" y="1385135"/>
-            <a:ext cx="1538205" cy="486032"/>
+            <a:off x="6639264" y="1417938"/>
+            <a:ext cx="1240231" cy="486032"/>
           </a:xfrm>
           <a:prstGeom prst="rect">
             <a:avLst/>
@@ -3605,9 +3603,9 @@
           <p:nvPr/>
         </p:nvCxnSpPr>
         <p:spPr>
-          <a:xfrm rot="10800000">
-            <a:off x="6683072" y="1628152"/>
-            <a:ext cx="749382" cy="497637"/>
+          <a:xfrm rot="10800000" flipV="1">
+            <a:off x="7879495" y="1650100"/>
+            <a:ext cx="377500" cy="10854"/>
           </a:xfrm>
           <a:prstGeom prst="curvedConnector3">
             <a:avLst>
@@ -3647,8 +3645,8 @@
         </p:nvSpPr>
         <p:spPr>
           <a:xfrm>
-            <a:off x="5140767" y="3127499"/>
-            <a:ext cx="1538205" cy="486032"/>
+            <a:off x="6635164" y="3513543"/>
+            <a:ext cx="1240231" cy="486032"/>
           </a:xfrm>
           <a:prstGeom prst="rect">
             <a:avLst/>
@@ -3703,8 +3701,8 @@
         </p:nvSpPr>
         <p:spPr>
           <a:xfrm>
-            <a:off x="5144867" y="1965923"/>
-            <a:ext cx="1538205" cy="486032"/>
+            <a:off x="6639264" y="1998726"/>
+            <a:ext cx="1240231" cy="486032"/>
           </a:xfrm>
           <a:prstGeom prst="rect">
             <a:avLst/>
@@ -3732,6 +3730,13 @@
           <a:p>
             <a:pPr algn="ctr"/>
             <a:r>
+              <a:rPr lang="en-GB" sz="1200" dirty="0" err="1"/>
+              <a:t>Jdo</a:t>
+            </a:r>
+            <a:br>
+              <a:rPr lang="en-GB" sz="1200" dirty="0"/>
+            </a:br>
+            <a:r>
               <a:rPr lang="en-GB" sz="1200" dirty="0"/>
               <a:t>DataNucleus5</a:t>
             </a:r>
@@ -3752,8 +3757,8 @@
         </p:nvSpPr>
         <p:spPr>
           <a:xfrm>
-            <a:off x="5144867" y="4667530"/>
-            <a:ext cx="1538205" cy="486032"/>
+            <a:off x="6639264" y="5053574"/>
+            <a:ext cx="1240231" cy="486032"/>
           </a:xfrm>
           <a:prstGeom prst="rect">
             <a:avLst/>
@@ -3808,8 +3813,8 @@
         </p:nvSpPr>
         <p:spPr>
           <a:xfrm>
-            <a:off x="5144867" y="5267030"/>
-            <a:ext cx="1538205" cy="486032"/>
+            <a:off x="6639264" y="5653074"/>
+            <a:ext cx="1240231" cy="486032"/>
           </a:xfrm>
           <a:prstGeom prst="rect">
             <a:avLst/>
@@ -3864,8 +3869,8 @@
         </p:nvSpPr>
         <p:spPr>
           <a:xfrm>
-            <a:off x="2990407" y="5037532"/>
-            <a:ext cx="1538205" cy="486032"/>
+            <a:off x="4243860" y="3952944"/>
+            <a:ext cx="1240231" cy="486032"/>
           </a:xfrm>
           <a:prstGeom prst="rect">
             <a:avLst/>
@@ -3911,18 +3916,18 @@
           <p:cNvCxnSpPr>
             <a:cxnSpLocks/>
             <a:stCxn id="18" idx="1"/>
-            <a:endCxn id="20" idx="3"/>
+            <a:endCxn id="521" idx="6"/>
           </p:cNvCxnSpPr>
           <p:nvPr/>
         </p:nvCxnSpPr>
         <p:spPr>
           <a:xfrm rot="10800000">
-            <a:off x="4528613" y="5280548"/>
-            <a:ext cx="616255" cy="229498"/>
+            <a:off x="5802854" y="4461514"/>
+            <a:ext cx="836411" cy="1434577"/>
           </a:xfrm>
           <a:prstGeom prst="curvedConnector3">
             <a:avLst>
-              <a:gd name="adj1" fmla="val 50000"/>
+              <a:gd name="adj1" fmla="val 37367"/>
             </a:avLst>
           </a:prstGeom>
           <a:ln>
@@ -3962,8 +3967,8 @@
         </p:nvCxnSpPr>
         <p:spPr>
           <a:xfrm rot="10800000">
-            <a:off x="6678973" y="3370516"/>
-            <a:ext cx="1532395" cy="839711"/>
+            <a:off x="7875395" y="3756560"/>
+            <a:ext cx="1137496" cy="367283"/>
           </a:xfrm>
           <a:prstGeom prst="curvedConnector3">
             <a:avLst>
@@ -4007,8 +4012,8 @@
         </p:nvCxnSpPr>
         <p:spPr>
           <a:xfrm rot="10800000" flipV="1">
-            <a:off x="6683073" y="4210226"/>
-            <a:ext cx="1528295" cy="700320"/>
+            <a:off x="7879495" y="4123842"/>
+            <a:ext cx="1133396" cy="1172748"/>
           </a:xfrm>
           <a:prstGeom prst="curvedConnector3">
             <a:avLst>
@@ -4052,8 +4057,8 @@
         </p:nvCxnSpPr>
         <p:spPr>
           <a:xfrm rot="10800000">
-            <a:off x="7609953" y="2125788"/>
-            <a:ext cx="601415" cy="2084438"/>
+            <a:off x="8400109" y="1650100"/>
+            <a:ext cx="612782" cy="2473742"/>
           </a:xfrm>
           <a:prstGeom prst="curvedConnector3">
             <a:avLst>
@@ -4097,8 +4102,8 @@
         </p:nvCxnSpPr>
         <p:spPr>
           <a:xfrm rot="10800000" flipV="1">
-            <a:off x="6683073" y="4210226"/>
-            <a:ext cx="1528295" cy="1299820"/>
+            <a:off x="7879495" y="4123842"/>
+            <a:ext cx="1133396" cy="1772248"/>
           </a:xfrm>
           <a:prstGeom prst="curvedConnector3">
             <a:avLst>
@@ -4138,8 +4143,8 @@
         </p:nvSpPr>
         <p:spPr>
           <a:xfrm>
-            <a:off x="5144867" y="426823"/>
-            <a:ext cx="1538205" cy="486032"/>
+            <a:off x="6639264" y="459626"/>
+            <a:ext cx="1240231" cy="486032"/>
           </a:xfrm>
           <a:prstGeom prst="rect">
             <a:avLst/>
@@ -4174,51 +4179,6 @@
           </a:p>
         </p:txBody>
       </p:sp>
-      <p:cxnSp>
-        <p:nvCxnSpPr>
-          <p:cNvPr id="41" name="Connector: Curved 40">
-            <a:extLst>
-              <a:ext uri="{FF2B5EF4-FFF2-40B4-BE49-F238E27FC236}">
-                <a16:creationId xmlns:a16="http://schemas.microsoft.com/office/drawing/2014/main" id="{5B1755F9-6AF2-488D-A9D0-DE69F3307DD3}"/>
-              </a:ext>
-            </a:extLst>
-          </p:cNvPr>
-          <p:cNvCxnSpPr>
-            <a:cxnSpLocks/>
-            <a:stCxn id="17" idx="1"/>
-            <a:endCxn id="20" idx="3"/>
-          </p:cNvCxnSpPr>
-          <p:nvPr/>
-        </p:nvCxnSpPr>
-        <p:spPr>
-          <a:xfrm rot="10800000" flipV="1">
-            <a:off x="4528613" y="4910546"/>
-            <a:ext cx="616255" cy="370002"/>
-          </a:xfrm>
-          <a:prstGeom prst="curvedConnector3">
-            <a:avLst>
-              <a:gd name="adj1" fmla="val 50000"/>
-            </a:avLst>
-          </a:prstGeom>
-          <a:ln>
-            <a:tailEnd type="triangle"/>
-          </a:ln>
-        </p:spPr>
-        <p:style>
-          <a:lnRef idx="1">
-            <a:schemeClr val="accent1"/>
-          </a:lnRef>
-          <a:fillRef idx="0">
-            <a:schemeClr val="accent1"/>
-          </a:fillRef>
-          <a:effectRef idx="0">
-            <a:schemeClr val="accent1"/>
-          </a:effectRef>
-          <a:fontRef idx="minor">
-            <a:schemeClr val="tx1"/>
-          </a:fontRef>
-        </p:style>
-      </p:cxnSp>
       <p:sp>
         <p:nvSpPr>
           <p:cNvPr id="80" name="Rectangle 79">
@@ -4233,8 +4193,58 @@
         </p:nvSpPr>
         <p:spPr>
           <a:xfrm>
-            <a:off x="783551" y="270733"/>
-            <a:ext cx="1538205" cy="486032"/>
+            <a:off x="634268" y="582678"/>
+            <a:ext cx="1240231" cy="486032"/>
+          </a:xfrm>
+          <a:prstGeom prst="rect">
+            <a:avLst/>
+          </a:prstGeom>
+        </p:spPr>
+        <p:style>
+          <a:lnRef idx="2">
+            <a:schemeClr val="accent6">
+              <a:shade val="50000"/>
+            </a:schemeClr>
+          </a:lnRef>
+          <a:fillRef idx="1">
+            <a:schemeClr val="accent6"/>
+          </a:fillRef>
+          <a:effectRef idx="0">
+            <a:schemeClr val="accent6"/>
+          </a:effectRef>
+          <a:fontRef idx="minor">
+            <a:schemeClr val="lt1"/>
+          </a:fontRef>
+        </p:style>
+        <p:txBody>
+          <a:bodyPr rtlCol="0" anchor="ctr"/>
+          <a:lstStyle/>
+          <a:p>
+            <a:pPr algn="ctr"/>
+            <a:r>
+              <a:rPr lang="en-GB" sz="1200" dirty="0" err="1"/>
+              <a:t>Applib</a:t>
+            </a:r>
+            <a:endParaRPr lang="en-GB" sz="1200" dirty="0"/>
+          </a:p>
+        </p:txBody>
+      </p:sp>
+      <p:sp>
+        <p:nvSpPr>
+          <p:cNvPr id="81" name="Rectangle 80">
+            <a:extLst>
+              <a:ext uri="{FF2B5EF4-FFF2-40B4-BE49-F238E27FC236}">
+                <a16:creationId xmlns:a16="http://schemas.microsoft.com/office/drawing/2014/main" id="{9628B3BA-B27E-4A22-82C8-2C262BA1DABF}"/>
+              </a:ext>
+            </a:extLst>
+          </p:cNvPr>
+          <p:cNvSpPr/>
+          <p:nvPr/>
+        </p:nvSpPr>
+        <p:spPr>
+          <a:xfrm>
+            <a:off x="2467770" y="2631790"/>
+            <a:ext cx="1240231" cy="486032"/>
           </a:xfrm>
           <a:prstGeom prst="rect">
             <a:avLst/>
@@ -4262,56 +4272,6 @@
           <a:p>
             <a:pPr algn="ctr"/>
             <a:r>
-              <a:rPr lang="en-GB" sz="1200" dirty="0" err="1"/>
-              <a:t>Applib</a:t>
-            </a:r>
-            <a:endParaRPr lang="en-GB" sz="1200" dirty="0"/>
-          </a:p>
-        </p:txBody>
-      </p:sp>
-      <p:sp>
-        <p:nvSpPr>
-          <p:cNvPr id="81" name="Rectangle 80">
-            <a:extLst>
-              <a:ext uri="{FF2B5EF4-FFF2-40B4-BE49-F238E27FC236}">
-                <a16:creationId xmlns:a16="http://schemas.microsoft.com/office/drawing/2014/main" id="{9628B3BA-B27E-4A22-82C8-2C262BA1DABF}"/>
-              </a:ext>
-            </a:extLst>
-          </p:cNvPr>
-          <p:cNvSpPr/>
-          <p:nvPr/>
-        </p:nvSpPr>
-        <p:spPr>
-          <a:xfrm>
-            <a:off x="2990407" y="264955"/>
-            <a:ext cx="1538205" cy="486032"/>
-          </a:xfrm>
-          <a:prstGeom prst="rect">
-            <a:avLst/>
-          </a:prstGeom>
-        </p:spPr>
-        <p:style>
-          <a:lnRef idx="2">
-            <a:schemeClr val="accent1">
-              <a:shade val="50000"/>
-            </a:schemeClr>
-          </a:lnRef>
-          <a:fillRef idx="1">
-            <a:schemeClr val="accent1"/>
-          </a:fillRef>
-          <a:effectRef idx="0">
-            <a:schemeClr val="accent1"/>
-          </a:effectRef>
-          <a:fontRef idx="minor">
-            <a:schemeClr val="lt1"/>
-          </a:fontRef>
-        </p:style>
-        <p:txBody>
-          <a:bodyPr rtlCol="0" anchor="ctr"/>
-          <a:lstStyle/>
-          <a:p>
-            <a:pPr algn="ctr"/>
-            <a:r>
               <a:rPr lang="en-GB" sz="1200" dirty="0"/>
               <a:t>Metamodel</a:t>
             </a:r>
@@ -4332,8 +4292,8 @@
         </p:nvSpPr>
         <p:spPr>
           <a:xfrm>
-            <a:off x="2990407" y="1029317"/>
-            <a:ext cx="1538205" cy="486032"/>
+            <a:off x="3087885" y="1795728"/>
+            <a:ext cx="1240231" cy="486032"/>
           </a:xfrm>
           <a:prstGeom prst="rect">
             <a:avLst/>
@@ -4384,9 +4344,9 @@
           <p:nvPr/>
         </p:nvCxnSpPr>
         <p:spPr>
-          <a:xfrm rot="10800000" flipV="1">
-            <a:off x="2321757" y="507971"/>
-            <a:ext cx="668651" cy="5778"/>
+          <a:xfrm rot="10800000">
+            <a:off x="1874500" y="825694"/>
+            <a:ext cx="593271" cy="2049112"/>
           </a:xfrm>
           <a:prstGeom prst="curvedConnector3">
             <a:avLst>
@@ -4430,15 +4390,15 @@
           <p:nvPr/>
         </p:nvCxnSpPr>
         <p:spPr>
-          <a:xfrm rot="10800000" flipH="1">
-            <a:off x="2990406" y="507971"/>
-            <a:ext cx="1538205" cy="764362"/>
+          <a:xfrm rot="10800000" flipH="1" flipV="1">
+            <a:off x="3087885" y="2038744"/>
+            <a:ext cx="620116" cy="836062"/>
           </a:xfrm>
           <a:prstGeom prst="curvedConnector5">
             <a:avLst>
-              <a:gd name="adj1" fmla="val -14861"/>
+              <a:gd name="adj1" fmla="val -36864"/>
               <a:gd name="adj2" fmla="val 50000"/>
-              <a:gd name="adj3" fmla="val 114861"/>
+              <a:gd name="adj3" fmla="val 136864"/>
             </a:avLst>
           </a:prstGeom>
           <a:ln>
@@ -4478,15 +4438,15 @@
           <p:nvPr/>
         </p:nvCxnSpPr>
         <p:spPr>
-          <a:xfrm rot="10800000" flipH="1">
-            <a:off x="2990406" y="1272333"/>
-            <a:ext cx="1538205" cy="760714"/>
+          <a:xfrm rot="10800000" flipH="1" flipV="1">
+            <a:off x="3274016" y="1207458"/>
+            <a:ext cx="1054099" cy="831285"/>
           </a:xfrm>
           <a:prstGeom prst="curvedConnector5">
             <a:avLst>
-              <a:gd name="adj1" fmla="val -14861"/>
+              <a:gd name="adj1" fmla="val -21687"/>
               <a:gd name="adj2" fmla="val 50000"/>
-              <a:gd name="adj3" fmla="val 114861"/>
+              <a:gd name="adj3" fmla="val 121687"/>
             </a:avLst>
           </a:prstGeom>
           <a:ln>
@@ -4523,8 +4483,8 @@
         </p:nvSpPr>
         <p:spPr>
           <a:xfrm>
-            <a:off x="2990407" y="1790031"/>
-            <a:ext cx="1538205" cy="486032"/>
+            <a:off x="3274017" y="964443"/>
+            <a:ext cx="1240231" cy="486032"/>
           </a:xfrm>
           <a:prstGeom prst="rect">
             <a:avLst/>
@@ -4552,10 +4512,16 @@
           <a:p>
             <a:pPr algn="ctr"/>
             <a:r>
-              <a:rPr lang="en-GB" sz="1200" dirty="0" err="1"/>
-              <a:t>RuntimeServices</a:t>
-            </a:r>
-            <a:endParaRPr lang="en-GB" sz="1200" dirty="0"/>
+              <a:rPr lang="en-GB" sz="1200" dirty="0"/>
+              <a:t>Runtime</a:t>
+            </a:r>
+            <a:br>
+              <a:rPr lang="en-GB" sz="1200" dirty="0"/>
+            </a:br>
+            <a:r>
+              <a:rPr lang="en-GB" sz="1200" dirty="0"/>
+              <a:t>Services</a:t>
+            </a:r>
           </a:p>
         </p:txBody>
       </p:sp>
@@ -4576,9 +4542,9 @@
           <p:nvPr/>
         </p:nvCxnSpPr>
         <p:spPr>
-          <a:xfrm rot="10800000" flipV="1">
-            <a:off x="4528613" y="1628151"/>
-            <a:ext cx="616255" cy="404896"/>
+          <a:xfrm rot="10800000">
+            <a:off x="4514248" y="1207460"/>
+            <a:ext cx="2125016" cy="453495"/>
           </a:xfrm>
           <a:prstGeom prst="curvedConnector3">
             <a:avLst>
@@ -4619,8 +4585,8 @@
         </p:nvSpPr>
         <p:spPr>
           <a:xfrm>
-            <a:off x="783551" y="1036770"/>
-            <a:ext cx="1538205" cy="486032"/>
+            <a:off x="716399" y="3324916"/>
+            <a:ext cx="1240231" cy="486032"/>
           </a:xfrm>
           <a:prstGeom prst="rect">
             <a:avLst/>
@@ -4668,7 +4634,7 @@
         </p:nvSpPr>
         <p:spPr>
           <a:xfrm>
-            <a:off x="10961177" y="5835277"/>
+            <a:off x="10936793" y="5835277"/>
             <a:ext cx="1089327" cy="369134"/>
           </a:xfrm>
           <a:prstGeom prst="rect">
@@ -4732,8 +4698,8 @@
         </p:nvCxnSpPr>
         <p:spPr>
           <a:xfrm rot="10800000" flipV="1">
-            <a:off x="2321757" y="507970"/>
-            <a:ext cx="668651" cy="771815"/>
+            <a:off x="1956630" y="2874806"/>
+            <a:ext cx="511140" cy="693126"/>
           </a:xfrm>
           <a:prstGeom prst="curvedConnector3">
             <a:avLst>
@@ -4774,8 +4740,8 @@
         </p:nvSpPr>
         <p:spPr>
           <a:xfrm>
-            <a:off x="783551" y="2125233"/>
-            <a:ext cx="1538205" cy="486032"/>
+            <a:off x="603416" y="4508989"/>
+            <a:ext cx="1240231" cy="486032"/>
           </a:xfrm>
           <a:prstGeom prst="rect">
             <a:avLst/>
@@ -4824,7 +4790,7 @@
         </p:nvSpPr>
         <p:spPr>
           <a:xfrm>
-            <a:off x="8525408" y="5835277"/>
+            <a:off x="9718552" y="6319443"/>
             <a:ext cx="1089327" cy="369134"/>
           </a:xfrm>
           <a:prstGeom prst="rect">
@@ -4863,105 +4829,6 @@
               <a:rPr lang="en-GB" sz="1050" dirty="0"/>
               <a:t>Properties</a:t>
             </a:r>
-          </a:p>
-        </p:txBody>
-      </p:sp>
-      <p:sp>
-        <p:nvSpPr>
-          <p:cNvPr id="134" name="Rectangle 133">
-            <a:extLst>
-              <a:ext uri="{FF2B5EF4-FFF2-40B4-BE49-F238E27FC236}">
-                <a16:creationId xmlns:a16="http://schemas.microsoft.com/office/drawing/2014/main" id="{9AD2DD96-38BC-4EA0-B08E-91AFA6D60162}"/>
-              </a:ext>
-            </a:extLst>
-          </p:cNvPr>
-          <p:cNvSpPr/>
-          <p:nvPr/>
-        </p:nvSpPr>
-        <p:spPr>
-          <a:xfrm>
-            <a:off x="2990407" y="3125539"/>
-            <a:ext cx="1538205" cy="486032"/>
-          </a:xfrm>
-          <a:prstGeom prst="rect">
-            <a:avLst/>
-          </a:prstGeom>
-        </p:spPr>
-        <p:style>
-          <a:lnRef idx="2">
-            <a:schemeClr val="accent6">
-              <a:shade val="50000"/>
-            </a:schemeClr>
-          </a:lnRef>
-          <a:fillRef idx="1">
-            <a:schemeClr val="accent6"/>
-          </a:fillRef>
-          <a:effectRef idx="0">
-            <a:schemeClr val="accent6"/>
-          </a:effectRef>
-          <a:fontRef idx="minor">
-            <a:schemeClr val="lt1"/>
-          </a:fontRef>
-        </p:style>
-        <p:txBody>
-          <a:bodyPr rtlCol="0" anchor="ctr"/>
-          <a:lstStyle/>
-          <a:p>
-            <a:pPr algn="ctr"/>
-            <a:r>
-              <a:rPr lang="en-GB" sz="1200" dirty="0"/>
-              <a:t>Shiro</a:t>
-            </a:r>
-          </a:p>
-        </p:txBody>
-      </p:sp>
-      <p:sp>
-        <p:nvSpPr>
-          <p:cNvPr id="135" name="Rectangle 134">
-            <a:extLst>
-              <a:ext uri="{FF2B5EF4-FFF2-40B4-BE49-F238E27FC236}">
-                <a16:creationId xmlns:a16="http://schemas.microsoft.com/office/drawing/2014/main" id="{037970DA-5ADC-49F9-97A2-89A9F79F37BB}"/>
-              </a:ext>
-            </a:extLst>
-          </p:cNvPr>
-          <p:cNvSpPr/>
-          <p:nvPr/>
-        </p:nvSpPr>
-        <p:spPr>
-          <a:xfrm>
-            <a:off x="9763643" y="6334547"/>
-            <a:ext cx="1089327" cy="369134"/>
-          </a:xfrm>
-          <a:prstGeom prst="rect">
-            <a:avLst/>
-          </a:prstGeom>
-        </p:spPr>
-        <p:style>
-          <a:lnRef idx="2">
-            <a:schemeClr val="accent6">
-              <a:shade val="50000"/>
-            </a:schemeClr>
-          </a:lnRef>
-          <a:fillRef idx="1">
-            <a:schemeClr val="accent6"/>
-          </a:fillRef>
-          <a:effectRef idx="0">
-            <a:schemeClr val="accent6"/>
-          </a:effectRef>
-          <a:fontRef idx="minor">
-            <a:schemeClr val="lt1"/>
-          </a:fontRef>
-        </p:style>
-        <p:txBody>
-          <a:bodyPr rtlCol="0" anchor="ctr"/>
-          <a:lstStyle/>
-          <a:p>
-            <a:pPr algn="ctr"/>
-            <a:r>
-              <a:rPr lang="en-GB" sz="1050" dirty="0" err="1"/>
-              <a:t>WebModule</a:t>
-            </a:r>
-            <a:endParaRPr lang="en-GB" sz="1050" dirty="0"/>
           </a:p>
         </p:txBody>
       </p:sp>
@@ -4983,14 +4850,14 @@
         </p:nvCxnSpPr>
         <p:spPr>
           <a:xfrm rot="10800000" flipH="1" flipV="1">
-            <a:off x="783550" y="1279785"/>
-            <a:ext cx="1538205" cy="1088463"/>
+            <a:off x="716399" y="3567931"/>
+            <a:ext cx="1127248" cy="1184073"/>
           </a:xfrm>
           <a:prstGeom prst="curvedConnector5">
             <a:avLst>
-              <a:gd name="adj1" fmla="val -14861"/>
+              <a:gd name="adj1" fmla="val -20279"/>
               <a:gd name="adj2" fmla="val 50000"/>
-              <a:gd name="adj3" fmla="val 114861"/>
+              <a:gd name="adj3" fmla="val 120279"/>
             </a:avLst>
           </a:prstGeom>
           <a:ln>
@@ -5027,8 +4894,8 @@
         </p:nvSpPr>
         <p:spPr>
           <a:xfrm>
-            <a:off x="257563" y="1836489"/>
-            <a:ext cx="2064193" cy="252867"/>
+            <a:off x="240569" y="3974421"/>
+            <a:ext cx="2240013" cy="253916"/>
           </a:xfrm>
           <a:prstGeom prst="rect">
             <a:avLst/>
@@ -5053,58 +4920,12 @@
           </a:p>
         </p:txBody>
       </p:sp>
-      <p:cxnSp>
-        <p:nvCxnSpPr>
-          <p:cNvPr id="169" name="Connector: Curved 168">
-            <a:extLst>
-              <a:ext uri="{FF2B5EF4-FFF2-40B4-BE49-F238E27FC236}">
-                <a16:creationId xmlns:a16="http://schemas.microsoft.com/office/drawing/2014/main" id="{A067AF33-10AE-4C5E-9B30-F2CDCA6D3873}"/>
-              </a:ext>
-            </a:extLst>
-          </p:cNvPr>
-          <p:cNvCxnSpPr>
-            <a:cxnSpLocks/>
-            <a:stCxn id="14" idx="1"/>
-            <a:endCxn id="134" idx="3"/>
-          </p:cNvCxnSpPr>
-          <p:nvPr/>
-        </p:nvCxnSpPr>
-        <p:spPr>
-          <a:xfrm rot="10800000">
-            <a:off x="4528613" y="3368555"/>
-            <a:ext cx="612155" cy="1960"/>
-          </a:xfrm>
-          <a:prstGeom prst="curvedConnector3">
-            <a:avLst>
-              <a:gd name="adj1" fmla="val 50000"/>
-            </a:avLst>
-          </a:prstGeom>
-          <a:ln>
-            <a:prstDash val="solid"/>
-            <a:tailEnd type="triangle"/>
-          </a:ln>
-        </p:spPr>
-        <p:style>
-          <a:lnRef idx="1">
-            <a:schemeClr val="accent1"/>
-          </a:lnRef>
-          <a:fillRef idx="0">
-            <a:schemeClr val="accent1"/>
-          </a:fillRef>
-          <a:effectRef idx="0">
-            <a:schemeClr val="accent1"/>
-          </a:effectRef>
-          <a:fontRef idx="minor">
-            <a:schemeClr val="tx1"/>
-          </a:fontRef>
-        </p:style>
-      </p:cxnSp>
-      <p:sp>
-        <p:nvSpPr>
-          <p:cNvPr id="177" name="Rectangle 176">
-            <a:extLst>
-              <a:ext uri="{FF2B5EF4-FFF2-40B4-BE49-F238E27FC236}">
-                <a16:creationId xmlns:a16="http://schemas.microsoft.com/office/drawing/2014/main" id="{DAF5D7AC-03BA-456C-97CF-26ED0E02F74B}"/>
+      <p:sp>
+        <p:nvSpPr>
+          <p:cNvPr id="269" name="Rectangle 268">
+            <a:extLst>
+              <a:ext uri="{FF2B5EF4-FFF2-40B4-BE49-F238E27FC236}">
+                <a16:creationId xmlns:a16="http://schemas.microsoft.com/office/drawing/2014/main" id="{0354E88B-4A98-4BA9-93B2-416FEFC3BF41}"/>
               </a:ext>
             </a:extLst>
           </p:cNvPr>
@@ -5113,386 +4934,8 @@
         </p:nvSpPr>
         <p:spPr>
           <a:xfrm>
-            <a:off x="2990407" y="4317234"/>
-            <a:ext cx="1538205" cy="486032"/>
-          </a:xfrm>
-          <a:prstGeom prst="rect">
-            <a:avLst/>
-          </a:prstGeom>
-        </p:spPr>
-        <p:style>
-          <a:lnRef idx="2">
-            <a:schemeClr val="accent6">
-              <a:shade val="50000"/>
-            </a:schemeClr>
-          </a:lnRef>
-          <a:fillRef idx="1">
-            <a:schemeClr val="accent6"/>
-          </a:fillRef>
-          <a:effectRef idx="0">
-            <a:schemeClr val="accent6"/>
-          </a:effectRef>
-          <a:fontRef idx="minor">
-            <a:schemeClr val="lt1"/>
-          </a:fontRef>
-        </p:style>
-        <p:txBody>
-          <a:bodyPr rtlCol="0" anchor="ctr"/>
-          <a:lstStyle/>
-          <a:p>
-            <a:pPr algn="ctr"/>
-            <a:r>
-              <a:rPr lang="en-GB" sz="1200" dirty="0"/>
-              <a:t>Wicket</a:t>
-            </a:r>
-          </a:p>
-        </p:txBody>
-      </p:sp>
-      <p:sp>
-        <p:nvSpPr>
-          <p:cNvPr id="178" name="Rectangle 177">
-            <a:extLst>
-              <a:ext uri="{FF2B5EF4-FFF2-40B4-BE49-F238E27FC236}">
-                <a16:creationId xmlns:a16="http://schemas.microsoft.com/office/drawing/2014/main" id="{413A0E2E-348A-4FC4-B0BE-02E843B55B84}"/>
-              </a:ext>
-            </a:extLst>
-          </p:cNvPr>
-          <p:cNvSpPr/>
-          <p:nvPr/>
-        </p:nvSpPr>
-        <p:spPr>
-          <a:xfrm>
-            <a:off x="2990407" y="5696556"/>
-            <a:ext cx="1538205" cy="486032"/>
-          </a:xfrm>
-          <a:prstGeom prst="rect">
-            <a:avLst/>
-          </a:prstGeom>
-        </p:spPr>
-        <p:style>
-          <a:lnRef idx="2">
-            <a:schemeClr val="accent6">
-              <a:shade val="50000"/>
-            </a:schemeClr>
-          </a:lnRef>
-          <a:fillRef idx="1">
-            <a:schemeClr val="accent6"/>
-          </a:fillRef>
-          <a:effectRef idx="0">
-            <a:schemeClr val="accent6"/>
-          </a:effectRef>
-          <a:fontRef idx="minor">
-            <a:schemeClr val="lt1"/>
-          </a:fontRef>
-        </p:style>
-        <p:txBody>
-          <a:bodyPr rtlCol="0" anchor="ctr"/>
-          <a:lstStyle/>
-          <a:p>
-            <a:pPr algn="ctr"/>
-            <a:r>
-              <a:rPr lang="en-GB" sz="1200" dirty="0" err="1"/>
-              <a:t>RestfulObjects</a:t>
-            </a:r>
-            <a:endParaRPr lang="en-GB" sz="1200" dirty="0"/>
-          </a:p>
-        </p:txBody>
-      </p:sp>
-      <p:sp>
-        <p:nvSpPr>
-          <p:cNvPr id="183" name="Rectangle 182">
-            <a:extLst>
-              <a:ext uri="{FF2B5EF4-FFF2-40B4-BE49-F238E27FC236}">
-                <a16:creationId xmlns:a16="http://schemas.microsoft.com/office/drawing/2014/main" id="{7029411B-3EF4-4A1C-91D2-7F7BE5D917AB}"/>
-              </a:ext>
-            </a:extLst>
-          </p:cNvPr>
-          <p:cNvSpPr/>
-          <p:nvPr/>
-        </p:nvSpPr>
-        <p:spPr>
-          <a:xfrm>
-            <a:off x="783551" y="5037532"/>
-            <a:ext cx="1538205" cy="486032"/>
-          </a:xfrm>
-          <a:prstGeom prst="rect">
-            <a:avLst/>
-          </a:prstGeom>
-        </p:spPr>
-        <p:style>
-          <a:lnRef idx="2">
-            <a:schemeClr val="accent6">
-              <a:shade val="50000"/>
-            </a:schemeClr>
-          </a:lnRef>
-          <a:fillRef idx="1">
-            <a:schemeClr val="accent6"/>
-          </a:fillRef>
-          <a:effectRef idx="0">
-            <a:schemeClr val="accent6"/>
-          </a:effectRef>
-          <a:fontRef idx="minor">
-            <a:schemeClr val="lt1"/>
-          </a:fontRef>
-        </p:style>
-        <p:txBody>
-          <a:bodyPr rtlCol="0" anchor="ctr"/>
-          <a:lstStyle/>
-          <a:p>
-            <a:pPr algn="ctr"/>
-            <a:r>
-              <a:rPr lang="en-GB" sz="1200" dirty="0" err="1"/>
-              <a:t>TemplateResources</a:t>
-            </a:r>
-            <a:endParaRPr lang="en-GB" sz="1200" dirty="0"/>
-          </a:p>
-        </p:txBody>
-      </p:sp>
-      <p:sp>
-        <p:nvSpPr>
-          <p:cNvPr id="184" name="Rectangle 183">
-            <a:extLst>
-              <a:ext uri="{FF2B5EF4-FFF2-40B4-BE49-F238E27FC236}">
-                <a16:creationId xmlns:a16="http://schemas.microsoft.com/office/drawing/2014/main" id="{DF74DF7F-F778-4A60-941E-0FF74705EACC}"/>
-              </a:ext>
-            </a:extLst>
-          </p:cNvPr>
-          <p:cNvSpPr/>
-          <p:nvPr/>
-        </p:nvSpPr>
-        <p:spPr>
-          <a:xfrm>
-            <a:off x="2990407" y="6278127"/>
-            <a:ext cx="1538205" cy="486032"/>
-          </a:xfrm>
-          <a:prstGeom prst="rect">
-            <a:avLst/>
-          </a:prstGeom>
-        </p:spPr>
-        <p:style>
-          <a:lnRef idx="2">
-            <a:schemeClr val="accent6">
-              <a:shade val="50000"/>
-            </a:schemeClr>
-          </a:lnRef>
-          <a:fillRef idx="1">
-            <a:schemeClr val="accent6"/>
-          </a:fillRef>
-          <a:effectRef idx="0">
-            <a:schemeClr val="accent6"/>
-          </a:effectRef>
-          <a:fontRef idx="minor">
-            <a:schemeClr val="lt1"/>
-          </a:fontRef>
-        </p:style>
-        <p:txBody>
-          <a:bodyPr rtlCol="0" anchor="ctr"/>
-          <a:lstStyle/>
-          <a:p>
-            <a:pPr algn="ctr"/>
-            <a:r>
-              <a:rPr lang="en-GB" sz="1200" dirty="0"/>
-              <a:t>H2Console</a:t>
-            </a:r>
-          </a:p>
-        </p:txBody>
-      </p:sp>
-      <p:cxnSp>
-        <p:nvCxnSpPr>
-          <p:cNvPr id="201" name="Connector: Curved 200">
-            <a:extLst>
-              <a:ext uri="{FF2B5EF4-FFF2-40B4-BE49-F238E27FC236}">
-                <a16:creationId xmlns:a16="http://schemas.microsoft.com/office/drawing/2014/main" id="{FE9F0745-339C-4F47-A525-B25CED48DB13}"/>
-              </a:ext>
-            </a:extLst>
-          </p:cNvPr>
-          <p:cNvCxnSpPr>
-            <a:cxnSpLocks/>
-            <a:stCxn id="17" idx="1"/>
-            <a:endCxn id="177" idx="3"/>
-          </p:cNvCxnSpPr>
-          <p:nvPr/>
-        </p:nvCxnSpPr>
-        <p:spPr>
-          <a:xfrm rot="10800000">
-            <a:off x="4528613" y="4560250"/>
-            <a:ext cx="616255" cy="350296"/>
-          </a:xfrm>
-          <a:prstGeom prst="curvedConnector3">
-            <a:avLst>
-              <a:gd name="adj1" fmla="val 50000"/>
-            </a:avLst>
-          </a:prstGeom>
-          <a:ln>
-            <a:tailEnd type="triangle"/>
-          </a:ln>
-        </p:spPr>
-        <p:style>
-          <a:lnRef idx="1">
-            <a:schemeClr val="accent1"/>
-          </a:lnRef>
-          <a:fillRef idx="0">
-            <a:schemeClr val="accent1"/>
-          </a:fillRef>
-          <a:effectRef idx="0">
-            <a:schemeClr val="accent1"/>
-          </a:effectRef>
-          <a:fontRef idx="minor">
-            <a:schemeClr val="tx1"/>
-          </a:fontRef>
-        </p:style>
-      </p:cxnSp>
-      <p:cxnSp>
-        <p:nvCxnSpPr>
-          <p:cNvPr id="204" name="Connector: Curved 203">
-            <a:extLst>
-              <a:ext uri="{FF2B5EF4-FFF2-40B4-BE49-F238E27FC236}">
-                <a16:creationId xmlns:a16="http://schemas.microsoft.com/office/drawing/2014/main" id="{93248EBF-E8CF-4C99-9FDA-1CF2A3A99F8A}"/>
-              </a:ext>
-            </a:extLst>
-          </p:cNvPr>
-          <p:cNvCxnSpPr>
-            <a:cxnSpLocks/>
-            <a:stCxn id="18" idx="1"/>
-            <a:endCxn id="178" idx="3"/>
-          </p:cNvCxnSpPr>
-          <p:nvPr/>
-        </p:nvCxnSpPr>
-        <p:spPr>
-          <a:xfrm rot="10800000" flipV="1">
-            <a:off x="4528613" y="5510046"/>
-            <a:ext cx="616255" cy="429526"/>
-          </a:xfrm>
-          <a:prstGeom prst="curvedConnector3">
-            <a:avLst>
-              <a:gd name="adj1" fmla="val 50000"/>
-            </a:avLst>
-          </a:prstGeom>
-          <a:ln>
-            <a:tailEnd type="triangle"/>
-          </a:ln>
-        </p:spPr>
-        <p:style>
-          <a:lnRef idx="1">
-            <a:schemeClr val="accent1"/>
-          </a:lnRef>
-          <a:fillRef idx="0">
-            <a:schemeClr val="accent1"/>
-          </a:fillRef>
-          <a:effectRef idx="0">
-            <a:schemeClr val="accent1"/>
-          </a:effectRef>
-          <a:fontRef idx="minor">
-            <a:schemeClr val="tx1"/>
-          </a:fontRef>
-        </p:style>
-      </p:cxnSp>
-      <p:cxnSp>
-        <p:nvCxnSpPr>
-          <p:cNvPr id="213" name="Connector: Curved 212">
-            <a:extLst>
-              <a:ext uri="{FF2B5EF4-FFF2-40B4-BE49-F238E27FC236}">
-                <a16:creationId xmlns:a16="http://schemas.microsoft.com/office/drawing/2014/main" id="{D2A1CE92-B40F-486D-BD56-FDD4CBCE331B}"/>
-              </a:ext>
-            </a:extLst>
-          </p:cNvPr>
-          <p:cNvCxnSpPr>
-            <a:cxnSpLocks/>
-            <a:stCxn id="20" idx="1"/>
-            <a:endCxn id="183" idx="3"/>
-          </p:cNvCxnSpPr>
-          <p:nvPr/>
-        </p:nvCxnSpPr>
-        <p:spPr>
-          <a:xfrm rot="10800000">
-            <a:off x="2321757" y="5280548"/>
-            <a:ext cx="668651" cy="12700"/>
-          </a:xfrm>
-          <a:prstGeom prst="curvedConnector3">
-            <a:avLst>
-              <a:gd name="adj1" fmla="val 50000"/>
-            </a:avLst>
-          </a:prstGeom>
-          <a:ln>
-            <a:tailEnd type="triangle"/>
-          </a:ln>
-        </p:spPr>
-        <p:style>
-          <a:lnRef idx="1">
-            <a:schemeClr val="accent1"/>
-          </a:lnRef>
-          <a:fillRef idx="0">
-            <a:schemeClr val="accent1"/>
-          </a:fillRef>
-          <a:effectRef idx="0">
-            <a:schemeClr val="accent1"/>
-          </a:effectRef>
-          <a:fontRef idx="minor">
-            <a:schemeClr val="tx1"/>
-          </a:fontRef>
-        </p:style>
-      </p:cxnSp>
-      <p:cxnSp>
-        <p:nvCxnSpPr>
-          <p:cNvPr id="217" name="Connector: Curved 216">
-            <a:extLst>
-              <a:ext uri="{FF2B5EF4-FFF2-40B4-BE49-F238E27FC236}">
-                <a16:creationId xmlns:a16="http://schemas.microsoft.com/office/drawing/2014/main" id="{12C94ED8-E639-44BF-A3D4-1A961A199B78}"/>
-              </a:ext>
-            </a:extLst>
-          </p:cNvPr>
-          <p:cNvCxnSpPr>
-            <a:cxnSpLocks/>
-            <a:stCxn id="92" idx="1"/>
-            <a:endCxn id="184" idx="3"/>
-          </p:cNvCxnSpPr>
-          <p:nvPr/>
-        </p:nvCxnSpPr>
-        <p:spPr>
-          <a:xfrm rot="10800000" flipV="1">
-            <a:off x="4528612" y="6108849"/>
-            <a:ext cx="618336" cy="412293"/>
-          </a:xfrm>
-          <a:prstGeom prst="curvedConnector3">
-            <a:avLst>
-              <a:gd name="adj1" fmla="val 50000"/>
-            </a:avLst>
-          </a:prstGeom>
-          <a:ln>
-            <a:tailEnd type="triangle"/>
-          </a:ln>
-        </p:spPr>
-        <p:style>
-          <a:lnRef idx="1">
-            <a:schemeClr val="accent1"/>
-          </a:lnRef>
-          <a:fillRef idx="0">
-            <a:schemeClr val="accent1"/>
-          </a:fillRef>
-          <a:effectRef idx="0">
-            <a:schemeClr val="accent1"/>
-          </a:effectRef>
-          <a:fontRef idx="minor">
-            <a:schemeClr val="tx1"/>
-          </a:fontRef>
-        </p:style>
-      </p:cxnSp>
-      <p:sp>
-        <p:nvSpPr>
-          <p:cNvPr id="269" name="Rectangle 268">
-            <a:extLst>
-              <a:ext uri="{FF2B5EF4-FFF2-40B4-BE49-F238E27FC236}">
-                <a16:creationId xmlns:a16="http://schemas.microsoft.com/office/drawing/2014/main" id="{0354E88B-4A98-4BA9-93B2-416FEFC3BF41}"/>
-              </a:ext>
-            </a:extLst>
-          </p:cNvPr>
-          <p:cNvSpPr/>
-          <p:nvPr/>
-        </p:nvSpPr>
-        <p:spPr>
-          <a:xfrm>
-            <a:off x="5144867" y="2546711"/>
-            <a:ext cx="1538205" cy="486032"/>
+            <a:off x="6639264" y="2932755"/>
+            <a:ext cx="1240231" cy="486032"/>
           </a:xfrm>
           <a:prstGeom prst="rect">
             <a:avLst/>
@@ -5552,7 +4995,7 @@
         </p:nvSpPr>
         <p:spPr>
           <a:xfrm>
-            <a:off x="8211367" y="1411566"/>
+            <a:off x="10160953" y="1450394"/>
             <a:ext cx="1785587" cy="486032"/>
           </a:xfrm>
           <a:prstGeom prst="rect">
@@ -5613,7 +5056,7 @@
         </p:nvSpPr>
         <p:spPr>
           <a:xfrm>
-            <a:off x="8204731" y="2488203"/>
+            <a:off x="9006255" y="2401819"/>
             <a:ext cx="1538205" cy="486032"/>
           </a:xfrm>
           <a:prstGeom prst="rect">
@@ -5667,20 +5110,18 @@
           </p:cNvPr>
           <p:cNvCxnSpPr>
             <a:cxnSpLocks/>
-            <a:stCxn id="285" idx="2"/>
+            <a:stCxn id="285" idx="1"/>
             <a:endCxn id="286" idx="0"/>
           </p:cNvCxnSpPr>
           <p:nvPr/>
         </p:nvCxnSpPr>
         <p:spPr>
-          <a:xfrm rot="5400000">
-            <a:off x="8743696" y="2127737"/>
-            <a:ext cx="590605" cy="130327"/>
-          </a:xfrm>
-          <a:prstGeom prst="curvedConnector3">
-            <a:avLst>
-              <a:gd name="adj1" fmla="val 50000"/>
-            </a:avLst>
+          <a:xfrm rot="10800000" flipV="1">
+            <a:off x="9775359" y="1693409"/>
+            <a:ext cx="385595" cy="708409"/>
+          </a:xfrm>
+          <a:prstGeom prst="curvedConnector2">
+            <a:avLst/>
           </a:prstGeom>
           <a:ln>
             <a:tailEnd type="triangle"/>
@@ -5715,7 +5156,7 @@
         </p:nvSpPr>
         <p:spPr>
           <a:xfrm>
-            <a:off x="9038998" y="2069718"/>
+            <a:off x="9840522" y="1983334"/>
             <a:ext cx="1878796" cy="253916"/>
           </a:xfrm>
           <a:prstGeom prst="rect">
@@ -5762,8 +5203,8 @@
         </p:nvCxnSpPr>
         <p:spPr>
           <a:xfrm rot="10800000" flipV="1">
-            <a:off x="6683073" y="2731219"/>
-            <a:ext cx="1521659" cy="58508"/>
+            <a:off x="7879495" y="2644835"/>
+            <a:ext cx="1126760" cy="530936"/>
           </a:xfrm>
           <a:prstGeom prst="curvedConnector3">
             <a:avLst>
@@ -5807,8 +5248,8 @@
         </p:nvCxnSpPr>
         <p:spPr>
           <a:xfrm rot="10800000" flipV="1">
-            <a:off x="6683072" y="2125787"/>
-            <a:ext cx="749382" cy="83151"/>
+            <a:off x="7879495" y="1650100"/>
+            <a:ext cx="377500" cy="591642"/>
           </a:xfrm>
           <a:prstGeom prst="curvedConnector3">
             <a:avLst>
@@ -5848,8 +5289,8 @@
         </p:nvSpPr>
         <p:spPr>
           <a:xfrm>
-            <a:off x="10155839" y="3224924"/>
-            <a:ext cx="1538205" cy="486032"/>
+            <a:off x="10882660" y="3104870"/>
+            <a:ext cx="1129853" cy="486032"/>
           </a:xfrm>
           <a:prstGeom prst="rect">
             <a:avLst/>
@@ -5904,8 +5345,8 @@
         </p:nvSpPr>
         <p:spPr>
           <a:xfrm>
-            <a:off x="10419546" y="3947218"/>
-            <a:ext cx="1590060" cy="486032"/>
+            <a:off x="10859918" y="3880826"/>
+            <a:ext cx="1167942" cy="486032"/>
           </a:xfrm>
           <a:prstGeom prst="rect">
             <a:avLst/>
@@ -5960,7 +5401,7 @@
         </p:nvSpPr>
         <p:spPr>
           <a:xfrm>
-            <a:off x="9742936" y="5835277"/>
+            <a:off x="9718552" y="5835277"/>
             <a:ext cx="1089327" cy="369134"/>
           </a:xfrm>
           <a:prstGeom prst="rect">
@@ -6020,8 +5461,8 @@
         </p:nvCxnSpPr>
         <p:spPr>
           <a:xfrm flipV="1">
-            <a:off x="9749572" y="3467940"/>
-            <a:ext cx="406267" cy="742286"/>
+            <a:off x="10551096" y="3347886"/>
+            <a:ext cx="331564" cy="775956"/>
           </a:xfrm>
           <a:prstGeom prst="curvedConnector3">
             <a:avLst>
@@ -6064,9 +5505,9 @@
           <p:nvPr/>
         </p:nvCxnSpPr>
         <p:spPr>
-          <a:xfrm rot="16200000" flipH="1">
-            <a:off x="10951628" y="3684270"/>
-            <a:ext cx="236262" cy="289634"/>
+          <a:xfrm rot="5400000">
+            <a:off x="11300776" y="3734015"/>
+            <a:ext cx="289924" cy="3698"/>
           </a:xfrm>
           <a:prstGeom prst="curvedConnector3">
             <a:avLst>
@@ -6112,8 +5553,8 @@
         </p:nvCxnSpPr>
         <p:spPr>
           <a:xfrm rot="10800000">
-            <a:off x="7609953" y="2125789"/>
-            <a:ext cx="594779" cy="605431"/>
+            <a:off x="8400109" y="1650101"/>
+            <a:ext cx="606146" cy="994735"/>
           </a:xfrm>
           <a:prstGeom prst="curvedConnector3">
             <a:avLst>
@@ -6157,8 +5598,8 @@
         </p:nvCxnSpPr>
         <p:spPr>
           <a:xfrm>
-            <a:off x="9742936" y="2731219"/>
-            <a:ext cx="412903" cy="736721"/>
+            <a:off x="10544460" y="2644835"/>
+            <a:ext cx="338200" cy="703051"/>
           </a:xfrm>
           <a:prstGeom prst="curvedConnector3">
             <a:avLst>
@@ -6202,8 +5643,8 @@
         </p:nvCxnSpPr>
         <p:spPr>
           <a:xfrm rot="10800000" flipV="1">
-            <a:off x="6685153" y="4210226"/>
-            <a:ext cx="1526214" cy="1898624"/>
+            <a:off x="7875395" y="4123842"/>
+            <a:ext cx="1137496" cy="2380168"/>
           </a:xfrm>
           <a:prstGeom prst="curvedConnector3">
             <a:avLst>
@@ -6241,14 +5682,14 @@
           <p:cNvCxnSpPr>
             <a:cxnSpLocks/>
             <a:stCxn id="92" idx="1"/>
-            <a:endCxn id="20" idx="3"/>
+            <a:endCxn id="521" idx="6"/>
           </p:cNvCxnSpPr>
           <p:nvPr/>
         </p:nvCxnSpPr>
         <p:spPr>
           <a:xfrm rot="10800000">
-            <a:off x="4528612" y="5280548"/>
-            <a:ext cx="618336" cy="828302"/>
+            <a:off x="5802854" y="4461514"/>
+            <a:ext cx="832311" cy="2042497"/>
           </a:xfrm>
           <a:prstGeom prst="curvedConnector3">
             <a:avLst>
@@ -6288,8 +5729,8 @@
         </p:nvSpPr>
         <p:spPr>
           <a:xfrm>
-            <a:off x="7432454" y="2031133"/>
-            <a:ext cx="177498" cy="189310"/>
+            <a:off x="8256995" y="1555445"/>
+            <a:ext cx="143114" cy="189310"/>
           </a:xfrm>
           <a:prstGeom prst="ellipse">
             <a:avLst/>
@@ -6336,8 +5777,8 @@
         </p:nvCxnSpPr>
         <p:spPr>
           <a:xfrm rot="10800000">
-            <a:off x="6683072" y="669840"/>
-            <a:ext cx="749382" cy="1455949"/>
+            <a:off x="7879495" y="702642"/>
+            <a:ext cx="377500" cy="947458"/>
           </a:xfrm>
           <a:prstGeom prst="curvedConnector3">
             <a:avLst>
@@ -6377,7 +5818,7 @@
         </p:nvSpPr>
         <p:spPr>
           <a:xfrm>
-            <a:off x="10924941" y="5496060"/>
+            <a:off x="10900557" y="5496060"/>
             <a:ext cx="177498" cy="189310"/>
           </a:xfrm>
           <a:prstGeom prst="ellipse">
@@ -6421,7 +5862,7 @@
         </p:nvSpPr>
         <p:spPr>
           <a:xfrm>
-            <a:off x="11086875" y="5349245"/>
+            <a:off x="11089870" y="5376245"/>
             <a:ext cx="943185" cy="415498"/>
           </a:xfrm>
           <a:prstGeom prst="rect">
@@ -6456,8 +5897,8 @@
         </p:nvSpPr>
         <p:spPr>
           <a:xfrm>
-            <a:off x="9030653" y="4501141"/>
-            <a:ext cx="1878796" cy="253916"/>
+            <a:off x="9195466" y="4954603"/>
+            <a:ext cx="718919" cy="253916"/>
           </a:xfrm>
           <a:prstGeom prst="rect">
             <a:avLst/>
@@ -6491,8 +5932,8 @@
         </p:nvSpPr>
         <p:spPr>
           <a:xfrm>
-            <a:off x="5144867" y="3708012"/>
-            <a:ext cx="1538205" cy="486032"/>
+            <a:off x="6639264" y="4094056"/>
+            <a:ext cx="1240231" cy="486032"/>
           </a:xfrm>
           <a:prstGeom prst="rect">
             <a:avLst/>
@@ -6540,120 +5981,20 @@
       </p:sp>
       <p:sp>
         <p:nvSpPr>
-          <p:cNvPr id="125" name="Rectangle 124">
-            <a:extLst>
-              <a:ext uri="{FF2B5EF4-FFF2-40B4-BE49-F238E27FC236}">
-                <a16:creationId xmlns:a16="http://schemas.microsoft.com/office/drawing/2014/main" id="{1935E35C-1264-4F97-8E33-3C5F2259556C}"/>
-              </a:ext>
-            </a:extLst>
-          </p:cNvPr>
-          <p:cNvSpPr/>
+          <p:cNvPr id="71" name="TextBox 70">
+            <a:extLst>
+              <a:ext uri="{FF2B5EF4-FFF2-40B4-BE49-F238E27FC236}">
+                <a16:creationId xmlns:a16="http://schemas.microsoft.com/office/drawing/2014/main" id="{9468C3BA-1104-4FAF-B227-156B513C306D}"/>
+              </a:ext>
+            </a:extLst>
+          </p:cNvPr>
+          <p:cNvSpPr txBox="1"/>
           <p:nvPr/>
         </p:nvSpPr>
         <p:spPr>
           <a:xfrm>
-            <a:off x="2990407" y="3706052"/>
-            <a:ext cx="1538205" cy="486032"/>
-          </a:xfrm>
-          <a:prstGeom prst="rect">
-            <a:avLst/>
-          </a:prstGeom>
-          <a:solidFill>
-            <a:srgbClr val="70AD47">
-              <a:alpha val="50196"/>
-            </a:srgbClr>
-          </a:solidFill>
-        </p:spPr>
-        <p:style>
-          <a:lnRef idx="2">
-            <a:schemeClr val="accent6">
-              <a:shade val="50000"/>
-            </a:schemeClr>
-          </a:lnRef>
-          <a:fillRef idx="1">
-            <a:schemeClr val="accent6"/>
-          </a:fillRef>
-          <a:effectRef idx="0">
-            <a:schemeClr val="accent6"/>
-          </a:effectRef>
-          <a:fontRef idx="minor">
-            <a:schemeClr val="lt1"/>
-          </a:fontRef>
-        </p:style>
-        <p:txBody>
-          <a:bodyPr rtlCol="0" anchor="ctr"/>
-          <a:lstStyle/>
-          <a:p>
-            <a:pPr algn="ctr"/>
-            <a:r>
-              <a:rPr lang="en-GB" sz="1200" dirty="0"/>
-              <a:t>Keycloak</a:t>
-            </a:r>
-          </a:p>
-        </p:txBody>
-      </p:sp>
-      <p:cxnSp>
-        <p:nvCxnSpPr>
-          <p:cNvPr id="126" name="Connector: Curved 125">
-            <a:extLst>
-              <a:ext uri="{FF2B5EF4-FFF2-40B4-BE49-F238E27FC236}">
-                <a16:creationId xmlns:a16="http://schemas.microsoft.com/office/drawing/2014/main" id="{1F9A5455-6900-4E96-BA45-E51C295BB70C}"/>
-              </a:ext>
-            </a:extLst>
-          </p:cNvPr>
-          <p:cNvCxnSpPr>
-            <a:cxnSpLocks/>
-            <a:stCxn id="123" idx="1"/>
-            <a:endCxn id="125" idx="3"/>
-          </p:cNvCxnSpPr>
-          <p:nvPr/>
-        </p:nvCxnSpPr>
-        <p:spPr>
-          <a:xfrm rot="10800000">
-            <a:off x="4528613" y="3949068"/>
-            <a:ext cx="616255" cy="1960"/>
-          </a:xfrm>
-          <a:prstGeom prst="curvedConnector3">
-            <a:avLst>
-              <a:gd name="adj1" fmla="val 50000"/>
-            </a:avLst>
-          </a:prstGeom>
-          <a:ln>
-            <a:prstDash val="solid"/>
-            <a:tailEnd type="triangle"/>
-          </a:ln>
-        </p:spPr>
-        <p:style>
-          <a:lnRef idx="1">
-            <a:schemeClr val="accent1"/>
-          </a:lnRef>
-          <a:fillRef idx="0">
-            <a:schemeClr val="accent1"/>
-          </a:fillRef>
-          <a:effectRef idx="0">
-            <a:schemeClr val="accent1"/>
-          </a:effectRef>
-          <a:fontRef idx="minor">
-            <a:schemeClr val="tx1"/>
-          </a:fontRef>
-        </p:style>
-      </p:cxnSp>
-      <p:sp>
-        <p:nvSpPr>
-          <p:cNvPr id="71" name="TextBox 70">
-            <a:extLst>
-              <a:ext uri="{FF2B5EF4-FFF2-40B4-BE49-F238E27FC236}">
-                <a16:creationId xmlns:a16="http://schemas.microsoft.com/office/drawing/2014/main" id="{9468C3BA-1104-4FAF-B227-156B513C306D}"/>
-              </a:ext>
-            </a:extLst>
-          </p:cNvPr>
-          <p:cNvSpPr txBox="1"/>
-          <p:nvPr/>
-        </p:nvSpPr>
-        <p:spPr>
-          <a:xfrm>
-            <a:off x="5824368" y="4173626"/>
-            <a:ext cx="1379318" cy="253916"/>
+            <a:off x="6450917" y="4589119"/>
+            <a:ext cx="1617328" cy="253916"/>
           </a:xfrm>
           <a:prstGeom prst="rect">
             <a:avLst/>
@@ -6666,6 +6007,7 @@
           </a:bodyPr>
           <a:lstStyle/>
           <a:p>
+            <a:pPr algn="ctr"/>
             <a:r>
               <a:rPr lang="en-GB" sz="1050" dirty="0"/>
               <a:t>(not used in this app)</a:t>
@@ -6687,8 +6029,8 @@
         </p:nvSpPr>
         <p:spPr>
           <a:xfrm flipH="1">
-            <a:off x="8383874" y="218114"/>
-            <a:ext cx="3553660" cy="646331"/>
+            <a:off x="8831182" y="189666"/>
+            <a:ext cx="3203888" cy="646331"/>
           </a:xfrm>
           <a:prstGeom prst="rect">
             <a:avLst/>
@@ -6734,8 +6076,8 @@
         </p:nvSpPr>
         <p:spPr>
           <a:xfrm>
-            <a:off x="111761" y="3032743"/>
-            <a:ext cx="1538205" cy="486032"/>
+            <a:off x="78530" y="2190660"/>
+            <a:ext cx="1240231" cy="486032"/>
           </a:xfrm>
           <a:prstGeom prst="rect">
             <a:avLst/>
@@ -6786,15 +6128,15 @@
           <p:nvPr/>
         </p:nvCxnSpPr>
         <p:spPr>
-          <a:xfrm rot="10800000" flipH="1" flipV="1">
-            <a:off x="783550" y="1279785"/>
-            <a:ext cx="866415" cy="1995973"/>
+          <a:xfrm rot="10800000" flipH="1">
+            <a:off x="716399" y="2433676"/>
+            <a:ext cx="602362" cy="1134256"/>
           </a:xfrm>
           <a:prstGeom prst="curvedConnector5">
             <a:avLst>
-              <a:gd name="adj1" fmla="val -73238"/>
-              <a:gd name="adj2" fmla="val 76912"/>
-              <a:gd name="adj3" fmla="val 126385"/>
+              <a:gd name="adj1" fmla="val -37951"/>
+              <a:gd name="adj2" fmla="val 50000"/>
+              <a:gd name="adj3" fmla="val 137951"/>
             </a:avLst>
           </a:prstGeom>
           <a:ln>
@@ -6831,7 +6173,7 @@
         </p:nvSpPr>
         <p:spPr>
           <a:xfrm>
-            <a:off x="10968112" y="6319443"/>
+            <a:off x="10943728" y="6319443"/>
             <a:ext cx="1089327" cy="369134"/>
           </a:xfrm>
           <a:prstGeom prst="rect">
@@ -6891,8 +6233,8 @@
         </p:nvSpPr>
         <p:spPr>
           <a:xfrm>
-            <a:off x="5144867" y="418622"/>
-            <a:ext cx="1538205" cy="486032"/>
+            <a:off x="6639264" y="451425"/>
+            <a:ext cx="1240231" cy="486032"/>
           </a:xfrm>
           <a:prstGeom prst="rect">
             <a:avLst/>
@@ -6940,8 +6282,8 @@
         </p:nvSpPr>
         <p:spPr>
           <a:xfrm>
-            <a:off x="5146948" y="5865834"/>
-            <a:ext cx="1538205" cy="486032"/>
+            <a:off x="6635164" y="6260994"/>
+            <a:ext cx="1240231" cy="486032"/>
           </a:xfrm>
           <a:prstGeom prst="rect">
             <a:avLst/>
@@ -6975,6 +6317,1669 @@
           </a:p>
         </p:txBody>
       </p:sp>
+      <p:sp>
+        <p:nvSpPr>
+          <p:cNvPr id="78" name="Rectangle 77">
+            <a:extLst>
+              <a:ext uri="{FF2B5EF4-FFF2-40B4-BE49-F238E27FC236}">
+                <a16:creationId xmlns:a16="http://schemas.microsoft.com/office/drawing/2014/main" id="{019EAB0B-40DE-4456-AD8E-A0D5EB668A89}"/>
+              </a:ext>
+            </a:extLst>
+          </p:cNvPr>
+          <p:cNvSpPr/>
+          <p:nvPr/>
+        </p:nvSpPr>
+        <p:spPr>
+          <a:xfrm>
+            <a:off x="441290" y="1344336"/>
+            <a:ext cx="1240231" cy="486032"/>
+          </a:xfrm>
+          <a:prstGeom prst="rect">
+            <a:avLst/>
+          </a:prstGeom>
+        </p:spPr>
+        <p:style>
+          <a:lnRef idx="2">
+            <a:schemeClr val="accent1">
+              <a:shade val="50000"/>
+            </a:schemeClr>
+          </a:lnRef>
+          <a:fillRef idx="1">
+            <a:schemeClr val="accent1"/>
+          </a:fillRef>
+          <a:effectRef idx="0">
+            <a:schemeClr val="accent1"/>
+          </a:effectRef>
+          <a:fontRef idx="minor">
+            <a:schemeClr val="lt1"/>
+          </a:fontRef>
+        </p:style>
+        <p:txBody>
+          <a:bodyPr rtlCol="0" anchor="ctr"/>
+          <a:lstStyle/>
+          <a:p>
+            <a:pPr algn="ctr"/>
+            <a:r>
+              <a:rPr lang="en-GB" sz="1200" dirty="0"/>
+              <a:t>Schema</a:t>
+            </a:r>
+          </a:p>
+        </p:txBody>
+      </p:sp>
+      <p:cxnSp>
+        <p:nvCxnSpPr>
+          <p:cNvPr id="79" name="Connector: Curved 78">
+            <a:extLst>
+              <a:ext uri="{FF2B5EF4-FFF2-40B4-BE49-F238E27FC236}">
+                <a16:creationId xmlns:a16="http://schemas.microsoft.com/office/drawing/2014/main" id="{223E57F4-BD85-4886-83C8-2A0EE46C93B0}"/>
+              </a:ext>
+            </a:extLst>
+          </p:cNvPr>
+          <p:cNvCxnSpPr>
+            <a:cxnSpLocks/>
+            <a:stCxn id="78" idx="1"/>
+            <a:endCxn id="75" idx="3"/>
+          </p:cNvCxnSpPr>
+          <p:nvPr/>
+        </p:nvCxnSpPr>
+        <p:spPr>
+          <a:xfrm rot="10800000" flipH="1" flipV="1">
+            <a:off x="441289" y="1587352"/>
+            <a:ext cx="877471" cy="846324"/>
+          </a:xfrm>
+          <a:prstGeom prst="curvedConnector5">
+            <a:avLst>
+              <a:gd name="adj1" fmla="val -26052"/>
+              <a:gd name="adj2" fmla="val 50000"/>
+              <a:gd name="adj3" fmla="val 126052"/>
+            </a:avLst>
+          </a:prstGeom>
+          <a:ln>
+            <a:prstDash val="solid"/>
+            <a:tailEnd type="triangle"/>
+          </a:ln>
+        </p:spPr>
+        <p:style>
+          <a:lnRef idx="1">
+            <a:schemeClr val="accent1"/>
+          </a:lnRef>
+          <a:fillRef idx="0">
+            <a:schemeClr val="accent1"/>
+          </a:fillRef>
+          <a:effectRef idx="0">
+            <a:schemeClr val="accent1"/>
+          </a:effectRef>
+          <a:fontRef idx="minor">
+            <a:schemeClr val="tx1"/>
+          </a:fontRef>
+        </p:style>
+      </p:cxnSp>
+      <p:cxnSp>
+        <p:nvCxnSpPr>
+          <p:cNvPr id="100" name="Connector: Curved 99">
+            <a:extLst>
+              <a:ext uri="{FF2B5EF4-FFF2-40B4-BE49-F238E27FC236}">
+                <a16:creationId xmlns:a16="http://schemas.microsoft.com/office/drawing/2014/main" id="{F0479769-8049-452B-B759-B787100AB158}"/>
+              </a:ext>
+            </a:extLst>
+          </p:cNvPr>
+          <p:cNvCxnSpPr>
+            <a:cxnSpLocks/>
+            <a:stCxn id="80" idx="1"/>
+            <a:endCxn id="78" idx="3"/>
+          </p:cNvCxnSpPr>
+          <p:nvPr/>
+        </p:nvCxnSpPr>
+        <p:spPr>
+          <a:xfrm rot="10800000" flipH="1" flipV="1">
+            <a:off x="634267" y="825694"/>
+            <a:ext cx="1047253" cy="761658"/>
+          </a:xfrm>
+          <a:prstGeom prst="curvedConnector5">
+            <a:avLst>
+              <a:gd name="adj1" fmla="val -21829"/>
+              <a:gd name="adj2" fmla="val 50000"/>
+              <a:gd name="adj3" fmla="val 121829"/>
+            </a:avLst>
+          </a:prstGeom>
+          <a:ln>
+            <a:prstDash val="solid"/>
+            <a:tailEnd type="triangle"/>
+          </a:ln>
+        </p:spPr>
+        <p:style>
+          <a:lnRef idx="1">
+            <a:schemeClr val="accent1"/>
+          </a:lnRef>
+          <a:fillRef idx="0">
+            <a:schemeClr val="accent1"/>
+          </a:fillRef>
+          <a:effectRef idx="0">
+            <a:schemeClr val="accent1"/>
+          </a:effectRef>
+          <a:fontRef idx="minor">
+            <a:schemeClr val="tx1"/>
+          </a:fontRef>
+        </p:style>
+      </p:cxnSp>
+      <p:sp>
+        <p:nvSpPr>
+          <p:cNvPr id="148" name="Rectangle 147">
+            <a:extLst>
+              <a:ext uri="{FF2B5EF4-FFF2-40B4-BE49-F238E27FC236}">
+                <a16:creationId xmlns:a16="http://schemas.microsoft.com/office/drawing/2014/main" id="{466BDA64-8508-416B-8330-A58A44CD7990}"/>
+              </a:ext>
+            </a:extLst>
+          </p:cNvPr>
+          <p:cNvSpPr/>
+          <p:nvPr/>
+        </p:nvSpPr>
+        <p:spPr>
+          <a:xfrm>
+            <a:off x="2957567" y="183022"/>
+            <a:ext cx="1240231" cy="486032"/>
+          </a:xfrm>
+          <a:prstGeom prst="rect">
+            <a:avLst/>
+          </a:prstGeom>
+          <a:solidFill>
+            <a:srgbClr val="CCCCFF"/>
+          </a:solidFill>
+        </p:spPr>
+        <p:style>
+          <a:lnRef idx="2">
+            <a:schemeClr val="accent1">
+              <a:shade val="50000"/>
+            </a:schemeClr>
+          </a:lnRef>
+          <a:fillRef idx="1">
+            <a:schemeClr val="accent1"/>
+          </a:fillRef>
+          <a:effectRef idx="0">
+            <a:schemeClr val="accent1"/>
+          </a:effectRef>
+          <a:fontRef idx="minor">
+            <a:schemeClr val="lt1"/>
+          </a:fontRef>
+        </p:style>
+        <p:txBody>
+          <a:bodyPr rtlCol="0" anchor="ctr"/>
+          <a:lstStyle/>
+          <a:p>
+            <a:pPr algn="ctr"/>
+            <a:r>
+              <a:rPr lang="en-GB" sz="1200" dirty="0" err="1"/>
+              <a:t>CodeGen</a:t>
+            </a:r>
+            <a:br>
+              <a:rPr lang="en-GB" sz="1200" dirty="0"/>
+            </a:br>
+            <a:r>
+              <a:rPr lang="en-GB" sz="1200" dirty="0" err="1"/>
+              <a:t>ByteBuddy</a:t>
+            </a:r>
+            <a:endParaRPr lang="en-GB" sz="1200" dirty="0"/>
+          </a:p>
+        </p:txBody>
+      </p:sp>
+      <p:cxnSp>
+        <p:nvCxnSpPr>
+          <p:cNvPr id="149" name="Connector: Curved 148">
+            <a:extLst>
+              <a:ext uri="{FF2B5EF4-FFF2-40B4-BE49-F238E27FC236}">
+                <a16:creationId xmlns:a16="http://schemas.microsoft.com/office/drawing/2014/main" id="{38EF5427-4ED3-441A-8017-4008285705AE}"/>
+              </a:ext>
+            </a:extLst>
+          </p:cNvPr>
+          <p:cNvCxnSpPr>
+            <a:cxnSpLocks/>
+            <a:stCxn id="99" idx="1"/>
+            <a:endCxn id="148" idx="3"/>
+          </p:cNvCxnSpPr>
+          <p:nvPr/>
+        </p:nvCxnSpPr>
+        <p:spPr>
+          <a:xfrm rot="10800000" flipH="1">
+            <a:off x="3274016" y="426039"/>
+            <a:ext cx="923781" cy="781421"/>
+          </a:xfrm>
+          <a:prstGeom prst="curvedConnector5">
+            <a:avLst>
+              <a:gd name="adj1" fmla="val -24746"/>
+              <a:gd name="adj2" fmla="val 50000"/>
+              <a:gd name="adj3" fmla="val 124746"/>
+            </a:avLst>
+          </a:prstGeom>
+          <a:ln>
+            <a:prstDash val="solid"/>
+            <a:tailEnd type="triangle"/>
+          </a:ln>
+        </p:spPr>
+        <p:style>
+          <a:lnRef idx="1">
+            <a:schemeClr val="accent1"/>
+          </a:lnRef>
+          <a:fillRef idx="0">
+            <a:schemeClr val="accent1"/>
+          </a:fillRef>
+          <a:effectRef idx="0">
+            <a:schemeClr val="accent1"/>
+          </a:effectRef>
+          <a:fontRef idx="minor">
+            <a:schemeClr val="tx1"/>
+          </a:fontRef>
+        </p:style>
+      </p:cxnSp>
+      <p:sp>
+        <p:nvSpPr>
+          <p:cNvPr id="153" name="Rectangle 152">
+            <a:extLst>
+              <a:ext uri="{FF2B5EF4-FFF2-40B4-BE49-F238E27FC236}">
+                <a16:creationId xmlns:a16="http://schemas.microsoft.com/office/drawing/2014/main" id="{703D0774-566D-434B-811E-27FAAA6CD613}"/>
+              </a:ext>
+            </a:extLst>
+          </p:cNvPr>
+          <p:cNvSpPr/>
+          <p:nvPr/>
+        </p:nvSpPr>
+        <p:spPr>
+          <a:xfrm>
+            <a:off x="2278839" y="3641675"/>
+            <a:ext cx="1240231" cy="486032"/>
+          </a:xfrm>
+          <a:prstGeom prst="rect">
+            <a:avLst/>
+          </a:prstGeom>
+        </p:spPr>
+        <p:style>
+          <a:lnRef idx="2">
+            <a:schemeClr val="accent1">
+              <a:shade val="50000"/>
+            </a:schemeClr>
+          </a:lnRef>
+          <a:fillRef idx="1">
+            <a:schemeClr val="accent1"/>
+          </a:fillRef>
+          <a:effectRef idx="0">
+            <a:schemeClr val="accent1"/>
+          </a:effectRef>
+          <a:fontRef idx="minor">
+            <a:schemeClr val="lt1"/>
+          </a:fontRef>
+        </p:style>
+        <p:txBody>
+          <a:bodyPr rtlCol="0" anchor="ctr"/>
+          <a:lstStyle/>
+          <a:p>
+            <a:pPr algn="ctr"/>
+            <a:r>
+              <a:rPr lang="en-GB" sz="1200" dirty="0"/>
+              <a:t>Security</a:t>
+            </a:r>
+            <a:br>
+              <a:rPr lang="en-GB" sz="1200" dirty="0"/>
+            </a:br>
+            <a:r>
+              <a:rPr lang="en-GB" sz="1200" dirty="0" err="1"/>
+              <a:t>Api</a:t>
+            </a:r>
+            <a:endParaRPr lang="en-GB" sz="1200" dirty="0"/>
+          </a:p>
+        </p:txBody>
+      </p:sp>
+      <p:cxnSp>
+        <p:nvCxnSpPr>
+          <p:cNvPr id="156" name="Connector: Curved 155">
+            <a:extLst>
+              <a:ext uri="{FF2B5EF4-FFF2-40B4-BE49-F238E27FC236}">
+                <a16:creationId xmlns:a16="http://schemas.microsoft.com/office/drawing/2014/main" id="{3CC6DBC9-8279-403B-B525-6CB479CEEB29}"/>
+              </a:ext>
+            </a:extLst>
+          </p:cNvPr>
+          <p:cNvCxnSpPr>
+            <a:cxnSpLocks/>
+            <a:stCxn id="81" idx="1"/>
+            <a:endCxn id="153" idx="3"/>
+          </p:cNvCxnSpPr>
+          <p:nvPr/>
+        </p:nvCxnSpPr>
+        <p:spPr>
+          <a:xfrm rot="10800000" flipH="1" flipV="1">
+            <a:off x="2467770" y="2874805"/>
+            <a:ext cx="1051300" cy="1009885"/>
+          </a:xfrm>
+          <a:prstGeom prst="curvedConnector5">
+            <a:avLst>
+              <a:gd name="adj1" fmla="val -21745"/>
+              <a:gd name="adj2" fmla="val 50000"/>
+              <a:gd name="adj3" fmla="val 121745"/>
+            </a:avLst>
+          </a:prstGeom>
+          <a:ln>
+            <a:prstDash val="solid"/>
+            <a:tailEnd type="triangle"/>
+          </a:ln>
+        </p:spPr>
+        <p:style>
+          <a:lnRef idx="1">
+            <a:schemeClr val="accent1"/>
+          </a:lnRef>
+          <a:fillRef idx="0">
+            <a:schemeClr val="accent1"/>
+          </a:fillRef>
+          <a:effectRef idx="0">
+            <a:schemeClr val="accent1"/>
+          </a:effectRef>
+          <a:fontRef idx="minor">
+            <a:schemeClr val="tx1"/>
+          </a:fontRef>
+        </p:style>
+      </p:cxnSp>
+      <p:cxnSp>
+        <p:nvCxnSpPr>
+          <p:cNvPr id="160" name="Connector: Curved 159">
+            <a:extLst>
+              <a:ext uri="{FF2B5EF4-FFF2-40B4-BE49-F238E27FC236}">
+                <a16:creationId xmlns:a16="http://schemas.microsoft.com/office/drawing/2014/main" id="{A93701F6-1ECE-4FAA-9E95-FD9BF121DC31}"/>
+              </a:ext>
+            </a:extLst>
+          </p:cNvPr>
+          <p:cNvCxnSpPr>
+            <a:cxnSpLocks/>
+            <a:stCxn id="269" idx="1"/>
+            <a:endCxn id="233" idx="6"/>
+          </p:cNvCxnSpPr>
+          <p:nvPr/>
+        </p:nvCxnSpPr>
+        <p:spPr>
+          <a:xfrm rot="10800000" flipV="1">
+            <a:off x="6214758" y="3175771"/>
+            <a:ext cx="424507" cy="464904"/>
+          </a:xfrm>
+          <a:prstGeom prst="curvedConnector3">
+            <a:avLst>
+              <a:gd name="adj1" fmla="val 50000"/>
+            </a:avLst>
+          </a:prstGeom>
+          <a:ln>
+            <a:prstDash val="solid"/>
+            <a:tailEnd type="triangle"/>
+          </a:ln>
+        </p:spPr>
+        <p:style>
+          <a:lnRef idx="1">
+            <a:schemeClr val="accent1"/>
+          </a:lnRef>
+          <a:fillRef idx="0">
+            <a:schemeClr val="accent1"/>
+          </a:fillRef>
+          <a:effectRef idx="0">
+            <a:schemeClr val="accent1"/>
+          </a:effectRef>
+          <a:fontRef idx="minor">
+            <a:schemeClr val="tx1"/>
+          </a:fontRef>
+        </p:style>
+      </p:cxnSp>
+      <p:cxnSp>
+        <p:nvCxnSpPr>
+          <p:cNvPr id="164" name="Connector: Curved 163">
+            <a:extLst>
+              <a:ext uri="{FF2B5EF4-FFF2-40B4-BE49-F238E27FC236}">
+                <a16:creationId xmlns:a16="http://schemas.microsoft.com/office/drawing/2014/main" id="{D425123B-6404-44E3-8247-9FCFEBDCF6A2}"/>
+              </a:ext>
+            </a:extLst>
+          </p:cNvPr>
+          <p:cNvCxnSpPr>
+            <a:cxnSpLocks/>
+            <a:stCxn id="14" idx="1"/>
+            <a:endCxn id="233" idx="6"/>
+          </p:cNvCxnSpPr>
+          <p:nvPr/>
+        </p:nvCxnSpPr>
+        <p:spPr>
+          <a:xfrm rot="10800000">
+            <a:off x="6214758" y="3640675"/>
+            <a:ext cx="420407" cy="115884"/>
+          </a:xfrm>
+          <a:prstGeom prst="curvedConnector3">
+            <a:avLst>
+              <a:gd name="adj1" fmla="val 50000"/>
+            </a:avLst>
+          </a:prstGeom>
+          <a:ln>
+            <a:prstDash val="solid"/>
+            <a:tailEnd type="triangle"/>
+          </a:ln>
+        </p:spPr>
+        <p:style>
+          <a:lnRef idx="1">
+            <a:schemeClr val="accent1"/>
+          </a:lnRef>
+          <a:fillRef idx="0">
+            <a:schemeClr val="accent1"/>
+          </a:fillRef>
+          <a:effectRef idx="0">
+            <a:schemeClr val="accent1"/>
+          </a:effectRef>
+          <a:fontRef idx="minor">
+            <a:schemeClr val="tx1"/>
+          </a:fontRef>
+        </p:style>
+      </p:cxnSp>
+      <p:cxnSp>
+        <p:nvCxnSpPr>
+          <p:cNvPr id="167" name="Connector: Curved 166">
+            <a:extLst>
+              <a:ext uri="{FF2B5EF4-FFF2-40B4-BE49-F238E27FC236}">
+                <a16:creationId xmlns:a16="http://schemas.microsoft.com/office/drawing/2014/main" id="{0DEC3ED6-16AE-476A-89A6-5AA8C77D2399}"/>
+              </a:ext>
+            </a:extLst>
+          </p:cNvPr>
+          <p:cNvCxnSpPr>
+            <a:cxnSpLocks/>
+            <a:stCxn id="123" idx="1"/>
+            <a:endCxn id="233" idx="6"/>
+          </p:cNvCxnSpPr>
+          <p:nvPr/>
+        </p:nvCxnSpPr>
+        <p:spPr>
+          <a:xfrm rot="10800000">
+            <a:off x="6214758" y="3640676"/>
+            <a:ext cx="424507" cy="696397"/>
+          </a:xfrm>
+          <a:prstGeom prst="curvedConnector3">
+            <a:avLst>
+              <a:gd name="adj1" fmla="val 50000"/>
+            </a:avLst>
+          </a:prstGeom>
+          <a:ln>
+            <a:prstDash val="solid"/>
+            <a:tailEnd type="triangle"/>
+          </a:ln>
+        </p:spPr>
+        <p:style>
+          <a:lnRef idx="1">
+            <a:schemeClr val="accent1"/>
+          </a:lnRef>
+          <a:fillRef idx="0">
+            <a:schemeClr val="accent1"/>
+          </a:fillRef>
+          <a:effectRef idx="0">
+            <a:schemeClr val="accent1"/>
+          </a:effectRef>
+          <a:fontRef idx="minor">
+            <a:schemeClr val="tx1"/>
+          </a:fontRef>
+        </p:style>
+      </p:cxnSp>
+      <p:sp>
+        <p:nvSpPr>
+          <p:cNvPr id="223" name="Rectangle 222">
+            <a:extLst>
+              <a:ext uri="{FF2B5EF4-FFF2-40B4-BE49-F238E27FC236}">
+                <a16:creationId xmlns:a16="http://schemas.microsoft.com/office/drawing/2014/main" id="{67C88167-8AF3-4349-A053-9BB844135D48}"/>
+              </a:ext>
+            </a:extLst>
+          </p:cNvPr>
+          <p:cNvSpPr/>
+          <p:nvPr/>
+        </p:nvSpPr>
+        <p:spPr>
+          <a:xfrm>
+            <a:off x="5253364" y="2448519"/>
+            <a:ext cx="1240231" cy="486032"/>
+          </a:xfrm>
+          <a:prstGeom prst="rect">
+            <a:avLst/>
+          </a:prstGeom>
+        </p:spPr>
+        <p:style>
+          <a:lnRef idx="2">
+            <a:schemeClr val="accent6">
+              <a:shade val="50000"/>
+            </a:schemeClr>
+          </a:lnRef>
+          <a:fillRef idx="1">
+            <a:schemeClr val="accent6"/>
+          </a:fillRef>
+          <a:effectRef idx="0">
+            <a:schemeClr val="accent6"/>
+          </a:effectRef>
+          <a:fontRef idx="minor">
+            <a:schemeClr val="lt1"/>
+          </a:fontRef>
+        </p:style>
+        <p:txBody>
+          <a:bodyPr rtlCol="0" anchor="ctr"/>
+          <a:lstStyle/>
+          <a:p>
+            <a:pPr algn="ctr"/>
+            <a:r>
+              <a:rPr lang="en-GB" sz="1200" dirty="0" err="1"/>
+              <a:t>Jdo</a:t>
+            </a:r>
+            <a:br>
+              <a:rPr lang="en-GB" sz="1200" dirty="0"/>
+            </a:br>
+            <a:r>
+              <a:rPr lang="en-GB" sz="1200" dirty="0" err="1"/>
+              <a:t>Applib</a:t>
+            </a:r>
+            <a:endParaRPr lang="en-GB" sz="1200" dirty="0"/>
+          </a:p>
+        </p:txBody>
+      </p:sp>
+      <p:sp>
+        <p:nvSpPr>
+          <p:cNvPr id="233" name="Oval 232">
+            <a:extLst>
+              <a:ext uri="{FF2B5EF4-FFF2-40B4-BE49-F238E27FC236}">
+                <a16:creationId xmlns:a16="http://schemas.microsoft.com/office/drawing/2014/main" id="{31497D29-AD42-45EA-B7C4-81C12A2CE9C1}"/>
+              </a:ext>
+            </a:extLst>
+          </p:cNvPr>
+          <p:cNvSpPr/>
+          <p:nvPr/>
+        </p:nvSpPr>
+        <p:spPr>
+          <a:xfrm>
+            <a:off x="6071643" y="3546020"/>
+            <a:ext cx="143114" cy="189310"/>
+          </a:xfrm>
+          <a:prstGeom prst="ellipse">
+            <a:avLst/>
+          </a:prstGeom>
+        </p:spPr>
+        <p:style>
+          <a:lnRef idx="2">
+            <a:schemeClr val="accent6"/>
+          </a:lnRef>
+          <a:fillRef idx="1">
+            <a:schemeClr val="lt1"/>
+          </a:fillRef>
+          <a:effectRef idx="0">
+            <a:schemeClr val="accent6"/>
+          </a:effectRef>
+          <a:fontRef idx="minor">
+            <a:schemeClr val="dk1"/>
+          </a:fontRef>
+        </p:style>
+        <p:txBody>
+          <a:bodyPr rtlCol="0" anchor="ctr"/>
+          <a:lstStyle/>
+          <a:p>
+            <a:pPr algn="ctr"/>
+            <a:endParaRPr lang="en-GB"/>
+          </a:p>
+        </p:txBody>
+      </p:sp>
+      <p:cxnSp>
+        <p:nvCxnSpPr>
+          <p:cNvPr id="234" name="Connector: Curved 233">
+            <a:extLst>
+              <a:ext uri="{FF2B5EF4-FFF2-40B4-BE49-F238E27FC236}">
+                <a16:creationId xmlns:a16="http://schemas.microsoft.com/office/drawing/2014/main" id="{7CF0E77E-4950-47ED-9A66-6899BACD9B16}"/>
+              </a:ext>
+            </a:extLst>
+          </p:cNvPr>
+          <p:cNvCxnSpPr>
+            <a:cxnSpLocks/>
+            <a:stCxn id="233" idx="2"/>
+            <a:endCxn id="153" idx="3"/>
+          </p:cNvCxnSpPr>
+          <p:nvPr/>
+        </p:nvCxnSpPr>
+        <p:spPr>
+          <a:xfrm rot="10800000" flipV="1">
+            <a:off x="3519071" y="3640675"/>
+            <a:ext cx="2552573" cy="244016"/>
+          </a:xfrm>
+          <a:prstGeom prst="curvedConnector3">
+            <a:avLst>
+              <a:gd name="adj1" fmla="val 50000"/>
+            </a:avLst>
+          </a:prstGeom>
+          <a:ln>
+            <a:prstDash val="solid"/>
+            <a:tailEnd type="triangle"/>
+          </a:ln>
+        </p:spPr>
+        <p:style>
+          <a:lnRef idx="1">
+            <a:schemeClr val="accent1"/>
+          </a:lnRef>
+          <a:fillRef idx="0">
+            <a:schemeClr val="accent1"/>
+          </a:fillRef>
+          <a:effectRef idx="0">
+            <a:schemeClr val="accent1"/>
+          </a:effectRef>
+          <a:fontRef idx="minor">
+            <a:schemeClr val="tx1"/>
+          </a:fontRef>
+        </p:style>
+      </p:cxnSp>
+      <p:cxnSp>
+        <p:nvCxnSpPr>
+          <p:cNvPr id="241" name="Connector: Curved 240">
+            <a:extLst>
+              <a:ext uri="{FF2B5EF4-FFF2-40B4-BE49-F238E27FC236}">
+                <a16:creationId xmlns:a16="http://schemas.microsoft.com/office/drawing/2014/main" id="{E2F5FA43-24C2-4587-9D46-72A5C80B90E0}"/>
+              </a:ext>
+            </a:extLst>
+          </p:cNvPr>
+          <p:cNvCxnSpPr>
+            <a:cxnSpLocks/>
+            <a:stCxn id="15" idx="1"/>
+            <a:endCxn id="223" idx="3"/>
+          </p:cNvCxnSpPr>
+          <p:nvPr/>
+        </p:nvCxnSpPr>
+        <p:spPr>
+          <a:xfrm rot="10800000" flipV="1">
+            <a:off x="6493596" y="2241741"/>
+            <a:ext cx="145669" cy="449793"/>
+          </a:xfrm>
+          <a:prstGeom prst="curvedConnector3">
+            <a:avLst>
+              <a:gd name="adj1" fmla="val 50000"/>
+            </a:avLst>
+          </a:prstGeom>
+          <a:ln>
+            <a:prstDash val="solid"/>
+            <a:tailEnd type="triangle"/>
+          </a:ln>
+        </p:spPr>
+        <p:style>
+          <a:lnRef idx="1">
+            <a:schemeClr val="accent1"/>
+          </a:lnRef>
+          <a:fillRef idx="0">
+            <a:schemeClr val="accent1"/>
+          </a:fillRef>
+          <a:effectRef idx="0">
+            <a:schemeClr val="accent1"/>
+          </a:effectRef>
+          <a:fontRef idx="minor">
+            <a:schemeClr val="tx1"/>
+          </a:fontRef>
+        </p:style>
+      </p:cxnSp>
+      <p:cxnSp>
+        <p:nvCxnSpPr>
+          <p:cNvPr id="247" name="Connector: Curved 246">
+            <a:extLst>
+              <a:ext uri="{FF2B5EF4-FFF2-40B4-BE49-F238E27FC236}">
+                <a16:creationId xmlns:a16="http://schemas.microsoft.com/office/drawing/2014/main" id="{8555EA29-7165-4061-8043-376D320DD97E}"/>
+              </a:ext>
+            </a:extLst>
+          </p:cNvPr>
+          <p:cNvCxnSpPr>
+            <a:cxnSpLocks/>
+            <a:stCxn id="15" idx="1"/>
+            <a:endCxn id="83" idx="3"/>
+          </p:cNvCxnSpPr>
+          <p:nvPr/>
+        </p:nvCxnSpPr>
+        <p:spPr>
+          <a:xfrm rot="10800000">
+            <a:off x="4328116" y="2038744"/>
+            <a:ext cx="2311148" cy="202998"/>
+          </a:xfrm>
+          <a:prstGeom prst="curvedConnector3">
+            <a:avLst>
+              <a:gd name="adj1" fmla="val 50000"/>
+            </a:avLst>
+          </a:prstGeom>
+          <a:ln>
+            <a:prstDash val="solid"/>
+            <a:tailEnd type="triangle"/>
+          </a:ln>
+        </p:spPr>
+        <p:style>
+          <a:lnRef idx="1">
+            <a:schemeClr val="accent1"/>
+          </a:lnRef>
+          <a:fillRef idx="0">
+            <a:schemeClr val="accent1"/>
+          </a:fillRef>
+          <a:effectRef idx="0">
+            <a:schemeClr val="accent1"/>
+          </a:effectRef>
+          <a:fontRef idx="minor">
+            <a:schemeClr val="tx1"/>
+          </a:fontRef>
+        </p:style>
+      </p:cxnSp>
+      <p:cxnSp>
+        <p:nvCxnSpPr>
+          <p:cNvPr id="331" name="Connector: Curved 330">
+            <a:extLst>
+              <a:ext uri="{FF2B5EF4-FFF2-40B4-BE49-F238E27FC236}">
+                <a16:creationId xmlns:a16="http://schemas.microsoft.com/office/drawing/2014/main" id="{5F00A177-63E2-4B2E-8E74-C93F15DD6666}"/>
+              </a:ext>
+            </a:extLst>
+          </p:cNvPr>
+          <p:cNvCxnSpPr>
+            <a:cxnSpLocks/>
+            <a:stCxn id="233" idx="2"/>
+            <a:endCxn id="99" idx="3"/>
+          </p:cNvCxnSpPr>
+          <p:nvPr/>
+        </p:nvCxnSpPr>
+        <p:spPr>
+          <a:xfrm rot="10800000">
+            <a:off x="4514249" y="1207459"/>
+            <a:ext cx="1557395" cy="2433216"/>
+          </a:xfrm>
+          <a:prstGeom prst="curvedConnector3">
+            <a:avLst>
+              <a:gd name="adj1" fmla="val 71920"/>
+            </a:avLst>
+          </a:prstGeom>
+          <a:ln>
+            <a:prstDash val="solid"/>
+            <a:tailEnd type="triangle"/>
+          </a:ln>
+        </p:spPr>
+        <p:style>
+          <a:lnRef idx="1">
+            <a:schemeClr val="accent1"/>
+          </a:lnRef>
+          <a:fillRef idx="0">
+            <a:schemeClr val="accent1"/>
+          </a:fillRef>
+          <a:effectRef idx="0">
+            <a:schemeClr val="accent1"/>
+          </a:effectRef>
+          <a:fontRef idx="minor">
+            <a:schemeClr val="tx1"/>
+          </a:fontRef>
+        </p:style>
+      </p:cxnSp>
+      <p:cxnSp>
+        <p:nvCxnSpPr>
+          <p:cNvPr id="348" name="Connector: Curved 347">
+            <a:extLst>
+              <a:ext uri="{FF2B5EF4-FFF2-40B4-BE49-F238E27FC236}">
+                <a16:creationId xmlns:a16="http://schemas.microsoft.com/office/drawing/2014/main" id="{0A1B64F1-94D0-4BD0-BE80-517184198C22}"/>
+              </a:ext>
+            </a:extLst>
+          </p:cNvPr>
+          <p:cNvCxnSpPr>
+            <a:cxnSpLocks/>
+            <a:stCxn id="123" idx="1"/>
+            <a:endCxn id="521" idx="6"/>
+          </p:cNvCxnSpPr>
+          <p:nvPr/>
+        </p:nvCxnSpPr>
+        <p:spPr>
+          <a:xfrm rot="10800000" flipV="1">
+            <a:off x="5802854" y="4337071"/>
+            <a:ext cx="836411" cy="124441"/>
+          </a:xfrm>
+          <a:prstGeom prst="curvedConnector3">
+            <a:avLst>
+              <a:gd name="adj1" fmla="val 50000"/>
+            </a:avLst>
+          </a:prstGeom>
+          <a:ln>
+            <a:prstDash val="solid"/>
+            <a:tailEnd type="triangle"/>
+          </a:ln>
+        </p:spPr>
+        <p:style>
+          <a:lnRef idx="1">
+            <a:schemeClr val="accent1"/>
+          </a:lnRef>
+          <a:fillRef idx="0">
+            <a:schemeClr val="accent1"/>
+          </a:fillRef>
+          <a:effectRef idx="0">
+            <a:schemeClr val="accent1"/>
+          </a:effectRef>
+          <a:fontRef idx="minor">
+            <a:schemeClr val="tx1"/>
+          </a:fontRef>
+        </p:style>
+      </p:cxnSp>
+      <p:cxnSp>
+        <p:nvCxnSpPr>
+          <p:cNvPr id="379" name="Connector: Curved 378">
+            <a:extLst>
+              <a:ext uri="{FF2B5EF4-FFF2-40B4-BE49-F238E27FC236}">
+                <a16:creationId xmlns:a16="http://schemas.microsoft.com/office/drawing/2014/main" id="{693311C8-E088-42C5-839B-CAAF3E998474}"/>
+              </a:ext>
+            </a:extLst>
+          </p:cNvPr>
+          <p:cNvCxnSpPr>
+            <a:cxnSpLocks/>
+            <a:stCxn id="14" idx="1"/>
+            <a:endCxn id="521" idx="6"/>
+          </p:cNvCxnSpPr>
+          <p:nvPr/>
+        </p:nvCxnSpPr>
+        <p:spPr>
+          <a:xfrm rot="10800000" flipV="1">
+            <a:off x="5802854" y="3756559"/>
+            <a:ext cx="832311" cy="704954"/>
+          </a:xfrm>
+          <a:prstGeom prst="curvedConnector3">
+            <a:avLst>
+              <a:gd name="adj1" fmla="val 50000"/>
+            </a:avLst>
+          </a:prstGeom>
+          <a:ln>
+            <a:prstDash val="solid"/>
+            <a:tailEnd type="triangle"/>
+          </a:ln>
+        </p:spPr>
+        <p:style>
+          <a:lnRef idx="1">
+            <a:schemeClr val="accent1"/>
+          </a:lnRef>
+          <a:fillRef idx="0">
+            <a:schemeClr val="accent1"/>
+          </a:fillRef>
+          <a:effectRef idx="0">
+            <a:schemeClr val="accent1"/>
+          </a:effectRef>
+          <a:fontRef idx="minor">
+            <a:schemeClr val="tx1"/>
+          </a:fontRef>
+        </p:style>
+      </p:cxnSp>
+      <p:sp>
+        <p:nvSpPr>
+          <p:cNvPr id="384" name="Rectangle 383">
+            <a:extLst>
+              <a:ext uri="{FF2B5EF4-FFF2-40B4-BE49-F238E27FC236}">
+                <a16:creationId xmlns:a16="http://schemas.microsoft.com/office/drawing/2014/main" id="{B6955408-A447-459D-B770-59E76E50FAB2}"/>
+              </a:ext>
+            </a:extLst>
+          </p:cNvPr>
+          <p:cNvSpPr/>
+          <p:nvPr/>
+        </p:nvSpPr>
+        <p:spPr>
+          <a:xfrm>
+            <a:off x="2952163" y="6076427"/>
+            <a:ext cx="1240231" cy="486032"/>
+          </a:xfrm>
+          <a:prstGeom prst="rect">
+            <a:avLst/>
+          </a:prstGeom>
+        </p:spPr>
+        <p:style>
+          <a:lnRef idx="2">
+            <a:schemeClr val="accent1">
+              <a:shade val="50000"/>
+            </a:schemeClr>
+          </a:lnRef>
+          <a:fillRef idx="1">
+            <a:schemeClr val="accent1"/>
+          </a:fillRef>
+          <a:effectRef idx="0">
+            <a:schemeClr val="accent1"/>
+          </a:effectRef>
+          <a:fontRef idx="minor">
+            <a:schemeClr val="lt1"/>
+          </a:fontRef>
+        </p:style>
+        <p:txBody>
+          <a:bodyPr rtlCol="0" anchor="ctr"/>
+          <a:lstStyle/>
+          <a:p>
+            <a:pPr algn="ctr"/>
+            <a:r>
+              <a:rPr lang="en-GB" sz="1200" dirty="0" err="1"/>
+              <a:t>RestfulObjects</a:t>
+            </a:r>
+            <a:br>
+              <a:rPr lang="en-GB" sz="1200" dirty="0"/>
+            </a:br>
+            <a:r>
+              <a:rPr lang="en-GB" sz="1200" dirty="0" err="1"/>
+              <a:t>Applib</a:t>
+            </a:r>
+            <a:endParaRPr lang="en-GB" sz="1200" dirty="0"/>
+          </a:p>
+        </p:txBody>
+      </p:sp>
+      <p:sp>
+        <p:nvSpPr>
+          <p:cNvPr id="385" name="Rectangle 384">
+            <a:extLst>
+              <a:ext uri="{FF2B5EF4-FFF2-40B4-BE49-F238E27FC236}">
+                <a16:creationId xmlns:a16="http://schemas.microsoft.com/office/drawing/2014/main" id="{C5EA3B9F-D374-4D8C-9231-FDFF0BC047FF}"/>
+              </a:ext>
+            </a:extLst>
+          </p:cNvPr>
+          <p:cNvSpPr/>
+          <p:nvPr/>
+        </p:nvSpPr>
+        <p:spPr>
+          <a:xfrm>
+            <a:off x="4910059" y="6114239"/>
+            <a:ext cx="1240231" cy="486032"/>
+          </a:xfrm>
+          <a:prstGeom prst="rect">
+            <a:avLst/>
+          </a:prstGeom>
+        </p:spPr>
+        <p:style>
+          <a:lnRef idx="2">
+            <a:schemeClr val="accent1">
+              <a:shade val="50000"/>
+            </a:schemeClr>
+          </a:lnRef>
+          <a:fillRef idx="1">
+            <a:schemeClr val="accent1"/>
+          </a:fillRef>
+          <a:effectRef idx="0">
+            <a:schemeClr val="accent1"/>
+          </a:effectRef>
+          <a:fontRef idx="minor">
+            <a:schemeClr val="lt1"/>
+          </a:fontRef>
+        </p:style>
+        <p:txBody>
+          <a:bodyPr rtlCol="0" anchor="ctr"/>
+          <a:lstStyle/>
+          <a:p>
+            <a:pPr algn="ctr"/>
+            <a:r>
+              <a:rPr lang="en-GB" sz="1200" dirty="0" err="1"/>
+              <a:t>RestfulObjects</a:t>
+            </a:r>
+            <a:br>
+              <a:rPr lang="en-GB" sz="1200" dirty="0"/>
+            </a:br>
+            <a:r>
+              <a:rPr lang="en-GB" sz="1200" dirty="0"/>
+              <a:t>Rendering</a:t>
+            </a:r>
+          </a:p>
+        </p:txBody>
+      </p:sp>
+      <p:cxnSp>
+        <p:nvCxnSpPr>
+          <p:cNvPr id="386" name="Connector: Curved 385">
+            <a:extLst>
+              <a:ext uri="{FF2B5EF4-FFF2-40B4-BE49-F238E27FC236}">
+                <a16:creationId xmlns:a16="http://schemas.microsoft.com/office/drawing/2014/main" id="{30EB5CC5-701D-4574-8373-4107AED42121}"/>
+              </a:ext>
+            </a:extLst>
+          </p:cNvPr>
+          <p:cNvCxnSpPr>
+            <a:cxnSpLocks/>
+            <a:stCxn id="18" idx="1"/>
+            <a:endCxn id="385" idx="3"/>
+          </p:cNvCxnSpPr>
+          <p:nvPr/>
+        </p:nvCxnSpPr>
+        <p:spPr>
+          <a:xfrm rot="10800000" flipV="1">
+            <a:off x="6150290" y="5896089"/>
+            <a:ext cx="488974" cy="461165"/>
+          </a:xfrm>
+          <a:prstGeom prst="curvedConnector3">
+            <a:avLst>
+              <a:gd name="adj1" fmla="val 50000"/>
+            </a:avLst>
+          </a:prstGeom>
+          <a:ln>
+            <a:tailEnd type="triangle"/>
+          </a:ln>
+        </p:spPr>
+        <p:style>
+          <a:lnRef idx="1">
+            <a:schemeClr val="accent1"/>
+          </a:lnRef>
+          <a:fillRef idx="0">
+            <a:schemeClr val="accent1"/>
+          </a:fillRef>
+          <a:effectRef idx="0">
+            <a:schemeClr val="accent1"/>
+          </a:effectRef>
+          <a:fontRef idx="minor">
+            <a:schemeClr val="tx1"/>
+          </a:fontRef>
+        </p:style>
+      </p:cxnSp>
+      <p:cxnSp>
+        <p:nvCxnSpPr>
+          <p:cNvPr id="390" name="Connector: Curved 389">
+            <a:extLst>
+              <a:ext uri="{FF2B5EF4-FFF2-40B4-BE49-F238E27FC236}">
+                <a16:creationId xmlns:a16="http://schemas.microsoft.com/office/drawing/2014/main" id="{7AB8B917-957D-4715-B55D-C258416DA569}"/>
+              </a:ext>
+            </a:extLst>
+          </p:cNvPr>
+          <p:cNvCxnSpPr>
+            <a:cxnSpLocks/>
+            <a:stCxn id="385" idx="1"/>
+            <a:endCxn id="384" idx="3"/>
+          </p:cNvCxnSpPr>
+          <p:nvPr/>
+        </p:nvCxnSpPr>
+        <p:spPr>
+          <a:xfrm rot="10800000">
+            <a:off x="4192395" y="6319443"/>
+            <a:ext cx="717665" cy="37812"/>
+          </a:xfrm>
+          <a:prstGeom prst="curvedConnector3">
+            <a:avLst>
+              <a:gd name="adj1" fmla="val 50000"/>
+            </a:avLst>
+          </a:prstGeom>
+          <a:ln>
+            <a:tailEnd type="triangle"/>
+          </a:ln>
+        </p:spPr>
+        <p:style>
+          <a:lnRef idx="1">
+            <a:schemeClr val="accent1"/>
+          </a:lnRef>
+          <a:fillRef idx="0">
+            <a:schemeClr val="accent1"/>
+          </a:fillRef>
+          <a:effectRef idx="0">
+            <a:schemeClr val="accent1"/>
+          </a:effectRef>
+          <a:fontRef idx="minor">
+            <a:schemeClr val="tx1"/>
+          </a:fontRef>
+        </p:style>
+      </p:cxnSp>
+      <p:cxnSp>
+        <p:nvCxnSpPr>
+          <p:cNvPr id="391" name="Connector: Curved 390">
+            <a:extLst>
+              <a:ext uri="{FF2B5EF4-FFF2-40B4-BE49-F238E27FC236}">
+                <a16:creationId xmlns:a16="http://schemas.microsoft.com/office/drawing/2014/main" id="{5FFE4DAD-3872-4976-8AB8-B86B3C86144D}"/>
+              </a:ext>
+            </a:extLst>
+          </p:cNvPr>
+          <p:cNvCxnSpPr>
+            <a:cxnSpLocks/>
+            <a:stCxn id="385" idx="1"/>
+            <a:endCxn id="81" idx="3"/>
+          </p:cNvCxnSpPr>
+          <p:nvPr/>
+        </p:nvCxnSpPr>
+        <p:spPr>
+          <a:xfrm rot="10800000">
+            <a:off x="3708001" y="2874807"/>
+            <a:ext cx="1202058" cy="3482449"/>
+          </a:xfrm>
+          <a:prstGeom prst="curvedConnector3">
+            <a:avLst>
+              <a:gd name="adj1" fmla="val 77723"/>
+            </a:avLst>
+          </a:prstGeom>
+          <a:ln>
+            <a:tailEnd type="triangle"/>
+          </a:ln>
+        </p:spPr>
+        <p:style>
+          <a:lnRef idx="1">
+            <a:schemeClr val="accent1"/>
+          </a:lnRef>
+          <a:fillRef idx="0">
+            <a:schemeClr val="accent1"/>
+          </a:fillRef>
+          <a:effectRef idx="0">
+            <a:schemeClr val="accent1"/>
+          </a:effectRef>
+          <a:fontRef idx="minor">
+            <a:schemeClr val="tx1"/>
+          </a:fontRef>
+        </p:style>
+      </p:cxnSp>
+      <p:sp>
+        <p:nvSpPr>
+          <p:cNvPr id="393" name="Rectangle 392">
+            <a:extLst>
+              <a:ext uri="{FF2B5EF4-FFF2-40B4-BE49-F238E27FC236}">
+                <a16:creationId xmlns:a16="http://schemas.microsoft.com/office/drawing/2014/main" id="{AEB167D4-E8EA-402E-9ABC-2FAA715DAFE6}"/>
+              </a:ext>
+            </a:extLst>
+          </p:cNvPr>
+          <p:cNvSpPr/>
+          <p:nvPr/>
+        </p:nvSpPr>
+        <p:spPr>
+          <a:xfrm>
+            <a:off x="8314694" y="6260994"/>
+            <a:ext cx="1240231" cy="486032"/>
+          </a:xfrm>
+          <a:prstGeom prst="rect">
+            <a:avLst/>
+          </a:prstGeom>
+          <a:solidFill>
+            <a:srgbClr val="CCCCFF"/>
+          </a:solidFill>
+        </p:spPr>
+        <p:style>
+          <a:lnRef idx="2">
+            <a:schemeClr val="accent1">
+              <a:shade val="50000"/>
+            </a:schemeClr>
+          </a:lnRef>
+          <a:fillRef idx="1">
+            <a:schemeClr val="accent1"/>
+          </a:fillRef>
+          <a:effectRef idx="0">
+            <a:schemeClr val="accent1"/>
+          </a:effectRef>
+          <a:fontRef idx="minor">
+            <a:schemeClr val="lt1"/>
+          </a:fontRef>
+        </p:style>
+        <p:txBody>
+          <a:bodyPr rtlCol="0" anchor="ctr"/>
+          <a:lstStyle/>
+          <a:p>
+            <a:pPr algn="ctr"/>
+            <a:r>
+              <a:rPr lang="en-GB" sz="1200" dirty="0" err="1"/>
+              <a:t>RestfulObjects</a:t>
+            </a:r>
+            <a:br>
+              <a:rPr lang="en-GB" sz="1200" dirty="0"/>
+            </a:br>
+            <a:r>
+              <a:rPr lang="en-GB" sz="1200" dirty="0"/>
+              <a:t>JaxrsResteasy4</a:t>
+            </a:r>
+          </a:p>
+        </p:txBody>
+      </p:sp>
+      <p:cxnSp>
+        <p:nvCxnSpPr>
+          <p:cNvPr id="394" name="Connector: Curved 393">
+            <a:extLst>
+              <a:ext uri="{FF2B5EF4-FFF2-40B4-BE49-F238E27FC236}">
+                <a16:creationId xmlns:a16="http://schemas.microsoft.com/office/drawing/2014/main" id="{1BFB8B8B-A096-44B4-AE4B-E6D918BEB432}"/>
+              </a:ext>
+            </a:extLst>
+          </p:cNvPr>
+          <p:cNvCxnSpPr>
+            <a:cxnSpLocks/>
+            <a:stCxn id="393" idx="1"/>
+            <a:endCxn id="18" idx="3"/>
+          </p:cNvCxnSpPr>
+          <p:nvPr/>
+        </p:nvCxnSpPr>
+        <p:spPr>
+          <a:xfrm rot="10800000">
+            <a:off x="7879496" y="5896090"/>
+            <a:ext cx="435199" cy="607920"/>
+          </a:xfrm>
+          <a:prstGeom prst="curvedConnector3">
+            <a:avLst>
+              <a:gd name="adj1" fmla="val 50000"/>
+            </a:avLst>
+          </a:prstGeom>
+          <a:ln>
+            <a:tailEnd type="triangle"/>
+          </a:ln>
+        </p:spPr>
+        <p:style>
+          <a:lnRef idx="1">
+            <a:schemeClr val="accent1"/>
+          </a:lnRef>
+          <a:fillRef idx="0">
+            <a:schemeClr val="accent1"/>
+          </a:fillRef>
+          <a:effectRef idx="0">
+            <a:schemeClr val="accent1"/>
+          </a:effectRef>
+          <a:fontRef idx="minor">
+            <a:schemeClr val="tx1"/>
+          </a:fontRef>
+        </p:style>
+      </p:cxnSp>
+      <p:cxnSp>
+        <p:nvCxnSpPr>
+          <p:cNvPr id="505" name="Connector: Curved 504">
+            <a:extLst>
+              <a:ext uri="{FF2B5EF4-FFF2-40B4-BE49-F238E27FC236}">
+                <a16:creationId xmlns:a16="http://schemas.microsoft.com/office/drawing/2014/main" id="{8F2A31F5-3BFB-46BE-BFB4-556309DB43D0}"/>
+              </a:ext>
+            </a:extLst>
+          </p:cNvPr>
+          <p:cNvCxnSpPr>
+            <a:cxnSpLocks/>
+            <a:stCxn id="148" idx="1"/>
+            <a:endCxn id="75" idx="3"/>
+          </p:cNvCxnSpPr>
+          <p:nvPr/>
+        </p:nvCxnSpPr>
+        <p:spPr>
+          <a:xfrm rot="10800000" flipV="1">
+            <a:off x="1318761" y="426038"/>
+            <a:ext cx="1638806" cy="2007638"/>
+          </a:xfrm>
+          <a:prstGeom prst="curvedConnector3">
+            <a:avLst>
+              <a:gd name="adj1" fmla="val 50000"/>
+            </a:avLst>
+          </a:prstGeom>
+          <a:ln>
+            <a:prstDash val="solid"/>
+            <a:tailEnd type="triangle"/>
+          </a:ln>
+        </p:spPr>
+        <p:style>
+          <a:lnRef idx="1">
+            <a:schemeClr val="accent1"/>
+          </a:lnRef>
+          <a:fillRef idx="0">
+            <a:schemeClr val="accent1"/>
+          </a:fillRef>
+          <a:effectRef idx="0">
+            <a:schemeClr val="accent1"/>
+          </a:effectRef>
+          <a:fontRef idx="minor">
+            <a:schemeClr val="tx1"/>
+          </a:fontRef>
+        </p:style>
+      </p:cxnSp>
+      <p:sp>
+        <p:nvSpPr>
+          <p:cNvPr id="521" name="Oval 520">
+            <a:extLst>
+              <a:ext uri="{FF2B5EF4-FFF2-40B4-BE49-F238E27FC236}">
+                <a16:creationId xmlns:a16="http://schemas.microsoft.com/office/drawing/2014/main" id="{7D1F11B8-B9C2-4F6D-9C46-3AB1762CEFC5}"/>
+              </a:ext>
+            </a:extLst>
+          </p:cNvPr>
+          <p:cNvSpPr/>
+          <p:nvPr/>
+        </p:nvSpPr>
+        <p:spPr>
+          <a:xfrm>
+            <a:off x="5659739" y="4366858"/>
+            <a:ext cx="143114" cy="189310"/>
+          </a:xfrm>
+          <a:prstGeom prst="ellipse">
+            <a:avLst/>
+          </a:prstGeom>
+        </p:spPr>
+        <p:style>
+          <a:lnRef idx="2">
+            <a:schemeClr val="accent6"/>
+          </a:lnRef>
+          <a:fillRef idx="1">
+            <a:schemeClr val="lt1"/>
+          </a:fillRef>
+          <a:effectRef idx="0">
+            <a:schemeClr val="accent6"/>
+          </a:effectRef>
+          <a:fontRef idx="minor">
+            <a:schemeClr val="dk1"/>
+          </a:fontRef>
+        </p:style>
+        <p:txBody>
+          <a:bodyPr rtlCol="0" anchor="ctr"/>
+          <a:lstStyle/>
+          <a:p>
+            <a:pPr algn="ctr"/>
+            <a:endParaRPr lang="en-GB"/>
+          </a:p>
+        </p:txBody>
+      </p:sp>
+      <p:cxnSp>
+        <p:nvCxnSpPr>
+          <p:cNvPr id="522" name="Connector: Curved 521">
+            <a:extLst>
+              <a:ext uri="{FF2B5EF4-FFF2-40B4-BE49-F238E27FC236}">
+                <a16:creationId xmlns:a16="http://schemas.microsoft.com/office/drawing/2014/main" id="{25DABAE5-C463-4610-A46E-D5DD6AE7270E}"/>
+              </a:ext>
+            </a:extLst>
+          </p:cNvPr>
+          <p:cNvCxnSpPr>
+            <a:cxnSpLocks/>
+            <a:stCxn id="521" idx="2"/>
+            <a:endCxn id="20" idx="3"/>
+          </p:cNvCxnSpPr>
+          <p:nvPr/>
+        </p:nvCxnSpPr>
+        <p:spPr>
+          <a:xfrm rot="10800000">
+            <a:off x="5484091" y="4195961"/>
+            <a:ext cx="175648" cy="265553"/>
+          </a:xfrm>
+          <a:prstGeom prst="curvedConnector3">
+            <a:avLst>
+              <a:gd name="adj1" fmla="val 50000"/>
+            </a:avLst>
+          </a:prstGeom>
+          <a:ln>
+            <a:prstDash val="solid"/>
+            <a:tailEnd type="triangle"/>
+          </a:ln>
+        </p:spPr>
+        <p:style>
+          <a:lnRef idx="1">
+            <a:schemeClr val="accent1"/>
+          </a:lnRef>
+          <a:fillRef idx="0">
+            <a:schemeClr val="accent1"/>
+          </a:fillRef>
+          <a:effectRef idx="0">
+            <a:schemeClr val="accent1"/>
+          </a:effectRef>
+          <a:fontRef idx="minor">
+            <a:schemeClr val="tx1"/>
+          </a:fontRef>
+        </p:style>
+      </p:cxnSp>
+      <p:sp>
+        <p:nvSpPr>
+          <p:cNvPr id="550" name="Rectangle 549">
+            <a:extLst>
+              <a:ext uri="{FF2B5EF4-FFF2-40B4-BE49-F238E27FC236}">
+                <a16:creationId xmlns:a16="http://schemas.microsoft.com/office/drawing/2014/main" id="{1581F3F0-4C9E-4C78-B17D-2E2AAEAB87A5}"/>
+              </a:ext>
+            </a:extLst>
+          </p:cNvPr>
+          <p:cNvSpPr/>
+          <p:nvPr/>
+        </p:nvSpPr>
+        <p:spPr>
+          <a:xfrm>
+            <a:off x="4514248" y="5442354"/>
+            <a:ext cx="1240231" cy="486032"/>
+          </a:xfrm>
+          <a:prstGeom prst="rect">
+            <a:avLst/>
+          </a:prstGeom>
+        </p:spPr>
+        <p:style>
+          <a:lnRef idx="2">
+            <a:schemeClr val="accent1">
+              <a:shade val="50000"/>
+            </a:schemeClr>
+          </a:lnRef>
+          <a:fillRef idx="1">
+            <a:schemeClr val="accent1"/>
+          </a:fillRef>
+          <a:effectRef idx="0">
+            <a:schemeClr val="accent1"/>
+          </a:effectRef>
+          <a:fontRef idx="minor">
+            <a:schemeClr val="lt1"/>
+          </a:fontRef>
+        </p:style>
+        <p:txBody>
+          <a:bodyPr rtlCol="0" anchor="ctr"/>
+          <a:lstStyle/>
+          <a:p>
+            <a:pPr algn="ctr"/>
+            <a:r>
+              <a:rPr lang="en-GB" sz="1200" dirty="0"/>
+              <a:t>Wicket</a:t>
+            </a:r>
+            <a:br>
+              <a:rPr lang="en-GB" sz="1200" dirty="0"/>
+            </a:br>
+            <a:r>
+              <a:rPr lang="en-GB" sz="1200" dirty="0"/>
+              <a:t>Ui</a:t>
+            </a:r>
+          </a:p>
+        </p:txBody>
+      </p:sp>
+      <p:sp>
+        <p:nvSpPr>
+          <p:cNvPr id="551" name="Rectangle 550">
+            <a:extLst>
+              <a:ext uri="{FF2B5EF4-FFF2-40B4-BE49-F238E27FC236}">
+                <a16:creationId xmlns:a16="http://schemas.microsoft.com/office/drawing/2014/main" id="{099749A5-083C-4771-835B-AB868F588926}"/>
+              </a:ext>
+            </a:extLst>
+          </p:cNvPr>
+          <p:cNvSpPr/>
+          <p:nvPr/>
+        </p:nvSpPr>
+        <p:spPr>
+          <a:xfrm>
+            <a:off x="4514248" y="4797386"/>
+            <a:ext cx="1240231" cy="486032"/>
+          </a:xfrm>
+          <a:prstGeom prst="rect">
+            <a:avLst/>
+          </a:prstGeom>
+        </p:spPr>
+        <p:style>
+          <a:lnRef idx="2">
+            <a:schemeClr val="accent1">
+              <a:shade val="50000"/>
+            </a:schemeClr>
+          </a:lnRef>
+          <a:fillRef idx="1">
+            <a:schemeClr val="accent1"/>
+          </a:fillRef>
+          <a:effectRef idx="0">
+            <a:schemeClr val="accent1"/>
+          </a:effectRef>
+          <a:fontRef idx="minor">
+            <a:schemeClr val="lt1"/>
+          </a:fontRef>
+        </p:style>
+        <p:txBody>
+          <a:bodyPr rtlCol="0" anchor="ctr"/>
+          <a:lstStyle/>
+          <a:p>
+            <a:pPr algn="ctr"/>
+            <a:r>
+              <a:rPr lang="en-GB" sz="1200" dirty="0"/>
+              <a:t>Wicket</a:t>
+            </a:r>
+            <a:br>
+              <a:rPr lang="en-GB" sz="1200" dirty="0"/>
+            </a:br>
+            <a:r>
+              <a:rPr lang="en-GB" sz="1200" dirty="0"/>
+              <a:t>Model</a:t>
+            </a:r>
+          </a:p>
+        </p:txBody>
+      </p:sp>
+      <p:cxnSp>
+        <p:nvCxnSpPr>
+          <p:cNvPr id="552" name="Connector: Curved 551">
+            <a:extLst>
+              <a:ext uri="{FF2B5EF4-FFF2-40B4-BE49-F238E27FC236}">
+                <a16:creationId xmlns:a16="http://schemas.microsoft.com/office/drawing/2014/main" id="{7B7AC35E-02B7-4EB6-804A-2F1E76B1DB52}"/>
+              </a:ext>
+            </a:extLst>
+          </p:cNvPr>
+          <p:cNvCxnSpPr>
+            <a:cxnSpLocks/>
+            <a:stCxn id="550" idx="1"/>
+            <a:endCxn id="551" idx="3"/>
+          </p:cNvCxnSpPr>
+          <p:nvPr/>
+        </p:nvCxnSpPr>
+        <p:spPr>
+          <a:xfrm rot="10800000" flipH="1">
+            <a:off x="4514247" y="5040402"/>
+            <a:ext cx="1240231" cy="644968"/>
+          </a:xfrm>
+          <a:prstGeom prst="curvedConnector5">
+            <a:avLst>
+              <a:gd name="adj1" fmla="val -18432"/>
+              <a:gd name="adj2" fmla="val 50000"/>
+              <a:gd name="adj3" fmla="val 118432"/>
+            </a:avLst>
+          </a:prstGeom>
+          <a:ln>
+            <a:prstDash val="solid"/>
+            <a:tailEnd type="triangle"/>
+          </a:ln>
+        </p:spPr>
+        <p:style>
+          <a:lnRef idx="1">
+            <a:schemeClr val="accent1"/>
+          </a:lnRef>
+          <a:fillRef idx="0">
+            <a:schemeClr val="accent1"/>
+          </a:fillRef>
+          <a:effectRef idx="0">
+            <a:schemeClr val="accent1"/>
+          </a:effectRef>
+          <a:fontRef idx="minor">
+            <a:schemeClr val="tx1"/>
+          </a:fontRef>
+        </p:style>
+      </p:cxnSp>
+      <p:cxnSp>
+        <p:nvCxnSpPr>
+          <p:cNvPr id="560" name="Connector: Curved 559">
+            <a:extLst>
+              <a:ext uri="{FF2B5EF4-FFF2-40B4-BE49-F238E27FC236}">
+                <a16:creationId xmlns:a16="http://schemas.microsoft.com/office/drawing/2014/main" id="{39CE9CC6-4BF8-4DF9-AEC5-2AD4A0DE4274}"/>
+              </a:ext>
+            </a:extLst>
+          </p:cNvPr>
+          <p:cNvCxnSpPr>
+            <a:cxnSpLocks/>
+            <a:stCxn id="17" idx="1"/>
+            <a:endCxn id="550" idx="3"/>
+          </p:cNvCxnSpPr>
+          <p:nvPr/>
+        </p:nvCxnSpPr>
+        <p:spPr>
+          <a:xfrm rot="10800000" flipV="1">
+            <a:off x="5754480" y="5296590"/>
+            <a:ext cx="884785" cy="388780"/>
+          </a:xfrm>
+          <a:prstGeom prst="curvedConnector3">
+            <a:avLst>
+              <a:gd name="adj1" fmla="val 50000"/>
+            </a:avLst>
+          </a:prstGeom>
+          <a:ln>
+            <a:prstDash val="solid"/>
+            <a:tailEnd type="triangle"/>
+          </a:ln>
+        </p:spPr>
+        <p:style>
+          <a:lnRef idx="1">
+            <a:schemeClr val="accent1"/>
+          </a:lnRef>
+          <a:fillRef idx="0">
+            <a:schemeClr val="accent1"/>
+          </a:fillRef>
+          <a:effectRef idx="0">
+            <a:schemeClr val="accent1"/>
+          </a:effectRef>
+          <a:fontRef idx="minor">
+            <a:schemeClr val="tx1"/>
+          </a:fontRef>
+        </p:style>
+      </p:cxnSp>
+      <p:cxnSp>
+        <p:nvCxnSpPr>
+          <p:cNvPr id="571" name="Connector: Curved 570">
+            <a:extLst>
+              <a:ext uri="{FF2B5EF4-FFF2-40B4-BE49-F238E27FC236}">
+                <a16:creationId xmlns:a16="http://schemas.microsoft.com/office/drawing/2014/main" id="{B8AEA742-547C-4667-A497-D7376F01779A}"/>
+              </a:ext>
+            </a:extLst>
+          </p:cNvPr>
+          <p:cNvCxnSpPr>
+            <a:cxnSpLocks/>
+            <a:stCxn id="551" idx="1"/>
+            <a:endCxn id="521" idx="6"/>
+          </p:cNvCxnSpPr>
+          <p:nvPr/>
+        </p:nvCxnSpPr>
+        <p:spPr>
+          <a:xfrm rot="10800000" flipH="1">
+            <a:off x="4514247" y="4461514"/>
+            <a:ext cx="1288605" cy="578889"/>
+          </a:xfrm>
+          <a:prstGeom prst="curvedConnector5">
+            <a:avLst>
+              <a:gd name="adj1" fmla="val -17740"/>
+              <a:gd name="adj2" fmla="val 62814"/>
+              <a:gd name="adj3" fmla="val 106702"/>
+            </a:avLst>
+          </a:prstGeom>
+          <a:ln>
+            <a:prstDash val="solid"/>
+            <a:tailEnd type="triangle"/>
+          </a:ln>
+        </p:spPr>
+        <p:style>
+          <a:lnRef idx="1">
+            <a:schemeClr val="accent1"/>
+          </a:lnRef>
+          <a:fillRef idx="0">
+            <a:schemeClr val="accent1"/>
+          </a:fillRef>
+          <a:effectRef idx="0">
+            <a:schemeClr val="accent1"/>
+          </a:effectRef>
+          <a:fontRef idx="minor">
+            <a:schemeClr val="tx1"/>
+          </a:fontRef>
+        </p:style>
+      </p:cxnSp>
+      <p:cxnSp>
+        <p:nvCxnSpPr>
+          <p:cNvPr id="577" name="Connector: Curved 576">
+            <a:extLst>
+              <a:ext uri="{FF2B5EF4-FFF2-40B4-BE49-F238E27FC236}">
+                <a16:creationId xmlns:a16="http://schemas.microsoft.com/office/drawing/2014/main" id="{EAC3244F-4ED5-40E4-9D3C-5AD1F2A9784D}"/>
+              </a:ext>
+            </a:extLst>
+          </p:cNvPr>
+          <p:cNvCxnSpPr>
+            <a:cxnSpLocks/>
+            <a:stCxn id="20" idx="1"/>
+            <a:endCxn id="83" idx="3"/>
+          </p:cNvCxnSpPr>
+          <p:nvPr/>
+        </p:nvCxnSpPr>
+        <p:spPr>
+          <a:xfrm rot="10800000" flipH="1">
+            <a:off x="4243860" y="2038744"/>
+            <a:ext cx="84256" cy="2157216"/>
+          </a:xfrm>
+          <a:prstGeom prst="curvedConnector5">
+            <a:avLst>
+              <a:gd name="adj1" fmla="val -271316"/>
+              <a:gd name="adj2" fmla="val 50000"/>
+              <a:gd name="adj3" fmla="val 371316"/>
+            </a:avLst>
+          </a:prstGeom>
+          <a:ln>
+            <a:prstDash val="solid"/>
+            <a:tailEnd type="triangle"/>
+          </a:ln>
+        </p:spPr>
+        <p:style>
+          <a:lnRef idx="1">
+            <a:schemeClr val="accent1"/>
+          </a:lnRef>
+          <a:fillRef idx="0">
+            <a:schemeClr val="accent1"/>
+          </a:fillRef>
+          <a:effectRef idx="0">
+            <a:schemeClr val="accent1"/>
+          </a:effectRef>
+          <a:fontRef idx="minor">
+            <a:schemeClr val="tx1"/>
+          </a:fontRef>
+        </p:style>
+      </p:cxnSp>
     </p:spTree>
     <p:extLst>
       <p:ext uri="{BB962C8B-B14F-4D97-AF65-F5344CB8AC3E}">

</xml_diff>

<commit_message>
ISIS-2216: adds @Named(...) and converts @DomainService(nature=DOMAIN) to @Service
</commit_message>
<xml_diff>
--- a/antora/components/core/modules/archdesign/attachments/isis-configurations-and-modules.pptx
+++ b/antora/components/core/modules/archdesign/attachments/isis-configurations-and-modules.pptx
@@ -6,6 +6,7 @@
   </p:sldMasterIdLst>
   <p:sldIdLst>
     <p:sldId id="256" r:id="rId2"/>
+    <p:sldId id="257" r:id="rId3"/>
   </p:sldIdLst>
   <p:sldSz cx="12192000" cy="6858000"/>
   <p:notesSz cx="6858000" cy="9144000"/>
@@ -261,7 +262,7 @@
           <a:p>
             <a:fld id="{3159BD86-569B-442C-ABE1-0B002BE59BAD}" type="datetimeFigureOut">
               <a:rPr lang="en-GB" smtClean="0"/>
-              <a:t>05/12/2019</a:t>
+              <a:t>06/12/2019</a:t>
             </a:fld>
             <a:endParaRPr lang="en-GB"/>
           </a:p>
@@ -461,7 +462,7 @@
           <a:p>
             <a:fld id="{3159BD86-569B-442C-ABE1-0B002BE59BAD}" type="datetimeFigureOut">
               <a:rPr lang="en-GB" smtClean="0"/>
-              <a:t>05/12/2019</a:t>
+              <a:t>06/12/2019</a:t>
             </a:fld>
             <a:endParaRPr lang="en-GB"/>
           </a:p>
@@ -671,7 +672,7 @@
           <a:p>
             <a:fld id="{3159BD86-569B-442C-ABE1-0B002BE59BAD}" type="datetimeFigureOut">
               <a:rPr lang="en-GB" smtClean="0"/>
-              <a:t>05/12/2019</a:t>
+              <a:t>06/12/2019</a:t>
             </a:fld>
             <a:endParaRPr lang="en-GB"/>
           </a:p>
@@ -871,7 +872,7 @@
           <a:p>
             <a:fld id="{3159BD86-569B-442C-ABE1-0B002BE59BAD}" type="datetimeFigureOut">
               <a:rPr lang="en-GB" smtClean="0"/>
-              <a:t>05/12/2019</a:t>
+              <a:t>06/12/2019</a:t>
             </a:fld>
             <a:endParaRPr lang="en-GB"/>
           </a:p>
@@ -1147,7 +1148,7 @@
           <a:p>
             <a:fld id="{3159BD86-569B-442C-ABE1-0B002BE59BAD}" type="datetimeFigureOut">
               <a:rPr lang="en-GB" smtClean="0"/>
-              <a:t>05/12/2019</a:t>
+              <a:t>06/12/2019</a:t>
             </a:fld>
             <a:endParaRPr lang="en-GB"/>
           </a:p>
@@ -1415,7 +1416,7 @@
           <a:p>
             <a:fld id="{3159BD86-569B-442C-ABE1-0B002BE59BAD}" type="datetimeFigureOut">
               <a:rPr lang="en-GB" smtClean="0"/>
-              <a:t>05/12/2019</a:t>
+              <a:t>06/12/2019</a:t>
             </a:fld>
             <a:endParaRPr lang="en-GB"/>
           </a:p>
@@ -1830,7 +1831,7 @@
           <a:p>
             <a:fld id="{3159BD86-569B-442C-ABE1-0B002BE59BAD}" type="datetimeFigureOut">
               <a:rPr lang="en-GB" smtClean="0"/>
-              <a:t>05/12/2019</a:t>
+              <a:t>06/12/2019</a:t>
             </a:fld>
             <a:endParaRPr lang="en-GB"/>
           </a:p>
@@ -1972,7 +1973,7 @@
           <a:p>
             <a:fld id="{3159BD86-569B-442C-ABE1-0B002BE59BAD}" type="datetimeFigureOut">
               <a:rPr lang="en-GB" smtClean="0"/>
-              <a:t>05/12/2019</a:t>
+              <a:t>06/12/2019</a:t>
             </a:fld>
             <a:endParaRPr lang="en-GB"/>
           </a:p>
@@ -2085,7 +2086,7 @@
           <a:p>
             <a:fld id="{3159BD86-569B-442C-ABE1-0B002BE59BAD}" type="datetimeFigureOut">
               <a:rPr lang="en-GB" smtClean="0"/>
-              <a:t>05/12/2019</a:t>
+              <a:t>06/12/2019</a:t>
             </a:fld>
             <a:endParaRPr lang="en-GB"/>
           </a:p>
@@ -2398,7 +2399,7 @@
           <a:p>
             <a:fld id="{3159BD86-569B-442C-ABE1-0B002BE59BAD}" type="datetimeFigureOut">
               <a:rPr lang="en-GB" smtClean="0"/>
-              <a:t>05/12/2019</a:t>
+              <a:t>06/12/2019</a:t>
             </a:fld>
             <a:endParaRPr lang="en-GB"/>
           </a:p>
@@ -2687,7 +2688,7 @@
           <a:p>
             <a:fld id="{3159BD86-569B-442C-ABE1-0B002BE59BAD}" type="datetimeFigureOut">
               <a:rPr lang="en-GB" smtClean="0"/>
-              <a:t>05/12/2019</a:t>
+              <a:t>06/12/2019</a:t>
             </a:fld>
             <a:endParaRPr lang="en-GB"/>
           </a:p>
@@ -2930,7 +2931,7 @@
           <a:p>
             <a:fld id="{3159BD86-569B-442C-ABE1-0B002BE59BAD}" type="datetimeFigureOut">
               <a:rPr lang="en-GB" smtClean="0"/>
-              <a:t>05/12/2019</a:t>
+              <a:t>06/12/2019</a:t>
             </a:fld>
             <a:endParaRPr lang="en-GB"/>
           </a:p>
@@ -3349,6 +3350,79 @@
       </p:grpSpPr>
       <p:sp>
         <p:nvSpPr>
+          <p:cNvPr id="133" name="Rectangle 132">
+            <a:extLst>
+              <a:ext uri="{FF2B5EF4-FFF2-40B4-BE49-F238E27FC236}">
+                <a16:creationId xmlns:a16="http://schemas.microsoft.com/office/drawing/2014/main" id="{CFB28331-C485-4A67-BEB6-61F55D45790D}"/>
+              </a:ext>
+            </a:extLst>
+          </p:cNvPr>
+          <p:cNvSpPr/>
+          <p:nvPr/>
+        </p:nvSpPr>
+        <p:spPr>
+          <a:xfrm>
+            <a:off x="10531303" y="4817152"/>
+            <a:ext cx="1660697" cy="1981303"/>
+          </a:xfrm>
+          <a:prstGeom prst="rect">
+            <a:avLst/>
+          </a:prstGeom>
+          <a:solidFill>
+            <a:schemeClr val="bg1">
+              <a:lumMod val="95000"/>
+            </a:schemeClr>
+          </a:solidFill>
+          <a:ln>
+            <a:solidFill>
+              <a:schemeClr val="bg1">
+                <a:lumMod val="75000"/>
+              </a:schemeClr>
+            </a:solidFill>
+          </a:ln>
+        </p:spPr>
+        <p:style>
+          <a:lnRef idx="2">
+            <a:schemeClr val="accent3">
+              <a:shade val="50000"/>
+            </a:schemeClr>
+          </a:lnRef>
+          <a:fillRef idx="1">
+            <a:schemeClr val="accent3"/>
+          </a:fillRef>
+          <a:effectRef idx="0">
+            <a:schemeClr val="accent3"/>
+          </a:effectRef>
+          <a:fontRef idx="minor">
+            <a:schemeClr val="lt1"/>
+          </a:fontRef>
+        </p:style>
+        <p:txBody>
+          <a:bodyPr rtlCol="0" anchor="t" anchorCtr="0"/>
+          <a:lstStyle/>
+          <a:p>
+            <a:r>
+              <a:rPr lang="en-GB" sz="1200" dirty="0">
+                <a:ln w="0"/>
+                <a:solidFill>
+                  <a:schemeClr val="tx1"/>
+                </a:solidFill>
+                <a:effectLst>
+                  <a:outerShdw blurRad="38100" dist="19050" dir="2700000" algn="tl" rotWithShape="0">
+                    <a:schemeClr val="dk1">
+                      <a:alpha val="40000"/>
+                    </a:schemeClr>
+                  </a:outerShdw>
+                </a:effectLst>
+              </a:rPr>
+              <a:t>Key</a:t>
+            </a:r>
+            <a:endParaRPr lang="en-GB" sz="1200" dirty="0"/>
+          </a:p>
+        </p:txBody>
+      </p:sp>
+      <p:sp>
+        <p:nvSpPr>
           <p:cNvPr id="4" name="Rectangle 3">
             <a:extLst>
               <a:ext uri="{FF2B5EF4-FFF2-40B4-BE49-F238E27FC236}">
@@ -3361,7 +3435,7 @@
         </p:nvSpPr>
         <p:spPr>
           <a:xfrm>
-            <a:off x="10162268" y="4797386"/>
+            <a:off x="5144595" y="5083018"/>
             <a:ext cx="1785587" cy="486032"/>
           </a:xfrm>
           <a:prstGeom prst="rect">
@@ -3422,7 +3496,7 @@
         </p:nvSpPr>
         <p:spPr>
           <a:xfrm>
-            <a:off x="9012891" y="3880826"/>
+            <a:off x="5261819" y="3974726"/>
             <a:ext cx="1538205" cy="486032"/>
           </a:xfrm>
           <a:prstGeom prst="rect">
@@ -3469,18 +3543,20 @@
           </p:cNvPr>
           <p:cNvCxnSpPr>
             <a:cxnSpLocks/>
-            <a:stCxn id="4" idx="1"/>
+            <a:stCxn id="4" idx="0"/>
             <a:endCxn id="5" idx="2"/>
           </p:cNvCxnSpPr>
           <p:nvPr/>
         </p:nvCxnSpPr>
         <p:spPr>
-          <a:xfrm rot="10800000">
-            <a:off x="9781994" y="4366858"/>
-            <a:ext cx="380274" cy="673544"/>
-          </a:xfrm>
-          <a:prstGeom prst="curvedConnector2">
-            <a:avLst/>
+          <a:xfrm rot="16200000" flipV="1">
+            <a:off x="5723026" y="4768654"/>
+            <a:ext cx="622260" cy="6467"/>
+          </a:xfrm>
+          <a:prstGeom prst="curvedConnector3">
+            <a:avLst>
+              <a:gd name="adj1" fmla="val 50000"/>
+            </a:avLst>
           </a:prstGeom>
           <a:ln>
             <a:tailEnd type="triangle"/>
@@ -3515,7 +3591,7 @@
         </p:nvSpPr>
         <p:spPr>
           <a:xfrm>
-            <a:off x="8068245" y="928649"/>
+            <a:off x="3673897" y="1709499"/>
             <a:ext cx="943185" cy="252867"/>
           </a:xfrm>
           <a:prstGeom prst="rect">
@@ -3550,7 +3626,7 @@
         </p:nvSpPr>
         <p:spPr>
           <a:xfrm>
-            <a:off x="6639264" y="1417938"/>
+            <a:off x="1161116" y="1181516"/>
             <a:ext cx="1240231" cy="486032"/>
           </a:xfrm>
           <a:prstGeom prst="rect">
@@ -3580,9 +3656,15 @@
             <a:pPr algn="ctr"/>
             <a:r>
               <a:rPr lang="en-GB" sz="1200" dirty="0" err="1"/>
-              <a:t>SpringBoot</a:t>
-            </a:r>
-            <a:endParaRPr lang="en-GB" sz="1200" dirty="0"/>
+              <a:t>Jdo</a:t>
+            </a:r>
+            <a:br>
+              <a:rPr lang="en-GB" sz="1200" dirty="0"/>
+            </a:br>
+            <a:r>
+              <a:rPr lang="en-GB" sz="1200" dirty="0"/>
+              <a:t>DataNucleus5</a:t>
+            </a:r>
           </a:p>
         </p:txBody>
       </p:sp>
@@ -3604,7 +3686,7 @@
         </p:nvCxnSpPr>
         <p:spPr>
           <a:xfrm rot="10800000" flipV="1">
-            <a:off x="7879495" y="1650100"/>
+            <a:off x="2401347" y="1413678"/>
             <a:ext cx="377500" cy="10854"/>
           </a:xfrm>
           <a:prstGeom prst="curvedConnector3">
@@ -3645,7 +3727,7 @@
         </p:nvSpPr>
         <p:spPr>
           <a:xfrm>
-            <a:off x="6635164" y="3513543"/>
+            <a:off x="1157016" y="3277121"/>
             <a:ext cx="1240231" cy="486032"/>
           </a:xfrm>
           <a:prstGeom prst="rect">
@@ -3701,7 +3783,7 @@
         </p:nvSpPr>
         <p:spPr>
           <a:xfrm>
-            <a:off x="6639264" y="1998726"/>
+            <a:off x="1161116" y="1762304"/>
             <a:ext cx="1240231" cy="486032"/>
           </a:xfrm>
           <a:prstGeom prst="rect">
@@ -3731,15 +3813,9 @@
             <a:pPr algn="ctr"/>
             <a:r>
               <a:rPr lang="en-GB" sz="1200" dirty="0" err="1"/>
-              <a:t>Jdo</a:t>
-            </a:r>
-            <a:br>
-              <a:rPr lang="en-GB" sz="1200" dirty="0"/>
-            </a:br>
-            <a:r>
-              <a:rPr lang="en-GB" sz="1200" dirty="0"/>
-              <a:t>DataNucleus5</a:t>
-            </a:r>
+              <a:t>SpringBoot</a:t>
+            </a:r>
+            <a:endParaRPr lang="en-GB" sz="1200" dirty="0"/>
           </a:p>
         </p:txBody>
       </p:sp>
@@ -3757,7 +3833,7 @@
         </p:nvSpPr>
         <p:spPr>
           <a:xfrm>
-            <a:off x="6639264" y="5053574"/>
+            <a:off x="1161116" y="4817152"/>
             <a:ext cx="1240231" cy="486032"/>
           </a:xfrm>
           <a:prstGeom prst="rect">
@@ -3787,7 +3863,7 @@
             <a:pPr algn="ctr"/>
             <a:r>
               <a:rPr lang="en-GB" sz="1200" dirty="0"/>
-              <a:t>Wicket</a:t>
+              <a:t>Restful Objects</a:t>
             </a:r>
             <a:br>
               <a:rPr lang="en-GB" sz="1200" dirty="0"/>
@@ -3813,7 +3889,7 @@
         </p:nvSpPr>
         <p:spPr>
           <a:xfrm>
-            <a:off x="6639264" y="5653074"/>
+            <a:off x="1161116" y="5416652"/>
             <a:ext cx="1240231" cy="486032"/>
           </a:xfrm>
           <a:prstGeom prst="rect">
@@ -3842,113 +3918,12 @@
           <a:p>
             <a:pPr algn="ctr"/>
             <a:r>
-              <a:rPr lang="en-GB" sz="1200" dirty="0" err="1"/>
-              <a:t>RestfulObjects</a:t>
-            </a:r>
-            <a:br>
               <a:rPr lang="en-GB" sz="1200" dirty="0"/>
-            </a:br>
-            <a:r>
-              <a:rPr lang="en-GB" sz="1200" dirty="0"/>
-              <a:t>Viewer</a:t>
-            </a:r>
-          </a:p>
-        </p:txBody>
-      </p:sp>
-      <p:sp>
-        <p:nvSpPr>
-          <p:cNvPr id="20" name="Rectangle 19">
-            <a:extLst>
-              <a:ext uri="{FF2B5EF4-FFF2-40B4-BE49-F238E27FC236}">
-                <a16:creationId xmlns:a16="http://schemas.microsoft.com/office/drawing/2014/main" id="{A4CB25D0-CCE8-4562-840D-18B17FB16980}"/>
-              </a:ext>
-            </a:extLst>
-          </p:cNvPr>
-          <p:cNvSpPr/>
-          <p:nvPr/>
-        </p:nvSpPr>
-        <p:spPr>
-          <a:xfrm>
-            <a:off x="4243860" y="3952944"/>
-            <a:ext cx="1240231" cy="486032"/>
-          </a:xfrm>
-          <a:prstGeom prst="rect">
-            <a:avLst/>
-          </a:prstGeom>
-        </p:spPr>
-        <p:style>
-          <a:lnRef idx="2">
-            <a:schemeClr val="accent1">
-              <a:shade val="50000"/>
-            </a:schemeClr>
-          </a:lnRef>
-          <a:fillRef idx="1">
-            <a:schemeClr val="accent1"/>
-          </a:fillRef>
-          <a:effectRef idx="0">
-            <a:schemeClr val="accent1"/>
-          </a:effectRef>
-          <a:fontRef idx="minor">
-            <a:schemeClr val="lt1"/>
-          </a:fontRef>
-        </p:style>
-        <p:txBody>
-          <a:bodyPr rtlCol="0" anchor="ctr"/>
-          <a:lstStyle/>
-          <a:p>
-            <a:pPr algn="ctr"/>
-            <a:r>
-              <a:rPr lang="en-GB" sz="1200" dirty="0"/>
-              <a:t>WebApp</a:t>
-            </a:r>
-          </a:p>
-        </p:txBody>
-      </p:sp>
-      <p:cxnSp>
-        <p:nvCxnSpPr>
-          <p:cNvPr id="27" name="Connector: Curved 26">
-            <a:extLst>
-              <a:ext uri="{FF2B5EF4-FFF2-40B4-BE49-F238E27FC236}">
-                <a16:creationId xmlns:a16="http://schemas.microsoft.com/office/drawing/2014/main" id="{48479D4A-1585-4427-8B90-80F900C5789B}"/>
-              </a:ext>
-            </a:extLst>
-          </p:cNvPr>
-          <p:cNvCxnSpPr>
-            <a:cxnSpLocks/>
-            <a:stCxn id="18" idx="1"/>
-            <a:endCxn id="521" idx="6"/>
-          </p:cNvCxnSpPr>
-          <p:nvPr/>
-        </p:nvCxnSpPr>
-        <p:spPr>
-          <a:xfrm rot="10800000">
-            <a:off x="5802854" y="4461514"/>
-            <a:ext cx="836411" cy="1434577"/>
-          </a:xfrm>
-          <a:prstGeom prst="curvedConnector3">
-            <a:avLst>
-              <a:gd name="adj1" fmla="val 37367"/>
-            </a:avLst>
-          </a:prstGeom>
-          <a:ln>
-            <a:tailEnd type="triangle"/>
-          </a:ln>
-        </p:spPr>
-        <p:style>
-          <a:lnRef idx="1">
-            <a:schemeClr val="accent1"/>
-          </a:lnRef>
-          <a:fillRef idx="0">
-            <a:schemeClr val="accent1"/>
-          </a:fillRef>
-          <a:effectRef idx="0">
-            <a:schemeClr val="accent1"/>
-          </a:effectRef>
-          <a:fontRef idx="minor">
-            <a:schemeClr val="tx1"/>
-          </a:fontRef>
-        </p:style>
-      </p:cxnSp>
+              <a:t>Wicket Viewer</a:t>
+            </a:r>
+          </a:p>
+        </p:txBody>
+      </p:sp>
       <p:cxnSp>
         <p:nvCxnSpPr>
           <p:cNvPr id="32" name="Connector: Curved 31">
@@ -3967,8 +3942,8 @@
         </p:nvCxnSpPr>
         <p:spPr>
           <a:xfrm rot="10800000">
-            <a:off x="7875395" y="3756560"/>
-            <a:ext cx="1137496" cy="367283"/>
+            <a:off x="2397247" y="3520138"/>
+            <a:ext cx="2864572" cy="697605"/>
           </a:xfrm>
           <a:prstGeom prst="curvedConnector3">
             <a:avLst>
@@ -4012,8 +3987,8 @@
         </p:nvCxnSpPr>
         <p:spPr>
           <a:xfrm rot="10800000" flipV="1">
-            <a:off x="7879495" y="4123842"/>
-            <a:ext cx="1133396" cy="1172748"/>
+            <a:off x="2401347" y="4217742"/>
+            <a:ext cx="2860472" cy="842426"/>
           </a:xfrm>
           <a:prstGeom prst="curvedConnector3">
             <a:avLst>
@@ -4057,8 +4032,8 @@
         </p:nvCxnSpPr>
         <p:spPr>
           <a:xfrm rot="10800000">
-            <a:off x="8400109" y="1650100"/>
-            <a:ext cx="612782" cy="2473742"/>
+            <a:off x="2921961" y="1413678"/>
+            <a:ext cx="2339858" cy="2804064"/>
           </a:xfrm>
           <a:prstGeom prst="curvedConnector3">
             <a:avLst>
@@ -4102,8 +4077,8 @@
         </p:nvCxnSpPr>
         <p:spPr>
           <a:xfrm rot="10800000" flipV="1">
-            <a:off x="7879495" y="4123842"/>
-            <a:ext cx="1133396" cy="1772248"/>
+            <a:off x="2401347" y="4217742"/>
+            <a:ext cx="2860472" cy="1441926"/>
           </a:xfrm>
           <a:prstGeom prst="curvedConnector3">
             <a:avLst>
@@ -4143,7 +4118,7 @@
         </p:nvSpPr>
         <p:spPr>
           <a:xfrm>
-            <a:off x="6639264" y="459626"/>
+            <a:off x="1161116" y="223204"/>
             <a:ext cx="1240231" cy="486032"/>
           </a:xfrm>
           <a:prstGeom prst="rect">
@@ -4181,10 +4156,10 @@
       </p:sp>
       <p:sp>
         <p:nvSpPr>
-          <p:cNvPr id="80" name="Rectangle 79">
-            <a:extLst>
-              <a:ext uri="{FF2B5EF4-FFF2-40B4-BE49-F238E27FC236}">
-                <a16:creationId xmlns:a16="http://schemas.microsoft.com/office/drawing/2014/main" id="{8BA66BC8-5B57-42F2-B0B6-BBDFB803C19B}"/>
+          <p:cNvPr id="120" name="Rectangle 119">
+            <a:extLst>
+              <a:ext uri="{FF2B5EF4-FFF2-40B4-BE49-F238E27FC236}">
+                <a16:creationId xmlns:a16="http://schemas.microsoft.com/office/drawing/2014/main" id="{C37653D5-41D4-4C2D-82D7-604F34FD559F}"/>
               </a:ext>
             </a:extLst>
           </p:cNvPr>
@@ -4193,58 +4168,8 @@
         </p:nvSpPr>
         <p:spPr>
           <a:xfrm>
-            <a:off x="634268" y="582678"/>
-            <a:ext cx="1240231" cy="486032"/>
-          </a:xfrm>
-          <a:prstGeom prst="rect">
-            <a:avLst/>
-          </a:prstGeom>
-        </p:spPr>
-        <p:style>
-          <a:lnRef idx="2">
-            <a:schemeClr val="accent6">
-              <a:shade val="50000"/>
-            </a:schemeClr>
-          </a:lnRef>
-          <a:fillRef idx="1">
-            <a:schemeClr val="accent6"/>
-          </a:fillRef>
-          <a:effectRef idx="0">
-            <a:schemeClr val="accent6"/>
-          </a:effectRef>
-          <a:fontRef idx="minor">
-            <a:schemeClr val="lt1"/>
-          </a:fontRef>
-        </p:style>
-        <p:txBody>
-          <a:bodyPr rtlCol="0" anchor="ctr"/>
-          <a:lstStyle/>
-          <a:p>
-            <a:pPr algn="ctr"/>
-            <a:r>
-              <a:rPr lang="en-GB" sz="1200" dirty="0" err="1"/>
-              <a:t>Applib</a:t>
-            </a:r>
-            <a:endParaRPr lang="en-GB" sz="1200" dirty="0"/>
-          </a:p>
-        </p:txBody>
-      </p:sp>
-      <p:sp>
-        <p:nvSpPr>
-          <p:cNvPr id="81" name="Rectangle 80">
-            <a:extLst>
-              <a:ext uri="{FF2B5EF4-FFF2-40B4-BE49-F238E27FC236}">
-                <a16:creationId xmlns:a16="http://schemas.microsoft.com/office/drawing/2014/main" id="{9628B3BA-B27E-4A22-82C8-2C262BA1DABF}"/>
-              </a:ext>
-            </a:extLst>
-          </p:cNvPr>
-          <p:cNvSpPr/>
-          <p:nvPr/>
-        </p:nvSpPr>
-        <p:spPr>
-          <a:xfrm>
-            <a:off x="2467770" y="2631790"/>
-            <a:ext cx="1240231" cy="486032"/>
+            <a:off x="10974446" y="5349054"/>
+            <a:ext cx="1089327" cy="369134"/>
           </a:xfrm>
           <a:prstGeom prst="rect">
             <a:avLst/>
@@ -4272,397 +4197,6 @@
           <a:p>
             <a:pPr algn="ctr"/>
             <a:r>
-              <a:rPr lang="en-GB" sz="1200" dirty="0"/>
-              <a:t>Metamodel</a:t>
-            </a:r>
-          </a:p>
-        </p:txBody>
-      </p:sp>
-      <p:sp>
-        <p:nvSpPr>
-          <p:cNvPr id="83" name="Rectangle 82">
-            <a:extLst>
-              <a:ext uri="{FF2B5EF4-FFF2-40B4-BE49-F238E27FC236}">
-                <a16:creationId xmlns:a16="http://schemas.microsoft.com/office/drawing/2014/main" id="{A4DD96EA-3E39-4D05-A946-0B7EDF5A51A1}"/>
-              </a:ext>
-            </a:extLst>
-          </p:cNvPr>
-          <p:cNvSpPr/>
-          <p:nvPr/>
-        </p:nvSpPr>
-        <p:spPr>
-          <a:xfrm>
-            <a:off x="3087885" y="1795728"/>
-            <a:ext cx="1240231" cy="486032"/>
-          </a:xfrm>
-          <a:prstGeom prst="rect">
-            <a:avLst/>
-          </a:prstGeom>
-        </p:spPr>
-        <p:style>
-          <a:lnRef idx="2">
-            <a:schemeClr val="accent1">
-              <a:shade val="50000"/>
-            </a:schemeClr>
-          </a:lnRef>
-          <a:fillRef idx="1">
-            <a:schemeClr val="accent1"/>
-          </a:fillRef>
-          <a:effectRef idx="0">
-            <a:schemeClr val="accent1"/>
-          </a:effectRef>
-          <a:fontRef idx="minor">
-            <a:schemeClr val="lt1"/>
-          </a:fontRef>
-        </p:style>
-        <p:txBody>
-          <a:bodyPr rtlCol="0" anchor="ctr"/>
-          <a:lstStyle/>
-          <a:p>
-            <a:pPr algn="ctr"/>
-            <a:r>
-              <a:rPr lang="en-GB" sz="1200" dirty="0"/>
-              <a:t>Runtime</a:t>
-            </a:r>
-          </a:p>
-        </p:txBody>
-      </p:sp>
-      <p:cxnSp>
-        <p:nvCxnSpPr>
-          <p:cNvPr id="84" name="Connector: Curved 83">
-            <a:extLst>
-              <a:ext uri="{FF2B5EF4-FFF2-40B4-BE49-F238E27FC236}">
-                <a16:creationId xmlns:a16="http://schemas.microsoft.com/office/drawing/2014/main" id="{6484D11A-DBAB-4364-B77A-37674B39B183}"/>
-              </a:ext>
-            </a:extLst>
-          </p:cNvPr>
-          <p:cNvCxnSpPr>
-            <a:cxnSpLocks/>
-            <a:stCxn id="81" idx="1"/>
-            <a:endCxn id="80" idx="3"/>
-          </p:cNvCxnSpPr>
-          <p:nvPr/>
-        </p:nvCxnSpPr>
-        <p:spPr>
-          <a:xfrm rot="10800000">
-            <a:off x="1874500" y="825694"/>
-            <a:ext cx="593271" cy="2049112"/>
-          </a:xfrm>
-          <a:prstGeom prst="curvedConnector3">
-            <a:avLst>
-              <a:gd name="adj1" fmla="val 50000"/>
-            </a:avLst>
-          </a:prstGeom>
-          <a:ln>
-            <a:prstDash val="solid"/>
-            <a:tailEnd type="triangle"/>
-          </a:ln>
-        </p:spPr>
-        <p:style>
-          <a:lnRef idx="1">
-            <a:schemeClr val="accent1"/>
-          </a:lnRef>
-          <a:fillRef idx="0">
-            <a:schemeClr val="accent1"/>
-          </a:fillRef>
-          <a:effectRef idx="0">
-            <a:schemeClr val="accent1"/>
-          </a:effectRef>
-          <a:fontRef idx="minor">
-            <a:schemeClr val="tx1"/>
-          </a:fontRef>
-        </p:style>
-      </p:cxnSp>
-      <p:cxnSp>
-        <p:nvCxnSpPr>
-          <p:cNvPr id="90" name="Connector: Curved 89">
-            <a:extLst>
-              <a:ext uri="{FF2B5EF4-FFF2-40B4-BE49-F238E27FC236}">
-                <a16:creationId xmlns:a16="http://schemas.microsoft.com/office/drawing/2014/main" id="{87E4CFA5-AF76-42C7-A763-3D44C7292444}"/>
-              </a:ext>
-            </a:extLst>
-          </p:cNvPr>
-          <p:cNvCxnSpPr>
-            <a:cxnSpLocks/>
-            <a:stCxn id="83" idx="1"/>
-            <a:endCxn id="81" idx="3"/>
-          </p:cNvCxnSpPr>
-          <p:nvPr/>
-        </p:nvCxnSpPr>
-        <p:spPr>
-          <a:xfrm rot="10800000" flipH="1" flipV="1">
-            <a:off x="3087885" y="2038744"/>
-            <a:ext cx="620116" cy="836062"/>
-          </a:xfrm>
-          <a:prstGeom prst="curvedConnector5">
-            <a:avLst>
-              <a:gd name="adj1" fmla="val -36864"/>
-              <a:gd name="adj2" fmla="val 50000"/>
-              <a:gd name="adj3" fmla="val 136864"/>
-            </a:avLst>
-          </a:prstGeom>
-          <a:ln>
-            <a:prstDash val="solid"/>
-            <a:tailEnd type="triangle"/>
-          </a:ln>
-        </p:spPr>
-        <p:style>
-          <a:lnRef idx="1">
-            <a:schemeClr val="accent1"/>
-          </a:lnRef>
-          <a:fillRef idx="0">
-            <a:schemeClr val="accent1"/>
-          </a:fillRef>
-          <a:effectRef idx="0">
-            <a:schemeClr val="accent1"/>
-          </a:effectRef>
-          <a:fontRef idx="minor">
-            <a:schemeClr val="tx1"/>
-          </a:fontRef>
-        </p:style>
-      </p:cxnSp>
-      <p:cxnSp>
-        <p:nvCxnSpPr>
-          <p:cNvPr id="93" name="Connector: Curved 92">
-            <a:extLst>
-              <a:ext uri="{FF2B5EF4-FFF2-40B4-BE49-F238E27FC236}">
-                <a16:creationId xmlns:a16="http://schemas.microsoft.com/office/drawing/2014/main" id="{9490D9E0-ABAC-46C9-9164-37B6D5C8FF84}"/>
-              </a:ext>
-            </a:extLst>
-          </p:cNvPr>
-          <p:cNvCxnSpPr>
-            <a:cxnSpLocks/>
-            <a:stCxn id="99" idx="1"/>
-            <a:endCxn id="83" idx="3"/>
-          </p:cNvCxnSpPr>
-          <p:nvPr/>
-        </p:nvCxnSpPr>
-        <p:spPr>
-          <a:xfrm rot="10800000" flipH="1" flipV="1">
-            <a:off x="3274016" y="1207458"/>
-            <a:ext cx="1054099" cy="831285"/>
-          </a:xfrm>
-          <a:prstGeom prst="curvedConnector5">
-            <a:avLst>
-              <a:gd name="adj1" fmla="val -21687"/>
-              <a:gd name="adj2" fmla="val 50000"/>
-              <a:gd name="adj3" fmla="val 121687"/>
-            </a:avLst>
-          </a:prstGeom>
-          <a:ln>
-            <a:prstDash val="solid"/>
-            <a:tailEnd type="triangle"/>
-          </a:ln>
-        </p:spPr>
-        <p:style>
-          <a:lnRef idx="1">
-            <a:schemeClr val="accent1"/>
-          </a:lnRef>
-          <a:fillRef idx="0">
-            <a:schemeClr val="accent1"/>
-          </a:fillRef>
-          <a:effectRef idx="0">
-            <a:schemeClr val="accent1"/>
-          </a:effectRef>
-          <a:fontRef idx="minor">
-            <a:schemeClr val="tx1"/>
-          </a:fontRef>
-        </p:style>
-      </p:cxnSp>
-      <p:sp>
-        <p:nvSpPr>
-          <p:cNvPr id="99" name="Rectangle 98">
-            <a:extLst>
-              <a:ext uri="{FF2B5EF4-FFF2-40B4-BE49-F238E27FC236}">
-                <a16:creationId xmlns:a16="http://schemas.microsoft.com/office/drawing/2014/main" id="{9411BEDB-9F4E-48A0-802D-3363014B0B78}"/>
-              </a:ext>
-            </a:extLst>
-          </p:cNvPr>
-          <p:cNvSpPr/>
-          <p:nvPr/>
-        </p:nvSpPr>
-        <p:spPr>
-          <a:xfrm>
-            <a:off x="3274017" y="964443"/>
-            <a:ext cx="1240231" cy="486032"/>
-          </a:xfrm>
-          <a:prstGeom prst="rect">
-            <a:avLst/>
-          </a:prstGeom>
-        </p:spPr>
-        <p:style>
-          <a:lnRef idx="2">
-            <a:schemeClr val="accent1">
-              <a:shade val="50000"/>
-            </a:schemeClr>
-          </a:lnRef>
-          <a:fillRef idx="1">
-            <a:schemeClr val="accent1"/>
-          </a:fillRef>
-          <a:effectRef idx="0">
-            <a:schemeClr val="accent1"/>
-          </a:effectRef>
-          <a:fontRef idx="minor">
-            <a:schemeClr val="lt1"/>
-          </a:fontRef>
-        </p:style>
-        <p:txBody>
-          <a:bodyPr rtlCol="0" anchor="ctr"/>
-          <a:lstStyle/>
-          <a:p>
-            <a:pPr algn="ctr"/>
-            <a:r>
-              <a:rPr lang="en-GB" sz="1200" dirty="0"/>
-              <a:t>Runtime</a:t>
-            </a:r>
-            <a:br>
-              <a:rPr lang="en-GB" sz="1200" dirty="0"/>
-            </a:br>
-            <a:r>
-              <a:rPr lang="en-GB" sz="1200" dirty="0"/>
-              <a:t>Services</a:t>
-            </a:r>
-          </a:p>
-        </p:txBody>
-      </p:sp>
-      <p:cxnSp>
-        <p:nvCxnSpPr>
-          <p:cNvPr id="101" name="Connector: Curved 100">
-            <a:extLst>
-              <a:ext uri="{FF2B5EF4-FFF2-40B4-BE49-F238E27FC236}">
-                <a16:creationId xmlns:a16="http://schemas.microsoft.com/office/drawing/2014/main" id="{32116EEB-BD70-457A-A7B4-0D5746ABEF16}"/>
-              </a:ext>
-            </a:extLst>
-          </p:cNvPr>
-          <p:cNvCxnSpPr>
-            <a:cxnSpLocks/>
-            <a:stCxn id="9" idx="1"/>
-            <a:endCxn id="99" idx="3"/>
-          </p:cNvCxnSpPr>
-          <p:nvPr/>
-        </p:nvCxnSpPr>
-        <p:spPr>
-          <a:xfrm rot="10800000">
-            <a:off x="4514248" y="1207460"/>
-            <a:ext cx="2125016" cy="453495"/>
-          </a:xfrm>
-          <a:prstGeom prst="curvedConnector3">
-            <a:avLst>
-              <a:gd name="adj1" fmla="val 50000"/>
-            </a:avLst>
-          </a:prstGeom>
-          <a:ln>
-            <a:prstDash val="solid"/>
-            <a:tailEnd type="triangle"/>
-          </a:ln>
-        </p:spPr>
-        <p:style>
-          <a:lnRef idx="1">
-            <a:schemeClr val="accent1"/>
-          </a:lnRef>
-          <a:fillRef idx="0">
-            <a:schemeClr val="accent1"/>
-          </a:fillRef>
-          <a:effectRef idx="0">
-            <a:schemeClr val="accent1"/>
-          </a:effectRef>
-          <a:fontRef idx="minor">
-            <a:schemeClr val="tx1"/>
-          </a:fontRef>
-        </p:style>
-      </p:cxnSp>
-      <p:sp>
-        <p:nvSpPr>
-          <p:cNvPr id="111" name="Rectangle 110">
-            <a:extLst>
-              <a:ext uri="{FF2B5EF4-FFF2-40B4-BE49-F238E27FC236}">
-                <a16:creationId xmlns:a16="http://schemas.microsoft.com/office/drawing/2014/main" id="{9D4E7237-01E5-4455-A567-99B66E54CF3B}"/>
-              </a:ext>
-            </a:extLst>
-          </p:cNvPr>
-          <p:cNvSpPr/>
-          <p:nvPr/>
-        </p:nvSpPr>
-        <p:spPr>
-          <a:xfrm>
-            <a:off x="716399" y="3324916"/>
-            <a:ext cx="1240231" cy="486032"/>
-          </a:xfrm>
-          <a:prstGeom prst="rect">
-            <a:avLst/>
-          </a:prstGeom>
-        </p:spPr>
-        <p:style>
-          <a:lnRef idx="2">
-            <a:schemeClr val="accent1">
-              <a:shade val="50000"/>
-            </a:schemeClr>
-          </a:lnRef>
-          <a:fillRef idx="1">
-            <a:schemeClr val="accent1"/>
-          </a:fillRef>
-          <a:effectRef idx="0">
-            <a:schemeClr val="accent1"/>
-          </a:effectRef>
-          <a:fontRef idx="minor">
-            <a:schemeClr val="lt1"/>
-          </a:fontRef>
-        </p:style>
-        <p:txBody>
-          <a:bodyPr rtlCol="0" anchor="ctr"/>
-          <a:lstStyle/>
-          <a:p>
-            <a:pPr algn="ctr"/>
-            <a:r>
-              <a:rPr lang="en-GB" sz="1200" dirty="0"/>
-              <a:t>Config</a:t>
-            </a:r>
-          </a:p>
-        </p:txBody>
-      </p:sp>
-      <p:sp>
-        <p:nvSpPr>
-          <p:cNvPr id="120" name="Rectangle 119">
-            <a:extLst>
-              <a:ext uri="{FF2B5EF4-FFF2-40B4-BE49-F238E27FC236}">
-                <a16:creationId xmlns:a16="http://schemas.microsoft.com/office/drawing/2014/main" id="{C37653D5-41D4-4C2D-82D7-604F34FD559F}"/>
-              </a:ext>
-            </a:extLst>
-          </p:cNvPr>
-          <p:cNvSpPr/>
-          <p:nvPr/>
-        </p:nvSpPr>
-        <p:spPr>
-          <a:xfrm>
-            <a:off x="10936793" y="5835277"/>
-            <a:ext cx="1089327" cy="369134"/>
-          </a:xfrm>
-          <a:prstGeom prst="rect">
-            <a:avLst/>
-          </a:prstGeom>
-        </p:spPr>
-        <p:style>
-          <a:lnRef idx="2">
-            <a:schemeClr val="accent1">
-              <a:shade val="50000"/>
-            </a:schemeClr>
-          </a:lnRef>
-          <a:fillRef idx="1">
-            <a:schemeClr val="accent1"/>
-          </a:fillRef>
-          <a:effectRef idx="0">
-            <a:schemeClr val="accent1"/>
-          </a:effectRef>
-          <a:fontRef idx="minor">
-            <a:schemeClr val="lt1"/>
-          </a:fontRef>
-        </p:style>
-        <p:txBody>
-          <a:bodyPr rtlCol="0" anchor="ctr"/>
-          <a:lstStyle/>
-          <a:p>
-            <a:pPr algn="ctr"/>
-            <a:r>
               <a:rPr lang="en-GB" sz="1050" dirty="0"/>
               <a:t>@Configuration</a:t>
             </a:r>
@@ -4670,68 +4204,18 @@
               <a:rPr lang="en-GB" sz="1050" dirty="0"/>
             </a:br>
             <a:r>
-              <a:rPr lang="en-GB" sz="1050" dirty="0" err="1"/>
-              <a:t>IsisModule</a:t>
-            </a:r>
-            <a:r>
               <a:rPr lang="en-GB" sz="1050" dirty="0"/>
-              <a:t>…</a:t>
-            </a:r>
-          </a:p>
-        </p:txBody>
-      </p:sp>
-      <p:cxnSp>
-        <p:nvCxnSpPr>
-          <p:cNvPr id="124" name="Connector: Curved 123">
-            <a:extLst>
-              <a:ext uri="{FF2B5EF4-FFF2-40B4-BE49-F238E27FC236}">
-                <a16:creationId xmlns:a16="http://schemas.microsoft.com/office/drawing/2014/main" id="{6DA8D7C9-FCEE-4A96-AD75-EC93B00E01F8}"/>
-              </a:ext>
-            </a:extLst>
-          </p:cNvPr>
-          <p:cNvCxnSpPr>
-            <a:cxnSpLocks/>
-            <a:stCxn id="81" idx="1"/>
-            <a:endCxn id="111" idx="3"/>
-          </p:cNvCxnSpPr>
-          <p:nvPr/>
-        </p:nvCxnSpPr>
-        <p:spPr>
-          <a:xfrm rot="10800000" flipV="1">
-            <a:off x="1956630" y="2874806"/>
-            <a:ext cx="511140" cy="693126"/>
-          </a:xfrm>
-          <a:prstGeom prst="curvedConnector3">
-            <a:avLst>
-              <a:gd name="adj1" fmla="val 50000"/>
-            </a:avLst>
-          </a:prstGeom>
-          <a:ln>
-            <a:prstDash val="solid"/>
-            <a:tailEnd type="triangle"/>
-          </a:ln>
-        </p:spPr>
-        <p:style>
-          <a:lnRef idx="1">
-            <a:schemeClr val="accent1"/>
-          </a:lnRef>
-          <a:fillRef idx="0">
-            <a:schemeClr val="accent1"/>
-          </a:fillRef>
-          <a:effectRef idx="0">
-            <a:schemeClr val="accent1"/>
-          </a:effectRef>
-          <a:fontRef idx="minor">
-            <a:schemeClr val="tx1"/>
-          </a:fontRef>
-        </p:style>
-      </p:cxnSp>
-      <p:sp>
-        <p:nvSpPr>
-          <p:cNvPr id="128" name="Rectangle 127">
-            <a:extLst>
-              <a:ext uri="{FF2B5EF4-FFF2-40B4-BE49-F238E27FC236}">
-                <a16:creationId xmlns:a16="http://schemas.microsoft.com/office/drawing/2014/main" id="{52CE5F89-45D5-404C-9C59-750E81FF00FA}"/>
+              <a:t>core</a:t>
+            </a:r>
+          </a:p>
+        </p:txBody>
+      </p:sp>
+      <p:sp>
+        <p:nvSpPr>
+          <p:cNvPr id="269" name="Rectangle 268">
+            <a:extLst>
+              <a:ext uri="{FF2B5EF4-FFF2-40B4-BE49-F238E27FC236}">
+                <a16:creationId xmlns:a16="http://schemas.microsoft.com/office/drawing/2014/main" id="{0354E88B-4A98-4BA9-93B2-416FEFC3BF41}"/>
               </a:ext>
             </a:extLst>
           </p:cNvPr>
@@ -4740,201 +4224,7 @@
         </p:nvSpPr>
         <p:spPr>
           <a:xfrm>
-            <a:off x="603416" y="4508989"/>
-            <a:ext cx="1240231" cy="486032"/>
-          </a:xfrm>
-          <a:prstGeom prst="rect">
-            <a:avLst/>
-          </a:prstGeom>
-        </p:spPr>
-        <p:style>
-          <a:lnRef idx="2">
-            <a:schemeClr val="accent3">
-              <a:shade val="50000"/>
-            </a:schemeClr>
-          </a:lnRef>
-          <a:fillRef idx="1">
-            <a:schemeClr val="accent3"/>
-          </a:fillRef>
-          <a:effectRef idx="0">
-            <a:schemeClr val="accent3"/>
-          </a:effectRef>
-          <a:fontRef idx="minor">
-            <a:schemeClr val="lt1"/>
-          </a:fontRef>
-        </p:style>
-        <p:txBody>
-          <a:bodyPr rtlCol="0" anchor="ctr"/>
-          <a:lstStyle/>
-          <a:p>
-            <a:pPr algn="ctr"/>
-            <a:r>
-              <a:rPr lang="en-GB" sz="1200" dirty="0" err="1"/>
-              <a:t>IsisConfiguration</a:t>
-            </a:r>
-            <a:endParaRPr lang="en-GB" sz="1200" dirty="0"/>
-          </a:p>
-        </p:txBody>
-      </p:sp>
-      <p:sp>
-        <p:nvSpPr>
-          <p:cNvPr id="129" name="Rectangle 128">
-            <a:extLst>
-              <a:ext uri="{FF2B5EF4-FFF2-40B4-BE49-F238E27FC236}">
-                <a16:creationId xmlns:a16="http://schemas.microsoft.com/office/drawing/2014/main" id="{8DBE7C89-BD25-4085-8230-A1ABAD594AE3}"/>
-              </a:ext>
-            </a:extLst>
-          </p:cNvPr>
-          <p:cNvSpPr/>
-          <p:nvPr/>
-        </p:nvSpPr>
-        <p:spPr>
-          <a:xfrm>
-            <a:off x="9718552" y="6319443"/>
-            <a:ext cx="1089327" cy="369134"/>
-          </a:xfrm>
-          <a:prstGeom prst="rect">
-            <a:avLst/>
-          </a:prstGeom>
-        </p:spPr>
-        <p:style>
-          <a:lnRef idx="2">
-            <a:schemeClr val="accent3">
-              <a:shade val="50000"/>
-            </a:schemeClr>
-          </a:lnRef>
-          <a:fillRef idx="1">
-            <a:schemeClr val="accent3"/>
-          </a:fillRef>
-          <a:effectRef idx="0">
-            <a:schemeClr val="accent3"/>
-          </a:effectRef>
-          <a:fontRef idx="minor">
-            <a:schemeClr val="lt1"/>
-          </a:fontRef>
-        </p:style>
-        <p:txBody>
-          <a:bodyPr rtlCol="0" anchor="ctr"/>
-          <a:lstStyle/>
-          <a:p>
-            <a:pPr algn="ctr"/>
-            <a:r>
-              <a:rPr lang="en-GB" sz="1050" dirty="0"/>
-              <a:t>@Configuration</a:t>
-            </a:r>
-            <a:br>
-              <a:rPr lang="en-GB" sz="1050" dirty="0"/>
-            </a:br>
-            <a:r>
-              <a:rPr lang="en-GB" sz="1050" dirty="0"/>
-              <a:t>Properties</a:t>
-            </a:r>
-          </a:p>
-        </p:txBody>
-      </p:sp>
-      <p:cxnSp>
-        <p:nvCxnSpPr>
-          <p:cNvPr id="150" name="Connector: Curved 149">
-            <a:extLst>
-              <a:ext uri="{FF2B5EF4-FFF2-40B4-BE49-F238E27FC236}">
-                <a16:creationId xmlns:a16="http://schemas.microsoft.com/office/drawing/2014/main" id="{7369A1C7-49E3-447F-9B5A-7E6D73E0A181}"/>
-              </a:ext>
-            </a:extLst>
-          </p:cNvPr>
-          <p:cNvCxnSpPr>
-            <a:cxnSpLocks/>
-            <a:stCxn id="111" idx="1"/>
-            <a:endCxn id="128" idx="3"/>
-          </p:cNvCxnSpPr>
-          <p:nvPr/>
-        </p:nvCxnSpPr>
-        <p:spPr>
-          <a:xfrm rot="10800000" flipH="1" flipV="1">
-            <a:off x="716399" y="3567931"/>
-            <a:ext cx="1127248" cy="1184073"/>
-          </a:xfrm>
-          <a:prstGeom prst="curvedConnector5">
-            <a:avLst>
-              <a:gd name="adj1" fmla="val -20279"/>
-              <a:gd name="adj2" fmla="val 50000"/>
-              <a:gd name="adj3" fmla="val 120279"/>
-            </a:avLst>
-          </a:prstGeom>
-          <a:ln>
-            <a:prstDash val="lgDashDotDot"/>
-            <a:tailEnd type="triangle"/>
-          </a:ln>
-        </p:spPr>
-        <p:style>
-          <a:lnRef idx="1">
-            <a:schemeClr val="accent1"/>
-          </a:lnRef>
-          <a:fillRef idx="0">
-            <a:schemeClr val="accent1"/>
-          </a:fillRef>
-          <a:effectRef idx="0">
-            <a:schemeClr val="accent1"/>
-          </a:effectRef>
-          <a:fontRef idx="minor">
-            <a:schemeClr val="tx1"/>
-          </a:fontRef>
-        </p:style>
-      </p:cxnSp>
-      <p:sp>
-        <p:nvSpPr>
-          <p:cNvPr id="155" name="TextBox 154">
-            <a:extLst>
-              <a:ext uri="{FF2B5EF4-FFF2-40B4-BE49-F238E27FC236}">
-                <a16:creationId xmlns:a16="http://schemas.microsoft.com/office/drawing/2014/main" id="{BCBEB27F-C918-42D3-98C8-DF9BAC518E75}"/>
-              </a:ext>
-            </a:extLst>
-          </p:cNvPr>
-          <p:cNvSpPr txBox="1"/>
-          <p:nvPr/>
-        </p:nvSpPr>
-        <p:spPr>
-          <a:xfrm>
-            <a:off x="240569" y="3974421"/>
-            <a:ext cx="2240013" cy="253916"/>
-          </a:xfrm>
-          <a:prstGeom prst="rect">
-            <a:avLst/>
-          </a:prstGeom>
-          <a:noFill/>
-        </p:spPr>
-        <p:txBody>
-          <a:bodyPr wrap="square" rtlCol="0">
-            <a:spAutoFit/>
-          </a:bodyPr>
-          <a:lstStyle/>
-          <a:p>
-            <a:r>
-              <a:rPr lang="en-GB" sz="1050" dirty="0"/>
-              <a:t>@</a:t>
-            </a:r>
-            <a:r>
-              <a:rPr lang="en-GB" sz="1050" dirty="0" err="1"/>
-              <a:t>EnableConfigurationProperties</a:t>
-            </a:r>
-            <a:endParaRPr lang="en-GB" sz="1050" dirty="0"/>
-          </a:p>
-        </p:txBody>
-      </p:sp>
-      <p:sp>
-        <p:nvSpPr>
-          <p:cNvPr id="269" name="Rectangle 268">
-            <a:extLst>
-              <a:ext uri="{FF2B5EF4-FFF2-40B4-BE49-F238E27FC236}">
-                <a16:creationId xmlns:a16="http://schemas.microsoft.com/office/drawing/2014/main" id="{0354E88B-4A98-4BA9-93B2-416FEFC3BF41}"/>
-              </a:ext>
-            </a:extLst>
-          </p:cNvPr>
-          <p:cNvSpPr/>
-          <p:nvPr/>
-        </p:nvSpPr>
-        <p:spPr>
-          <a:xfrm>
-            <a:off x="6639264" y="2932755"/>
+            <a:off x="1161116" y="2696333"/>
             <a:ext cx="1240231" cy="486032"/>
           </a:xfrm>
           <a:prstGeom prst="rect">
@@ -4995,7 +4285,7 @@
         </p:nvSpPr>
         <p:spPr>
           <a:xfrm>
-            <a:off x="10160953" y="1450394"/>
+            <a:off x="5131491" y="1135899"/>
             <a:ext cx="1785587" cy="486032"/>
           </a:xfrm>
           <a:prstGeom prst="rect">
@@ -5056,7 +4346,7 @@
         </p:nvSpPr>
         <p:spPr>
           <a:xfrm>
-            <a:off x="9006255" y="2401819"/>
+            <a:off x="5255183" y="2495719"/>
             <a:ext cx="1538205" cy="486032"/>
           </a:xfrm>
           <a:prstGeom prst="rect">
@@ -5110,18 +4400,20 @@
           </p:cNvPr>
           <p:cNvCxnSpPr>
             <a:cxnSpLocks/>
-            <a:stCxn id="285" idx="1"/>
+            <a:stCxn id="285" idx="2"/>
             <a:endCxn id="286" idx="0"/>
           </p:cNvCxnSpPr>
           <p:nvPr/>
         </p:nvCxnSpPr>
         <p:spPr>
-          <a:xfrm rot="10800000" flipV="1">
-            <a:off x="9775359" y="1693409"/>
-            <a:ext cx="385595" cy="708409"/>
-          </a:xfrm>
-          <a:prstGeom prst="curvedConnector2">
-            <a:avLst/>
+          <a:xfrm rot="16200000" flipH="1">
+            <a:off x="5587391" y="2058824"/>
+            <a:ext cx="873788" cy="1"/>
+          </a:xfrm>
+          <a:prstGeom prst="curvedConnector3">
+            <a:avLst>
+              <a:gd name="adj1" fmla="val 50000"/>
+            </a:avLst>
           </a:prstGeom>
           <a:ln>
             <a:tailEnd type="triangle"/>
@@ -5156,7 +4448,7 @@
         </p:nvSpPr>
         <p:spPr>
           <a:xfrm>
-            <a:off x="9840522" y="1983334"/>
+            <a:off x="6055791" y="1809721"/>
             <a:ext cx="1878796" cy="253916"/>
           </a:xfrm>
           <a:prstGeom prst="rect">
@@ -5203,8 +4495,8 @@
         </p:nvCxnSpPr>
         <p:spPr>
           <a:xfrm rot="10800000" flipV="1">
-            <a:off x="7879495" y="2644835"/>
-            <a:ext cx="1126760" cy="530936"/>
+            <a:off x="2401347" y="2738735"/>
+            <a:ext cx="2853836" cy="200614"/>
           </a:xfrm>
           <a:prstGeom prst="curvedConnector3">
             <a:avLst>
@@ -5248,7 +4540,7 @@
         </p:nvCxnSpPr>
         <p:spPr>
           <a:xfrm rot="10800000" flipV="1">
-            <a:off x="7879495" y="1650100"/>
+            <a:off x="2401347" y="1413678"/>
             <a:ext cx="377500" cy="591642"/>
           </a:xfrm>
           <a:prstGeom prst="curvedConnector3">
@@ -5289,7 +4581,7 @@
         </p:nvSpPr>
         <p:spPr>
           <a:xfrm>
-            <a:off x="10882660" y="3104870"/>
+            <a:off x="7531668" y="3179852"/>
             <a:ext cx="1129853" cy="486032"/>
           </a:xfrm>
           <a:prstGeom prst="rect">
@@ -5345,7 +4637,7 @@
         </p:nvSpPr>
         <p:spPr>
           <a:xfrm>
-            <a:off x="10859918" y="3880826"/>
+            <a:off x="9011430" y="3209939"/>
             <a:ext cx="1167942" cy="486032"/>
           </a:xfrm>
           <a:prstGeom prst="rect">
@@ -5401,7 +4693,7 @@
         </p:nvSpPr>
         <p:spPr>
           <a:xfrm>
-            <a:off x="9718552" y="5835277"/>
+            <a:off x="10974446" y="6326037"/>
             <a:ext cx="1089327" cy="369134"/>
           </a:xfrm>
           <a:prstGeom prst="rect">
@@ -5438,7 +4730,7 @@
             </a:br>
             <a:r>
               <a:rPr lang="en-GB" sz="1050" dirty="0"/>
-              <a:t>(application)</a:t>
+              <a:t>application</a:t>
             </a:r>
           </a:p>
         </p:txBody>
@@ -5461,8 +4753,8 @@
         </p:nvCxnSpPr>
         <p:spPr>
           <a:xfrm flipV="1">
-            <a:off x="10551096" y="3347886"/>
-            <a:ext cx="331564" cy="775956"/>
+            <a:off x="6800024" y="3422868"/>
+            <a:ext cx="731644" cy="794874"/>
           </a:xfrm>
           <a:prstGeom prst="curvedConnector3">
             <a:avLst>
@@ -5499,15 +4791,15 @@
           </p:cNvPr>
           <p:cNvCxnSpPr>
             <a:cxnSpLocks/>
-            <a:stCxn id="377" idx="2"/>
-            <a:endCxn id="387" idx="0"/>
+            <a:stCxn id="377" idx="3"/>
+            <a:endCxn id="387" idx="1"/>
           </p:cNvCxnSpPr>
           <p:nvPr/>
         </p:nvCxnSpPr>
         <p:spPr>
-          <a:xfrm rot="5400000">
-            <a:off x="11300776" y="3734015"/>
-            <a:ext cx="289924" cy="3698"/>
+          <a:xfrm>
+            <a:off x="8661521" y="3422868"/>
+            <a:ext cx="349909" cy="30087"/>
           </a:xfrm>
           <a:prstGeom prst="curvedConnector3">
             <a:avLst>
@@ -5553,8 +4845,8 @@
         </p:nvCxnSpPr>
         <p:spPr>
           <a:xfrm rot="10800000">
-            <a:off x="8400109" y="1650101"/>
-            <a:ext cx="606146" cy="994735"/>
+            <a:off x="2921961" y="1413679"/>
+            <a:ext cx="2333222" cy="1325057"/>
           </a:xfrm>
           <a:prstGeom prst="curvedConnector3">
             <a:avLst>
@@ -5598,8 +4890,8 @@
         </p:nvCxnSpPr>
         <p:spPr>
           <a:xfrm>
-            <a:off x="10544460" y="2644835"/>
-            <a:ext cx="338200" cy="703051"/>
+            <a:off x="6793388" y="2738735"/>
+            <a:ext cx="738280" cy="684133"/>
           </a:xfrm>
           <a:prstGeom prst="curvedConnector3">
             <a:avLst>
@@ -5643,8 +4935,8 @@
         </p:nvCxnSpPr>
         <p:spPr>
           <a:xfrm rot="10800000" flipV="1">
-            <a:off x="7875395" y="4123842"/>
-            <a:ext cx="1137496" cy="2380168"/>
+            <a:off x="2397247" y="4217742"/>
+            <a:ext cx="2864572" cy="2049846"/>
           </a:xfrm>
           <a:prstGeom prst="curvedConnector3">
             <a:avLst>
@@ -5670,51 +4962,6 @@
           </a:fontRef>
         </p:style>
       </p:cxnSp>
-      <p:cxnSp>
-        <p:nvCxnSpPr>
-          <p:cNvPr id="82" name="Connector: Curved 81">
-            <a:extLst>
-              <a:ext uri="{FF2B5EF4-FFF2-40B4-BE49-F238E27FC236}">
-                <a16:creationId xmlns:a16="http://schemas.microsoft.com/office/drawing/2014/main" id="{B4575090-D3B8-4D0D-9F06-00CC05DD7A90}"/>
-              </a:ext>
-            </a:extLst>
-          </p:cNvPr>
-          <p:cNvCxnSpPr>
-            <a:cxnSpLocks/>
-            <a:stCxn id="92" idx="1"/>
-            <a:endCxn id="521" idx="6"/>
-          </p:cNvCxnSpPr>
-          <p:nvPr/>
-        </p:nvCxnSpPr>
-        <p:spPr>
-          <a:xfrm rot="10800000">
-            <a:off x="5802854" y="4461514"/>
-            <a:ext cx="832311" cy="2042497"/>
-          </a:xfrm>
-          <a:prstGeom prst="curvedConnector3">
-            <a:avLst>
-              <a:gd name="adj1" fmla="val 50000"/>
-            </a:avLst>
-          </a:prstGeom>
-          <a:ln>
-            <a:tailEnd type="triangle"/>
-          </a:ln>
-        </p:spPr>
-        <p:style>
-          <a:lnRef idx="1">
-            <a:schemeClr val="accent1"/>
-          </a:lnRef>
-          <a:fillRef idx="0">
-            <a:schemeClr val="accent1"/>
-          </a:fillRef>
-          <a:effectRef idx="0">
-            <a:schemeClr val="accent1"/>
-          </a:effectRef>
-          <a:fontRef idx="minor">
-            <a:schemeClr val="tx1"/>
-          </a:fontRef>
-        </p:style>
-      </p:cxnSp>
       <p:sp>
         <p:nvSpPr>
           <p:cNvPr id="42" name="Oval 41">
@@ -5729,7 +4976,7 @@
         </p:nvSpPr>
         <p:spPr>
           <a:xfrm>
-            <a:off x="8256995" y="1555445"/>
+            <a:off x="2778847" y="1319023"/>
             <a:ext cx="143114" cy="189310"/>
           </a:xfrm>
           <a:prstGeom prst="ellipse">
@@ -5777,7 +5024,7 @@
         </p:nvCxnSpPr>
         <p:spPr>
           <a:xfrm rot="10800000">
-            <a:off x="7879495" y="702642"/>
+            <a:off x="2401347" y="466220"/>
             <a:ext cx="377500" cy="947458"/>
           </a:xfrm>
           <a:prstGeom prst="curvedConnector3">
@@ -5818,7 +5065,7 @@
         </p:nvSpPr>
         <p:spPr>
           <a:xfrm>
-            <a:off x="10900557" y="5496060"/>
+            <a:off x="10938210" y="5009837"/>
             <a:ext cx="177498" cy="189310"/>
           </a:xfrm>
           <a:prstGeom prst="ellipse">
@@ -5862,7 +5109,7 @@
         </p:nvSpPr>
         <p:spPr>
           <a:xfrm>
-            <a:off x="11089870" y="5376245"/>
+            <a:off x="11127523" y="4890022"/>
             <a:ext cx="943185" cy="415498"/>
           </a:xfrm>
           <a:prstGeom prst="rect">
@@ -5897,7 +5144,7 @@
         </p:nvSpPr>
         <p:spPr>
           <a:xfrm>
-            <a:off x="9195466" y="4954603"/>
+            <a:off x="6087573" y="4637747"/>
             <a:ext cx="718919" cy="253916"/>
           </a:xfrm>
           <a:prstGeom prst="rect">
@@ -5932,7 +5179,7 @@
         </p:nvSpPr>
         <p:spPr>
           <a:xfrm>
-            <a:off x="6639264" y="4094056"/>
+            <a:off x="1161116" y="3857634"/>
             <a:ext cx="1240231" cy="486032"/>
           </a:xfrm>
           <a:prstGeom prst="rect">
@@ -5993,7 +5240,7 @@
         </p:nvSpPr>
         <p:spPr>
           <a:xfrm>
-            <a:off x="6450917" y="4589119"/>
+            <a:off x="972769" y="4352697"/>
             <a:ext cx="1617328" cy="253916"/>
           </a:xfrm>
           <a:prstGeom prst="rect">
@@ -6064,6 +5311,1486 @@
       </p:sp>
       <p:sp>
         <p:nvSpPr>
+          <p:cNvPr id="86" name="Rectangle 85">
+            <a:extLst>
+              <a:ext uri="{FF2B5EF4-FFF2-40B4-BE49-F238E27FC236}">
+                <a16:creationId xmlns:a16="http://schemas.microsoft.com/office/drawing/2014/main" id="{32168251-15DA-4469-9763-4F4F29B26CFB}"/>
+              </a:ext>
+            </a:extLst>
+          </p:cNvPr>
+          <p:cNvSpPr/>
+          <p:nvPr/>
+        </p:nvSpPr>
+        <p:spPr>
+          <a:xfrm>
+            <a:off x="10981381" y="5833220"/>
+            <a:ext cx="1089327" cy="369134"/>
+          </a:xfrm>
+          <a:prstGeom prst="rect">
+            <a:avLst/>
+          </a:prstGeom>
+        </p:spPr>
+        <p:style>
+          <a:lnRef idx="2">
+            <a:schemeClr val="accent5">
+              <a:shade val="50000"/>
+            </a:schemeClr>
+          </a:lnRef>
+          <a:fillRef idx="1">
+            <a:schemeClr val="accent5"/>
+          </a:fillRef>
+          <a:effectRef idx="0">
+            <a:schemeClr val="accent5"/>
+          </a:effectRef>
+          <a:fontRef idx="minor">
+            <a:schemeClr val="lt1"/>
+          </a:fontRef>
+        </p:style>
+        <p:txBody>
+          <a:bodyPr rtlCol="0" anchor="ctr"/>
+          <a:lstStyle/>
+          <a:p>
+            <a:pPr algn="ctr"/>
+            <a:r>
+              <a:rPr lang="en-GB" sz="1050" dirty="0"/>
+              <a:t>@Configuration</a:t>
+            </a:r>
+            <a:br>
+              <a:rPr lang="en-GB" sz="1050" dirty="0"/>
+            </a:br>
+            <a:r>
+              <a:rPr lang="en-GB" sz="1050" dirty="0"/>
+              <a:t>extensions</a:t>
+            </a:r>
+          </a:p>
+        </p:txBody>
+      </p:sp>
+      <p:sp>
+        <p:nvSpPr>
+          <p:cNvPr id="91" name="Rectangle 90">
+            <a:extLst>
+              <a:ext uri="{FF2B5EF4-FFF2-40B4-BE49-F238E27FC236}">
+                <a16:creationId xmlns:a16="http://schemas.microsoft.com/office/drawing/2014/main" id="{1EFBFD41-7EFF-41C4-9398-4E198CEF93CD}"/>
+              </a:ext>
+            </a:extLst>
+          </p:cNvPr>
+          <p:cNvSpPr/>
+          <p:nvPr/>
+        </p:nvSpPr>
+        <p:spPr>
+          <a:xfrm>
+            <a:off x="1161116" y="215003"/>
+            <a:ext cx="1240231" cy="486032"/>
+          </a:xfrm>
+          <a:prstGeom prst="rect">
+            <a:avLst/>
+          </a:prstGeom>
+        </p:spPr>
+        <p:style>
+          <a:lnRef idx="2">
+            <a:schemeClr val="accent5">
+              <a:shade val="50000"/>
+            </a:schemeClr>
+          </a:lnRef>
+          <a:fillRef idx="1">
+            <a:schemeClr val="accent5"/>
+          </a:fillRef>
+          <a:effectRef idx="0">
+            <a:schemeClr val="accent5"/>
+          </a:effectRef>
+          <a:fontRef idx="minor">
+            <a:schemeClr val="lt1"/>
+          </a:fontRef>
+        </p:style>
+        <p:txBody>
+          <a:bodyPr rtlCol="0" anchor="ctr"/>
+          <a:lstStyle/>
+          <a:p>
+            <a:pPr algn="ctr"/>
+            <a:r>
+              <a:rPr lang="en-GB" sz="1200" dirty="0"/>
+              <a:t>Fixtures</a:t>
+            </a:r>
+          </a:p>
+        </p:txBody>
+      </p:sp>
+      <p:sp>
+        <p:nvSpPr>
+          <p:cNvPr id="92" name="Rectangle 91">
+            <a:extLst>
+              <a:ext uri="{FF2B5EF4-FFF2-40B4-BE49-F238E27FC236}">
+                <a16:creationId xmlns:a16="http://schemas.microsoft.com/office/drawing/2014/main" id="{14693512-383A-4929-AF26-D8704FB13744}"/>
+              </a:ext>
+            </a:extLst>
+          </p:cNvPr>
+          <p:cNvSpPr/>
+          <p:nvPr/>
+        </p:nvSpPr>
+        <p:spPr>
+          <a:xfrm>
+            <a:off x="1157016" y="6024572"/>
+            <a:ext cx="1240231" cy="486032"/>
+          </a:xfrm>
+          <a:prstGeom prst="rect">
+            <a:avLst/>
+          </a:prstGeom>
+        </p:spPr>
+        <p:style>
+          <a:lnRef idx="2">
+            <a:schemeClr val="accent5">
+              <a:shade val="50000"/>
+            </a:schemeClr>
+          </a:lnRef>
+          <a:fillRef idx="1">
+            <a:schemeClr val="accent5"/>
+          </a:fillRef>
+          <a:effectRef idx="0">
+            <a:schemeClr val="accent5"/>
+          </a:effectRef>
+          <a:fontRef idx="minor">
+            <a:schemeClr val="lt1"/>
+          </a:fontRef>
+        </p:style>
+        <p:txBody>
+          <a:bodyPr rtlCol="0" anchor="ctr"/>
+          <a:lstStyle/>
+          <a:p>
+            <a:pPr algn="ctr"/>
+            <a:r>
+              <a:rPr lang="en-GB" sz="1200" dirty="0"/>
+              <a:t>H2Console</a:t>
+            </a:r>
+          </a:p>
+        </p:txBody>
+      </p:sp>
+    </p:spTree>
+    <p:extLst>
+      <p:ext uri="{BB962C8B-B14F-4D97-AF65-F5344CB8AC3E}">
+        <p14:creationId xmlns:p14="http://schemas.microsoft.com/office/powerpoint/2010/main" val="2252395404"/>
+      </p:ext>
+    </p:extLst>
+  </p:cSld>
+  <p:clrMapOvr>
+    <a:masterClrMapping/>
+  </p:clrMapOvr>
+</p:sld>
+</file>
+
+<file path=ppt/slides/slide2.xml><?xml version="1.0" encoding="utf-8"?>
+<p:sld xmlns:a="http://schemas.openxmlformats.org/drawingml/2006/main" xmlns:r="http://schemas.openxmlformats.org/officeDocument/2006/relationships" xmlns:p="http://schemas.openxmlformats.org/presentationml/2006/main">
+  <p:cSld>
+    <p:spTree>
+      <p:nvGrpSpPr>
+        <p:cNvPr id="1" name=""/>
+        <p:cNvGrpSpPr/>
+        <p:nvPr/>
+      </p:nvGrpSpPr>
+      <p:grpSpPr>
+        <a:xfrm>
+          <a:off x="0" y="0"/>
+          <a:ext cx="0" cy="0"/>
+          <a:chOff x="0" y="0"/>
+          <a:chExt cx="0" cy="0"/>
+        </a:xfrm>
+      </p:grpSpPr>
+      <p:sp>
+        <p:nvSpPr>
+          <p:cNvPr id="452" name="Rectangle 451">
+            <a:extLst>
+              <a:ext uri="{FF2B5EF4-FFF2-40B4-BE49-F238E27FC236}">
+                <a16:creationId xmlns:a16="http://schemas.microsoft.com/office/drawing/2014/main" id="{D9ADC600-60E4-4E1F-B34B-1A0471DEB050}"/>
+              </a:ext>
+            </a:extLst>
+          </p:cNvPr>
+          <p:cNvSpPr/>
+          <p:nvPr/>
+        </p:nvSpPr>
+        <p:spPr>
+          <a:xfrm>
+            <a:off x="-9697" y="5269201"/>
+            <a:ext cx="3372065" cy="1605201"/>
+          </a:xfrm>
+          <a:prstGeom prst="rect">
+            <a:avLst/>
+          </a:prstGeom>
+          <a:solidFill>
+            <a:schemeClr val="bg1">
+              <a:lumMod val="95000"/>
+            </a:schemeClr>
+          </a:solidFill>
+          <a:ln>
+            <a:solidFill>
+              <a:schemeClr val="bg1">
+                <a:lumMod val="75000"/>
+              </a:schemeClr>
+            </a:solidFill>
+          </a:ln>
+        </p:spPr>
+        <p:style>
+          <a:lnRef idx="2">
+            <a:schemeClr val="accent3">
+              <a:shade val="50000"/>
+            </a:schemeClr>
+          </a:lnRef>
+          <a:fillRef idx="1">
+            <a:schemeClr val="accent3"/>
+          </a:fillRef>
+          <a:effectRef idx="0">
+            <a:schemeClr val="accent3"/>
+          </a:effectRef>
+          <a:fontRef idx="minor">
+            <a:schemeClr val="lt1"/>
+          </a:fontRef>
+        </p:style>
+        <p:txBody>
+          <a:bodyPr rtlCol="0" anchor="t" anchorCtr="0"/>
+          <a:lstStyle/>
+          <a:p>
+            <a:pPr algn="r"/>
+            <a:r>
+              <a:rPr lang="en-GB" sz="1200" dirty="0">
+                <a:ln w="0"/>
+                <a:solidFill>
+                  <a:schemeClr val="tx1"/>
+                </a:solidFill>
+                <a:effectLst>
+                  <a:outerShdw blurRad="38100" dist="19050" dir="2700000" algn="tl" rotWithShape="0">
+                    <a:schemeClr val="dk1">
+                      <a:alpha val="40000"/>
+                    </a:schemeClr>
+                  </a:outerShdw>
+                </a:effectLst>
+              </a:rPr>
+              <a:t>Key</a:t>
+            </a:r>
+            <a:endParaRPr lang="en-GB" sz="1200" dirty="0"/>
+          </a:p>
+        </p:txBody>
+      </p:sp>
+      <p:sp>
+        <p:nvSpPr>
+          <p:cNvPr id="9" name="Rectangle 8">
+            <a:extLst>
+              <a:ext uri="{FF2B5EF4-FFF2-40B4-BE49-F238E27FC236}">
+                <a16:creationId xmlns:a16="http://schemas.microsoft.com/office/drawing/2014/main" id="{3575A359-CD62-4416-8337-ACCC97F8F76E}"/>
+              </a:ext>
+            </a:extLst>
+          </p:cNvPr>
+          <p:cNvSpPr/>
+          <p:nvPr/>
+        </p:nvSpPr>
+        <p:spPr>
+          <a:xfrm>
+            <a:off x="10456674" y="1747588"/>
+            <a:ext cx="1240231" cy="486032"/>
+          </a:xfrm>
+          <a:prstGeom prst="rect">
+            <a:avLst/>
+          </a:prstGeom>
+        </p:spPr>
+        <p:style>
+          <a:lnRef idx="2">
+            <a:schemeClr val="accent1">
+              <a:shade val="50000"/>
+            </a:schemeClr>
+          </a:lnRef>
+          <a:fillRef idx="1">
+            <a:schemeClr val="accent1"/>
+          </a:fillRef>
+          <a:effectRef idx="0">
+            <a:schemeClr val="accent1"/>
+          </a:effectRef>
+          <a:fontRef idx="minor">
+            <a:schemeClr val="lt1"/>
+          </a:fontRef>
+        </p:style>
+        <p:txBody>
+          <a:bodyPr rtlCol="0" anchor="ctr"/>
+          <a:lstStyle/>
+          <a:p>
+            <a:pPr algn="ctr"/>
+            <a:r>
+              <a:rPr lang="en-GB" sz="1200" dirty="0" err="1"/>
+              <a:t>SpringBoot</a:t>
+            </a:r>
+            <a:endParaRPr lang="en-GB" sz="1200" dirty="0"/>
+          </a:p>
+        </p:txBody>
+      </p:sp>
+      <p:sp>
+        <p:nvSpPr>
+          <p:cNvPr id="14" name="Rectangle 13">
+            <a:extLst>
+              <a:ext uri="{FF2B5EF4-FFF2-40B4-BE49-F238E27FC236}">
+                <a16:creationId xmlns:a16="http://schemas.microsoft.com/office/drawing/2014/main" id="{F5E9154C-00CF-4857-BF05-29BC97B261E0}"/>
+              </a:ext>
+            </a:extLst>
+          </p:cNvPr>
+          <p:cNvSpPr/>
+          <p:nvPr/>
+        </p:nvSpPr>
+        <p:spPr>
+          <a:xfrm>
+            <a:off x="10462067" y="3268323"/>
+            <a:ext cx="1240231" cy="486032"/>
+          </a:xfrm>
+          <a:prstGeom prst="rect">
+            <a:avLst/>
+          </a:prstGeom>
+        </p:spPr>
+        <p:style>
+          <a:lnRef idx="2">
+            <a:schemeClr val="accent1">
+              <a:shade val="50000"/>
+            </a:schemeClr>
+          </a:lnRef>
+          <a:fillRef idx="1">
+            <a:schemeClr val="accent1"/>
+          </a:fillRef>
+          <a:effectRef idx="0">
+            <a:schemeClr val="accent1"/>
+          </a:effectRef>
+          <a:fontRef idx="minor">
+            <a:schemeClr val="lt1"/>
+          </a:fontRef>
+        </p:style>
+        <p:txBody>
+          <a:bodyPr rtlCol="0" anchor="ctr"/>
+          <a:lstStyle/>
+          <a:p>
+            <a:pPr algn="ctr"/>
+            <a:r>
+              <a:rPr lang="en-GB" sz="1200" dirty="0"/>
+              <a:t>Security</a:t>
+            </a:r>
+            <a:br>
+              <a:rPr lang="en-GB" sz="1200" dirty="0"/>
+            </a:br>
+            <a:r>
+              <a:rPr lang="en-GB" sz="1200" dirty="0"/>
+              <a:t>Shiro</a:t>
+            </a:r>
+          </a:p>
+        </p:txBody>
+      </p:sp>
+      <p:sp>
+        <p:nvSpPr>
+          <p:cNvPr id="15" name="Rectangle 14">
+            <a:extLst>
+              <a:ext uri="{FF2B5EF4-FFF2-40B4-BE49-F238E27FC236}">
+                <a16:creationId xmlns:a16="http://schemas.microsoft.com/office/drawing/2014/main" id="{F73E0802-B509-4EB9-847E-233480A355E1}"/>
+              </a:ext>
+            </a:extLst>
+          </p:cNvPr>
+          <p:cNvSpPr/>
+          <p:nvPr/>
+        </p:nvSpPr>
+        <p:spPr>
+          <a:xfrm>
+            <a:off x="10452574" y="1147692"/>
+            <a:ext cx="1240231" cy="486032"/>
+          </a:xfrm>
+          <a:prstGeom prst="rect">
+            <a:avLst/>
+          </a:prstGeom>
+        </p:spPr>
+        <p:style>
+          <a:lnRef idx="2">
+            <a:schemeClr val="accent1">
+              <a:shade val="50000"/>
+            </a:schemeClr>
+          </a:lnRef>
+          <a:fillRef idx="1">
+            <a:schemeClr val="accent1"/>
+          </a:fillRef>
+          <a:effectRef idx="0">
+            <a:schemeClr val="accent1"/>
+          </a:effectRef>
+          <a:fontRef idx="minor">
+            <a:schemeClr val="lt1"/>
+          </a:fontRef>
+        </p:style>
+        <p:txBody>
+          <a:bodyPr rtlCol="0" anchor="ctr"/>
+          <a:lstStyle/>
+          <a:p>
+            <a:pPr algn="ctr"/>
+            <a:r>
+              <a:rPr lang="en-GB" sz="1200" dirty="0" err="1"/>
+              <a:t>Jdo</a:t>
+            </a:r>
+            <a:br>
+              <a:rPr lang="en-GB" sz="1200" dirty="0"/>
+            </a:br>
+            <a:r>
+              <a:rPr lang="en-GB" sz="1200" dirty="0"/>
+              <a:t>DataNucleus5</a:t>
+            </a:r>
+          </a:p>
+        </p:txBody>
+      </p:sp>
+      <p:sp>
+        <p:nvSpPr>
+          <p:cNvPr id="20" name="Rectangle 19">
+            <a:extLst>
+              <a:ext uri="{FF2B5EF4-FFF2-40B4-BE49-F238E27FC236}">
+                <a16:creationId xmlns:a16="http://schemas.microsoft.com/office/drawing/2014/main" id="{A4CB25D0-CCE8-4562-840D-18B17FB16980}"/>
+              </a:ext>
+            </a:extLst>
+          </p:cNvPr>
+          <p:cNvSpPr/>
+          <p:nvPr/>
+        </p:nvSpPr>
+        <p:spPr>
+          <a:xfrm>
+            <a:off x="7650024" y="3302459"/>
+            <a:ext cx="1240231" cy="486032"/>
+          </a:xfrm>
+          <a:prstGeom prst="rect">
+            <a:avLst/>
+          </a:prstGeom>
+        </p:spPr>
+        <p:style>
+          <a:lnRef idx="2">
+            <a:schemeClr val="accent1">
+              <a:shade val="50000"/>
+            </a:schemeClr>
+          </a:lnRef>
+          <a:fillRef idx="1">
+            <a:schemeClr val="accent1"/>
+          </a:fillRef>
+          <a:effectRef idx="0">
+            <a:schemeClr val="accent1"/>
+          </a:effectRef>
+          <a:fontRef idx="minor">
+            <a:schemeClr val="lt1"/>
+          </a:fontRef>
+        </p:style>
+        <p:txBody>
+          <a:bodyPr rtlCol="0" anchor="ctr"/>
+          <a:lstStyle/>
+          <a:p>
+            <a:pPr algn="ctr"/>
+            <a:r>
+              <a:rPr lang="en-GB" sz="1200" dirty="0"/>
+              <a:t>WebApp</a:t>
+            </a:r>
+          </a:p>
+        </p:txBody>
+      </p:sp>
+      <p:sp>
+        <p:nvSpPr>
+          <p:cNvPr id="80" name="Rectangle 79">
+            <a:extLst>
+              <a:ext uri="{FF2B5EF4-FFF2-40B4-BE49-F238E27FC236}">
+                <a16:creationId xmlns:a16="http://schemas.microsoft.com/office/drawing/2014/main" id="{8BA66BC8-5B57-42F2-B0B6-BBDFB803C19B}"/>
+              </a:ext>
+            </a:extLst>
+          </p:cNvPr>
+          <p:cNvSpPr/>
+          <p:nvPr/>
+        </p:nvSpPr>
+        <p:spPr>
+          <a:xfrm>
+            <a:off x="2607980" y="1526373"/>
+            <a:ext cx="1240231" cy="486032"/>
+          </a:xfrm>
+          <a:prstGeom prst="rect">
+            <a:avLst/>
+          </a:prstGeom>
+        </p:spPr>
+        <p:style>
+          <a:lnRef idx="2">
+            <a:schemeClr val="accent6">
+              <a:shade val="50000"/>
+            </a:schemeClr>
+          </a:lnRef>
+          <a:fillRef idx="1">
+            <a:schemeClr val="accent6"/>
+          </a:fillRef>
+          <a:effectRef idx="0">
+            <a:schemeClr val="accent6"/>
+          </a:effectRef>
+          <a:fontRef idx="minor">
+            <a:schemeClr val="lt1"/>
+          </a:fontRef>
+        </p:style>
+        <p:txBody>
+          <a:bodyPr rtlCol="0" anchor="ctr"/>
+          <a:lstStyle/>
+          <a:p>
+            <a:pPr algn="ctr"/>
+            <a:r>
+              <a:rPr lang="en-GB" sz="1200" dirty="0" err="1"/>
+              <a:t>Applib</a:t>
+            </a:r>
+            <a:endParaRPr lang="en-GB" sz="1200" dirty="0"/>
+          </a:p>
+        </p:txBody>
+      </p:sp>
+      <p:sp>
+        <p:nvSpPr>
+          <p:cNvPr id="81" name="Rectangle 80">
+            <a:extLst>
+              <a:ext uri="{FF2B5EF4-FFF2-40B4-BE49-F238E27FC236}">
+                <a16:creationId xmlns:a16="http://schemas.microsoft.com/office/drawing/2014/main" id="{9628B3BA-B27E-4A22-82C8-2C262BA1DABF}"/>
+              </a:ext>
+            </a:extLst>
+          </p:cNvPr>
+          <p:cNvSpPr/>
+          <p:nvPr/>
+        </p:nvSpPr>
+        <p:spPr>
+          <a:xfrm>
+            <a:off x="4337895" y="2762055"/>
+            <a:ext cx="1240231" cy="486032"/>
+          </a:xfrm>
+          <a:prstGeom prst="rect">
+            <a:avLst/>
+          </a:prstGeom>
+        </p:spPr>
+        <p:style>
+          <a:lnRef idx="2">
+            <a:schemeClr val="accent1">
+              <a:shade val="50000"/>
+            </a:schemeClr>
+          </a:lnRef>
+          <a:fillRef idx="1">
+            <a:schemeClr val="accent1"/>
+          </a:fillRef>
+          <a:effectRef idx="0">
+            <a:schemeClr val="accent1"/>
+          </a:effectRef>
+          <a:fontRef idx="minor">
+            <a:schemeClr val="lt1"/>
+          </a:fontRef>
+        </p:style>
+        <p:txBody>
+          <a:bodyPr rtlCol="0" anchor="ctr"/>
+          <a:lstStyle/>
+          <a:p>
+            <a:pPr algn="ctr"/>
+            <a:r>
+              <a:rPr lang="en-GB" sz="1200" dirty="0"/>
+              <a:t>Metamodel</a:t>
+            </a:r>
+          </a:p>
+        </p:txBody>
+      </p:sp>
+      <p:sp>
+        <p:nvSpPr>
+          <p:cNvPr id="83" name="Rectangle 82">
+            <a:extLst>
+              <a:ext uri="{FF2B5EF4-FFF2-40B4-BE49-F238E27FC236}">
+                <a16:creationId xmlns:a16="http://schemas.microsoft.com/office/drawing/2014/main" id="{A4DD96EA-3E39-4D05-A946-0B7EDF5A51A1}"/>
+              </a:ext>
+            </a:extLst>
+          </p:cNvPr>
+          <p:cNvSpPr/>
+          <p:nvPr/>
+        </p:nvSpPr>
+        <p:spPr>
+          <a:xfrm>
+            <a:off x="5831350" y="2157575"/>
+            <a:ext cx="1240231" cy="486032"/>
+          </a:xfrm>
+          <a:prstGeom prst="rect">
+            <a:avLst/>
+          </a:prstGeom>
+        </p:spPr>
+        <p:style>
+          <a:lnRef idx="2">
+            <a:schemeClr val="accent1">
+              <a:shade val="50000"/>
+            </a:schemeClr>
+          </a:lnRef>
+          <a:fillRef idx="1">
+            <a:schemeClr val="accent1"/>
+          </a:fillRef>
+          <a:effectRef idx="0">
+            <a:schemeClr val="accent1"/>
+          </a:effectRef>
+          <a:fontRef idx="minor">
+            <a:schemeClr val="lt1"/>
+          </a:fontRef>
+        </p:style>
+        <p:txBody>
+          <a:bodyPr rtlCol="0" anchor="ctr"/>
+          <a:lstStyle/>
+          <a:p>
+            <a:pPr algn="ctr"/>
+            <a:r>
+              <a:rPr lang="en-GB" sz="1200" dirty="0"/>
+              <a:t>Runtime</a:t>
+            </a:r>
+          </a:p>
+        </p:txBody>
+      </p:sp>
+      <p:cxnSp>
+        <p:nvCxnSpPr>
+          <p:cNvPr id="84" name="Connector: Curved 83">
+            <a:extLst>
+              <a:ext uri="{FF2B5EF4-FFF2-40B4-BE49-F238E27FC236}">
+                <a16:creationId xmlns:a16="http://schemas.microsoft.com/office/drawing/2014/main" id="{6484D11A-DBAB-4364-B77A-37674B39B183}"/>
+              </a:ext>
+            </a:extLst>
+          </p:cNvPr>
+          <p:cNvCxnSpPr>
+            <a:cxnSpLocks/>
+            <a:stCxn id="81" idx="1"/>
+            <a:endCxn id="80" idx="3"/>
+          </p:cNvCxnSpPr>
+          <p:nvPr/>
+        </p:nvCxnSpPr>
+        <p:spPr>
+          <a:xfrm rot="10800000">
+            <a:off x="3848211" y="1769389"/>
+            <a:ext cx="489684" cy="1235682"/>
+          </a:xfrm>
+          <a:prstGeom prst="curvedConnector3">
+            <a:avLst>
+              <a:gd name="adj1" fmla="val 50000"/>
+            </a:avLst>
+          </a:prstGeom>
+          <a:ln>
+            <a:prstDash val="solid"/>
+            <a:tailEnd type="triangle"/>
+          </a:ln>
+        </p:spPr>
+        <p:style>
+          <a:lnRef idx="1">
+            <a:schemeClr val="accent1"/>
+          </a:lnRef>
+          <a:fillRef idx="0">
+            <a:schemeClr val="accent1"/>
+          </a:fillRef>
+          <a:effectRef idx="0">
+            <a:schemeClr val="accent1"/>
+          </a:effectRef>
+          <a:fontRef idx="minor">
+            <a:schemeClr val="tx1"/>
+          </a:fontRef>
+        </p:style>
+      </p:cxnSp>
+      <p:cxnSp>
+        <p:nvCxnSpPr>
+          <p:cNvPr id="90" name="Connector: Curved 89">
+            <a:extLst>
+              <a:ext uri="{FF2B5EF4-FFF2-40B4-BE49-F238E27FC236}">
+                <a16:creationId xmlns:a16="http://schemas.microsoft.com/office/drawing/2014/main" id="{87E4CFA5-AF76-42C7-A763-3D44C7292444}"/>
+              </a:ext>
+            </a:extLst>
+          </p:cNvPr>
+          <p:cNvCxnSpPr>
+            <a:cxnSpLocks/>
+            <a:stCxn id="83" idx="1"/>
+            <a:endCxn id="81" idx="3"/>
+          </p:cNvCxnSpPr>
+          <p:nvPr/>
+        </p:nvCxnSpPr>
+        <p:spPr>
+          <a:xfrm rot="10800000" flipV="1">
+            <a:off x="5578126" y="2400591"/>
+            <a:ext cx="253224" cy="604480"/>
+          </a:xfrm>
+          <a:prstGeom prst="curvedConnector3">
+            <a:avLst>
+              <a:gd name="adj1" fmla="val 50000"/>
+            </a:avLst>
+          </a:prstGeom>
+          <a:ln>
+            <a:prstDash val="solid"/>
+            <a:tailEnd type="triangle"/>
+          </a:ln>
+        </p:spPr>
+        <p:style>
+          <a:lnRef idx="1">
+            <a:schemeClr val="accent1"/>
+          </a:lnRef>
+          <a:fillRef idx="0">
+            <a:schemeClr val="accent1"/>
+          </a:fillRef>
+          <a:effectRef idx="0">
+            <a:schemeClr val="accent1"/>
+          </a:effectRef>
+          <a:fontRef idx="minor">
+            <a:schemeClr val="tx1"/>
+          </a:fontRef>
+        </p:style>
+      </p:cxnSp>
+      <p:cxnSp>
+        <p:nvCxnSpPr>
+          <p:cNvPr id="93" name="Connector: Curved 92">
+            <a:extLst>
+              <a:ext uri="{FF2B5EF4-FFF2-40B4-BE49-F238E27FC236}">
+                <a16:creationId xmlns:a16="http://schemas.microsoft.com/office/drawing/2014/main" id="{9490D9E0-ABAC-46C9-9164-37B6D5C8FF84}"/>
+              </a:ext>
+            </a:extLst>
+          </p:cNvPr>
+          <p:cNvCxnSpPr>
+            <a:cxnSpLocks/>
+            <a:stCxn id="99" idx="1"/>
+            <a:endCxn id="83" idx="3"/>
+          </p:cNvCxnSpPr>
+          <p:nvPr/>
+        </p:nvCxnSpPr>
+        <p:spPr>
+          <a:xfrm rot="10800000">
+            <a:off x="7071582" y="2400591"/>
+            <a:ext cx="553915" cy="349578"/>
+          </a:xfrm>
+          <a:prstGeom prst="curvedConnector3">
+            <a:avLst>
+              <a:gd name="adj1" fmla="val 50000"/>
+            </a:avLst>
+          </a:prstGeom>
+          <a:ln>
+            <a:prstDash val="solid"/>
+            <a:tailEnd type="triangle"/>
+          </a:ln>
+        </p:spPr>
+        <p:style>
+          <a:lnRef idx="1">
+            <a:schemeClr val="accent1"/>
+          </a:lnRef>
+          <a:fillRef idx="0">
+            <a:schemeClr val="accent1"/>
+          </a:fillRef>
+          <a:effectRef idx="0">
+            <a:schemeClr val="accent1"/>
+          </a:effectRef>
+          <a:fontRef idx="minor">
+            <a:schemeClr val="tx1"/>
+          </a:fontRef>
+        </p:style>
+      </p:cxnSp>
+      <p:sp>
+        <p:nvSpPr>
+          <p:cNvPr id="99" name="Rectangle 98">
+            <a:extLst>
+              <a:ext uri="{FF2B5EF4-FFF2-40B4-BE49-F238E27FC236}">
+                <a16:creationId xmlns:a16="http://schemas.microsoft.com/office/drawing/2014/main" id="{9411BEDB-9F4E-48A0-802D-3363014B0B78}"/>
+              </a:ext>
+            </a:extLst>
+          </p:cNvPr>
+          <p:cNvSpPr/>
+          <p:nvPr/>
+        </p:nvSpPr>
+        <p:spPr>
+          <a:xfrm>
+            <a:off x="7625496" y="2507153"/>
+            <a:ext cx="1240231" cy="486032"/>
+          </a:xfrm>
+          <a:prstGeom prst="rect">
+            <a:avLst/>
+          </a:prstGeom>
+        </p:spPr>
+        <p:style>
+          <a:lnRef idx="2">
+            <a:schemeClr val="accent1">
+              <a:shade val="50000"/>
+            </a:schemeClr>
+          </a:lnRef>
+          <a:fillRef idx="1">
+            <a:schemeClr val="accent1"/>
+          </a:fillRef>
+          <a:effectRef idx="0">
+            <a:schemeClr val="accent1"/>
+          </a:effectRef>
+          <a:fontRef idx="minor">
+            <a:schemeClr val="lt1"/>
+          </a:fontRef>
+        </p:style>
+        <p:txBody>
+          <a:bodyPr rtlCol="0" anchor="ctr"/>
+          <a:lstStyle/>
+          <a:p>
+            <a:pPr algn="ctr"/>
+            <a:r>
+              <a:rPr lang="en-GB" sz="1200" dirty="0"/>
+              <a:t>Runtime</a:t>
+            </a:r>
+            <a:br>
+              <a:rPr lang="en-GB" sz="1200" dirty="0"/>
+            </a:br>
+            <a:r>
+              <a:rPr lang="en-GB" sz="1200" dirty="0"/>
+              <a:t>Services</a:t>
+            </a:r>
+          </a:p>
+        </p:txBody>
+      </p:sp>
+      <p:cxnSp>
+        <p:nvCxnSpPr>
+          <p:cNvPr id="101" name="Connector: Curved 100">
+            <a:extLst>
+              <a:ext uri="{FF2B5EF4-FFF2-40B4-BE49-F238E27FC236}">
+                <a16:creationId xmlns:a16="http://schemas.microsoft.com/office/drawing/2014/main" id="{32116EEB-BD70-457A-A7B4-0D5746ABEF16}"/>
+              </a:ext>
+            </a:extLst>
+          </p:cNvPr>
+          <p:cNvCxnSpPr>
+            <a:cxnSpLocks/>
+            <a:stCxn id="9" idx="1"/>
+            <a:endCxn id="233" idx="6"/>
+          </p:cNvCxnSpPr>
+          <p:nvPr/>
+        </p:nvCxnSpPr>
+        <p:spPr>
+          <a:xfrm rot="10800000" flipV="1">
+            <a:off x="9624668" y="1990604"/>
+            <a:ext cx="832006" cy="632118"/>
+          </a:xfrm>
+          <a:prstGeom prst="curvedConnector3">
+            <a:avLst>
+              <a:gd name="adj1" fmla="val 50000"/>
+            </a:avLst>
+          </a:prstGeom>
+          <a:ln>
+            <a:prstDash val="solid"/>
+            <a:tailEnd type="triangle"/>
+          </a:ln>
+        </p:spPr>
+        <p:style>
+          <a:lnRef idx="1">
+            <a:schemeClr val="accent1"/>
+          </a:lnRef>
+          <a:fillRef idx="0">
+            <a:schemeClr val="accent1"/>
+          </a:fillRef>
+          <a:effectRef idx="0">
+            <a:schemeClr val="accent1"/>
+          </a:effectRef>
+          <a:fontRef idx="minor">
+            <a:schemeClr val="tx1"/>
+          </a:fontRef>
+        </p:style>
+      </p:cxnSp>
+      <p:sp>
+        <p:nvSpPr>
+          <p:cNvPr id="111" name="Rectangle 110">
+            <a:extLst>
+              <a:ext uri="{FF2B5EF4-FFF2-40B4-BE49-F238E27FC236}">
+                <a16:creationId xmlns:a16="http://schemas.microsoft.com/office/drawing/2014/main" id="{9D4E7237-01E5-4455-A567-99B66E54CF3B}"/>
+              </a:ext>
+            </a:extLst>
+          </p:cNvPr>
+          <p:cNvSpPr/>
+          <p:nvPr/>
+        </p:nvSpPr>
+        <p:spPr>
+          <a:xfrm>
+            <a:off x="1785517" y="2258629"/>
+            <a:ext cx="1240231" cy="486032"/>
+          </a:xfrm>
+          <a:prstGeom prst="rect">
+            <a:avLst/>
+          </a:prstGeom>
+        </p:spPr>
+        <p:style>
+          <a:lnRef idx="2">
+            <a:schemeClr val="accent1">
+              <a:shade val="50000"/>
+            </a:schemeClr>
+          </a:lnRef>
+          <a:fillRef idx="1">
+            <a:schemeClr val="accent1"/>
+          </a:fillRef>
+          <a:effectRef idx="0">
+            <a:schemeClr val="accent1"/>
+          </a:effectRef>
+          <a:fontRef idx="minor">
+            <a:schemeClr val="lt1"/>
+          </a:fontRef>
+        </p:style>
+        <p:txBody>
+          <a:bodyPr rtlCol="0" anchor="ctr"/>
+          <a:lstStyle/>
+          <a:p>
+            <a:pPr algn="ctr"/>
+            <a:r>
+              <a:rPr lang="en-GB" sz="1200" dirty="0"/>
+              <a:t>Config</a:t>
+            </a:r>
+          </a:p>
+        </p:txBody>
+      </p:sp>
+      <p:sp>
+        <p:nvSpPr>
+          <p:cNvPr id="120" name="Rectangle 119">
+            <a:extLst>
+              <a:ext uri="{FF2B5EF4-FFF2-40B4-BE49-F238E27FC236}">
+                <a16:creationId xmlns:a16="http://schemas.microsoft.com/office/drawing/2014/main" id="{C37653D5-41D4-4C2D-82D7-604F34FD559F}"/>
+              </a:ext>
+            </a:extLst>
+          </p:cNvPr>
+          <p:cNvSpPr/>
+          <p:nvPr/>
+        </p:nvSpPr>
+        <p:spPr>
+          <a:xfrm>
+            <a:off x="122425" y="5728233"/>
+            <a:ext cx="1089327" cy="369134"/>
+          </a:xfrm>
+          <a:prstGeom prst="rect">
+            <a:avLst/>
+          </a:prstGeom>
+        </p:spPr>
+        <p:style>
+          <a:lnRef idx="2">
+            <a:schemeClr val="accent1">
+              <a:shade val="50000"/>
+            </a:schemeClr>
+          </a:lnRef>
+          <a:fillRef idx="1">
+            <a:schemeClr val="accent1"/>
+          </a:fillRef>
+          <a:effectRef idx="0">
+            <a:schemeClr val="accent1"/>
+          </a:effectRef>
+          <a:fontRef idx="minor">
+            <a:schemeClr val="lt1"/>
+          </a:fontRef>
+        </p:style>
+        <p:txBody>
+          <a:bodyPr rtlCol="0" anchor="ctr"/>
+          <a:lstStyle/>
+          <a:p>
+            <a:pPr algn="ctr"/>
+            <a:r>
+              <a:rPr lang="en-GB" sz="1050" dirty="0"/>
+              <a:t>@Configuration</a:t>
+            </a:r>
+            <a:br>
+              <a:rPr lang="en-GB" sz="1050" dirty="0"/>
+            </a:br>
+            <a:r>
+              <a:rPr lang="en-GB" sz="1050" dirty="0"/>
+              <a:t>core</a:t>
+            </a:r>
+          </a:p>
+        </p:txBody>
+      </p:sp>
+      <p:cxnSp>
+        <p:nvCxnSpPr>
+          <p:cNvPr id="124" name="Connector: Curved 123">
+            <a:extLst>
+              <a:ext uri="{FF2B5EF4-FFF2-40B4-BE49-F238E27FC236}">
+                <a16:creationId xmlns:a16="http://schemas.microsoft.com/office/drawing/2014/main" id="{6DA8D7C9-FCEE-4A96-AD75-EC93B00E01F8}"/>
+              </a:ext>
+            </a:extLst>
+          </p:cNvPr>
+          <p:cNvCxnSpPr>
+            <a:cxnSpLocks/>
+            <a:stCxn id="81" idx="1"/>
+            <a:endCxn id="111" idx="3"/>
+          </p:cNvCxnSpPr>
+          <p:nvPr/>
+        </p:nvCxnSpPr>
+        <p:spPr>
+          <a:xfrm rot="10800000">
+            <a:off x="3025749" y="2501645"/>
+            <a:ext cx="1312147" cy="503426"/>
+          </a:xfrm>
+          <a:prstGeom prst="curvedConnector3">
+            <a:avLst>
+              <a:gd name="adj1" fmla="val 50000"/>
+            </a:avLst>
+          </a:prstGeom>
+          <a:ln>
+            <a:prstDash val="solid"/>
+            <a:tailEnd type="triangle"/>
+          </a:ln>
+        </p:spPr>
+        <p:style>
+          <a:lnRef idx="1">
+            <a:schemeClr val="accent1"/>
+          </a:lnRef>
+          <a:fillRef idx="0">
+            <a:schemeClr val="accent1"/>
+          </a:fillRef>
+          <a:effectRef idx="0">
+            <a:schemeClr val="accent1"/>
+          </a:effectRef>
+          <a:fontRef idx="minor">
+            <a:schemeClr val="tx1"/>
+          </a:fontRef>
+        </p:style>
+      </p:cxnSp>
+      <p:sp>
+        <p:nvSpPr>
+          <p:cNvPr id="128" name="Rectangle 127">
+            <a:extLst>
+              <a:ext uri="{FF2B5EF4-FFF2-40B4-BE49-F238E27FC236}">
+                <a16:creationId xmlns:a16="http://schemas.microsoft.com/office/drawing/2014/main" id="{52CE5F89-45D5-404C-9C59-750E81FF00FA}"/>
+              </a:ext>
+            </a:extLst>
+          </p:cNvPr>
+          <p:cNvSpPr/>
+          <p:nvPr/>
+        </p:nvSpPr>
+        <p:spPr>
+          <a:xfrm>
+            <a:off x="121764" y="3044430"/>
+            <a:ext cx="1240231" cy="486032"/>
+          </a:xfrm>
+          <a:prstGeom prst="rect">
+            <a:avLst/>
+          </a:prstGeom>
+        </p:spPr>
+        <p:style>
+          <a:lnRef idx="2">
+            <a:schemeClr val="accent4">
+              <a:shade val="50000"/>
+            </a:schemeClr>
+          </a:lnRef>
+          <a:fillRef idx="1">
+            <a:schemeClr val="accent4"/>
+          </a:fillRef>
+          <a:effectRef idx="0">
+            <a:schemeClr val="accent4"/>
+          </a:effectRef>
+          <a:fontRef idx="minor">
+            <a:schemeClr val="lt1"/>
+          </a:fontRef>
+        </p:style>
+        <p:txBody>
+          <a:bodyPr rtlCol="0" anchor="ctr"/>
+          <a:lstStyle/>
+          <a:p>
+            <a:pPr algn="ctr"/>
+            <a:r>
+              <a:rPr lang="en-GB" sz="1200" dirty="0" err="1"/>
+              <a:t>IsisConfiguration</a:t>
+            </a:r>
+            <a:endParaRPr lang="en-GB" sz="1200" dirty="0"/>
+          </a:p>
+        </p:txBody>
+      </p:sp>
+      <p:sp>
+        <p:nvSpPr>
+          <p:cNvPr id="129" name="Rectangle 128">
+            <a:extLst>
+              <a:ext uri="{FF2B5EF4-FFF2-40B4-BE49-F238E27FC236}">
+                <a16:creationId xmlns:a16="http://schemas.microsoft.com/office/drawing/2014/main" id="{8DBE7C89-BD25-4085-8230-A1ABAD594AE3}"/>
+              </a:ext>
+            </a:extLst>
+          </p:cNvPr>
+          <p:cNvSpPr/>
+          <p:nvPr/>
+        </p:nvSpPr>
+        <p:spPr>
+          <a:xfrm>
+            <a:off x="1398049" y="6240264"/>
+            <a:ext cx="1089327" cy="369134"/>
+          </a:xfrm>
+          <a:prstGeom prst="rect">
+            <a:avLst/>
+          </a:prstGeom>
+        </p:spPr>
+        <p:style>
+          <a:lnRef idx="2">
+            <a:schemeClr val="accent4">
+              <a:shade val="50000"/>
+            </a:schemeClr>
+          </a:lnRef>
+          <a:fillRef idx="1">
+            <a:schemeClr val="accent4"/>
+          </a:fillRef>
+          <a:effectRef idx="0">
+            <a:schemeClr val="accent4"/>
+          </a:effectRef>
+          <a:fontRef idx="minor">
+            <a:schemeClr val="lt1"/>
+          </a:fontRef>
+        </p:style>
+        <p:txBody>
+          <a:bodyPr rtlCol="0" anchor="ctr"/>
+          <a:lstStyle/>
+          <a:p>
+            <a:pPr algn="ctr"/>
+            <a:r>
+              <a:rPr lang="en-GB" sz="1050" dirty="0"/>
+              <a:t>@Configuration</a:t>
+            </a:r>
+            <a:br>
+              <a:rPr lang="en-GB" sz="1050" dirty="0"/>
+            </a:br>
+            <a:r>
+              <a:rPr lang="en-GB" sz="1050" dirty="0"/>
+              <a:t>Properties</a:t>
+            </a:r>
+          </a:p>
+        </p:txBody>
+      </p:sp>
+      <p:cxnSp>
+        <p:nvCxnSpPr>
+          <p:cNvPr id="150" name="Connector: Curved 149">
+            <a:extLst>
+              <a:ext uri="{FF2B5EF4-FFF2-40B4-BE49-F238E27FC236}">
+                <a16:creationId xmlns:a16="http://schemas.microsoft.com/office/drawing/2014/main" id="{7369A1C7-49E3-447F-9B5A-7E6D73E0A181}"/>
+              </a:ext>
+            </a:extLst>
+          </p:cNvPr>
+          <p:cNvCxnSpPr>
+            <a:cxnSpLocks/>
+            <a:stCxn id="111" idx="1"/>
+            <a:endCxn id="128" idx="3"/>
+          </p:cNvCxnSpPr>
+          <p:nvPr/>
+        </p:nvCxnSpPr>
+        <p:spPr>
+          <a:xfrm rot="10800000" flipV="1">
+            <a:off x="1361995" y="2501644"/>
+            <a:ext cx="423522" cy="785801"/>
+          </a:xfrm>
+          <a:prstGeom prst="curvedConnector3">
+            <a:avLst>
+              <a:gd name="adj1" fmla="val 50000"/>
+            </a:avLst>
+          </a:prstGeom>
+          <a:ln>
+            <a:prstDash val="lgDashDotDot"/>
+            <a:tailEnd type="triangle"/>
+          </a:ln>
+        </p:spPr>
+        <p:style>
+          <a:lnRef idx="1">
+            <a:schemeClr val="accent1"/>
+          </a:lnRef>
+          <a:fillRef idx="0">
+            <a:schemeClr val="accent1"/>
+          </a:fillRef>
+          <a:effectRef idx="0">
+            <a:schemeClr val="accent1"/>
+          </a:effectRef>
+          <a:fontRef idx="minor">
+            <a:schemeClr val="tx1"/>
+          </a:fontRef>
+        </p:style>
+      </p:cxnSp>
+      <p:sp>
+        <p:nvSpPr>
+          <p:cNvPr id="155" name="TextBox 154">
+            <a:extLst>
+              <a:ext uri="{FF2B5EF4-FFF2-40B4-BE49-F238E27FC236}">
+                <a16:creationId xmlns:a16="http://schemas.microsoft.com/office/drawing/2014/main" id="{BCBEB27F-C918-42D3-98C8-DF9BAC518E75}"/>
+              </a:ext>
+            </a:extLst>
+          </p:cNvPr>
+          <p:cNvSpPr txBox="1"/>
+          <p:nvPr/>
+        </p:nvSpPr>
+        <p:spPr>
+          <a:xfrm>
+            <a:off x="218107" y="2751154"/>
+            <a:ext cx="2240013" cy="253916"/>
+          </a:xfrm>
+          <a:prstGeom prst="rect">
+            <a:avLst/>
+          </a:prstGeom>
+          <a:noFill/>
+        </p:spPr>
+        <p:txBody>
+          <a:bodyPr wrap="square" rtlCol="0">
+            <a:spAutoFit/>
+          </a:bodyPr>
+          <a:lstStyle/>
+          <a:p>
+            <a:r>
+              <a:rPr lang="en-GB" sz="1050" dirty="0"/>
+              <a:t>@</a:t>
+            </a:r>
+            <a:r>
+              <a:rPr lang="en-GB" sz="1050" dirty="0" err="1"/>
+              <a:t>EnableConfigurationProperties</a:t>
+            </a:r>
+            <a:endParaRPr lang="en-GB" sz="1050" dirty="0"/>
+          </a:p>
+        </p:txBody>
+      </p:sp>
+      <p:sp>
+        <p:nvSpPr>
+          <p:cNvPr id="269" name="Rectangle 268">
+            <a:extLst>
+              <a:ext uri="{FF2B5EF4-FFF2-40B4-BE49-F238E27FC236}">
+                <a16:creationId xmlns:a16="http://schemas.microsoft.com/office/drawing/2014/main" id="{0354E88B-4A98-4BA9-93B2-416FEFC3BF41}"/>
+              </a:ext>
+            </a:extLst>
+          </p:cNvPr>
+          <p:cNvSpPr/>
+          <p:nvPr/>
+        </p:nvSpPr>
+        <p:spPr>
+          <a:xfrm>
+            <a:off x="10466167" y="2687535"/>
+            <a:ext cx="1240231" cy="486032"/>
+          </a:xfrm>
+          <a:prstGeom prst="rect">
+            <a:avLst/>
+          </a:prstGeom>
+        </p:spPr>
+        <p:style>
+          <a:lnRef idx="2">
+            <a:schemeClr val="accent1">
+              <a:shade val="50000"/>
+            </a:schemeClr>
+          </a:lnRef>
+          <a:fillRef idx="1">
+            <a:schemeClr val="accent1"/>
+          </a:fillRef>
+          <a:effectRef idx="0">
+            <a:schemeClr val="accent1"/>
+          </a:effectRef>
+          <a:fontRef idx="minor">
+            <a:schemeClr val="lt1"/>
+          </a:fontRef>
+        </p:style>
+        <p:txBody>
+          <a:bodyPr rot="0" spcFirstLastPara="0" vertOverflow="overflow" horzOverflow="overflow" vert="horz" wrap="square" lIns="91440" tIns="45720" rIns="91440" bIns="45720" numCol="1" spcCol="0" rtlCol="0" fromWordArt="0" anchor="ctr" anchorCtr="0" forceAA="0" compatLnSpc="1">
+            <a:prstTxWarp prst="textNoShape">
+              <a:avLst/>
+            </a:prstTxWarp>
+            <a:noAutofit/>
+          </a:bodyPr>
+          <a:lstStyle/>
+          <a:p>
+            <a:pPr algn="ctr"/>
+            <a:r>
+              <a:rPr lang="en-GB" sz="1200" dirty="0"/>
+              <a:t>Security</a:t>
+            </a:r>
+            <a:br>
+              <a:rPr lang="en-GB" sz="1200" dirty="0"/>
+            </a:br>
+            <a:r>
+              <a:rPr lang="en-GB" sz="1200" dirty="0"/>
+              <a:t>Bypass</a:t>
+            </a:r>
+          </a:p>
+        </p:txBody>
+      </p:sp>
+      <p:sp>
+        <p:nvSpPr>
+          <p:cNvPr id="114" name="Oval 113">
+            <a:extLst>
+              <a:ext uri="{FF2B5EF4-FFF2-40B4-BE49-F238E27FC236}">
+                <a16:creationId xmlns:a16="http://schemas.microsoft.com/office/drawing/2014/main" id="{8F0DEB79-4888-4DB9-8985-6BB7917CBBDC}"/>
+              </a:ext>
+            </a:extLst>
+          </p:cNvPr>
+          <p:cNvSpPr/>
+          <p:nvPr/>
+        </p:nvSpPr>
+        <p:spPr>
+          <a:xfrm>
+            <a:off x="90289" y="5389016"/>
+            <a:ext cx="177498" cy="189310"/>
+          </a:xfrm>
+          <a:prstGeom prst="ellipse">
+            <a:avLst/>
+          </a:prstGeom>
+        </p:spPr>
+        <p:style>
+          <a:lnRef idx="2">
+            <a:schemeClr val="accent6"/>
+          </a:lnRef>
+          <a:fillRef idx="1">
+            <a:schemeClr val="lt1"/>
+          </a:fillRef>
+          <a:effectRef idx="0">
+            <a:schemeClr val="accent6"/>
+          </a:effectRef>
+          <a:fontRef idx="minor">
+            <a:schemeClr val="dk1"/>
+          </a:fontRef>
+        </p:style>
+        <p:txBody>
+          <a:bodyPr rtlCol="0" anchor="ctr"/>
+          <a:lstStyle/>
+          <a:p>
+            <a:pPr algn="ctr"/>
+            <a:endParaRPr lang="en-GB"/>
+          </a:p>
+        </p:txBody>
+      </p:sp>
+      <p:sp>
+        <p:nvSpPr>
+          <p:cNvPr id="115" name="TextBox 114">
+            <a:extLst>
+              <a:ext uri="{FF2B5EF4-FFF2-40B4-BE49-F238E27FC236}">
+                <a16:creationId xmlns:a16="http://schemas.microsoft.com/office/drawing/2014/main" id="{6B5B04DF-5FB2-404C-9AB5-B0EE9A966812}"/>
+              </a:ext>
+            </a:extLst>
+          </p:cNvPr>
+          <p:cNvSpPr txBox="1"/>
+          <p:nvPr/>
+        </p:nvSpPr>
+        <p:spPr>
+          <a:xfrm>
+            <a:off x="279602" y="5269201"/>
+            <a:ext cx="943185" cy="415498"/>
+          </a:xfrm>
+          <a:prstGeom prst="rect">
+            <a:avLst/>
+          </a:prstGeom>
+          <a:noFill/>
+        </p:spPr>
+        <p:txBody>
+          <a:bodyPr wrap="square" rtlCol="0">
+            <a:spAutoFit/>
+          </a:bodyPr>
+          <a:lstStyle/>
+          <a:p>
+            <a:r>
+              <a:rPr lang="en-GB" sz="1050" dirty="0"/>
+              <a:t>common dependencies</a:t>
+            </a:r>
+          </a:p>
+        </p:txBody>
+      </p:sp>
+      <p:sp>
+        <p:nvSpPr>
+          <p:cNvPr id="123" name="Rectangle 122">
+            <a:extLst>
+              <a:ext uri="{FF2B5EF4-FFF2-40B4-BE49-F238E27FC236}">
+                <a16:creationId xmlns:a16="http://schemas.microsoft.com/office/drawing/2014/main" id="{7CA212B5-D148-4CEA-B3C2-FB7FAA771FBD}"/>
+              </a:ext>
+            </a:extLst>
+          </p:cNvPr>
+          <p:cNvSpPr/>
+          <p:nvPr/>
+        </p:nvSpPr>
+        <p:spPr>
+          <a:xfrm>
+            <a:off x="10466167" y="3848836"/>
+            <a:ext cx="1240231" cy="486032"/>
+          </a:xfrm>
+          <a:prstGeom prst="rect">
+            <a:avLst/>
+          </a:prstGeom>
+          <a:solidFill>
+            <a:srgbClr val="4472C4">
+              <a:alpha val="50196"/>
+            </a:srgbClr>
+          </a:solidFill>
+        </p:spPr>
+        <p:style>
+          <a:lnRef idx="2">
+            <a:schemeClr val="accent1">
+              <a:shade val="50000"/>
+            </a:schemeClr>
+          </a:lnRef>
+          <a:fillRef idx="1">
+            <a:schemeClr val="accent1"/>
+          </a:fillRef>
+          <a:effectRef idx="0">
+            <a:schemeClr val="accent1"/>
+          </a:effectRef>
+          <a:fontRef idx="minor">
+            <a:schemeClr val="lt1"/>
+          </a:fontRef>
+        </p:style>
+        <p:txBody>
+          <a:bodyPr rtlCol="0" anchor="ctr"/>
+          <a:lstStyle/>
+          <a:p>
+            <a:pPr algn="ctr"/>
+            <a:r>
+              <a:rPr lang="en-GB" sz="1200" dirty="0"/>
+              <a:t>Security</a:t>
+            </a:r>
+            <a:br>
+              <a:rPr lang="en-GB" sz="1200" dirty="0"/>
+            </a:br>
+            <a:r>
+              <a:rPr lang="en-GB" sz="1200" dirty="0"/>
+              <a:t>Keycloak</a:t>
+            </a:r>
+          </a:p>
+        </p:txBody>
+      </p:sp>
+      <p:sp>
+        <p:nvSpPr>
+          <p:cNvPr id="71" name="TextBox 70">
+            <a:extLst>
+              <a:ext uri="{FF2B5EF4-FFF2-40B4-BE49-F238E27FC236}">
+                <a16:creationId xmlns:a16="http://schemas.microsoft.com/office/drawing/2014/main" id="{9468C3BA-1104-4FAF-B227-156B513C306D}"/>
+              </a:ext>
+            </a:extLst>
+          </p:cNvPr>
+          <p:cNvSpPr txBox="1"/>
+          <p:nvPr/>
+        </p:nvSpPr>
+        <p:spPr>
+          <a:xfrm>
+            <a:off x="10277820" y="4343899"/>
+            <a:ext cx="1617328" cy="253916"/>
+          </a:xfrm>
+          <a:prstGeom prst="rect">
+            <a:avLst/>
+          </a:prstGeom>
+          <a:noFill/>
+        </p:spPr>
+        <p:txBody>
+          <a:bodyPr wrap="square" rtlCol="0">
+            <a:spAutoFit/>
+          </a:bodyPr>
+          <a:lstStyle/>
+          <a:p>
+            <a:pPr algn="ctr"/>
+            <a:r>
+              <a:rPr lang="en-GB" sz="1050" dirty="0"/>
+              <a:t>(not used in this app)</a:t>
+            </a:r>
+          </a:p>
+        </p:txBody>
+      </p:sp>
+      <p:sp>
+        <p:nvSpPr>
+          <p:cNvPr id="2" name="TextBox 1">
+            <a:extLst>
+              <a:ext uri="{FF2B5EF4-FFF2-40B4-BE49-F238E27FC236}">
+                <a16:creationId xmlns:a16="http://schemas.microsoft.com/office/drawing/2014/main" id="{F2FE4EC6-A964-40FD-9686-116AD5FEDF4E}"/>
+              </a:ext>
+            </a:extLst>
+          </p:cNvPr>
+          <p:cNvSpPr txBox="1"/>
+          <p:nvPr/>
+        </p:nvSpPr>
+        <p:spPr>
+          <a:xfrm flipH="1">
+            <a:off x="10411808" y="62554"/>
+            <a:ext cx="1717569" cy="646331"/>
+          </a:xfrm>
+          <a:prstGeom prst="rect">
+            <a:avLst/>
+          </a:prstGeom>
+          <a:noFill/>
+        </p:spPr>
+        <p:txBody>
+          <a:bodyPr wrap="square" rtlCol="0">
+            <a:spAutoFit/>
+          </a:bodyPr>
+          <a:lstStyle/>
+          <a:p>
+            <a:pPr algn="ctr"/>
+            <a:r>
+              <a:rPr lang="en-GB" dirty="0"/>
+              <a:t>Framework</a:t>
+            </a:r>
+            <a:br>
+              <a:rPr lang="en-GB" dirty="0"/>
+            </a:br>
+            <a:r>
+              <a:rPr lang="en-GB" dirty="0"/>
+              <a:t>dependencies</a:t>
+            </a:r>
+          </a:p>
+        </p:txBody>
+      </p:sp>
+      <p:sp>
+        <p:nvSpPr>
           <p:cNvPr id="75" name="Rectangle 74">
             <a:extLst>
               <a:ext uri="{FF2B5EF4-FFF2-40B4-BE49-F238E27FC236}">
@@ -6076,7 +6803,7 @@
         </p:nvSpPr>
         <p:spPr>
           <a:xfrm>
-            <a:off x="78530" y="2190660"/>
+            <a:off x="218107" y="1534143"/>
             <a:ext cx="1240231" cy="486032"/>
           </a:xfrm>
           <a:prstGeom prst="rect">
@@ -6128,15 +6855,13 @@
           <p:nvPr/>
         </p:nvCxnSpPr>
         <p:spPr>
-          <a:xfrm rot="10800000" flipH="1">
-            <a:off x="716399" y="2433676"/>
-            <a:ext cx="602362" cy="1134256"/>
-          </a:xfrm>
-          <a:prstGeom prst="curvedConnector5">
+          <a:xfrm rot="10800000">
+            <a:off x="1458339" y="1777159"/>
+            <a:ext cx="327179" cy="724486"/>
+          </a:xfrm>
+          <a:prstGeom prst="curvedConnector3">
             <a:avLst>
-              <a:gd name="adj1" fmla="val -37951"/>
-              <a:gd name="adj2" fmla="val 50000"/>
-              <a:gd name="adj3" fmla="val 137951"/>
+              <a:gd name="adj1" fmla="val 50000"/>
             </a:avLst>
           </a:prstGeom>
           <a:ln>
@@ -6173,7 +6898,7 @@
         </p:nvSpPr>
         <p:spPr>
           <a:xfrm>
-            <a:off x="10943728" y="6319443"/>
+            <a:off x="1398049" y="5728233"/>
             <a:ext cx="1089327" cy="369134"/>
           </a:xfrm>
           <a:prstGeom prst="rect">
@@ -6209,22 +6934,18 @@
               <a:rPr lang="en-GB" sz="1050" dirty="0"/>
             </a:br>
             <a:r>
-              <a:rPr lang="en-GB" sz="1050" dirty="0" err="1"/>
-              <a:t>IsisModuleExt</a:t>
-            </a:r>
-            <a:r>
               <a:rPr lang="en-GB" sz="1050" dirty="0"/>
-              <a:t>…</a:t>
-            </a:r>
-          </a:p>
-        </p:txBody>
-      </p:sp>
-      <p:sp>
-        <p:nvSpPr>
-          <p:cNvPr id="91" name="Rectangle 90">
-            <a:extLst>
-              <a:ext uri="{FF2B5EF4-FFF2-40B4-BE49-F238E27FC236}">
-                <a16:creationId xmlns:a16="http://schemas.microsoft.com/office/drawing/2014/main" id="{1EFBFD41-7EFF-41C4-9398-4E198CEF93CD}"/>
+              <a:t>extension</a:t>
+            </a:r>
+          </a:p>
+        </p:txBody>
+      </p:sp>
+      <p:sp>
+        <p:nvSpPr>
+          <p:cNvPr id="78" name="Rectangle 77">
+            <a:extLst>
+              <a:ext uri="{FF2B5EF4-FFF2-40B4-BE49-F238E27FC236}">
+                <a16:creationId xmlns:a16="http://schemas.microsoft.com/office/drawing/2014/main" id="{019EAB0B-40DE-4456-AD8E-A0D5EB668A89}"/>
               </a:ext>
             </a:extLst>
           </p:cNvPr>
@@ -6233,7 +6954,7 @@
         </p:nvSpPr>
         <p:spPr>
           <a:xfrm>
-            <a:off x="6639264" y="451425"/>
+            <a:off x="1849040" y="702000"/>
             <a:ext cx="1240231" cy="486032"/>
           </a:xfrm>
           <a:prstGeom prst="rect">
@@ -6242,113 +6963,15 @@
         </p:spPr>
         <p:style>
           <a:lnRef idx="2">
-            <a:schemeClr val="accent5">
+            <a:schemeClr val="accent6">
               <a:shade val="50000"/>
             </a:schemeClr>
           </a:lnRef>
           <a:fillRef idx="1">
-            <a:schemeClr val="accent5"/>
-          </a:fillRef>
-          <a:effectRef idx="0">
-            <a:schemeClr val="accent5"/>
-          </a:effectRef>
-          <a:fontRef idx="minor">
-            <a:schemeClr val="lt1"/>
-          </a:fontRef>
-        </p:style>
-        <p:txBody>
-          <a:bodyPr rtlCol="0" anchor="ctr"/>
-          <a:lstStyle/>
-          <a:p>
-            <a:pPr algn="ctr"/>
-            <a:r>
-              <a:rPr lang="en-GB" sz="1200" dirty="0"/>
-              <a:t>Fixtures</a:t>
-            </a:r>
-          </a:p>
-        </p:txBody>
-      </p:sp>
-      <p:sp>
-        <p:nvSpPr>
-          <p:cNvPr id="92" name="Rectangle 91">
-            <a:extLst>
-              <a:ext uri="{FF2B5EF4-FFF2-40B4-BE49-F238E27FC236}">
-                <a16:creationId xmlns:a16="http://schemas.microsoft.com/office/drawing/2014/main" id="{14693512-383A-4929-AF26-D8704FB13744}"/>
-              </a:ext>
-            </a:extLst>
-          </p:cNvPr>
-          <p:cNvSpPr/>
-          <p:nvPr/>
-        </p:nvSpPr>
-        <p:spPr>
-          <a:xfrm>
-            <a:off x="6635164" y="6260994"/>
-            <a:ext cx="1240231" cy="486032"/>
-          </a:xfrm>
-          <a:prstGeom prst="rect">
-            <a:avLst/>
-          </a:prstGeom>
-        </p:spPr>
-        <p:style>
-          <a:lnRef idx="2">
-            <a:schemeClr val="accent5">
-              <a:shade val="50000"/>
-            </a:schemeClr>
-          </a:lnRef>
-          <a:fillRef idx="1">
-            <a:schemeClr val="accent5"/>
-          </a:fillRef>
-          <a:effectRef idx="0">
-            <a:schemeClr val="accent5"/>
-          </a:effectRef>
-          <a:fontRef idx="minor">
-            <a:schemeClr val="lt1"/>
-          </a:fontRef>
-        </p:style>
-        <p:txBody>
-          <a:bodyPr rtlCol="0" anchor="ctr"/>
-          <a:lstStyle/>
-          <a:p>
-            <a:pPr algn="ctr"/>
-            <a:r>
-              <a:rPr lang="en-GB" sz="1200" dirty="0"/>
-              <a:t>H2Console</a:t>
-            </a:r>
-          </a:p>
-        </p:txBody>
-      </p:sp>
-      <p:sp>
-        <p:nvSpPr>
-          <p:cNvPr id="78" name="Rectangle 77">
-            <a:extLst>
-              <a:ext uri="{FF2B5EF4-FFF2-40B4-BE49-F238E27FC236}">
-                <a16:creationId xmlns:a16="http://schemas.microsoft.com/office/drawing/2014/main" id="{019EAB0B-40DE-4456-AD8E-A0D5EB668A89}"/>
-              </a:ext>
-            </a:extLst>
-          </p:cNvPr>
-          <p:cNvSpPr/>
-          <p:nvPr/>
-        </p:nvSpPr>
-        <p:spPr>
-          <a:xfrm>
-            <a:off x="441290" y="1344336"/>
-            <a:ext cx="1240231" cy="486032"/>
-          </a:xfrm>
-          <a:prstGeom prst="rect">
-            <a:avLst/>
-          </a:prstGeom>
-        </p:spPr>
-        <p:style>
-          <a:lnRef idx="2">
-            <a:schemeClr val="accent1">
-              <a:shade val="50000"/>
-            </a:schemeClr>
-          </a:lnRef>
-          <a:fillRef idx="1">
-            <a:schemeClr val="accent1"/>
-          </a:fillRef>
-          <a:effectRef idx="0">
-            <a:schemeClr val="accent1"/>
+            <a:schemeClr val="accent6"/>
+          </a:fillRef>
+          <a:effectRef idx="0">
+            <a:schemeClr val="accent6"/>
           </a:effectRef>
           <a:fontRef idx="minor">
             <a:schemeClr val="lt1"/>
@@ -6383,15 +7006,13 @@
           <p:nvPr/>
         </p:nvCxnSpPr>
         <p:spPr>
-          <a:xfrm rot="10800000" flipH="1" flipV="1">
-            <a:off x="441289" y="1587352"/>
-            <a:ext cx="877471" cy="846324"/>
-          </a:xfrm>
-          <a:prstGeom prst="curvedConnector5">
+          <a:xfrm rot="10800000" flipV="1">
+            <a:off x="1458338" y="945015"/>
+            <a:ext cx="390702" cy="832143"/>
+          </a:xfrm>
+          <a:prstGeom prst="curvedConnector3">
             <a:avLst>
-              <a:gd name="adj1" fmla="val -26052"/>
-              <a:gd name="adj2" fmla="val 50000"/>
-              <a:gd name="adj3" fmla="val 126052"/>
+              <a:gd name="adj1" fmla="val 50000"/>
             </a:avLst>
           </a:prstGeom>
           <a:ln>
@@ -6431,15 +7052,15 @@
           <p:nvPr/>
         </p:nvCxnSpPr>
         <p:spPr>
-          <a:xfrm rot="10800000" flipH="1" flipV="1">
-            <a:off x="634267" y="825694"/>
-            <a:ext cx="1047253" cy="761658"/>
+          <a:xfrm rot="10800000" flipH="1">
+            <a:off x="2607979" y="945017"/>
+            <a:ext cx="481291" cy="824373"/>
           </a:xfrm>
           <a:prstGeom prst="curvedConnector5">
             <a:avLst>
-              <a:gd name="adj1" fmla="val -21829"/>
+              <a:gd name="adj1" fmla="val -47497"/>
               <a:gd name="adj2" fmla="val 50000"/>
-              <a:gd name="adj3" fmla="val 121829"/>
+              <a:gd name="adj3" fmla="val 147497"/>
             </a:avLst>
           </a:prstGeom>
           <a:ln>
@@ -6464,10 +7085,10 @@
       </p:cxnSp>
       <p:sp>
         <p:nvSpPr>
-          <p:cNvPr id="148" name="Rectangle 147">
-            <a:extLst>
-              <a:ext uri="{FF2B5EF4-FFF2-40B4-BE49-F238E27FC236}">
-                <a16:creationId xmlns:a16="http://schemas.microsoft.com/office/drawing/2014/main" id="{466BDA64-8508-416B-8330-A58A44CD7990}"/>
+          <p:cNvPr id="153" name="Rectangle 152">
+            <a:extLst>
+              <a:ext uri="{FF2B5EF4-FFF2-40B4-BE49-F238E27FC236}">
+                <a16:creationId xmlns:a16="http://schemas.microsoft.com/office/drawing/2014/main" id="{703D0774-566D-434B-811E-27FAAA6CD613}"/>
               </a:ext>
             </a:extLst>
           </p:cNvPr>
@@ -6476,115 +7097,7 @@
         </p:nvSpPr>
         <p:spPr>
           <a:xfrm>
-            <a:off x="2957567" y="183022"/>
-            <a:ext cx="1240231" cy="486032"/>
-          </a:xfrm>
-          <a:prstGeom prst="rect">
-            <a:avLst/>
-          </a:prstGeom>
-          <a:solidFill>
-            <a:srgbClr val="CCCCFF"/>
-          </a:solidFill>
-        </p:spPr>
-        <p:style>
-          <a:lnRef idx="2">
-            <a:schemeClr val="accent1">
-              <a:shade val="50000"/>
-            </a:schemeClr>
-          </a:lnRef>
-          <a:fillRef idx="1">
-            <a:schemeClr val="accent1"/>
-          </a:fillRef>
-          <a:effectRef idx="0">
-            <a:schemeClr val="accent1"/>
-          </a:effectRef>
-          <a:fontRef idx="minor">
-            <a:schemeClr val="lt1"/>
-          </a:fontRef>
-        </p:style>
-        <p:txBody>
-          <a:bodyPr rtlCol="0" anchor="ctr"/>
-          <a:lstStyle/>
-          <a:p>
-            <a:pPr algn="ctr"/>
-            <a:r>
-              <a:rPr lang="en-GB" sz="1200" dirty="0" err="1"/>
-              <a:t>CodeGen</a:t>
-            </a:r>
-            <a:br>
-              <a:rPr lang="en-GB" sz="1200" dirty="0"/>
-            </a:br>
-            <a:r>
-              <a:rPr lang="en-GB" sz="1200" dirty="0" err="1"/>
-              <a:t>ByteBuddy</a:t>
-            </a:r>
-            <a:endParaRPr lang="en-GB" sz="1200" dirty="0"/>
-          </a:p>
-        </p:txBody>
-      </p:sp>
-      <p:cxnSp>
-        <p:nvCxnSpPr>
-          <p:cNvPr id="149" name="Connector: Curved 148">
-            <a:extLst>
-              <a:ext uri="{FF2B5EF4-FFF2-40B4-BE49-F238E27FC236}">
-                <a16:creationId xmlns:a16="http://schemas.microsoft.com/office/drawing/2014/main" id="{38EF5427-4ED3-441A-8017-4008285705AE}"/>
-              </a:ext>
-            </a:extLst>
-          </p:cNvPr>
-          <p:cNvCxnSpPr>
-            <a:cxnSpLocks/>
-            <a:stCxn id="99" idx="1"/>
-            <a:endCxn id="148" idx="3"/>
-          </p:cNvCxnSpPr>
-          <p:nvPr/>
-        </p:nvCxnSpPr>
-        <p:spPr>
-          <a:xfrm rot="10800000" flipH="1">
-            <a:off x="3274016" y="426039"/>
-            <a:ext cx="923781" cy="781421"/>
-          </a:xfrm>
-          <a:prstGeom prst="curvedConnector5">
-            <a:avLst>
-              <a:gd name="adj1" fmla="val -24746"/>
-              <a:gd name="adj2" fmla="val 50000"/>
-              <a:gd name="adj3" fmla="val 124746"/>
-            </a:avLst>
-          </a:prstGeom>
-          <a:ln>
-            <a:prstDash val="solid"/>
-            <a:tailEnd type="triangle"/>
-          </a:ln>
-        </p:spPr>
-        <p:style>
-          <a:lnRef idx="1">
-            <a:schemeClr val="accent1"/>
-          </a:lnRef>
-          <a:fillRef idx="0">
-            <a:schemeClr val="accent1"/>
-          </a:fillRef>
-          <a:effectRef idx="0">
-            <a:schemeClr val="accent1"/>
-          </a:effectRef>
-          <a:fontRef idx="minor">
-            <a:schemeClr val="tx1"/>
-          </a:fontRef>
-        </p:style>
-      </p:cxnSp>
-      <p:sp>
-        <p:nvSpPr>
-          <p:cNvPr id="153" name="Rectangle 152">
-            <a:extLst>
-              <a:ext uri="{FF2B5EF4-FFF2-40B4-BE49-F238E27FC236}">
-                <a16:creationId xmlns:a16="http://schemas.microsoft.com/office/drawing/2014/main" id="{703D0774-566D-434B-811E-27FAAA6CD613}"/>
-              </a:ext>
-            </a:extLst>
-          </p:cNvPr>
-          <p:cNvSpPr/>
-          <p:nvPr/>
-        </p:nvSpPr>
-        <p:spPr>
-          <a:xfrm>
-            <a:off x="2278839" y="3641675"/>
+            <a:off x="2326804" y="3675337"/>
             <a:ext cx="1240231" cy="486032"/>
           </a:xfrm>
           <a:prstGeom prst="rect">
@@ -6644,15 +7157,13 @@
           <p:nvPr/>
         </p:nvCxnSpPr>
         <p:spPr>
-          <a:xfrm rot="10800000" flipH="1" flipV="1">
-            <a:off x="2467770" y="2874805"/>
-            <a:ext cx="1051300" cy="1009885"/>
-          </a:xfrm>
-          <a:prstGeom prst="curvedConnector5">
+          <a:xfrm rot="10800000" flipV="1">
+            <a:off x="3567035" y="3005071"/>
+            <a:ext cx="770860" cy="913282"/>
+          </a:xfrm>
+          <a:prstGeom prst="curvedConnector3">
             <a:avLst>
-              <a:gd name="adj1" fmla="val -21745"/>
-              <a:gd name="adj2" fmla="val 50000"/>
-              <a:gd name="adj3" fmla="val 121745"/>
+              <a:gd name="adj1" fmla="val 50000"/>
             </a:avLst>
           </a:prstGeom>
           <a:ln>
@@ -6692,9 +7203,9 @@
           <p:nvPr/>
         </p:nvCxnSpPr>
         <p:spPr>
-          <a:xfrm rot="10800000" flipV="1">
-            <a:off x="6214758" y="3175771"/>
-            <a:ext cx="424507" cy="464904"/>
+          <a:xfrm rot="10800000">
+            <a:off x="9624669" y="2622723"/>
+            <a:ext cx="841499" cy="307829"/>
           </a:xfrm>
           <a:prstGeom prst="curvedConnector3">
             <a:avLst>
@@ -6739,8 +7250,8 @@
         </p:nvCxnSpPr>
         <p:spPr>
           <a:xfrm rot="10800000">
-            <a:off x="6214758" y="3640675"/>
-            <a:ext cx="420407" cy="115884"/>
+            <a:off x="9624669" y="2622723"/>
+            <a:ext cx="837399" cy="888617"/>
           </a:xfrm>
           <a:prstGeom prst="curvedConnector3">
             <a:avLst>
@@ -6785,8 +7296,8 @@
         </p:nvCxnSpPr>
         <p:spPr>
           <a:xfrm rot="10800000">
-            <a:off x="6214758" y="3640676"/>
-            <a:ext cx="424507" cy="696397"/>
+            <a:off x="9624669" y="2622722"/>
+            <a:ext cx="841499" cy="1469130"/>
           </a:xfrm>
           <a:prstGeom prst="curvedConnector3">
             <a:avLst>
@@ -6827,7 +7338,7 @@
         </p:nvSpPr>
         <p:spPr>
           <a:xfrm>
-            <a:off x="5253364" y="2448519"/>
+            <a:off x="8763544" y="734935"/>
             <a:ext cx="1240231" cy="486032"/>
           </a:xfrm>
           <a:prstGeom prst="rect">
@@ -6884,7 +7395,7 @@
         </p:nvSpPr>
         <p:spPr>
           <a:xfrm>
-            <a:off x="6071643" y="3546020"/>
+            <a:off x="9481554" y="2528067"/>
             <a:ext cx="143114" cy="189310"/>
           </a:xfrm>
           <a:prstGeom prst="ellipse">
@@ -6914,52 +7425,6 @@
           </a:p>
         </p:txBody>
       </p:sp>
-      <p:cxnSp>
-        <p:nvCxnSpPr>
-          <p:cNvPr id="234" name="Connector: Curved 233">
-            <a:extLst>
-              <a:ext uri="{FF2B5EF4-FFF2-40B4-BE49-F238E27FC236}">
-                <a16:creationId xmlns:a16="http://schemas.microsoft.com/office/drawing/2014/main" id="{7CF0E77E-4950-47ED-9A66-6899BACD9B16}"/>
-              </a:ext>
-            </a:extLst>
-          </p:cNvPr>
-          <p:cNvCxnSpPr>
-            <a:cxnSpLocks/>
-            <a:stCxn id="233" idx="2"/>
-            <a:endCxn id="153" idx="3"/>
-          </p:cNvCxnSpPr>
-          <p:nvPr/>
-        </p:nvCxnSpPr>
-        <p:spPr>
-          <a:xfrm rot="10800000" flipV="1">
-            <a:off x="3519071" y="3640675"/>
-            <a:ext cx="2552573" cy="244016"/>
-          </a:xfrm>
-          <a:prstGeom prst="curvedConnector3">
-            <a:avLst>
-              <a:gd name="adj1" fmla="val 50000"/>
-            </a:avLst>
-          </a:prstGeom>
-          <a:ln>
-            <a:prstDash val="solid"/>
-            <a:tailEnd type="triangle"/>
-          </a:ln>
-        </p:spPr>
-        <p:style>
-          <a:lnRef idx="1">
-            <a:schemeClr val="accent1"/>
-          </a:lnRef>
-          <a:fillRef idx="0">
-            <a:schemeClr val="accent1"/>
-          </a:fillRef>
-          <a:effectRef idx="0">
-            <a:schemeClr val="accent1"/>
-          </a:effectRef>
-          <a:fontRef idx="minor">
-            <a:schemeClr val="tx1"/>
-          </a:fontRef>
-        </p:style>
-      </p:cxnSp>
       <p:cxnSp>
         <p:nvCxnSpPr>
           <p:cNvPr id="241" name="Connector: Curved 240">
@@ -6977,9 +7442,9 @@
           <p:nvPr/>
         </p:nvCxnSpPr>
         <p:spPr>
-          <a:xfrm rot="10800000" flipV="1">
-            <a:off x="6493596" y="2241741"/>
-            <a:ext cx="145669" cy="449793"/>
+          <a:xfrm rot="10800000">
+            <a:off x="10003776" y="977952"/>
+            <a:ext cx="448799" cy="412757"/>
           </a:xfrm>
           <a:prstGeom prst="curvedConnector3">
             <a:avLst>
@@ -7023,9 +7488,9 @@
           <p:nvPr/>
         </p:nvCxnSpPr>
         <p:spPr>
-          <a:xfrm rot="10800000">
-            <a:off x="4328116" y="2038744"/>
-            <a:ext cx="2311148" cy="202998"/>
+          <a:xfrm rot="10800000" flipV="1">
+            <a:off x="7071582" y="1390707"/>
+            <a:ext cx="3380993" cy="1009883"/>
           </a:xfrm>
           <a:prstGeom prst="curvedConnector3">
             <a:avLst>
@@ -7069,13 +7534,13 @@
           <p:nvPr/>
         </p:nvCxnSpPr>
         <p:spPr>
-          <a:xfrm rot="10800000">
-            <a:off x="4514249" y="1207459"/>
-            <a:ext cx="1557395" cy="2433216"/>
+          <a:xfrm rot="10800000" flipV="1">
+            <a:off x="8865728" y="2622721"/>
+            <a:ext cx="615827" cy="127447"/>
           </a:xfrm>
           <a:prstGeom prst="curvedConnector3">
             <a:avLst>
-              <a:gd name="adj1" fmla="val 71920"/>
+              <a:gd name="adj1" fmla="val 50000"/>
             </a:avLst>
           </a:prstGeom>
           <a:ln>
@@ -7115,9 +7580,9 @@
           <p:nvPr/>
         </p:nvCxnSpPr>
         <p:spPr>
-          <a:xfrm rot="10800000" flipV="1">
-            <a:off x="5802854" y="4337071"/>
-            <a:ext cx="836411" cy="124441"/>
+          <a:xfrm rot="10800000">
+            <a:off x="9526775" y="3777296"/>
+            <a:ext cx="939393" cy="314556"/>
           </a:xfrm>
           <a:prstGeom prst="curvedConnector3">
             <a:avLst>
@@ -7162,8 +7627,8 @@
         </p:nvCxnSpPr>
         <p:spPr>
           <a:xfrm rot="10800000" flipV="1">
-            <a:off x="5802854" y="3756559"/>
-            <a:ext cx="832311" cy="704954"/>
+            <a:off x="9526775" y="3511338"/>
+            <a:ext cx="935293" cy="265957"/>
           </a:xfrm>
           <a:prstGeom prst="curvedConnector3">
             <a:avLst>
@@ -7192,10 +7657,10 @@
       </p:cxnSp>
       <p:sp>
         <p:nvSpPr>
-          <p:cNvPr id="384" name="Rectangle 383">
-            <a:extLst>
-              <a:ext uri="{FF2B5EF4-FFF2-40B4-BE49-F238E27FC236}">
-                <a16:creationId xmlns:a16="http://schemas.microsoft.com/office/drawing/2014/main" id="{B6955408-A447-459D-B770-59E76E50FAB2}"/>
+          <p:cNvPr id="237" name="Rectangle 236">
+            <a:extLst>
+              <a:ext uri="{FF2B5EF4-FFF2-40B4-BE49-F238E27FC236}">
+                <a16:creationId xmlns:a16="http://schemas.microsoft.com/office/drawing/2014/main" id="{DB128497-F1F0-4FEB-8B88-531E964E92A8}"/>
               </a:ext>
             </a:extLst>
           </p:cNvPr>
@@ -7204,7 +7669,65 @@
         </p:nvSpPr>
         <p:spPr>
           <a:xfrm>
-            <a:off x="2952163" y="6076427"/>
+            <a:off x="6916424" y="4602807"/>
+            <a:ext cx="4919737" cy="1134623"/>
+          </a:xfrm>
+          <a:prstGeom prst="rect">
+            <a:avLst/>
+          </a:prstGeom>
+          <a:solidFill>
+            <a:schemeClr val="bg1">
+              <a:lumMod val="95000"/>
+            </a:schemeClr>
+          </a:solidFill>
+          <a:ln>
+            <a:solidFill>
+              <a:schemeClr val="bg1">
+                <a:lumMod val="75000"/>
+              </a:schemeClr>
+            </a:solidFill>
+          </a:ln>
+        </p:spPr>
+        <p:style>
+          <a:lnRef idx="2">
+            <a:schemeClr val="accent3">
+              <a:shade val="50000"/>
+            </a:schemeClr>
+          </a:lnRef>
+          <a:fillRef idx="1">
+            <a:schemeClr val="accent3"/>
+          </a:fillRef>
+          <a:effectRef idx="0">
+            <a:schemeClr val="accent3"/>
+          </a:effectRef>
+          <a:fontRef idx="minor">
+            <a:schemeClr val="lt1"/>
+          </a:fontRef>
+        </p:style>
+        <p:txBody>
+          <a:bodyPr rtlCol="0" anchor="ctr"/>
+          <a:lstStyle/>
+          <a:p>
+            <a:pPr algn="ctr"/>
+            <a:endParaRPr lang="en-GB" sz="1200" dirty="0"/>
+          </a:p>
+        </p:txBody>
+      </p:sp>
+      <p:sp>
+        <p:nvSpPr>
+          <p:cNvPr id="18" name="Rectangle 17">
+            <a:extLst>
+              <a:ext uri="{FF2B5EF4-FFF2-40B4-BE49-F238E27FC236}">
+                <a16:creationId xmlns:a16="http://schemas.microsoft.com/office/drawing/2014/main" id="{F54D28BD-9280-46DD-AEDF-CAA9ABC4980F}"/>
+              </a:ext>
+            </a:extLst>
+          </p:cNvPr>
+          <p:cNvSpPr/>
+          <p:nvPr/>
+        </p:nvSpPr>
+        <p:spPr>
+          <a:xfrm>
+            <a:off x="10462067" y="4668902"/>
             <a:ext cx="1240231" cy="486032"/>
           </a:xfrm>
           <a:prstGeom prst="rect">
@@ -7240,6 +7763,62 @@
               <a:rPr lang="en-GB" sz="1200" dirty="0"/>
             </a:br>
             <a:r>
+              <a:rPr lang="en-GB" sz="1200" dirty="0"/>
+              <a:t>Viewer</a:t>
+            </a:r>
+          </a:p>
+        </p:txBody>
+      </p:sp>
+      <p:sp>
+        <p:nvSpPr>
+          <p:cNvPr id="384" name="Rectangle 383">
+            <a:extLst>
+              <a:ext uri="{FF2B5EF4-FFF2-40B4-BE49-F238E27FC236}">
+                <a16:creationId xmlns:a16="http://schemas.microsoft.com/office/drawing/2014/main" id="{B6955408-A447-459D-B770-59E76E50FAB2}"/>
+              </a:ext>
+            </a:extLst>
+          </p:cNvPr>
+          <p:cNvSpPr/>
+          <p:nvPr/>
+        </p:nvSpPr>
+        <p:spPr>
+          <a:xfrm>
+            <a:off x="7108506" y="5132310"/>
+            <a:ext cx="1240231" cy="486032"/>
+          </a:xfrm>
+          <a:prstGeom prst="rect">
+            <a:avLst/>
+          </a:prstGeom>
+        </p:spPr>
+        <p:style>
+          <a:lnRef idx="2">
+            <a:schemeClr val="accent1">
+              <a:shade val="50000"/>
+            </a:schemeClr>
+          </a:lnRef>
+          <a:fillRef idx="1">
+            <a:schemeClr val="accent1"/>
+          </a:fillRef>
+          <a:effectRef idx="0">
+            <a:schemeClr val="accent1"/>
+          </a:effectRef>
+          <a:fontRef idx="minor">
+            <a:schemeClr val="lt1"/>
+          </a:fontRef>
+        </p:style>
+        <p:txBody>
+          <a:bodyPr rtlCol="0" anchor="ctr"/>
+          <a:lstStyle/>
+          <a:p>
+            <a:pPr algn="ctr"/>
+            <a:r>
+              <a:rPr lang="en-GB" sz="1200" dirty="0" err="1"/>
+              <a:t>RestfulObjects</a:t>
+            </a:r>
+            <a:br>
+              <a:rPr lang="en-GB" sz="1200" dirty="0"/>
+            </a:br>
+            <a:r>
               <a:rPr lang="en-GB" sz="1200" dirty="0" err="1"/>
               <a:t>Applib</a:t>
             </a:r>
@@ -7261,7 +7840,7 @@
         </p:nvSpPr>
         <p:spPr>
           <a:xfrm>
-            <a:off x="4910059" y="6114239"/>
+            <a:off x="8883315" y="4920518"/>
             <a:ext cx="1240231" cy="486032"/>
           </a:xfrm>
           <a:prstGeom prst="rect">
@@ -7321,8 +7900,8 @@
         </p:nvCxnSpPr>
         <p:spPr>
           <a:xfrm rot="10800000" flipV="1">
-            <a:off x="6150290" y="5896089"/>
-            <a:ext cx="488974" cy="461165"/>
+            <a:off x="10123547" y="4911918"/>
+            <a:ext cx="338521" cy="251616"/>
           </a:xfrm>
           <a:prstGeom prst="curvedConnector3">
             <a:avLst>
@@ -7365,9 +7944,9 @@
           <p:nvPr/>
         </p:nvCxnSpPr>
         <p:spPr>
-          <a:xfrm rot="10800000">
-            <a:off x="4192395" y="6319443"/>
-            <a:ext cx="717665" cy="37812"/>
+          <a:xfrm rot="10800000" flipV="1">
+            <a:off x="8348737" y="5163534"/>
+            <a:ext cx="534578" cy="211792"/>
           </a:xfrm>
           <a:prstGeom prst="curvedConnector3">
             <a:avLst>
@@ -7393,6 +7972,564 @@
           </a:fontRef>
         </p:style>
       </p:cxnSp>
+      <p:sp>
+        <p:nvSpPr>
+          <p:cNvPr id="521" name="Oval 520">
+            <a:extLst>
+              <a:ext uri="{FF2B5EF4-FFF2-40B4-BE49-F238E27FC236}">
+                <a16:creationId xmlns:a16="http://schemas.microsoft.com/office/drawing/2014/main" id="{7D1F11B8-B9C2-4F6D-9C46-3AB1762CEFC5}"/>
+              </a:ext>
+            </a:extLst>
+          </p:cNvPr>
+          <p:cNvSpPr/>
+          <p:nvPr/>
+        </p:nvSpPr>
+        <p:spPr>
+          <a:xfrm>
+            <a:off x="9383660" y="3682641"/>
+            <a:ext cx="143114" cy="189310"/>
+          </a:xfrm>
+          <a:prstGeom prst="ellipse">
+            <a:avLst/>
+          </a:prstGeom>
+        </p:spPr>
+        <p:style>
+          <a:lnRef idx="2">
+            <a:schemeClr val="accent6"/>
+          </a:lnRef>
+          <a:fillRef idx="1">
+            <a:schemeClr val="lt1"/>
+          </a:fillRef>
+          <a:effectRef idx="0">
+            <a:schemeClr val="accent6"/>
+          </a:effectRef>
+          <a:fontRef idx="minor">
+            <a:schemeClr val="dk1"/>
+          </a:fontRef>
+        </p:style>
+        <p:txBody>
+          <a:bodyPr rtlCol="0" anchor="ctr"/>
+          <a:lstStyle/>
+          <a:p>
+            <a:pPr algn="ctr"/>
+            <a:endParaRPr lang="en-GB"/>
+          </a:p>
+        </p:txBody>
+      </p:sp>
+      <p:cxnSp>
+        <p:nvCxnSpPr>
+          <p:cNvPr id="522" name="Connector: Curved 521">
+            <a:extLst>
+              <a:ext uri="{FF2B5EF4-FFF2-40B4-BE49-F238E27FC236}">
+                <a16:creationId xmlns:a16="http://schemas.microsoft.com/office/drawing/2014/main" id="{25DABAE5-C463-4610-A46E-D5DD6AE7270E}"/>
+              </a:ext>
+            </a:extLst>
+          </p:cNvPr>
+          <p:cNvCxnSpPr>
+            <a:cxnSpLocks/>
+            <a:stCxn id="521" idx="2"/>
+            <a:endCxn id="20" idx="3"/>
+          </p:cNvCxnSpPr>
+          <p:nvPr/>
+        </p:nvCxnSpPr>
+        <p:spPr>
+          <a:xfrm rot="10800000">
+            <a:off x="8890256" y="3545476"/>
+            <a:ext cx="493405" cy="231821"/>
+          </a:xfrm>
+          <a:prstGeom prst="curvedConnector3">
+            <a:avLst>
+              <a:gd name="adj1" fmla="val 50000"/>
+            </a:avLst>
+          </a:prstGeom>
+          <a:ln>
+            <a:prstDash val="solid"/>
+            <a:tailEnd type="triangle"/>
+          </a:ln>
+        </p:spPr>
+        <p:style>
+          <a:lnRef idx="1">
+            <a:schemeClr val="accent1"/>
+          </a:lnRef>
+          <a:fillRef idx="0">
+            <a:schemeClr val="accent1"/>
+          </a:fillRef>
+          <a:effectRef idx="0">
+            <a:schemeClr val="accent1"/>
+          </a:effectRef>
+          <a:fontRef idx="minor">
+            <a:schemeClr val="tx1"/>
+          </a:fontRef>
+        </p:style>
+      </p:cxnSp>
+      <p:sp>
+        <p:nvSpPr>
+          <p:cNvPr id="226" name="Rectangle 225">
+            <a:extLst>
+              <a:ext uri="{FF2B5EF4-FFF2-40B4-BE49-F238E27FC236}">
+                <a16:creationId xmlns:a16="http://schemas.microsoft.com/office/drawing/2014/main" id="{4DFB4E73-6CA7-4F95-B312-B93F3C36C032}"/>
+              </a:ext>
+            </a:extLst>
+          </p:cNvPr>
+          <p:cNvSpPr/>
+          <p:nvPr/>
+        </p:nvSpPr>
+        <p:spPr>
+          <a:xfrm>
+            <a:off x="6916424" y="5849569"/>
+            <a:ext cx="4919737" cy="652454"/>
+          </a:xfrm>
+          <a:prstGeom prst="rect">
+            <a:avLst/>
+          </a:prstGeom>
+          <a:solidFill>
+            <a:schemeClr val="bg1">
+              <a:lumMod val="95000"/>
+            </a:schemeClr>
+          </a:solidFill>
+          <a:ln>
+            <a:solidFill>
+              <a:schemeClr val="bg1">
+                <a:lumMod val="75000"/>
+              </a:schemeClr>
+            </a:solidFill>
+          </a:ln>
+        </p:spPr>
+        <p:style>
+          <a:lnRef idx="2">
+            <a:schemeClr val="accent3">
+              <a:shade val="50000"/>
+            </a:schemeClr>
+          </a:lnRef>
+          <a:fillRef idx="1">
+            <a:schemeClr val="accent3"/>
+          </a:fillRef>
+          <a:effectRef idx="0">
+            <a:schemeClr val="accent3"/>
+          </a:effectRef>
+          <a:fontRef idx="minor">
+            <a:schemeClr val="lt1"/>
+          </a:fontRef>
+        </p:style>
+        <p:txBody>
+          <a:bodyPr rtlCol="0" anchor="ctr"/>
+          <a:lstStyle/>
+          <a:p>
+            <a:pPr algn="ctr"/>
+            <a:endParaRPr lang="en-GB" sz="1200" dirty="0"/>
+          </a:p>
+        </p:txBody>
+      </p:sp>
+      <p:sp>
+        <p:nvSpPr>
+          <p:cNvPr id="17" name="Rectangle 16">
+            <a:extLst>
+              <a:ext uri="{FF2B5EF4-FFF2-40B4-BE49-F238E27FC236}">
+                <a16:creationId xmlns:a16="http://schemas.microsoft.com/office/drawing/2014/main" id="{B781C3E2-54D4-4C68-96C4-1C5F5061F55A}"/>
+              </a:ext>
+            </a:extLst>
+          </p:cNvPr>
+          <p:cNvSpPr/>
+          <p:nvPr/>
+        </p:nvSpPr>
+        <p:spPr>
+          <a:xfrm>
+            <a:off x="10462067" y="5944870"/>
+            <a:ext cx="1240231" cy="486032"/>
+          </a:xfrm>
+          <a:prstGeom prst="rect">
+            <a:avLst/>
+          </a:prstGeom>
+        </p:spPr>
+        <p:style>
+          <a:lnRef idx="2">
+            <a:schemeClr val="accent1">
+              <a:shade val="50000"/>
+            </a:schemeClr>
+          </a:lnRef>
+          <a:fillRef idx="1">
+            <a:schemeClr val="accent1"/>
+          </a:fillRef>
+          <a:effectRef idx="0">
+            <a:schemeClr val="accent1"/>
+          </a:effectRef>
+          <a:fontRef idx="minor">
+            <a:schemeClr val="lt1"/>
+          </a:fontRef>
+        </p:style>
+        <p:txBody>
+          <a:bodyPr rtlCol="0" anchor="ctr"/>
+          <a:lstStyle/>
+          <a:p>
+            <a:pPr algn="ctr"/>
+            <a:r>
+              <a:rPr lang="en-GB" sz="1200" dirty="0"/>
+              <a:t>Wicket</a:t>
+            </a:r>
+            <a:br>
+              <a:rPr lang="en-GB" sz="1200" dirty="0"/>
+            </a:br>
+            <a:r>
+              <a:rPr lang="en-GB" sz="1200" dirty="0"/>
+              <a:t>Viewer</a:t>
+            </a:r>
+          </a:p>
+        </p:txBody>
+      </p:sp>
+      <p:sp>
+        <p:nvSpPr>
+          <p:cNvPr id="550" name="Rectangle 549">
+            <a:extLst>
+              <a:ext uri="{FF2B5EF4-FFF2-40B4-BE49-F238E27FC236}">
+                <a16:creationId xmlns:a16="http://schemas.microsoft.com/office/drawing/2014/main" id="{1581F3F0-4C9E-4C78-B17D-2E2AAEAB87A5}"/>
+              </a:ext>
+            </a:extLst>
+          </p:cNvPr>
+          <p:cNvSpPr/>
+          <p:nvPr/>
+        </p:nvSpPr>
+        <p:spPr>
+          <a:xfrm>
+            <a:off x="8914296" y="5939176"/>
+            <a:ext cx="1240231" cy="486032"/>
+          </a:xfrm>
+          <a:prstGeom prst="rect">
+            <a:avLst/>
+          </a:prstGeom>
+        </p:spPr>
+        <p:style>
+          <a:lnRef idx="2">
+            <a:schemeClr val="accent1">
+              <a:shade val="50000"/>
+            </a:schemeClr>
+          </a:lnRef>
+          <a:fillRef idx="1">
+            <a:schemeClr val="accent1"/>
+          </a:fillRef>
+          <a:effectRef idx="0">
+            <a:schemeClr val="accent1"/>
+          </a:effectRef>
+          <a:fontRef idx="minor">
+            <a:schemeClr val="lt1"/>
+          </a:fontRef>
+        </p:style>
+        <p:txBody>
+          <a:bodyPr rtlCol="0" anchor="ctr"/>
+          <a:lstStyle/>
+          <a:p>
+            <a:pPr algn="ctr"/>
+            <a:r>
+              <a:rPr lang="en-GB" sz="1200" dirty="0"/>
+              <a:t>Wicket</a:t>
+            </a:r>
+            <a:br>
+              <a:rPr lang="en-GB" sz="1200" dirty="0"/>
+            </a:br>
+            <a:r>
+              <a:rPr lang="en-GB" sz="1200" dirty="0"/>
+              <a:t>Ui</a:t>
+            </a:r>
+          </a:p>
+        </p:txBody>
+      </p:sp>
+      <p:sp>
+        <p:nvSpPr>
+          <p:cNvPr id="551" name="Rectangle 550">
+            <a:extLst>
+              <a:ext uri="{FF2B5EF4-FFF2-40B4-BE49-F238E27FC236}">
+                <a16:creationId xmlns:a16="http://schemas.microsoft.com/office/drawing/2014/main" id="{099749A5-083C-4771-835B-AB868F588926}"/>
+              </a:ext>
+            </a:extLst>
+          </p:cNvPr>
+          <p:cNvSpPr/>
+          <p:nvPr/>
+        </p:nvSpPr>
+        <p:spPr>
+          <a:xfrm>
+            <a:off x="7153991" y="5950370"/>
+            <a:ext cx="1240231" cy="486032"/>
+          </a:xfrm>
+          <a:prstGeom prst="rect">
+            <a:avLst/>
+          </a:prstGeom>
+        </p:spPr>
+        <p:style>
+          <a:lnRef idx="2">
+            <a:schemeClr val="accent1">
+              <a:shade val="50000"/>
+            </a:schemeClr>
+          </a:lnRef>
+          <a:fillRef idx="1">
+            <a:schemeClr val="accent1"/>
+          </a:fillRef>
+          <a:effectRef idx="0">
+            <a:schemeClr val="accent1"/>
+          </a:effectRef>
+          <a:fontRef idx="minor">
+            <a:schemeClr val="lt1"/>
+          </a:fontRef>
+        </p:style>
+        <p:txBody>
+          <a:bodyPr rtlCol="0" anchor="ctr"/>
+          <a:lstStyle/>
+          <a:p>
+            <a:pPr algn="ctr"/>
+            <a:r>
+              <a:rPr lang="en-GB" sz="1200" dirty="0"/>
+              <a:t>Wicket</a:t>
+            </a:r>
+            <a:br>
+              <a:rPr lang="en-GB" sz="1200" dirty="0"/>
+            </a:br>
+            <a:r>
+              <a:rPr lang="en-GB" sz="1200" dirty="0"/>
+              <a:t>Model</a:t>
+            </a:r>
+          </a:p>
+        </p:txBody>
+      </p:sp>
+      <p:cxnSp>
+        <p:nvCxnSpPr>
+          <p:cNvPr id="552" name="Connector: Curved 551">
+            <a:extLst>
+              <a:ext uri="{FF2B5EF4-FFF2-40B4-BE49-F238E27FC236}">
+                <a16:creationId xmlns:a16="http://schemas.microsoft.com/office/drawing/2014/main" id="{7B7AC35E-02B7-4EB6-804A-2F1E76B1DB52}"/>
+              </a:ext>
+            </a:extLst>
+          </p:cNvPr>
+          <p:cNvCxnSpPr>
+            <a:cxnSpLocks/>
+            <a:stCxn id="550" idx="1"/>
+            <a:endCxn id="551" idx="3"/>
+          </p:cNvCxnSpPr>
+          <p:nvPr/>
+        </p:nvCxnSpPr>
+        <p:spPr>
+          <a:xfrm rot="10800000" flipV="1">
+            <a:off x="8394222" y="6182192"/>
+            <a:ext cx="520074" cy="11194"/>
+          </a:xfrm>
+          <a:prstGeom prst="curvedConnector3">
+            <a:avLst>
+              <a:gd name="adj1" fmla="val 50000"/>
+            </a:avLst>
+          </a:prstGeom>
+          <a:ln>
+            <a:prstDash val="solid"/>
+            <a:tailEnd type="triangle"/>
+          </a:ln>
+        </p:spPr>
+        <p:style>
+          <a:lnRef idx="1">
+            <a:schemeClr val="accent1"/>
+          </a:lnRef>
+          <a:fillRef idx="0">
+            <a:schemeClr val="accent1"/>
+          </a:fillRef>
+          <a:effectRef idx="0">
+            <a:schemeClr val="accent1"/>
+          </a:effectRef>
+          <a:fontRef idx="minor">
+            <a:schemeClr val="tx1"/>
+          </a:fontRef>
+        </p:style>
+      </p:cxnSp>
+      <p:cxnSp>
+        <p:nvCxnSpPr>
+          <p:cNvPr id="560" name="Connector: Curved 559">
+            <a:extLst>
+              <a:ext uri="{FF2B5EF4-FFF2-40B4-BE49-F238E27FC236}">
+                <a16:creationId xmlns:a16="http://schemas.microsoft.com/office/drawing/2014/main" id="{39CE9CC6-4BF8-4DF9-AEC5-2AD4A0DE4274}"/>
+              </a:ext>
+            </a:extLst>
+          </p:cNvPr>
+          <p:cNvCxnSpPr>
+            <a:cxnSpLocks/>
+            <a:stCxn id="17" idx="1"/>
+            <a:endCxn id="550" idx="3"/>
+          </p:cNvCxnSpPr>
+          <p:nvPr/>
+        </p:nvCxnSpPr>
+        <p:spPr>
+          <a:xfrm rot="10800000">
+            <a:off x="10154527" y="6182192"/>
+            <a:ext cx="307540" cy="5694"/>
+          </a:xfrm>
+          <a:prstGeom prst="curvedConnector3">
+            <a:avLst>
+              <a:gd name="adj1" fmla="val 50000"/>
+            </a:avLst>
+          </a:prstGeom>
+          <a:ln>
+            <a:prstDash val="solid"/>
+            <a:tailEnd type="triangle"/>
+          </a:ln>
+        </p:spPr>
+        <p:style>
+          <a:lnRef idx="1">
+            <a:schemeClr val="accent1"/>
+          </a:lnRef>
+          <a:fillRef idx="0">
+            <a:schemeClr val="accent1"/>
+          </a:fillRef>
+          <a:effectRef idx="0">
+            <a:schemeClr val="accent1"/>
+          </a:effectRef>
+          <a:fontRef idx="minor">
+            <a:schemeClr val="tx1"/>
+          </a:fontRef>
+        </p:style>
+      </p:cxnSp>
+      <p:cxnSp>
+        <p:nvCxnSpPr>
+          <p:cNvPr id="571" name="Connector: Curved 570">
+            <a:extLst>
+              <a:ext uri="{FF2B5EF4-FFF2-40B4-BE49-F238E27FC236}">
+                <a16:creationId xmlns:a16="http://schemas.microsoft.com/office/drawing/2014/main" id="{B8AEA742-547C-4667-A497-D7376F01779A}"/>
+              </a:ext>
+            </a:extLst>
+          </p:cNvPr>
+          <p:cNvCxnSpPr>
+            <a:cxnSpLocks/>
+            <a:stCxn id="551" idx="1"/>
+            <a:endCxn id="521" idx="6"/>
+          </p:cNvCxnSpPr>
+          <p:nvPr/>
+        </p:nvCxnSpPr>
+        <p:spPr>
+          <a:xfrm rot="10800000" flipH="1">
+            <a:off x="7153990" y="3777296"/>
+            <a:ext cx="2372783" cy="2416090"/>
+          </a:xfrm>
+          <a:prstGeom prst="curvedConnector5">
+            <a:avLst>
+              <a:gd name="adj1" fmla="val -37111"/>
+              <a:gd name="adj2" fmla="val 83619"/>
+              <a:gd name="adj3" fmla="val 109634"/>
+            </a:avLst>
+          </a:prstGeom>
+          <a:ln>
+            <a:prstDash val="solid"/>
+            <a:tailEnd type="triangle"/>
+          </a:ln>
+        </p:spPr>
+        <p:style>
+          <a:lnRef idx="1">
+            <a:schemeClr val="accent1"/>
+          </a:lnRef>
+          <a:fillRef idx="0">
+            <a:schemeClr val="accent1"/>
+          </a:fillRef>
+          <a:effectRef idx="0">
+            <a:schemeClr val="accent1"/>
+          </a:effectRef>
+          <a:fontRef idx="minor">
+            <a:schemeClr val="tx1"/>
+          </a:fontRef>
+        </p:style>
+      </p:cxnSp>
+      <p:cxnSp>
+        <p:nvCxnSpPr>
+          <p:cNvPr id="577" name="Connector: Curved 576">
+            <a:extLst>
+              <a:ext uri="{FF2B5EF4-FFF2-40B4-BE49-F238E27FC236}">
+                <a16:creationId xmlns:a16="http://schemas.microsoft.com/office/drawing/2014/main" id="{EAC3244F-4ED5-40E4-9D3C-5AD1F2A9784D}"/>
+              </a:ext>
+            </a:extLst>
+          </p:cNvPr>
+          <p:cNvCxnSpPr>
+            <a:cxnSpLocks/>
+            <a:stCxn id="20" idx="1"/>
+            <a:endCxn id="83" idx="3"/>
+          </p:cNvCxnSpPr>
+          <p:nvPr/>
+        </p:nvCxnSpPr>
+        <p:spPr>
+          <a:xfrm rot="10800000">
+            <a:off x="7071582" y="2400591"/>
+            <a:ext cx="578443" cy="1144884"/>
+          </a:xfrm>
+          <a:prstGeom prst="curvedConnector3">
+            <a:avLst>
+              <a:gd name="adj1" fmla="val 50000"/>
+            </a:avLst>
+          </a:prstGeom>
+          <a:ln>
+            <a:prstDash val="solid"/>
+            <a:tailEnd type="triangle"/>
+          </a:ln>
+        </p:spPr>
+        <p:style>
+          <a:lnRef idx="1">
+            <a:schemeClr val="accent1"/>
+          </a:lnRef>
+          <a:fillRef idx="0">
+            <a:schemeClr val="accent1"/>
+          </a:fillRef>
+          <a:effectRef idx="0">
+            <a:schemeClr val="accent1"/>
+          </a:effectRef>
+          <a:fontRef idx="minor">
+            <a:schemeClr val="tx1"/>
+          </a:fontRef>
+        </p:style>
+      </p:cxnSp>
+      <p:sp>
+        <p:nvSpPr>
+          <p:cNvPr id="98" name="Rectangle 97">
+            <a:extLst>
+              <a:ext uri="{FF2B5EF4-FFF2-40B4-BE49-F238E27FC236}">
+                <a16:creationId xmlns:a16="http://schemas.microsoft.com/office/drawing/2014/main" id="{4EED6C1C-1A99-4AE7-8364-252E0864DFA2}"/>
+              </a:ext>
+            </a:extLst>
+          </p:cNvPr>
+          <p:cNvSpPr/>
+          <p:nvPr/>
+        </p:nvSpPr>
+        <p:spPr>
+          <a:xfrm>
+            <a:off x="133460" y="6196729"/>
+            <a:ext cx="1089327" cy="519041"/>
+          </a:xfrm>
+          <a:prstGeom prst="rect">
+            <a:avLst/>
+          </a:prstGeom>
+        </p:spPr>
+        <p:style>
+          <a:lnRef idx="2">
+            <a:schemeClr val="accent6">
+              <a:shade val="50000"/>
+            </a:schemeClr>
+          </a:lnRef>
+          <a:fillRef idx="1">
+            <a:schemeClr val="accent6"/>
+          </a:fillRef>
+          <a:effectRef idx="0">
+            <a:schemeClr val="accent6"/>
+          </a:effectRef>
+          <a:fontRef idx="minor">
+            <a:schemeClr val="lt1"/>
+          </a:fontRef>
+        </p:style>
+        <p:txBody>
+          <a:bodyPr rtlCol="0" anchor="ctr"/>
+          <a:lstStyle/>
+          <a:p>
+            <a:pPr algn="ctr"/>
+            <a:r>
+              <a:rPr lang="en-GB" sz="1050" dirty="0"/>
+              <a:t>@Configuration</a:t>
+            </a:r>
+            <a:br>
+              <a:rPr lang="en-GB" sz="1050" dirty="0"/>
+            </a:br>
+            <a:r>
+              <a:rPr lang="en-GB" sz="1050" dirty="0"/>
+              <a:t>referenced by domain app</a:t>
+            </a:r>
+          </a:p>
+        </p:txBody>
+      </p:sp>
       <p:cxnSp>
         <p:nvCxnSpPr>
           <p:cNvPr id="391" name="Connector: Curved 390">
@@ -7411,112 +8548,8 @@
         </p:nvCxnSpPr>
         <p:spPr>
           <a:xfrm rot="10800000">
-            <a:off x="3708001" y="2874807"/>
-            <a:ext cx="1202058" cy="3482449"/>
-          </a:xfrm>
-          <a:prstGeom prst="curvedConnector3">
-            <a:avLst>
-              <a:gd name="adj1" fmla="val 77723"/>
-            </a:avLst>
-          </a:prstGeom>
-          <a:ln>
-            <a:tailEnd type="triangle"/>
-          </a:ln>
-        </p:spPr>
-        <p:style>
-          <a:lnRef idx="1">
-            <a:schemeClr val="accent1"/>
-          </a:lnRef>
-          <a:fillRef idx="0">
-            <a:schemeClr val="accent1"/>
-          </a:fillRef>
-          <a:effectRef idx="0">
-            <a:schemeClr val="accent1"/>
-          </a:effectRef>
-          <a:fontRef idx="minor">
-            <a:schemeClr val="tx1"/>
-          </a:fontRef>
-        </p:style>
-      </p:cxnSp>
-      <p:sp>
-        <p:nvSpPr>
-          <p:cNvPr id="393" name="Rectangle 392">
-            <a:extLst>
-              <a:ext uri="{FF2B5EF4-FFF2-40B4-BE49-F238E27FC236}">
-                <a16:creationId xmlns:a16="http://schemas.microsoft.com/office/drawing/2014/main" id="{AEB167D4-E8EA-402E-9ABC-2FAA715DAFE6}"/>
-              </a:ext>
-            </a:extLst>
-          </p:cNvPr>
-          <p:cNvSpPr/>
-          <p:nvPr/>
-        </p:nvSpPr>
-        <p:spPr>
-          <a:xfrm>
-            <a:off x="8314694" y="6260994"/>
-            <a:ext cx="1240231" cy="486032"/>
-          </a:xfrm>
-          <a:prstGeom prst="rect">
-            <a:avLst/>
-          </a:prstGeom>
-          <a:solidFill>
-            <a:srgbClr val="CCCCFF"/>
-          </a:solidFill>
-        </p:spPr>
-        <p:style>
-          <a:lnRef idx="2">
-            <a:schemeClr val="accent1">
-              <a:shade val="50000"/>
-            </a:schemeClr>
-          </a:lnRef>
-          <a:fillRef idx="1">
-            <a:schemeClr val="accent1"/>
-          </a:fillRef>
-          <a:effectRef idx="0">
-            <a:schemeClr val="accent1"/>
-          </a:effectRef>
-          <a:fontRef idx="minor">
-            <a:schemeClr val="lt1"/>
-          </a:fontRef>
-        </p:style>
-        <p:txBody>
-          <a:bodyPr rtlCol="0" anchor="ctr"/>
-          <a:lstStyle/>
-          <a:p>
-            <a:pPr algn="ctr"/>
-            <a:r>
-              <a:rPr lang="en-GB" sz="1200" dirty="0" err="1"/>
-              <a:t>RestfulObjects</a:t>
-            </a:r>
-            <a:br>
-              <a:rPr lang="en-GB" sz="1200" dirty="0"/>
-            </a:br>
-            <a:r>
-              <a:rPr lang="en-GB" sz="1200" dirty="0"/>
-              <a:t>JaxrsResteasy4</a:t>
-            </a:r>
-          </a:p>
-        </p:txBody>
-      </p:sp>
-      <p:cxnSp>
-        <p:nvCxnSpPr>
-          <p:cNvPr id="394" name="Connector: Curved 393">
-            <a:extLst>
-              <a:ext uri="{FF2B5EF4-FFF2-40B4-BE49-F238E27FC236}">
-                <a16:creationId xmlns:a16="http://schemas.microsoft.com/office/drawing/2014/main" id="{1BFB8B8B-A096-44B4-AE4B-E6D918BEB432}"/>
-              </a:ext>
-            </a:extLst>
-          </p:cNvPr>
-          <p:cNvCxnSpPr>
-            <a:cxnSpLocks/>
-            <a:stCxn id="393" idx="1"/>
-            <a:endCxn id="18" idx="3"/>
-          </p:cNvCxnSpPr>
-          <p:nvPr/>
-        </p:nvCxnSpPr>
-        <p:spPr>
-          <a:xfrm rot="10800000">
-            <a:off x="7879496" y="5896090"/>
-            <a:ext cx="435199" cy="607920"/>
+            <a:off x="5578127" y="3005072"/>
+            <a:ext cx="3305189" cy="2158463"/>
           </a:xfrm>
           <a:prstGeom prst="curvedConnector3">
             <a:avLst>
@@ -7544,24 +8577,24 @@
       </p:cxnSp>
       <p:cxnSp>
         <p:nvCxnSpPr>
-          <p:cNvPr id="505" name="Connector: Curved 504">
-            <a:extLst>
-              <a:ext uri="{FF2B5EF4-FFF2-40B4-BE49-F238E27FC236}">
-                <a16:creationId xmlns:a16="http://schemas.microsoft.com/office/drawing/2014/main" id="{8F2A31F5-3BFB-46BE-BFB4-556309DB43D0}"/>
+          <p:cNvPr id="27" name="Connector: Curved 26">
+            <a:extLst>
+              <a:ext uri="{FF2B5EF4-FFF2-40B4-BE49-F238E27FC236}">
+                <a16:creationId xmlns:a16="http://schemas.microsoft.com/office/drawing/2014/main" id="{48479D4A-1585-4427-8B90-80F900C5789B}"/>
               </a:ext>
             </a:extLst>
           </p:cNvPr>
           <p:cNvCxnSpPr>
             <a:cxnSpLocks/>
-            <a:stCxn id="148" idx="1"/>
-            <a:endCxn id="75" idx="3"/>
+            <a:stCxn id="18" idx="1"/>
+            <a:endCxn id="521" idx="6"/>
           </p:cNvCxnSpPr>
           <p:nvPr/>
         </p:nvCxnSpPr>
         <p:spPr>
-          <a:xfrm rot="10800000" flipV="1">
-            <a:off x="1318761" y="426038"/>
-            <a:ext cx="1638806" cy="2007638"/>
+          <a:xfrm rot="10800000">
+            <a:off x="9526775" y="3777296"/>
+            <a:ext cx="935293" cy="1134622"/>
           </a:xfrm>
           <a:prstGeom prst="curvedConnector3">
             <a:avLst>
@@ -7569,399 +8602,6 @@
             </a:avLst>
           </a:prstGeom>
           <a:ln>
-            <a:prstDash val="solid"/>
-            <a:tailEnd type="triangle"/>
-          </a:ln>
-        </p:spPr>
-        <p:style>
-          <a:lnRef idx="1">
-            <a:schemeClr val="accent1"/>
-          </a:lnRef>
-          <a:fillRef idx="0">
-            <a:schemeClr val="accent1"/>
-          </a:fillRef>
-          <a:effectRef idx="0">
-            <a:schemeClr val="accent1"/>
-          </a:effectRef>
-          <a:fontRef idx="minor">
-            <a:schemeClr val="tx1"/>
-          </a:fontRef>
-        </p:style>
-      </p:cxnSp>
-      <p:sp>
-        <p:nvSpPr>
-          <p:cNvPr id="521" name="Oval 520">
-            <a:extLst>
-              <a:ext uri="{FF2B5EF4-FFF2-40B4-BE49-F238E27FC236}">
-                <a16:creationId xmlns:a16="http://schemas.microsoft.com/office/drawing/2014/main" id="{7D1F11B8-B9C2-4F6D-9C46-3AB1762CEFC5}"/>
-              </a:ext>
-            </a:extLst>
-          </p:cNvPr>
-          <p:cNvSpPr/>
-          <p:nvPr/>
-        </p:nvSpPr>
-        <p:spPr>
-          <a:xfrm>
-            <a:off x="5659739" y="4366858"/>
-            <a:ext cx="143114" cy="189310"/>
-          </a:xfrm>
-          <a:prstGeom prst="ellipse">
-            <a:avLst/>
-          </a:prstGeom>
-        </p:spPr>
-        <p:style>
-          <a:lnRef idx="2">
-            <a:schemeClr val="accent6"/>
-          </a:lnRef>
-          <a:fillRef idx="1">
-            <a:schemeClr val="lt1"/>
-          </a:fillRef>
-          <a:effectRef idx="0">
-            <a:schemeClr val="accent6"/>
-          </a:effectRef>
-          <a:fontRef idx="minor">
-            <a:schemeClr val="dk1"/>
-          </a:fontRef>
-        </p:style>
-        <p:txBody>
-          <a:bodyPr rtlCol="0" anchor="ctr"/>
-          <a:lstStyle/>
-          <a:p>
-            <a:pPr algn="ctr"/>
-            <a:endParaRPr lang="en-GB"/>
-          </a:p>
-        </p:txBody>
-      </p:sp>
-      <p:cxnSp>
-        <p:nvCxnSpPr>
-          <p:cNvPr id="522" name="Connector: Curved 521">
-            <a:extLst>
-              <a:ext uri="{FF2B5EF4-FFF2-40B4-BE49-F238E27FC236}">
-                <a16:creationId xmlns:a16="http://schemas.microsoft.com/office/drawing/2014/main" id="{25DABAE5-C463-4610-A46E-D5DD6AE7270E}"/>
-              </a:ext>
-            </a:extLst>
-          </p:cNvPr>
-          <p:cNvCxnSpPr>
-            <a:cxnSpLocks/>
-            <a:stCxn id="521" idx="2"/>
-            <a:endCxn id="20" idx="3"/>
-          </p:cNvCxnSpPr>
-          <p:nvPr/>
-        </p:nvCxnSpPr>
-        <p:spPr>
-          <a:xfrm rot="10800000">
-            <a:off x="5484091" y="4195961"/>
-            <a:ext cx="175648" cy="265553"/>
-          </a:xfrm>
-          <a:prstGeom prst="curvedConnector3">
-            <a:avLst>
-              <a:gd name="adj1" fmla="val 50000"/>
-            </a:avLst>
-          </a:prstGeom>
-          <a:ln>
-            <a:prstDash val="solid"/>
-            <a:tailEnd type="triangle"/>
-          </a:ln>
-        </p:spPr>
-        <p:style>
-          <a:lnRef idx="1">
-            <a:schemeClr val="accent1"/>
-          </a:lnRef>
-          <a:fillRef idx="0">
-            <a:schemeClr val="accent1"/>
-          </a:fillRef>
-          <a:effectRef idx="0">
-            <a:schemeClr val="accent1"/>
-          </a:effectRef>
-          <a:fontRef idx="minor">
-            <a:schemeClr val="tx1"/>
-          </a:fontRef>
-        </p:style>
-      </p:cxnSp>
-      <p:sp>
-        <p:nvSpPr>
-          <p:cNvPr id="550" name="Rectangle 549">
-            <a:extLst>
-              <a:ext uri="{FF2B5EF4-FFF2-40B4-BE49-F238E27FC236}">
-                <a16:creationId xmlns:a16="http://schemas.microsoft.com/office/drawing/2014/main" id="{1581F3F0-4C9E-4C78-B17D-2E2AAEAB87A5}"/>
-              </a:ext>
-            </a:extLst>
-          </p:cNvPr>
-          <p:cNvSpPr/>
-          <p:nvPr/>
-        </p:nvSpPr>
-        <p:spPr>
-          <a:xfrm>
-            <a:off x="4514248" y="5442354"/>
-            <a:ext cx="1240231" cy="486032"/>
-          </a:xfrm>
-          <a:prstGeom prst="rect">
-            <a:avLst/>
-          </a:prstGeom>
-        </p:spPr>
-        <p:style>
-          <a:lnRef idx="2">
-            <a:schemeClr val="accent1">
-              <a:shade val="50000"/>
-            </a:schemeClr>
-          </a:lnRef>
-          <a:fillRef idx="1">
-            <a:schemeClr val="accent1"/>
-          </a:fillRef>
-          <a:effectRef idx="0">
-            <a:schemeClr val="accent1"/>
-          </a:effectRef>
-          <a:fontRef idx="minor">
-            <a:schemeClr val="lt1"/>
-          </a:fontRef>
-        </p:style>
-        <p:txBody>
-          <a:bodyPr rtlCol="0" anchor="ctr"/>
-          <a:lstStyle/>
-          <a:p>
-            <a:pPr algn="ctr"/>
-            <a:r>
-              <a:rPr lang="en-GB" sz="1200" dirty="0"/>
-              <a:t>Wicket</a:t>
-            </a:r>
-            <a:br>
-              <a:rPr lang="en-GB" sz="1200" dirty="0"/>
-            </a:br>
-            <a:r>
-              <a:rPr lang="en-GB" sz="1200" dirty="0"/>
-              <a:t>Ui</a:t>
-            </a:r>
-          </a:p>
-        </p:txBody>
-      </p:sp>
-      <p:sp>
-        <p:nvSpPr>
-          <p:cNvPr id="551" name="Rectangle 550">
-            <a:extLst>
-              <a:ext uri="{FF2B5EF4-FFF2-40B4-BE49-F238E27FC236}">
-                <a16:creationId xmlns:a16="http://schemas.microsoft.com/office/drawing/2014/main" id="{099749A5-083C-4771-835B-AB868F588926}"/>
-              </a:ext>
-            </a:extLst>
-          </p:cNvPr>
-          <p:cNvSpPr/>
-          <p:nvPr/>
-        </p:nvSpPr>
-        <p:spPr>
-          <a:xfrm>
-            <a:off x="4514248" y="4797386"/>
-            <a:ext cx="1240231" cy="486032"/>
-          </a:xfrm>
-          <a:prstGeom prst="rect">
-            <a:avLst/>
-          </a:prstGeom>
-        </p:spPr>
-        <p:style>
-          <a:lnRef idx="2">
-            <a:schemeClr val="accent1">
-              <a:shade val="50000"/>
-            </a:schemeClr>
-          </a:lnRef>
-          <a:fillRef idx="1">
-            <a:schemeClr val="accent1"/>
-          </a:fillRef>
-          <a:effectRef idx="0">
-            <a:schemeClr val="accent1"/>
-          </a:effectRef>
-          <a:fontRef idx="minor">
-            <a:schemeClr val="lt1"/>
-          </a:fontRef>
-        </p:style>
-        <p:txBody>
-          <a:bodyPr rtlCol="0" anchor="ctr"/>
-          <a:lstStyle/>
-          <a:p>
-            <a:pPr algn="ctr"/>
-            <a:r>
-              <a:rPr lang="en-GB" sz="1200" dirty="0"/>
-              <a:t>Wicket</a:t>
-            </a:r>
-            <a:br>
-              <a:rPr lang="en-GB" sz="1200" dirty="0"/>
-            </a:br>
-            <a:r>
-              <a:rPr lang="en-GB" sz="1200" dirty="0"/>
-              <a:t>Model</a:t>
-            </a:r>
-          </a:p>
-        </p:txBody>
-      </p:sp>
-      <p:cxnSp>
-        <p:nvCxnSpPr>
-          <p:cNvPr id="552" name="Connector: Curved 551">
-            <a:extLst>
-              <a:ext uri="{FF2B5EF4-FFF2-40B4-BE49-F238E27FC236}">
-                <a16:creationId xmlns:a16="http://schemas.microsoft.com/office/drawing/2014/main" id="{7B7AC35E-02B7-4EB6-804A-2F1E76B1DB52}"/>
-              </a:ext>
-            </a:extLst>
-          </p:cNvPr>
-          <p:cNvCxnSpPr>
-            <a:cxnSpLocks/>
-            <a:stCxn id="550" idx="1"/>
-            <a:endCxn id="551" idx="3"/>
-          </p:cNvCxnSpPr>
-          <p:nvPr/>
-        </p:nvCxnSpPr>
-        <p:spPr>
-          <a:xfrm rot="10800000" flipH="1">
-            <a:off x="4514247" y="5040402"/>
-            <a:ext cx="1240231" cy="644968"/>
-          </a:xfrm>
-          <a:prstGeom prst="curvedConnector5">
-            <a:avLst>
-              <a:gd name="adj1" fmla="val -18432"/>
-              <a:gd name="adj2" fmla="val 50000"/>
-              <a:gd name="adj3" fmla="val 118432"/>
-            </a:avLst>
-          </a:prstGeom>
-          <a:ln>
-            <a:prstDash val="solid"/>
-            <a:tailEnd type="triangle"/>
-          </a:ln>
-        </p:spPr>
-        <p:style>
-          <a:lnRef idx="1">
-            <a:schemeClr val="accent1"/>
-          </a:lnRef>
-          <a:fillRef idx="0">
-            <a:schemeClr val="accent1"/>
-          </a:fillRef>
-          <a:effectRef idx="0">
-            <a:schemeClr val="accent1"/>
-          </a:effectRef>
-          <a:fontRef idx="minor">
-            <a:schemeClr val="tx1"/>
-          </a:fontRef>
-        </p:style>
-      </p:cxnSp>
-      <p:cxnSp>
-        <p:nvCxnSpPr>
-          <p:cNvPr id="560" name="Connector: Curved 559">
-            <a:extLst>
-              <a:ext uri="{FF2B5EF4-FFF2-40B4-BE49-F238E27FC236}">
-                <a16:creationId xmlns:a16="http://schemas.microsoft.com/office/drawing/2014/main" id="{39CE9CC6-4BF8-4DF9-AEC5-2AD4A0DE4274}"/>
-              </a:ext>
-            </a:extLst>
-          </p:cNvPr>
-          <p:cNvCxnSpPr>
-            <a:cxnSpLocks/>
-            <a:stCxn id="17" idx="1"/>
-            <a:endCxn id="550" idx="3"/>
-          </p:cNvCxnSpPr>
-          <p:nvPr/>
-        </p:nvCxnSpPr>
-        <p:spPr>
-          <a:xfrm rot="10800000" flipV="1">
-            <a:off x="5754480" y="5296590"/>
-            <a:ext cx="884785" cy="388780"/>
-          </a:xfrm>
-          <a:prstGeom prst="curvedConnector3">
-            <a:avLst>
-              <a:gd name="adj1" fmla="val 50000"/>
-            </a:avLst>
-          </a:prstGeom>
-          <a:ln>
-            <a:prstDash val="solid"/>
-            <a:tailEnd type="triangle"/>
-          </a:ln>
-        </p:spPr>
-        <p:style>
-          <a:lnRef idx="1">
-            <a:schemeClr val="accent1"/>
-          </a:lnRef>
-          <a:fillRef idx="0">
-            <a:schemeClr val="accent1"/>
-          </a:fillRef>
-          <a:effectRef idx="0">
-            <a:schemeClr val="accent1"/>
-          </a:effectRef>
-          <a:fontRef idx="minor">
-            <a:schemeClr val="tx1"/>
-          </a:fontRef>
-        </p:style>
-      </p:cxnSp>
-      <p:cxnSp>
-        <p:nvCxnSpPr>
-          <p:cNvPr id="571" name="Connector: Curved 570">
-            <a:extLst>
-              <a:ext uri="{FF2B5EF4-FFF2-40B4-BE49-F238E27FC236}">
-                <a16:creationId xmlns:a16="http://schemas.microsoft.com/office/drawing/2014/main" id="{B8AEA742-547C-4667-A497-D7376F01779A}"/>
-              </a:ext>
-            </a:extLst>
-          </p:cNvPr>
-          <p:cNvCxnSpPr>
-            <a:cxnSpLocks/>
-            <a:stCxn id="551" idx="1"/>
-            <a:endCxn id="521" idx="6"/>
-          </p:cNvCxnSpPr>
-          <p:nvPr/>
-        </p:nvCxnSpPr>
-        <p:spPr>
-          <a:xfrm rot="10800000" flipH="1">
-            <a:off x="4514247" y="4461514"/>
-            <a:ext cx="1288605" cy="578889"/>
-          </a:xfrm>
-          <a:prstGeom prst="curvedConnector5">
-            <a:avLst>
-              <a:gd name="adj1" fmla="val -17740"/>
-              <a:gd name="adj2" fmla="val 62814"/>
-              <a:gd name="adj3" fmla="val 106702"/>
-            </a:avLst>
-          </a:prstGeom>
-          <a:ln>
-            <a:prstDash val="solid"/>
-            <a:tailEnd type="triangle"/>
-          </a:ln>
-        </p:spPr>
-        <p:style>
-          <a:lnRef idx="1">
-            <a:schemeClr val="accent1"/>
-          </a:lnRef>
-          <a:fillRef idx="0">
-            <a:schemeClr val="accent1"/>
-          </a:fillRef>
-          <a:effectRef idx="0">
-            <a:schemeClr val="accent1"/>
-          </a:effectRef>
-          <a:fontRef idx="minor">
-            <a:schemeClr val="tx1"/>
-          </a:fontRef>
-        </p:style>
-      </p:cxnSp>
-      <p:cxnSp>
-        <p:nvCxnSpPr>
-          <p:cNvPr id="577" name="Connector: Curved 576">
-            <a:extLst>
-              <a:ext uri="{FF2B5EF4-FFF2-40B4-BE49-F238E27FC236}">
-                <a16:creationId xmlns:a16="http://schemas.microsoft.com/office/drawing/2014/main" id="{EAC3244F-4ED5-40E4-9D3C-5AD1F2A9784D}"/>
-              </a:ext>
-            </a:extLst>
-          </p:cNvPr>
-          <p:cNvCxnSpPr>
-            <a:cxnSpLocks/>
-            <a:stCxn id="20" idx="1"/>
-            <a:endCxn id="83" idx="3"/>
-          </p:cNvCxnSpPr>
-          <p:nvPr/>
-        </p:nvCxnSpPr>
-        <p:spPr>
-          <a:xfrm rot="10800000" flipH="1">
-            <a:off x="4243860" y="2038744"/>
-            <a:ext cx="84256" cy="2157216"/>
-          </a:xfrm>
-          <a:prstGeom prst="curvedConnector5">
-            <a:avLst>
-              <a:gd name="adj1" fmla="val -271316"/>
-              <a:gd name="adj2" fmla="val 50000"/>
-              <a:gd name="adj3" fmla="val 371316"/>
-            </a:avLst>
-          </a:prstGeom>
-          <a:ln>
-            <a:prstDash val="solid"/>
             <a:tailEnd type="triangle"/>
           </a:ln>
         </p:spPr>
@@ -7983,7 +8623,7 @@
     </p:spTree>
     <p:extLst>
       <p:ext uri="{BB962C8B-B14F-4D97-AF65-F5344CB8AC3E}">
-        <p14:creationId xmlns:p14="http://schemas.microsoft.com/office/powerpoint/2010/main" val="2252395404"/>
+        <p14:creationId xmlns:p14="http://schemas.microsoft.com/office/powerpoint/2010/main" val="264493912"/>
       </p:ext>
     </p:extLst>
   </p:cSld>

</xml_diff>

<commit_message>
ISIS-2259: search-n-replace text references to isis.apache.isis where missing "core" as the next bit.
Also adds in some missing dependencies on core-commons and lombok.
</commit_message>
<xml_diff>
--- a/antora/components/core/modules/archdesign/attachments/isis-configurations-and-modules.pptx
+++ b/antora/components/core/modules/archdesign/attachments/isis-configurations-and-modules.pptx
@@ -262,7 +262,7 @@
           <a:p>
             <a:fld id="{3159BD86-569B-442C-ABE1-0B002BE59BAD}" type="datetimeFigureOut">
               <a:rPr lang="en-GB" smtClean="0"/>
-              <a:t>06/12/2019</a:t>
+              <a:t>10/01/2020</a:t>
             </a:fld>
             <a:endParaRPr lang="en-GB"/>
           </a:p>
@@ -462,7 +462,7 @@
           <a:p>
             <a:fld id="{3159BD86-569B-442C-ABE1-0B002BE59BAD}" type="datetimeFigureOut">
               <a:rPr lang="en-GB" smtClean="0"/>
-              <a:t>06/12/2019</a:t>
+              <a:t>10/01/2020</a:t>
             </a:fld>
             <a:endParaRPr lang="en-GB"/>
           </a:p>
@@ -672,7 +672,7 @@
           <a:p>
             <a:fld id="{3159BD86-569B-442C-ABE1-0B002BE59BAD}" type="datetimeFigureOut">
               <a:rPr lang="en-GB" smtClean="0"/>
-              <a:t>06/12/2019</a:t>
+              <a:t>10/01/2020</a:t>
             </a:fld>
             <a:endParaRPr lang="en-GB"/>
           </a:p>
@@ -872,7 +872,7 @@
           <a:p>
             <a:fld id="{3159BD86-569B-442C-ABE1-0B002BE59BAD}" type="datetimeFigureOut">
               <a:rPr lang="en-GB" smtClean="0"/>
-              <a:t>06/12/2019</a:t>
+              <a:t>10/01/2020</a:t>
             </a:fld>
             <a:endParaRPr lang="en-GB"/>
           </a:p>
@@ -1148,7 +1148,7 @@
           <a:p>
             <a:fld id="{3159BD86-569B-442C-ABE1-0B002BE59BAD}" type="datetimeFigureOut">
               <a:rPr lang="en-GB" smtClean="0"/>
-              <a:t>06/12/2019</a:t>
+              <a:t>10/01/2020</a:t>
             </a:fld>
             <a:endParaRPr lang="en-GB"/>
           </a:p>
@@ -1416,7 +1416,7 @@
           <a:p>
             <a:fld id="{3159BD86-569B-442C-ABE1-0B002BE59BAD}" type="datetimeFigureOut">
               <a:rPr lang="en-GB" smtClean="0"/>
-              <a:t>06/12/2019</a:t>
+              <a:t>10/01/2020</a:t>
             </a:fld>
             <a:endParaRPr lang="en-GB"/>
           </a:p>
@@ -1831,7 +1831,7 @@
           <a:p>
             <a:fld id="{3159BD86-569B-442C-ABE1-0B002BE59BAD}" type="datetimeFigureOut">
               <a:rPr lang="en-GB" smtClean="0"/>
-              <a:t>06/12/2019</a:t>
+              <a:t>10/01/2020</a:t>
             </a:fld>
             <a:endParaRPr lang="en-GB"/>
           </a:p>
@@ -1973,7 +1973,7 @@
           <a:p>
             <a:fld id="{3159BD86-569B-442C-ABE1-0B002BE59BAD}" type="datetimeFigureOut">
               <a:rPr lang="en-GB" smtClean="0"/>
-              <a:t>06/12/2019</a:t>
+              <a:t>10/01/2020</a:t>
             </a:fld>
             <a:endParaRPr lang="en-GB"/>
           </a:p>
@@ -2086,7 +2086,7 @@
           <a:p>
             <a:fld id="{3159BD86-569B-442C-ABE1-0B002BE59BAD}" type="datetimeFigureOut">
               <a:rPr lang="en-GB" smtClean="0"/>
-              <a:t>06/12/2019</a:t>
+              <a:t>10/01/2020</a:t>
             </a:fld>
             <a:endParaRPr lang="en-GB"/>
           </a:p>
@@ -2399,7 +2399,7 @@
           <a:p>
             <a:fld id="{3159BD86-569B-442C-ABE1-0B002BE59BAD}" type="datetimeFigureOut">
               <a:rPr lang="en-GB" smtClean="0"/>
-              <a:t>06/12/2019</a:t>
+              <a:t>10/01/2020</a:t>
             </a:fld>
             <a:endParaRPr lang="en-GB"/>
           </a:p>
@@ -2688,7 +2688,7 @@
           <a:p>
             <a:fld id="{3159BD86-569B-442C-ABE1-0B002BE59BAD}" type="datetimeFigureOut">
               <a:rPr lang="en-GB" smtClean="0"/>
-              <a:t>06/12/2019</a:t>
+              <a:t>10/01/2020</a:t>
             </a:fld>
             <a:endParaRPr lang="en-GB"/>
           </a:p>
@@ -2931,7 +2931,7 @@
           <a:p>
             <a:fld id="{3159BD86-569B-442C-ABE1-0B002BE59BAD}" type="datetimeFigureOut">
               <a:rPr lang="en-GB" smtClean="0"/>
-              <a:t>06/12/2019</a:t>
+              <a:t>10/01/2020</a:t>
             </a:fld>
             <a:endParaRPr lang="en-GB"/>
           </a:p>
@@ -5611,7 +5611,7 @@
             <a:pPr algn="ctr"/>
             <a:r>
               <a:rPr lang="en-GB" sz="1200" dirty="0" err="1"/>
-              <a:t>SpringBoot</a:t>
+              <a:t>WebSpringBoot</a:t>
             </a:r>
             <a:endParaRPr lang="en-GB" sz="1200" dirty="0"/>
           </a:p>

</xml_diff>

<commit_message>
ISIS-2259: more fixes to unit tests (string literals)
</commit_message>
<xml_diff>
--- a/antora/components/core/modules/archdesign/attachments/isis-configurations-and-modules.pptx
+++ b/antora/components/core/modules/archdesign/attachments/isis-configurations-and-modules.pptx
@@ -3813,7 +3813,7 @@
             <a:pPr algn="ctr"/>
             <a:r>
               <a:rPr lang="en-GB" sz="1200" dirty="0" err="1"/>
-              <a:t>SpringBoot</a:t>
+              <a:t>WebSpringBoot</a:t>
             </a:r>
             <a:endParaRPr lang="en-GB" sz="1200" dirty="0"/>
           </a:p>
@@ -6180,7 +6180,7 @@
         </p:nvSpPr>
         <p:spPr>
           <a:xfrm>
-            <a:off x="1785517" y="2258629"/>
+            <a:off x="2106872" y="2495073"/>
             <a:ext cx="1240231" cy="486032"/>
           </a:xfrm>
           <a:prstGeom prst="rect">
@@ -6289,8 +6289,8 @@
         </p:nvCxnSpPr>
         <p:spPr>
           <a:xfrm rot="10800000">
-            <a:off x="3025749" y="2501645"/>
-            <a:ext cx="1312147" cy="503426"/>
+            <a:off x="3347103" y="2738089"/>
+            <a:ext cx="990792" cy="266982"/>
           </a:xfrm>
           <a:prstGeom prst="curvedConnector3">
             <a:avLst>
@@ -6331,7 +6331,7 @@
         </p:nvSpPr>
         <p:spPr>
           <a:xfrm>
-            <a:off x="121764" y="3044430"/>
+            <a:off x="203770" y="3257649"/>
             <a:ext cx="1240231" cy="486032"/>
           </a:xfrm>
           <a:prstGeom prst="rect">
@@ -6441,8 +6441,8 @@
         </p:nvCxnSpPr>
         <p:spPr>
           <a:xfrm rot="10800000" flipV="1">
-            <a:off x="1361995" y="2501644"/>
-            <a:ext cx="423522" cy="785801"/>
+            <a:off x="1444002" y="2738089"/>
+            <a:ext cx="662871" cy="762576"/>
           </a:xfrm>
           <a:prstGeom prst="curvedConnector3">
             <a:avLst>
@@ -6483,7 +6483,7 @@
         </p:nvSpPr>
         <p:spPr>
           <a:xfrm>
-            <a:off x="218107" y="2751154"/>
+            <a:off x="300113" y="2964373"/>
             <a:ext cx="2240013" cy="253916"/>
           </a:xfrm>
           <a:prstGeom prst="rect">
@@ -6803,7 +6803,7 @@
         </p:nvSpPr>
         <p:spPr>
           <a:xfrm>
-            <a:off x="218107" y="1534143"/>
+            <a:off x="271329" y="2038932"/>
             <a:ext cx="1240231" cy="486032"/>
           </a:xfrm>
           <a:prstGeom prst="rect">
@@ -6856,8 +6856,8 @@
         </p:nvCxnSpPr>
         <p:spPr>
           <a:xfrm rot="10800000">
-            <a:off x="1458339" y="1777159"/>
-            <a:ext cx="327179" cy="724486"/>
+            <a:off x="1511560" y="2281949"/>
+            <a:ext cx="595312" cy="456141"/>
           </a:xfrm>
           <a:prstGeom prst="curvedConnector3">
             <a:avLst>
@@ -6954,7 +6954,7 @@
         </p:nvSpPr>
         <p:spPr>
           <a:xfrm>
-            <a:off x="1849040" y="702000"/>
+            <a:off x="495604" y="474017"/>
             <a:ext cx="1240231" cy="486032"/>
           </a:xfrm>
           <a:prstGeom prst="rect">
@@ -7000,15 +7000,15 @@
           </p:cNvPr>
           <p:cNvCxnSpPr>
             <a:cxnSpLocks/>
-            <a:stCxn id="78" idx="1"/>
+            <a:stCxn id="80" idx="1"/>
             <a:endCxn id="75" idx="3"/>
           </p:cNvCxnSpPr>
           <p:nvPr/>
         </p:nvCxnSpPr>
         <p:spPr>
           <a:xfrm rot="10800000" flipV="1">
-            <a:off x="1458338" y="945015"/>
-            <a:ext cx="390702" cy="832143"/>
+            <a:off x="1511560" y="1769388"/>
+            <a:ext cx="1096420" cy="512559"/>
           </a:xfrm>
           <a:prstGeom prst="curvedConnector3">
             <a:avLst>
@@ -7016,7 +7016,7 @@
             </a:avLst>
           </a:prstGeom>
           <a:ln>
-            <a:prstDash val="solid"/>
+            <a:prstDash val="dash"/>
             <a:tailEnd type="triangle"/>
           </a:ln>
         </p:spPr>
@@ -7052,15 +7052,13 @@
           <p:nvPr/>
         </p:nvCxnSpPr>
         <p:spPr>
-          <a:xfrm rot="10800000" flipH="1">
-            <a:off x="2607979" y="945017"/>
-            <a:ext cx="481291" cy="824373"/>
-          </a:xfrm>
-          <a:prstGeom prst="curvedConnector5">
+          <a:xfrm rot="10800000">
+            <a:off x="1735836" y="717033"/>
+            <a:ext cx="872145" cy="1052356"/>
+          </a:xfrm>
+          <a:prstGeom prst="curvedConnector3">
             <a:avLst>
-              <a:gd name="adj1" fmla="val -47497"/>
-              <a:gd name="adj2" fmla="val 50000"/>
-              <a:gd name="adj3" fmla="val 147497"/>
+              <a:gd name="adj1" fmla="val 50000"/>
             </a:avLst>
           </a:prstGeom>
           <a:ln>
@@ -7097,7 +7095,7 @@
         </p:nvSpPr>
         <p:spPr>
           <a:xfrm>
-            <a:off x="2326804" y="3675337"/>
+            <a:off x="2408810" y="3888556"/>
             <a:ext cx="1240231" cy="486032"/>
           </a:xfrm>
           <a:prstGeom prst="rect">
@@ -7158,8 +7156,8 @@
         </p:nvCxnSpPr>
         <p:spPr>
           <a:xfrm rot="10800000" flipV="1">
-            <a:off x="3567035" y="3005071"/>
-            <a:ext cx="770860" cy="913282"/>
+            <a:off x="3649041" y="3005070"/>
+            <a:ext cx="688854" cy="1126501"/>
           </a:xfrm>
           <a:prstGeom prst="curvedConnector3">
             <a:avLst>
@@ -8620,6 +8618,41 @@
           </a:fontRef>
         </p:style>
       </p:cxnSp>
+      <p:sp>
+        <p:nvSpPr>
+          <p:cNvPr id="66" name="TextBox 65">
+            <a:extLst>
+              <a:ext uri="{FF2B5EF4-FFF2-40B4-BE49-F238E27FC236}">
+                <a16:creationId xmlns:a16="http://schemas.microsoft.com/office/drawing/2014/main" id="{DCF79E91-6633-44BD-8465-695BA07DE122}"/>
+              </a:ext>
+            </a:extLst>
+          </p:cNvPr>
+          <p:cNvSpPr txBox="1"/>
+          <p:nvPr/>
+        </p:nvSpPr>
+        <p:spPr>
+          <a:xfrm>
+            <a:off x="1313606" y="1599625"/>
+            <a:ext cx="2240013" cy="253916"/>
+          </a:xfrm>
+          <a:prstGeom prst="rect">
+            <a:avLst/>
+          </a:prstGeom>
+          <a:noFill/>
+        </p:spPr>
+        <p:txBody>
+          <a:bodyPr wrap="square" rtlCol="0">
+            <a:spAutoFit/>
+          </a:bodyPr>
+          <a:lstStyle/>
+          <a:p>
+            <a:r>
+              <a:rPr lang="en-GB" sz="1050" dirty="0"/>
+              <a:t>scope=provided</a:t>
+            </a:r>
+          </a:p>
+        </p:txBody>
+      </p:sp>
     </p:spTree>
     <p:extLst>
       <p:ext uri="{BB962C8B-B14F-4D97-AF65-F5344CB8AC3E}">

</xml_diff>